<commit_message>
Added link to LLILC for slide deck
</commit_message>
<xml_diff>
--- a/RoslynAndYou.pptx
+++ b/RoslynAndYou.pptx
@@ -1679,33 +1679,33 @@
     </dgm:pt>
   </dgm:ptLst>
   <dgm:cxnLst>
+    <dgm:cxn modelId="{C6DCB072-4394-4062-AE87-BC3F79818562}" srcId="{1002025F-1C72-4A21-ADB8-7F4B762D0701}" destId="{AC1EF113-D03B-420E-911E-B92C916ACEDF}" srcOrd="0" destOrd="0" parTransId="{3596FEFB-719F-4095-B6C5-079E00E3C72E}" sibTransId="{E3F70FB8-8A18-4458-9266-24A45CFE504C}"/>
+    <dgm:cxn modelId="{DCD357E6-3B99-4AC3-A81E-1D8E5B28EA4A}" type="presOf" srcId="{329A6205-D92F-4A22-8653-055AF4549D01}" destId="{99404815-EBB5-40EA-B4FB-18C60F71A14A}" srcOrd="0" destOrd="0" presId="urn:microsoft.com/office/officeart/2005/8/layout/chevron2"/>
+    <dgm:cxn modelId="{003416AB-762C-4B98-B62B-189A70C864B9}" srcId="{7EB9B65E-F1F1-4C0C-BCEF-84E7CC628B93}" destId="{2A98F07E-328C-46E7-8251-0118F4BFB566}" srcOrd="0" destOrd="0" parTransId="{2D9A8C24-217F-4619-992B-B0C2B61B4D2D}" sibTransId="{363DC761-3722-44DA-B104-F9B7A7D09A14}"/>
+    <dgm:cxn modelId="{0EAD68A0-D989-4A37-96EB-6EE2F661AA46}" srcId="{EE40FFF8-103D-4F45-B85F-403984910D7F}" destId="{1F8667CE-1C44-4E08-9A2B-FF616C613456}" srcOrd="2" destOrd="0" parTransId="{EACB439E-3988-4013-BCE0-44C4BC1A809E}" sibTransId="{8A1EDCB2-7721-4B0B-9ECE-0E0736CDE7BE}"/>
+    <dgm:cxn modelId="{9C44351A-EAC8-4F14-8B59-4465E6F4228A}" type="presOf" srcId="{95694C06-2B2B-4047-8F05-8E36FD842531}" destId="{114B75A6-06AB-4193-B4F9-C42AEDF360ED}" srcOrd="0" destOrd="0" presId="urn:microsoft.com/office/officeart/2005/8/layout/chevron2"/>
+    <dgm:cxn modelId="{06EF365C-2188-448C-B630-9BC4B2FABD60}" type="presOf" srcId="{95B1ADF6-2F93-4BE7-9AC4-D1E9AB468A86}" destId="{DC734305-151B-44F7-8A31-4DF6B9EFACF5}" srcOrd="0" destOrd="0" presId="urn:microsoft.com/office/officeart/2005/8/layout/chevron2"/>
+    <dgm:cxn modelId="{CA01A593-1FA6-4083-B431-989E97B542B1}" type="presOf" srcId="{A3920C65-3F7C-48E9-ACE8-6414D7482E18}" destId="{BBC3BD6A-454F-4CAA-A5C0-8F47CE19C2CC}" srcOrd="0" destOrd="0" presId="urn:microsoft.com/office/officeart/2005/8/layout/chevron2"/>
+    <dgm:cxn modelId="{0103D843-07BC-46D7-B5CF-881EB1990E31}" type="presOf" srcId="{55AF256D-980F-4EAC-BDE3-A1B7BB810149}" destId="{FF38E5F5-B2ED-46F9-98AC-B8A051288B43}" srcOrd="0" destOrd="0" presId="urn:microsoft.com/office/officeart/2005/8/layout/chevron2"/>
+    <dgm:cxn modelId="{6B6AEED6-C8AB-41D1-9284-C186433F0B1E}" type="presOf" srcId="{EADE0D2D-1205-40C5-86CE-1D93146D1A90}" destId="{540CB1EA-7FE9-4D73-A499-E9A4351FFD87}" srcOrd="0" destOrd="0" presId="urn:microsoft.com/office/officeart/2005/8/layout/chevron2"/>
     <dgm:cxn modelId="{A58080E9-33CB-4C07-920E-0A056786FE89}" srcId="{55AF256D-980F-4EAC-BDE3-A1B7BB810149}" destId="{329A6205-D92F-4A22-8653-055AF4549D01}" srcOrd="0" destOrd="0" parTransId="{BEC259D7-C0D1-4807-BF6D-B18A5084B23F}" sibTransId="{26A8870A-A98F-4E04-8A52-D7615622D8D3}"/>
-    <dgm:cxn modelId="{06EF365C-2188-448C-B630-9BC4B2FABD60}" type="presOf" srcId="{95B1ADF6-2F93-4BE7-9AC4-D1E9AB468A86}" destId="{DC734305-151B-44F7-8A31-4DF6B9EFACF5}" srcOrd="0" destOrd="0" presId="urn:microsoft.com/office/officeart/2005/8/layout/chevron2"/>
-    <dgm:cxn modelId="{6B6AEED6-C8AB-41D1-9284-C186433F0B1E}" type="presOf" srcId="{EADE0D2D-1205-40C5-86CE-1D93146D1A90}" destId="{540CB1EA-7FE9-4D73-A499-E9A4351FFD87}" srcOrd="0" destOrd="0" presId="urn:microsoft.com/office/officeart/2005/8/layout/chevron2"/>
-    <dgm:cxn modelId="{CA01A593-1FA6-4083-B431-989E97B542B1}" type="presOf" srcId="{A3920C65-3F7C-48E9-ACE8-6414D7482E18}" destId="{BBC3BD6A-454F-4CAA-A5C0-8F47CE19C2CC}" srcOrd="0" destOrd="0" presId="urn:microsoft.com/office/officeart/2005/8/layout/chevron2"/>
+    <dgm:cxn modelId="{4CB8A257-4370-4096-875D-308C3EB6A12E}" srcId="{1F8667CE-1C44-4E08-9A2B-FF616C613456}" destId="{95694C06-2B2B-4047-8F05-8E36FD842531}" srcOrd="0" destOrd="0" parTransId="{94B991CB-22F8-4502-8602-4106C506106C}" sibTransId="{9F3061E0-B093-4D7C-9680-103D4FEDC06A}"/>
+    <dgm:cxn modelId="{F232DB0F-D1DA-4851-84BA-3F5473E143D9}" srcId="{EE40FFF8-103D-4F45-B85F-403984910D7F}" destId="{295C1A26-C0BB-4CC5-A7C3-C9BB31F1079B}" srcOrd="5" destOrd="0" parTransId="{CCADCD90-BF8B-4450-868B-55E107F5E97C}" sibTransId="{2FF0FE31-AA20-4E75-AC28-31F2605A195E}"/>
+    <dgm:cxn modelId="{58354AFC-FF9F-4168-953F-3495D229016B}" srcId="{EE40FFF8-103D-4F45-B85F-403984910D7F}" destId="{EADE0D2D-1205-40C5-86CE-1D93146D1A90}" srcOrd="3" destOrd="0" parTransId="{1313A02D-916B-4376-9187-E1513360A3B7}" sibTransId="{FE89EA1D-5BF4-4389-891E-1C4333E940F1}"/>
+    <dgm:cxn modelId="{91C181B8-EF46-47FF-908C-8CEFA6F32B8D}" type="presOf" srcId="{7EB9B65E-F1F1-4C0C-BCEF-84E7CC628B93}" destId="{5830255F-49E8-44C9-A5BD-24B9CDC2A666}" srcOrd="0" destOrd="0" presId="urn:microsoft.com/office/officeart/2005/8/layout/chevron2"/>
+    <dgm:cxn modelId="{F95291AB-9FCB-45A0-9370-1BE1E020A44C}" type="presOf" srcId="{CED0AB39-B94A-4134-95E2-43EA72704BE0}" destId="{DAD2E2F8-54E6-4FAE-A9BD-86AF88168CB8}" srcOrd="0" destOrd="0" presId="urn:microsoft.com/office/officeart/2005/8/layout/chevron2"/>
+    <dgm:cxn modelId="{6C1D7293-C30D-4549-AED5-F126A7367255}" srcId="{EADE0D2D-1205-40C5-86CE-1D93146D1A90}" destId="{CED0AB39-B94A-4134-95E2-43EA72704BE0}" srcOrd="0" destOrd="0" parTransId="{80922B93-8062-40AC-9F4A-4357962A9003}" sibTransId="{CD781B07-49E8-4330-97C4-09871056819B}"/>
     <dgm:cxn modelId="{4ED9D936-B292-48D0-8935-08A116E8717A}" type="presOf" srcId="{1002025F-1C72-4A21-ADB8-7F4B762D0701}" destId="{D87B602B-E23A-4814-B38E-6089C0F57C7A}" srcOrd="0" destOrd="0" presId="urn:microsoft.com/office/officeart/2005/8/layout/chevron2"/>
-    <dgm:cxn modelId="{F95291AB-9FCB-45A0-9370-1BE1E020A44C}" type="presOf" srcId="{CED0AB39-B94A-4134-95E2-43EA72704BE0}" destId="{DAD2E2F8-54E6-4FAE-A9BD-86AF88168CB8}" srcOrd="0" destOrd="0" presId="urn:microsoft.com/office/officeart/2005/8/layout/chevron2"/>
+    <dgm:cxn modelId="{946299B6-2978-4AD5-9265-3EC1C4717D78}" type="presOf" srcId="{1F8667CE-1C44-4E08-9A2B-FF616C613456}" destId="{C8AD4FE8-2A6D-4A55-9C0A-17A337DE34C6}" srcOrd="0" destOrd="0" presId="urn:microsoft.com/office/officeart/2005/8/layout/chevron2"/>
     <dgm:cxn modelId="{0C3B6F2C-FC7D-432A-9C28-77B4A1C9C28E}" srcId="{EE40FFF8-103D-4F45-B85F-403984910D7F}" destId="{55AF256D-980F-4EAC-BDE3-A1B7BB810149}" srcOrd="0" destOrd="0" parTransId="{748A717C-599F-4C3A-B811-C08F8B1B0759}" sibTransId="{A0FA65F2-48E1-4C84-8387-4B40ABD643EF}"/>
-    <dgm:cxn modelId="{4CB8A257-4370-4096-875D-308C3EB6A12E}" srcId="{1F8667CE-1C44-4E08-9A2B-FF616C613456}" destId="{95694C06-2B2B-4047-8F05-8E36FD842531}" srcOrd="0" destOrd="0" parTransId="{94B991CB-22F8-4502-8602-4106C506106C}" sibTransId="{9F3061E0-B093-4D7C-9680-103D4FEDC06A}"/>
-    <dgm:cxn modelId="{C6DCB072-4394-4062-AE87-BC3F79818562}" srcId="{1002025F-1C72-4A21-ADB8-7F4B762D0701}" destId="{AC1EF113-D03B-420E-911E-B92C916ACEDF}" srcOrd="0" destOrd="0" parTransId="{3596FEFB-719F-4095-B6C5-079E00E3C72E}" sibTransId="{E3F70FB8-8A18-4458-9266-24A45CFE504C}"/>
+    <dgm:cxn modelId="{A4387B6C-47C1-43EA-AB0B-C9634E0707DB}" srcId="{EE40FFF8-103D-4F45-B85F-403984910D7F}" destId="{1002025F-1C72-4A21-ADB8-7F4B762D0701}" srcOrd="6" destOrd="0" parTransId="{765806DF-0E39-44E0-9A16-10384E41AC7A}" sibTransId="{70204279-0190-443C-A74E-BDAC0C260844}"/>
+    <dgm:cxn modelId="{37FBB0B3-8481-4EE8-82FF-FE2847EDC146}" srcId="{EE40FFF8-103D-4F45-B85F-403984910D7F}" destId="{7EB9B65E-F1F1-4C0C-BCEF-84E7CC628B93}" srcOrd="4" destOrd="0" parTransId="{C6EC86F0-2776-4AB7-AEC7-E5C672323418}" sibTransId="{E25BEE93-F45D-4AF9-8923-EC981D9554A2}"/>
+    <dgm:cxn modelId="{3FEC02A6-3B33-4CA3-A1B8-B28E86AA8748}" type="presOf" srcId="{EE40FFF8-103D-4F45-B85F-403984910D7F}" destId="{C0F71877-8D45-45C6-ADEB-A07688B38294}" srcOrd="0" destOrd="0" presId="urn:microsoft.com/office/officeart/2005/8/layout/chevron2"/>
+    <dgm:cxn modelId="{CE4F279D-9FF2-4D7D-9662-E2C36EFB7600}" type="presOf" srcId="{295C1A26-C0BB-4CC5-A7C3-C9BB31F1079B}" destId="{63437E7B-65DF-4A27-B708-B701FB2F2D97}" srcOrd="0" destOrd="0" presId="urn:microsoft.com/office/officeart/2005/8/layout/chevron2"/>
+    <dgm:cxn modelId="{26FA470A-BC9E-4344-9C68-21FB9BEFE51D}" type="presOf" srcId="{2A98F07E-328C-46E7-8251-0118F4BFB566}" destId="{7A703FAB-2697-4360-9F76-B04086C14C7D}" srcOrd="0" destOrd="0" presId="urn:microsoft.com/office/officeart/2005/8/layout/chevron2"/>
+    <dgm:cxn modelId="{D979ED70-DEDD-4FF2-A9F4-B36066266231}" srcId="{A3920C65-3F7C-48E9-ACE8-6414D7482E18}" destId="{95B1ADF6-2F93-4BE7-9AC4-D1E9AB468A86}" srcOrd="0" destOrd="0" parTransId="{8E7CC16E-DEE7-448C-9AE8-94347153FD45}" sibTransId="{8B39424F-A08A-4296-B69A-35544451D833}"/>
     <dgm:cxn modelId="{69986308-9F57-4347-842D-2BFBFAA33A8D}" srcId="{EE40FFF8-103D-4F45-B85F-403984910D7F}" destId="{A3920C65-3F7C-48E9-ACE8-6414D7482E18}" srcOrd="1" destOrd="0" parTransId="{0F08BE9B-F890-421A-B90E-90EC86276BFA}" sibTransId="{A84EAA2E-6FF3-4307-8D22-5FB6E0659300}"/>
-    <dgm:cxn modelId="{946299B6-2978-4AD5-9265-3EC1C4717D78}" type="presOf" srcId="{1F8667CE-1C44-4E08-9A2B-FF616C613456}" destId="{C8AD4FE8-2A6D-4A55-9C0A-17A337DE34C6}" srcOrd="0" destOrd="0" presId="urn:microsoft.com/office/officeart/2005/8/layout/chevron2"/>
-    <dgm:cxn modelId="{91C181B8-EF46-47FF-908C-8CEFA6F32B8D}" type="presOf" srcId="{7EB9B65E-F1F1-4C0C-BCEF-84E7CC628B93}" destId="{5830255F-49E8-44C9-A5BD-24B9CDC2A666}" srcOrd="0" destOrd="0" presId="urn:microsoft.com/office/officeart/2005/8/layout/chevron2"/>
-    <dgm:cxn modelId="{A4387B6C-47C1-43EA-AB0B-C9634E0707DB}" srcId="{EE40FFF8-103D-4F45-B85F-403984910D7F}" destId="{1002025F-1C72-4A21-ADB8-7F4B762D0701}" srcOrd="6" destOrd="0" parTransId="{765806DF-0E39-44E0-9A16-10384E41AC7A}" sibTransId="{70204279-0190-443C-A74E-BDAC0C260844}"/>
-    <dgm:cxn modelId="{CE4F279D-9FF2-4D7D-9662-E2C36EFB7600}" type="presOf" srcId="{295C1A26-C0BB-4CC5-A7C3-C9BB31F1079B}" destId="{63437E7B-65DF-4A27-B708-B701FB2F2D97}" srcOrd="0" destOrd="0" presId="urn:microsoft.com/office/officeart/2005/8/layout/chevron2"/>
-    <dgm:cxn modelId="{D979ED70-DEDD-4FF2-A9F4-B36066266231}" srcId="{A3920C65-3F7C-48E9-ACE8-6414D7482E18}" destId="{95B1ADF6-2F93-4BE7-9AC4-D1E9AB468A86}" srcOrd="0" destOrd="0" parTransId="{8E7CC16E-DEE7-448C-9AE8-94347153FD45}" sibTransId="{8B39424F-A08A-4296-B69A-35544451D833}"/>
-    <dgm:cxn modelId="{58354AFC-FF9F-4168-953F-3495D229016B}" srcId="{EE40FFF8-103D-4F45-B85F-403984910D7F}" destId="{EADE0D2D-1205-40C5-86CE-1D93146D1A90}" srcOrd="3" destOrd="0" parTransId="{1313A02D-916B-4376-9187-E1513360A3B7}" sibTransId="{FE89EA1D-5BF4-4389-891E-1C4333E940F1}"/>
-    <dgm:cxn modelId="{DCD357E6-3B99-4AC3-A81E-1D8E5B28EA4A}" type="presOf" srcId="{329A6205-D92F-4A22-8653-055AF4549D01}" destId="{99404815-EBB5-40EA-B4FB-18C60F71A14A}" srcOrd="0" destOrd="0" presId="urn:microsoft.com/office/officeart/2005/8/layout/chevron2"/>
-    <dgm:cxn modelId="{6C1D7293-C30D-4549-AED5-F126A7367255}" srcId="{EADE0D2D-1205-40C5-86CE-1D93146D1A90}" destId="{CED0AB39-B94A-4134-95E2-43EA72704BE0}" srcOrd="0" destOrd="0" parTransId="{80922B93-8062-40AC-9F4A-4357962A9003}" sibTransId="{CD781B07-49E8-4330-97C4-09871056819B}"/>
-    <dgm:cxn modelId="{37FBB0B3-8481-4EE8-82FF-FE2847EDC146}" srcId="{EE40FFF8-103D-4F45-B85F-403984910D7F}" destId="{7EB9B65E-F1F1-4C0C-BCEF-84E7CC628B93}" srcOrd="4" destOrd="0" parTransId="{C6EC86F0-2776-4AB7-AEC7-E5C672323418}" sibTransId="{E25BEE93-F45D-4AF9-8923-EC981D9554A2}"/>
-    <dgm:cxn modelId="{F232DB0F-D1DA-4851-84BA-3F5473E143D9}" srcId="{EE40FFF8-103D-4F45-B85F-403984910D7F}" destId="{295C1A26-C0BB-4CC5-A7C3-C9BB31F1079B}" srcOrd="5" destOrd="0" parTransId="{CCADCD90-BF8B-4450-868B-55E107F5E97C}" sibTransId="{2FF0FE31-AA20-4E75-AC28-31F2605A195E}"/>
-    <dgm:cxn modelId="{0103D843-07BC-46D7-B5CF-881EB1990E31}" type="presOf" srcId="{55AF256D-980F-4EAC-BDE3-A1B7BB810149}" destId="{FF38E5F5-B2ED-46F9-98AC-B8A051288B43}" srcOrd="0" destOrd="0" presId="urn:microsoft.com/office/officeart/2005/8/layout/chevron2"/>
-    <dgm:cxn modelId="{26FA470A-BC9E-4344-9C68-21FB9BEFE51D}" type="presOf" srcId="{2A98F07E-328C-46E7-8251-0118F4BFB566}" destId="{7A703FAB-2697-4360-9F76-B04086C14C7D}" srcOrd="0" destOrd="0" presId="urn:microsoft.com/office/officeart/2005/8/layout/chevron2"/>
-    <dgm:cxn modelId="{9C44351A-EAC8-4F14-8B59-4465E6F4228A}" type="presOf" srcId="{95694C06-2B2B-4047-8F05-8E36FD842531}" destId="{114B75A6-06AB-4193-B4F9-C42AEDF360ED}" srcOrd="0" destOrd="0" presId="urn:microsoft.com/office/officeart/2005/8/layout/chevron2"/>
     <dgm:cxn modelId="{3E678A58-A92A-441B-BD75-D4E269FBDAEE}" type="presOf" srcId="{AC1EF113-D03B-420E-911E-B92C916ACEDF}" destId="{37953712-67A3-4E6D-83CD-63697DE27E74}" srcOrd="0" destOrd="0" presId="urn:microsoft.com/office/officeart/2005/8/layout/chevron2"/>
-    <dgm:cxn modelId="{003416AB-762C-4B98-B62B-189A70C864B9}" srcId="{7EB9B65E-F1F1-4C0C-BCEF-84E7CC628B93}" destId="{2A98F07E-328C-46E7-8251-0118F4BFB566}" srcOrd="0" destOrd="0" parTransId="{2D9A8C24-217F-4619-992B-B0C2B61B4D2D}" sibTransId="{363DC761-3722-44DA-B104-F9B7A7D09A14}"/>
-    <dgm:cxn modelId="{3FEC02A6-3B33-4CA3-A1B8-B28E86AA8748}" type="presOf" srcId="{EE40FFF8-103D-4F45-B85F-403984910D7F}" destId="{C0F71877-8D45-45C6-ADEB-A07688B38294}" srcOrd="0" destOrd="0" presId="urn:microsoft.com/office/officeart/2005/8/layout/chevron2"/>
-    <dgm:cxn modelId="{0EAD68A0-D989-4A37-96EB-6EE2F661AA46}" srcId="{EE40FFF8-103D-4F45-B85F-403984910D7F}" destId="{1F8667CE-1C44-4E08-9A2B-FF616C613456}" srcOrd="2" destOrd="0" parTransId="{EACB439E-3988-4013-BCE0-44C4BC1A809E}" sibTransId="{8A1EDCB2-7721-4B0B-9ECE-0E0736CDE7BE}"/>
     <dgm:cxn modelId="{80E9981C-D6AF-4AA0-AE34-95916BB6042D}" type="presParOf" srcId="{C0F71877-8D45-45C6-ADEB-A07688B38294}" destId="{33F818AB-FF01-4241-9AE4-10038E362029}" srcOrd="0" destOrd="0" presId="urn:microsoft.com/office/officeart/2005/8/layout/chevron2"/>
     <dgm:cxn modelId="{BD8631D0-F477-4DAE-87B1-937628472942}" type="presParOf" srcId="{33F818AB-FF01-4241-9AE4-10038E362029}" destId="{FF38E5F5-B2ED-46F9-98AC-B8A051288B43}" srcOrd="0" destOrd="0" presId="urn:microsoft.com/office/officeart/2005/8/layout/chevron2"/>
     <dgm:cxn modelId="{2D223C1E-935B-45DD-ABB9-BBD1CC91D5F5}" type="presParOf" srcId="{33F818AB-FF01-4241-9AE4-10038E362029}" destId="{99404815-EBB5-40EA-B4FB-18C60F71A14A}" srcOrd="1" destOrd="0" presId="urn:microsoft.com/office/officeart/2005/8/layout/chevron2"/>
@@ -1752,1087 +1752,6 @@
       <dsp:cNvGrpSpPr/>
     </dsp:nvGrpSpPr>
     <dsp:grpSpPr/>
-    <dsp:sp modelId="{FF38E5F5-B2ED-46F9-98AC-B8A051288B43}">
-      <dsp:nvSpPr>
-        <dsp:cNvPr id="0" name=""/>
-        <dsp:cNvSpPr/>
-      </dsp:nvSpPr>
-      <dsp:spPr>
-        <a:xfrm rot="5400000">
-          <a:off x="-121226" y="122602"/>
-          <a:ext cx="808173" cy="565721"/>
-        </a:xfrm>
-        <a:prstGeom prst="chevron">
-          <a:avLst/>
-        </a:prstGeom>
-        <a:solidFill>
-          <a:schemeClr val="accent1">
-            <a:hueOff val="0"/>
-            <a:satOff val="0"/>
-            <a:lumOff val="0"/>
-            <a:alphaOff val="0"/>
-          </a:schemeClr>
-        </a:solidFill>
-        <a:ln w="15875" cap="flat" cmpd="sng" algn="ctr">
-          <a:solidFill>
-            <a:schemeClr val="accent1">
-              <a:hueOff val="0"/>
-              <a:satOff val="0"/>
-              <a:lumOff val="0"/>
-              <a:alphaOff val="0"/>
-            </a:schemeClr>
-          </a:solidFill>
-          <a:prstDash val="solid"/>
-        </a:ln>
-        <a:effectLst/>
-      </dsp:spPr>
-      <dsp:style>
-        <a:lnRef idx="2">
-          <a:scrgbClr r="0" g="0" b="0"/>
-        </a:lnRef>
-        <a:fillRef idx="1">
-          <a:scrgbClr r="0" g="0" b="0"/>
-        </a:fillRef>
-        <a:effectRef idx="0">
-          <a:scrgbClr r="0" g="0" b="0"/>
-        </a:effectRef>
-        <a:fontRef idx="minor">
-          <a:schemeClr val="lt1"/>
-        </a:fontRef>
-      </dsp:style>
-      <dsp:txBody>
-        <a:bodyPr spcFirstLastPara="0" vert="horz" wrap="square" lIns="10795" tIns="10795" rIns="10795" bIns="10795" numCol="1" spcCol="1270" anchor="ctr" anchorCtr="0">
-          <a:noAutofit/>
-        </a:bodyPr>
-        <a:lstStyle/>
-        <a:p>
-          <a:pPr lvl="0" algn="ctr" defTabSz="755650">
-            <a:lnSpc>
-              <a:spcPct val="90000"/>
-            </a:lnSpc>
-            <a:spcBef>
-              <a:spcPct val="0"/>
-            </a:spcBef>
-            <a:spcAft>
-              <a:spcPct val="35000"/>
-            </a:spcAft>
-          </a:pPr>
-          <a:r>
-            <a:rPr lang="en-US" sz="1700" kern="1200" dirty="0" smtClean="0"/>
-            <a:t>2002</a:t>
-          </a:r>
-          <a:endParaRPr lang="en-US" sz="1700" kern="1200" dirty="0"/>
-        </a:p>
-      </dsp:txBody>
-      <dsp:txXfrm rot="-5400000">
-        <a:off x="1" y="284237"/>
-        <a:ext cx="565721" cy="242452"/>
-      </dsp:txXfrm>
-    </dsp:sp>
-    <dsp:sp modelId="{99404815-EBB5-40EA-B4FB-18C60F71A14A}">
-      <dsp:nvSpPr>
-        <dsp:cNvPr id="0" name=""/>
-        <dsp:cNvSpPr/>
-      </dsp:nvSpPr>
-      <dsp:spPr>
-        <a:xfrm rot="5400000">
-          <a:off x="4211204" y="-3645482"/>
-          <a:ext cx="525313" cy="7816278"/>
-        </a:xfrm>
-        <a:prstGeom prst="round2SameRect">
-          <a:avLst/>
-        </a:prstGeom>
-        <a:solidFill>
-          <a:schemeClr val="lt1">
-            <a:alpha val="90000"/>
-            <a:hueOff val="0"/>
-            <a:satOff val="0"/>
-            <a:lumOff val="0"/>
-            <a:alphaOff val="0"/>
-          </a:schemeClr>
-        </a:solidFill>
-        <a:ln w="15875" cap="flat" cmpd="sng" algn="ctr">
-          <a:solidFill>
-            <a:schemeClr val="accent1">
-              <a:hueOff val="0"/>
-              <a:satOff val="0"/>
-              <a:lumOff val="0"/>
-              <a:alphaOff val="0"/>
-            </a:schemeClr>
-          </a:solidFill>
-          <a:prstDash val="solid"/>
-        </a:ln>
-        <a:effectLst/>
-      </dsp:spPr>
-      <dsp:style>
-        <a:lnRef idx="2">
-          <a:scrgbClr r="0" g="0" b="0"/>
-        </a:lnRef>
-        <a:fillRef idx="1">
-          <a:scrgbClr r="0" g="0" b="0"/>
-        </a:fillRef>
-        <a:effectRef idx="0">
-          <a:scrgbClr r="0" g="0" b="0"/>
-        </a:effectRef>
-        <a:fontRef idx="minor"/>
-      </dsp:style>
-      <dsp:txBody>
-        <a:bodyPr spcFirstLastPara="0" vert="horz" wrap="square" lIns="170688" tIns="15240" rIns="15240" bIns="15240" numCol="1" spcCol="1270" anchor="ctr" anchorCtr="0">
-          <a:noAutofit/>
-        </a:bodyPr>
-        <a:lstStyle/>
-        <a:p>
-          <a:pPr marL="228600" lvl="1" indent="-228600" algn="l" defTabSz="1066800">
-            <a:lnSpc>
-              <a:spcPct val="90000"/>
-            </a:lnSpc>
-            <a:spcBef>
-              <a:spcPct val="0"/>
-            </a:spcBef>
-            <a:spcAft>
-              <a:spcPct val="15000"/>
-            </a:spcAft>
-            <a:buChar char="••"/>
-          </a:pPr>
-          <a:r>
-            <a:rPr lang="en-US" sz="2400" kern="1200" dirty="0" smtClean="0"/>
-            <a:t>C# 1/VB7</a:t>
-          </a:r>
-          <a:endParaRPr lang="en-US" sz="2400" kern="1200" dirty="0"/>
-        </a:p>
-      </dsp:txBody>
-      <dsp:txXfrm rot="-5400000">
-        <a:off x="565722" y="25644"/>
-        <a:ext cx="7790634" cy="474025"/>
-      </dsp:txXfrm>
-    </dsp:sp>
-    <dsp:sp modelId="{BBC3BD6A-454F-4CAA-A5C0-8F47CE19C2CC}">
-      <dsp:nvSpPr>
-        <dsp:cNvPr id="0" name=""/>
-        <dsp:cNvSpPr/>
-      </dsp:nvSpPr>
-      <dsp:spPr>
-        <a:xfrm rot="5400000">
-          <a:off x="-121226" y="846814"/>
-          <a:ext cx="808173" cy="565721"/>
-        </a:xfrm>
-        <a:prstGeom prst="chevron">
-          <a:avLst/>
-        </a:prstGeom>
-        <a:solidFill>
-          <a:schemeClr val="accent1">
-            <a:hueOff val="0"/>
-            <a:satOff val="0"/>
-            <a:lumOff val="0"/>
-            <a:alphaOff val="0"/>
-          </a:schemeClr>
-        </a:solidFill>
-        <a:ln w="15875" cap="flat" cmpd="sng" algn="ctr">
-          <a:solidFill>
-            <a:schemeClr val="accent1">
-              <a:hueOff val="0"/>
-              <a:satOff val="0"/>
-              <a:lumOff val="0"/>
-              <a:alphaOff val="0"/>
-            </a:schemeClr>
-          </a:solidFill>
-          <a:prstDash val="solid"/>
-        </a:ln>
-        <a:effectLst/>
-      </dsp:spPr>
-      <dsp:style>
-        <a:lnRef idx="2">
-          <a:scrgbClr r="0" g="0" b="0"/>
-        </a:lnRef>
-        <a:fillRef idx="1">
-          <a:scrgbClr r="0" g="0" b="0"/>
-        </a:fillRef>
-        <a:effectRef idx="0">
-          <a:scrgbClr r="0" g="0" b="0"/>
-        </a:effectRef>
-        <a:fontRef idx="minor">
-          <a:schemeClr val="lt1"/>
-        </a:fontRef>
-      </dsp:style>
-      <dsp:txBody>
-        <a:bodyPr spcFirstLastPara="0" vert="horz" wrap="square" lIns="10795" tIns="10795" rIns="10795" bIns="10795" numCol="1" spcCol="1270" anchor="ctr" anchorCtr="0">
-          <a:noAutofit/>
-        </a:bodyPr>
-        <a:lstStyle/>
-        <a:p>
-          <a:pPr lvl="0" algn="ctr" defTabSz="755650">
-            <a:lnSpc>
-              <a:spcPct val="90000"/>
-            </a:lnSpc>
-            <a:spcBef>
-              <a:spcPct val="0"/>
-            </a:spcBef>
-            <a:spcAft>
-              <a:spcPct val="35000"/>
-            </a:spcAft>
-          </a:pPr>
-          <a:r>
-            <a:rPr lang="en-US" sz="1700" kern="1200" dirty="0" smtClean="0"/>
-            <a:t>2005</a:t>
-          </a:r>
-          <a:endParaRPr lang="en-US" sz="1700" kern="1200" dirty="0"/>
-        </a:p>
-      </dsp:txBody>
-      <dsp:txXfrm rot="-5400000">
-        <a:off x="1" y="1008449"/>
-        <a:ext cx="565721" cy="242452"/>
-      </dsp:txXfrm>
-    </dsp:sp>
-    <dsp:sp modelId="{DC734305-151B-44F7-8A31-4DF6B9EFACF5}">
-      <dsp:nvSpPr>
-        <dsp:cNvPr id="0" name=""/>
-        <dsp:cNvSpPr/>
-      </dsp:nvSpPr>
-      <dsp:spPr>
-        <a:xfrm rot="5400000">
-          <a:off x="4211204" y="-2919894"/>
-          <a:ext cx="525313" cy="7816278"/>
-        </a:xfrm>
-        <a:prstGeom prst="round2SameRect">
-          <a:avLst/>
-        </a:prstGeom>
-        <a:solidFill>
-          <a:schemeClr val="lt1">
-            <a:alpha val="90000"/>
-            <a:hueOff val="0"/>
-            <a:satOff val="0"/>
-            <a:lumOff val="0"/>
-            <a:alphaOff val="0"/>
-          </a:schemeClr>
-        </a:solidFill>
-        <a:ln w="15875" cap="flat" cmpd="sng" algn="ctr">
-          <a:solidFill>
-            <a:schemeClr val="accent1">
-              <a:hueOff val="0"/>
-              <a:satOff val="0"/>
-              <a:lumOff val="0"/>
-              <a:alphaOff val="0"/>
-            </a:schemeClr>
-          </a:solidFill>
-          <a:prstDash val="solid"/>
-        </a:ln>
-        <a:effectLst/>
-      </dsp:spPr>
-      <dsp:style>
-        <a:lnRef idx="2">
-          <a:scrgbClr r="0" g="0" b="0"/>
-        </a:lnRef>
-        <a:fillRef idx="1">
-          <a:scrgbClr r="0" g="0" b="0"/>
-        </a:fillRef>
-        <a:effectRef idx="0">
-          <a:scrgbClr r="0" g="0" b="0"/>
-        </a:effectRef>
-        <a:fontRef idx="minor"/>
-      </dsp:style>
-      <dsp:txBody>
-        <a:bodyPr spcFirstLastPara="0" vert="horz" wrap="square" lIns="170688" tIns="15240" rIns="15240" bIns="15240" numCol="1" spcCol="1270" anchor="ctr" anchorCtr="0">
-          <a:noAutofit/>
-        </a:bodyPr>
-        <a:lstStyle/>
-        <a:p>
-          <a:pPr marL="228600" lvl="1" indent="-228600" algn="l" defTabSz="1066800">
-            <a:lnSpc>
-              <a:spcPct val="90000"/>
-            </a:lnSpc>
-            <a:spcBef>
-              <a:spcPct val="0"/>
-            </a:spcBef>
-            <a:spcAft>
-              <a:spcPct val="15000"/>
-            </a:spcAft>
-            <a:buChar char="••"/>
-          </a:pPr>
-          <a:r>
-            <a:rPr lang="en-US" sz="2400" kern="1200" dirty="0" smtClean="0"/>
-            <a:t>Generics, Iterators, Anonymous Delegates, </a:t>
-          </a:r>
-          <a:r>
-            <a:rPr lang="en-US" sz="2400" kern="1200" dirty="0" err="1" smtClean="0"/>
-            <a:t>Nullable</a:t>
-          </a:r>
-          <a:r>
-            <a:rPr lang="en-US" sz="2400" kern="1200" dirty="0" smtClean="0"/>
-            <a:t>, Partial</a:t>
-          </a:r>
-          <a:endParaRPr lang="en-US" sz="2400" kern="1200" dirty="0"/>
-        </a:p>
-      </dsp:txBody>
-      <dsp:txXfrm rot="-5400000">
-        <a:off x="565722" y="751232"/>
-        <a:ext cx="7790634" cy="474025"/>
-      </dsp:txXfrm>
-    </dsp:sp>
-    <dsp:sp modelId="{C8AD4FE8-2A6D-4A55-9C0A-17A337DE34C6}">
-      <dsp:nvSpPr>
-        <dsp:cNvPr id="0" name=""/>
-        <dsp:cNvSpPr/>
-      </dsp:nvSpPr>
-      <dsp:spPr>
-        <a:xfrm rot="5400000">
-          <a:off x="-121226" y="1571026"/>
-          <a:ext cx="808173" cy="565721"/>
-        </a:xfrm>
-        <a:prstGeom prst="chevron">
-          <a:avLst/>
-        </a:prstGeom>
-        <a:solidFill>
-          <a:schemeClr val="accent1">
-            <a:hueOff val="0"/>
-            <a:satOff val="0"/>
-            <a:lumOff val="0"/>
-            <a:alphaOff val="0"/>
-          </a:schemeClr>
-        </a:solidFill>
-        <a:ln w="15875" cap="flat" cmpd="sng" algn="ctr">
-          <a:solidFill>
-            <a:schemeClr val="accent1">
-              <a:hueOff val="0"/>
-              <a:satOff val="0"/>
-              <a:lumOff val="0"/>
-              <a:alphaOff val="0"/>
-            </a:schemeClr>
-          </a:solidFill>
-          <a:prstDash val="solid"/>
-        </a:ln>
-        <a:effectLst/>
-      </dsp:spPr>
-      <dsp:style>
-        <a:lnRef idx="2">
-          <a:scrgbClr r="0" g="0" b="0"/>
-        </a:lnRef>
-        <a:fillRef idx="1">
-          <a:scrgbClr r="0" g="0" b="0"/>
-        </a:fillRef>
-        <a:effectRef idx="0">
-          <a:scrgbClr r="0" g="0" b="0"/>
-        </a:effectRef>
-        <a:fontRef idx="minor">
-          <a:schemeClr val="lt1"/>
-        </a:fontRef>
-      </dsp:style>
-      <dsp:txBody>
-        <a:bodyPr spcFirstLastPara="0" vert="horz" wrap="square" lIns="10795" tIns="10795" rIns="10795" bIns="10795" numCol="1" spcCol="1270" anchor="ctr" anchorCtr="0">
-          <a:noAutofit/>
-        </a:bodyPr>
-        <a:lstStyle/>
-        <a:p>
-          <a:pPr lvl="0" algn="ctr" defTabSz="755650">
-            <a:lnSpc>
-              <a:spcPct val="90000"/>
-            </a:lnSpc>
-            <a:spcBef>
-              <a:spcPct val="0"/>
-            </a:spcBef>
-            <a:spcAft>
-              <a:spcPct val="35000"/>
-            </a:spcAft>
-          </a:pPr>
-          <a:r>
-            <a:rPr lang="en-US" sz="1700" kern="1200" dirty="0" smtClean="0"/>
-            <a:t>2008</a:t>
-          </a:r>
-          <a:endParaRPr lang="en-US" sz="1700" kern="1200" dirty="0"/>
-        </a:p>
-      </dsp:txBody>
-      <dsp:txXfrm rot="-5400000">
-        <a:off x="1" y="1732661"/>
-        <a:ext cx="565721" cy="242452"/>
-      </dsp:txXfrm>
-    </dsp:sp>
-    <dsp:sp modelId="{114B75A6-06AB-4193-B4F9-C42AEDF360ED}">
-      <dsp:nvSpPr>
-        <dsp:cNvPr id="0" name=""/>
-        <dsp:cNvSpPr/>
-      </dsp:nvSpPr>
-      <dsp:spPr>
-        <a:xfrm rot="5400000">
-          <a:off x="4211204" y="-2195681"/>
-          <a:ext cx="525313" cy="7816278"/>
-        </a:xfrm>
-        <a:prstGeom prst="round2SameRect">
-          <a:avLst/>
-        </a:prstGeom>
-        <a:solidFill>
-          <a:schemeClr val="lt1">
-            <a:alpha val="90000"/>
-            <a:hueOff val="0"/>
-            <a:satOff val="0"/>
-            <a:lumOff val="0"/>
-            <a:alphaOff val="0"/>
-          </a:schemeClr>
-        </a:solidFill>
-        <a:ln w="15875" cap="flat" cmpd="sng" algn="ctr">
-          <a:solidFill>
-            <a:schemeClr val="accent1">
-              <a:hueOff val="0"/>
-              <a:satOff val="0"/>
-              <a:lumOff val="0"/>
-              <a:alphaOff val="0"/>
-            </a:schemeClr>
-          </a:solidFill>
-          <a:prstDash val="solid"/>
-        </a:ln>
-        <a:effectLst/>
-      </dsp:spPr>
-      <dsp:style>
-        <a:lnRef idx="2">
-          <a:scrgbClr r="0" g="0" b="0"/>
-        </a:lnRef>
-        <a:fillRef idx="1">
-          <a:scrgbClr r="0" g="0" b="0"/>
-        </a:fillRef>
-        <a:effectRef idx="0">
-          <a:scrgbClr r="0" g="0" b="0"/>
-        </a:effectRef>
-        <a:fontRef idx="minor"/>
-      </dsp:style>
-      <dsp:txBody>
-        <a:bodyPr spcFirstLastPara="0" vert="horz" wrap="square" lIns="170688" tIns="15240" rIns="15240" bIns="15240" numCol="1" spcCol="1270" anchor="ctr" anchorCtr="0">
-          <a:noAutofit/>
-        </a:bodyPr>
-        <a:lstStyle/>
-        <a:p>
-          <a:pPr marL="228600" lvl="1" indent="-228600" algn="l" defTabSz="1066800">
-            <a:lnSpc>
-              <a:spcPct val="90000"/>
-            </a:lnSpc>
-            <a:spcBef>
-              <a:spcPct val="0"/>
-            </a:spcBef>
-            <a:spcAft>
-              <a:spcPct val="15000"/>
-            </a:spcAft>
-            <a:buChar char="••"/>
-          </a:pPr>
-          <a:r>
-            <a:rPr lang="en-US" sz="2400" kern="1200" dirty="0" smtClean="0">
-              <a:solidFill>
-                <a:srgbClr val="00B050"/>
-              </a:solidFill>
-            </a:rPr>
-            <a:t>LINQ</a:t>
-          </a:r>
-          <a:r>
-            <a:rPr lang="en-US" sz="2400" kern="1200" dirty="0" smtClean="0"/>
-            <a:t>, Lambda, Anonymous, </a:t>
-          </a:r>
-          <a:r>
-            <a:rPr lang="en-US" sz="2400" kern="1200" dirty="0" err="1" smtClean="0"/>
-            <a:t>AutoProp</a:t>
-          </a:r>
-          <a:r>
-            <a:rPr lang="en-US" sz="2400" kern="1200" dirty="0" smtClean="0"/>
-            <a:t>, Extension Methods </a:t>
-          </a:r>
-          <a:endParaRPr lang="en-US" sz="2400" kern="1200" dirty="0"/>
-        </a:p>
-      </dsp:txBody>
-      <dsp:txXfrm rot="-5400000">
-        <a:off x="565722" y="1475445"/>
-        <a:ext cx="7790634" cy="474025"/>
-      </dsp:txXfrm>
-    </dsp:sp>
-    <dsp:sp modelId="{540CB1EA-7FE9-4D73-A499-E9A4351FFD87}">
-      <dsp:nvSpPr>
-        <dsp:cNvPr id="0" name=""/>
-        <dsp:cNvSpPr/>
-      </dsp:nvSpPr>
-      <dsp:spPr>
-        <a:xfrm rot="5400000">
-          <a:off x="-121226" y="2295239"/>
-          <a:ext cx="808173" cy="565721"/>
-        </a:xfrm>
-        <a:prstGeom prst="chevron">
-          <a:avLst/>
-        </a:prstGeom>
-        <a:solidFill>
-          <a:schemeClr val="accent1">
-            <a:hueOff val="0"/>
-            <a:satOff val="0"/>
-            <a:lumOff val="0"/>
-            <a:alphaOff val="0"/>
-          </a:schemeClr>
-        </a:solidFill>
-        <a:ln w="15875" cap="flat" cmpd="sng" algn="ctr">
-          <a:solidFill>
-            <a:schemeClr val="accent1">
-              <a:hueOff val="0"/>
-              <a:satOff val="0"/>
-              <a:lumOff val="0"/>
-              <a:alphaOff val="0"/>
-            </a:schemeClr>
-          </a:solidFill>
-          <a:prstDash val="solid"/>
-        </a:ln>
-        <a:effectLst/>
-      </dsp:spPr>
-      <dsp:style>
-        <a:lnRef idx="2">
-          <a:scrgbClr r="0" g="0" b="0"/>
-        </a:lnRef>
-        <a:fillRef idx="1">
-          <a:scrgbClr r="0" g="0" b="0"/>
-        </a:fillRef>
-        <a:effectRef idx="0">
-          <a:scrgbClr r="0" g="0" b="0"/>
-        </a:effectRef>
-        <a:fontRef idx="minor">
-          <a:schemeClr val="lt1"/>
-        </a:fontRef>
-      </dsp:style>
-      <dsp:txBody>
-        <a:bodyPr spcFirstLastPara="0" vert="horz" wrap="square" lIns="10795" tIns="10795" rIns="10795" bIns="10795" numCol="1" spcCol="1270" anchor="ctr" anchorCtr="0">
-          <a:noAutofit/>
-        </a:bodyPr>
-        <a:lstStyle/>
-        <a:p>
-          <a:pPr lvl="0" algn="ctr" defTabSz="755650">
-            <a:lnSpc>
-              <a:spcPct val="90000"/>
-            </a:lnSpc>
-            <a:spcBef>
-              <a:spcPct val="0"/>
-            </a:spcBef>
-            <a:spcAft>
-              <a:spcPct val="35000"/>
-            </a:spcAft>
-          </a:pPr>
-          <a:r>
-            <a:rPr lang="en-US" sz="1700" kern="1200" dirty="0" smtClean="0"/>
-            <a:t>2010</a:t>
-          </a:r>
-          <a:endParaRPr lang="en-US" sz="1700" kern="1200" dirty="0"/>
-        </a:p>
-      </dsp:txBody>
-      <dsp:txXfrm rot="-5400000">
-        <a:off x="1" y="2456874"/>
-        <a:ext cx="565721" cy="242452"/>
-      </dsp:txXfrm>
-    </dsp:sp>
-    <dsp:sp modelId="{DAD2E2F8-54E6-4FAE-A9BD-86AF88168CB8}">
-      <dsp:nvSpPr>
-        <dsp:cNvPr id="0" name=""/>
-        <dsp:cNvSpPr/>
-      </dsp:nvSpPr>
-      <dsp:spPr>
-        <a:xfrm rot="5400000">
-          <a:off x="4211204" y="-1471469"/>
-          <a:ext cx="525313" cy="7816278"/>
-        </a:xfrm>
-        <a:prstGeom prst="round2SameRect">
-          <a:avLst/>
-        </a:prstGeom>
-        <a:solidFill>
-          <a:schemeClr val="lt1">
-            <a:alpha val="90000"/>
-            <a:hueOff val="0"/>
-            <a:satOff val="0"/>
-            <a:lumOff val="0"/>
-            <a:alphaOff val="0"/>
-          </a:schemeClr>
-        </a:solidFill>
-        <a:ln w="15875" cap="flat" cmpd="sng" algn="ctr">
-          <a:solidFill>
-            <a:schemeClr val="accent1">
-              <a:hueOff val="0"/>
-              <a:satOff val="0"/>
-              <a:lumOff val="0"/>
-              <a:alphaOff val="0"/>
-            </a:schemeClr>
-          </a:solidFill>
-          <a:prstDash val="solid"/>
-        </a:ln>
-        <a:effectLst/>
-      </dsp:spPr>
-      <dsp:style>
-        <a:lnRef idx="2">
-          <a:scrgbClr r="0" g="0" b="0"/>
-        </a:lnRef>
-        <a:fillRef idx="1">
-          <a:scrgbClr r="0" g="0" b="0"/>
-        </a:fillRef>
-        <a:effectRef idx="0">
-          <a:scrgbClr r="0" g="0" b="0"/>
-        </a:effectRef>
-        <a:fontRef idx="minor"/>
-      </dsp:style>
-      <dsp:txBody>
-        <a:bodyPr spcFirstLastPara="0" vert="horz" wrap="square" lIns="170688" tIns="15240" rIns="15240" bIns="15240" numCol="1" spcCol="1270" anchor="ctr" anchorCtr="0">
-          <a:noAutofit/>
-        </a:bodyPr>
-        <a:lstStyle/>
-        <a:p>
-          <a:pPr marL="228600" lvl="1" indent="-228600" algn="l" defTabSz="1066800">
-            <a:lnSpc>
-              <a:spcPct val="90000"/>
-            </a:lnSpc>
-            <a:spcBef>
-              <a:spcPct val="0"/>
-            </a:spcBef>
-            <a:spcAft>
-              <a:spcPct val="15000"/>
-            </a:spcAft>
-            <a:buChar char="••"/>
-          </a:pPr>
-          <a:r>
-            <a:rPr lang="en-US" sz="2400" kern="1200" dirty="0" smtClean="0"/>
-            <a:t>Parallel, Dynamic, optional </a:t>
-          </a:r>
-          <a:r>
-            <a:rPr lang="en-US" sz="2400" kern="1200" dirty="0" err="1" smtClean="0"/>
-            <a:t>params</a:t>
-          </a:r>
-          <a:r>
-            <a:rPr lang="en-US" sz="2400" kern="1200" dirty="0" smtClean="0"/>
-            <a:t>, named arguments</a:t>
-          </a:r>
-          <a:endParaRPr lang="en-US" sz="2400" kern="1200" dirty="0"/>
-        </a:p>
-      </dsp:txBody>
-      <dsp:txXfrm rot="-5400000">
-        <a:off x="565722" y="2199657"/>
-        <a:ext cx="7790634" cy="474025"/>
-      </dsp:txXfrm>
-    </dsp:sp>
-    <dsp:sp modelId="{5830255F-49E8-44C9-A5BD-24B9CDC2A666}">
-      <dsp:nvSpPr>
-        <dsp:cNvPr id="0" name=""/>
-        <dsp:cNvSpPr/>
-      </dsp:nvSpPr>
-      <dsp:spPr>
-        <a:xfrm rot="5400000">
-          <a:off x="-121226" y="3019451"/>
-          <a:ext cx="808173" cy="565721"/>
-        </a:xfrm>
-        <a:prstGeom prst="chevron">
-          <a:avLst/>
-        </a:prstGeom>
-        <a:solidFill>
-          <a:schemeClr val="accent1">
-            <a:hueOff val="0"/>
-            <a:satOff val="0"/>
-            <a:lumOff val="0"/>
-            <a:alphaOff val="0"/>
-          </a:schemeClr>
-        </a:solidFill>
-        <a:ln w="15875" cap="flat" cmpd="sng" algn="ctr">
-          <a:solidFill>
-            <a:schemeClr val="accent1">
-              <a:hueOff val="0"/>
-              <a:satOff val="0"/>
-              <a:lumOff val="0"/>
-              <a:alphaOff val="0"/>
-            </a:schemeClr>
-          </a:solidFill>
-          <a:prstDash val="solid"/>
-        </a:ln>
-        <a:effectLst/>
-      </dsp:spPr>
-      <dsp:style>
-        <a:lnRef idx="2">
-          <a:scrgbClr r="0" g="0" b="0"/>
-        </a:lnRef>
-        <a:fillRef idx="1">
-          <a:scrgbClr r="0" g="0" b="0"/>
-        </a:fillRef>
-        <a:effectRef idx="0">
-          <a:scrgbClr r="0" g="0" b="0"/>
-        </a:effectRef>
-        <a:fontRef idx="minor">
-          <a:schemeClr val="lt1"/>
-        </a:fontRef>
-      </dsp:style>
-      <dsp:txBody>
-        <a:bodyPr spcFirstLastPara="0" vert="horz" wrap="square" lIns="10795" tIns="10795" rIns="10795" bIns="10795" numCol="1" spcCol="1270" anchor="ctr" anchorCtr="0">
-          <a:noAutofit/>
-        </a:bodyPr>
-        <a:lstStyle/>
-        <a:p>
-          <a:pPr lvl="0" algn="ctr" defTabSz="755650">
-            <a:lnSpc>
-              <a:spcPct val="90000"/>
-            </a:lnSpc>
-            <a:spcBef>
-              <a:spcPct val="0"/>
-            </a:spcBef>
-            <a:spcAft>
-              <a:spcPct val="35000"/>
-            </a:spcAft>
-          </a:pPr>
-          <a:r>
-            <a:rPr lang="en-US" sz="1700" kern="1200" dirty="0" smtClean="0"/>
-            <a:t>2012</a:t>
-          </a:r>
-          <a:endParaRPr lang="en-US" sz="1700" kern="1200" dirty="0"/>
-        </a:p>
-      </dsp:txBody>
-      <dsp:txXfrm rot="-5400000">
-        <a:off x="1" y="3181086"/>
-        <a:ext cx="565721" cy="242452"/>
-      </dsp:txXfrm>
-    </dsp:sp>
-    <dsp:sp modelId="{7A703FAB-2697-4360-9F76-B04086C14C7D}">
-      <dsp:nvSpPr>
-        <dsp:cNvPr id="0" name=""/>
-        <dsp:cNvSpPr/>
-      </dsp:nvSpPr>
-      <dsp:spPr>
-        <a:xfrm rot="5400000">
-          <a:off x="4211204" y="-747257"/>
-          <a:ext cx="525313" cy="7816278"/>
-        </a:xfrm>
-        <a:prstGeom prst="round2SameRect">
-          <a:avLst/>
-        </a:prstGeom>
-        <a:solidFill>
-          <a:schemeClr val="lt1">
-            <a:alpha val="90000"/>
-            <a:hueOff val="0"/>
-            <a:satOff val="0"/>
-            <a:lumOff val="0"/>
-            <a:alphaOff val="0"/>
-          </a:schemeClr>
-        </a:solidFill>
-        <a:ln w="15875" cap="flat" cmpd="sng" algn="ctr">
-          <a:solidFill>
-            <a:schemeClr val="accent1">
-              <a:hueOff val="0"/>
-              <a:satOff val="0"/>
-              <a:lumOff val="0"/>
-              <a:alphaOff val="0"/>
-            </a:schemeClr>
-          </a:solidFill>
-          <a:prstDash val="solid"/>
-        </a:ln>
-        <a:effectLst/>
-      </dsp:spPr>
-      <dsp:style>
-        <a:lnRef idx="2">
-          <a:scrgbClr r="0" g="0" b="0"/>
-        </a:lnRef>
-        <a:fillRef idx="1">
-          <a:scrgbClr r="0" g="0" b="0"/>
-        </a:fillRef>
-        <a:effectRef idx="0">
-          <a:scrgbClr r="0" g="0" b="0"/>
-        </a:effectRef>
-        <a:fontRef idx="minor"/>
-      </dsp:style>
-      <dsp:txBody>
-        <a:bodyPr spcFirstLastPara="0" vert="horz" wrap="square" lIns="170688" tIns="15240" rIns="15240" bIns="15240" numCol="1" spcCol="1270" anchor="ctr" anchorCtr="0">
-          <a:noAutofit/>
-        </a:bodyPr>
-        <a:lstStyle/>
-        <a:p>
-          <a:pPr marL="228600" lvl="1" indent="-228600" algn="l" defTabSz="1066800">
-            <a:lnSpc>
-              <a:spcPct val="90000"/>
-            </a:lnSpc>
-            <a:spcBef>
-              <a:spcPct val="0"/>
-            </a:spcBef>
-            <a:spcAft>
-              <a:spcPct val="15000"/>
-            </a:spcAft>
-            <a:buChar char="••"/>
-          </a:pPr>
-          <a:r>
-            <a:rPr lang="en-US" sz="2400" kern="1200" dirty="0" err="1" smtClean="0"/>
-            <a:t>Async</a:t>
-          </a:r>
-          <a:endParaRPr lang="en-US" sz="2400" kern="1200" dirty="0"/>
-        </a:p>
-      </dsp:txBody>
-      <dsp:txXfrm rot="-5400000">
-        <a:off x="565722" y="2923869"/>
-        <a:ext cx="7790634" cy="474025"/>
-      </dsp:txXfrm>
-    </dsp:sp>
-    <dsp:sp modelId="{63437E7B-65DF-4A27-B708-B701FB2F2D97}">
-      <dsp:nvSpPr>
-        <dsp:cNvPr id="0" name=""/>
-        <dsp:cNvSpPr/>
-      </dsp:nvSpPr>
-      <dsp:spPr>
-        <a:xfrm rot="5400000">
-          <a:off x="-121226" y="3743663"/>
-          <a:ext cx="808173" cy="565721"/>
-        </a:xfrm>
-        <a:prstGeom prst="chevron">
-          <a:avLst/>
-        </a:prstGeom>
-        <a:solidFill>
-          <a:schemeClr val="accent1">
-            <a:hueOff val="0"/>
-            <a:satOff val="0"/>
-            <a:lumOff val="0"/>
-            <a:alphaOff val="0"/>
-          </a:schemeClr>
-        </a:solidFill>
-        <a:ln w="15875" cap="flat" cmpd="sng" algn="ctr">
-          <a:solidFill>
-            <a:schemeClr val="accent1">
-              <a:hueOff val="0"/>
-              <a:satOff val="0"/>
-              <a:lumOff val="0"/>
-              <a:alphaOff val="0"/>
-            </a:schemeClr>
-          </a:solidFill>
-          <a:prstDash val="solid"/>
-        </a:ln>
-        <a:effectLst/>
-      </dsp:spPr>
-      <dsp:style>
-        <a:lnRef idx="2">
-          <a:scrgbClr r="0" g="0" b="0"/>
-        </a:lnRef>
-        <a:fillRef idx="1">
-          <a:scrgbClr r="0" g="0" b="0"/>
-        </a:fillRef>
-        <a:effectRef idx="0">
-          <a:scrgbClr r="0" g="0" b="0"/>
-        </a:effectRef>
-        <a:fontRef idx="minor">
-          <a:schemeClr val="lt1"/>
-        </a:fontRef>
-      </dsp:style>
-      <dsp:txBody>
-        <a:bodyPr spcFirstLastPara="0" vert="horz" wrap="square" lIns="10795" tIns="10795" rIns="10795" bIns="10795" numCol="1" spcCol="1270" anchor="ctr" anchorCtr="0">
-          <a:noAutofit/>
-        </a:bodyPr>
-        <a:lstStyle/>
-        <a:p>
-          <a:pPr lvl="0" algn="ctr" defTabSz="755650">
-            <a:lnSpc>
-              <a:spcPct val="90000"/>
-            </a:lnSpc>
-            <a:spcBef>
-              <a:spcPct val="0"/>
-            </a:spcBef>
-            <a:spcAft>
-              <a:spcPct val="35000"/>
-            </a:spcAft>
-          </a:pPr>
-          <a:r>
-            <a:rPr lang="en-US" sz="1700" kern="1200" dirty="0" smtClean="0"/>
-            <a:t>2013</a:t>
-          </a:r>
-          <a:endParaRPr lang="en-US" sz="1700" kern="1200" dirty="0"/>
-        </a:p>
-      </dsp:txBody>
-      <dsp:txXfrm rot="-5400000">
-        <a:off x="1" y="3905298"/>
-        <a:ext cx="565721" cy="242452"/>
-      </dsp:txXfrm>
-    </dsp:sp>
-    <dsp:sp modelId="{A736080A-6712-4C93-9E27-BF60389BE78D}">
-      <dsp:nvSpPr>
-        <dsp:cNvPr id="0" name=""/>
-        <dsp:cNvSpPr/>
-      </dsp:nvSpPr>
-      <dsp:spPr>
-        <a:xfrm rot="5400000">
-          <a:off x="4211204" y="-23044"/>
-          <a:ext cx="525313" cy="7816278"/>
-        </a:xfrm>
-        <a:prstGeom prst="round2SameRect">
-          <a:avLst/>
-        </a:prstGeom>
-        <a:solidFill>
-          <a:schemeClr val="lt1">
-            <a:alpha val="90000"/>
-            <a:hueOff val="0"/>
-            <a:satOff val="0"/>
-            <a:lumOff val="0"/>
-            <a:alphaOff val="0"/>
-          </a:schemeClr>
-        </a:solidFill>
-        <a:ln w="15875" cap="flat" cmpd="sng" algn="ctr">
-          <a:solidFill>
-            <a:schemeClr val="accent1">
-              <a:hueOff val="0"/>
-              <a:satOff val="0"/>
-              <a:lumOff val="0"/>
-              <a:alphaOff val="0"/>
-            </a:schemeClr>
-          </a:solidFill>
-          <a:prstDash val="solid"/>
-        </a:ln>
-        <a:effectLst/>
-      </dsp:spPr>
-      <dsp:style>
-        <a:lnRef idx="2">
-          <a:scrgbClr r="0" g="0" b="0"/>
-        </a:lnRef>
-        <a:fillRef idx="1">
-          <a:scrgbClr r="0" g="0" b="0"/>
-        </a:fillRef>
-        <a:effectRef idx="0">
-          <a:scrgbClr r="0" g="0" b="0"/>
-        </a:effectRef>
-        <a:fontRef idx="minor"/>
-      </dsp:style>
-    </dsp:sp>
-    <dsp:sp modelId="{D87B602B-E23A-4814-B38E-6089C0F57C7A}">
-      <dsp:nvSpPr>
-        <dsp:cNvPr id="0" name=""/>
-        <dsp:cNvSpPr/>
-      </dsp:nvSpPr>
-      <dsp:spPr>
-        <a:xfrm rot="5400000">
-          <a:off x="-121226" y="4467876"/>
-          <a:ext cx="808173" cy="565721"/>
-        </a:xfrm>
-        <a:prstGeom prst="chevron">
-          <a:avLst/>
-        </a:prstGeom>
-        <a:solidFill>
-          <a:schemeClr val="accent1">
-            <a:hueOff val="0"/>
-            <a:satOff val="0"/>
-            <a:lumOff val="0"/>
-            <a:alphaOff val="0"/>
-          </a:schemeClr>
-        </a:solidFill>
-        <a:ln w="15875" cap="flat" cmpd="sng" algn="ctr">
-          <a:solidFill>
-            <a:schemeClr val="accent1">
-              <a:hueOff val="0"/>
-              <a:satOff val="0"/>
-              <a:lumOff val="0"/>
-              <a:alphaOff val="0"/>
-            </a:schemeClr>
-          </a:solidFill>
-          <a:prstDash val="solid"/>
-        </a:ln>
-        <a:effectLst/>
-      </dsp:spPr>
-      <dsp:style>
-        <a:lnRef idx="2">
-          <a:scrgbClr r="0" g="0" b="0"/>
-        </a:lnRef>
-        <a:fillRef idx="1">
-          <a:scrgbClr r="0" g="0" b="0"/>
-        </a:fillRef>
-        <a:effectRef idx="0">
-          <a:scrgbClr r="0" g="0" b="0"/>
-        </a:effectRef>
-        <a:fontRef idx="minor">
-          <a:schemeClr val="lt1"/>
-        </a:fontRef>
-      </dsp:style>
-      <dsp:txBody>
-        <a:bodyPr spcFirstLastPara="0" vert="horz" wrap="square" lIns="10795" tIns="10795" rIns="10795" bIns="10795" numCol="1" spcCol="1270" anchor="ctr" anchorCtr="0">
-          <a:noAutofit/>
-        </a:bodyPr>
-        <a:lstStyle/>
-        <a:p>
-          <a:pPr lvl="0" algn="ctr" defTabSz="755650">
-            <a:lnSpc>
-              <a:spcPct val="90000"/>
-            </a:lnSpc>
-            <a:spcBef>
-              <a:spcPct val="0"/>
-            </a:spcBef>
-            <a:spcAft>
-              <a:spcPct val="35000"/>
-            </a:spcAft>
-          </a:pPr>
-          <a:r>
-            <a:rPr lang="en-US" sz="1700" kern="1200" dirty="0" smtClean="0"/>
-            <a:t>2015</a:t>
-          </a:r>
-          <a:endParaRPr lang="en-US" sz="1700" kern="1200" dirty="0"/>
-        </a:p>
-      </dsp:txBody>
-      <dsp:txXfrm rot="-5400000">
-        <a:off x="1" y="4629511"/>
-        <a:ext cx="565721" cy="242452"/>
-      </dsp:txXfrm>
-    </dsp:sp>
-    <dsp:sp modelId="{37953712-67A3-4E6D-83CD-63697DE27E74}">
-      <dsp:nvSpPr>
-        <dsp:cNvPr id="0" name=""/>
-        <dsp:cNvSpPr/>
-      </dsp:nvSpPr>
-      <dsp:spPr>
-        <a:xfrm rot="5400000">
-          <a:off x="4211204" y="701167"/>
-          <a:ext cx="525313" cy="7816278"/>
-        </a:xfrm>
-        <a:prstGeom prst="round2SameRect">
-          <a:avLst/>
-        </a:prstGeom>
-        <a:solidFill>
-          <a:schemeClr val="lt1">
-            <a:alpha val="90000"/>
-            <a:hueOff val="0"/>
-            <a:satOff val="0"/>
-            <a:lumOff val="0"/>
-            <a:alphaOff val="0"/>
-          </a:schemeClr>
-        </a:solidFill>
-        <a:ln w="15875" cap="flat" cmpd="sng" algn="ctr">
-          <a:solidFill>
-            <a:schemeClr val="accent1">
-              <a:hueOff val="0"/>
-              <a:satOff val="0"/>
-              <a:lumOff val="0"/>
-              <a:alphaOff val="0"/>
-            </a:schemeClr>
-          </a:solidFill>
-          <a:prstDash val="solid"/>
-        </a:ln>
-        <a:effectLst/>
-      </dsp:spPr>
-      <dsp:style>
-        <a:lnRef idx="2">
-          <a:scrgbClr r="0" g="0" b="0"/>
-        </a:lnRef>
-        <a:fillRef idx="1">
-          <a:scrgbClr r="0" g="0" b="0"/>
-        </a:fillRef>
-        <a:effectRef idx="0">
-          <a:scrgbClr r="0" g="0" b="0"/>
-        </a:effectRef>
-        <a:fontRef idx="minor"/>
-      </dsp:style>
-      <dsp:txBody>
-        <a:bodyPr spcFirstLastPara="0" vert="horz" wrap="square" lIns="170688" tIns="15240" rIns="15240" bIns="15240" numCol="1" spcCol="1270" anchor="ctr" anchorCtr="0">
-          <a:noAutofit/>
-        </a:bodyPr>
-        <a:lstStyle/>
-        <a:p>
-          <a:pPr marL="228600" lvl="1" indent="-228600" algn="l" defTabSz="1066800">
-            <a:lnSpc>
-              <a:spcPct val="90000"/>
-            </a:lnSpc>
-            <a:spcBef>
-              <a:spcPct val="0"/>
-            </a:spcBef>
-            <a:spcAft>
-              <a:spcPct val="15000"/>
-            </a:spcAft>
-            <a:buChar char="••"/>
-          </a:pPr>
-          <a:r>
-            <a:rPr lang="en-US" sz="2400" kern="1200" dirty="0" smtClean="0"/>
-            <a:t>Roslyn</a:t>
-          </a:r>
-          <a:endParaRPr lang="en-US" sz="2400" kern="1200" dirty="0"/>
-        </a:p>
-      </dsp:txBody>
-      <dsp:txXfrm rot="-5400000">
-        <a:off x="565722" y="4372293"/>
-        <a:ext cx="7790634" cy="474025"/>
-      </dsp:txXfrm>
-    </dsp:sp>
   </dsp:spTree>
 </dsp:drawing>
 </file>
@@ -13873,23 +12792,7 @@
                   <a:schemeClr val="tx1"/>
                 </a:solidFill>
               </a:rPr>
-              <a:t> Compiler </a:t>
-            </a:r>
-            <a:r>
-              <a:rPr lang="en-US" cap="small" dirty="0" smtClean="0">
-                <a:solidFill>
-                  <a:schemeClr val="tx1"/>
-                </a:solidFill>
-              </a:rPr>
-              <a:t>Platform (Roslyn</a:t>
-            </a:r>
-            <a:r>
-              <a:rPr lang="en-US" cap="small" dirty="0" smtClean="0">
-                <a:solidFill>
-                  <a:schemeClr val="tx1"/>
-                </a:solidFill>
-              </a:rPr>
-              <a:t>)</a:t>
+              <a:t> Compiler Platform (Roslyn)</a:t>
             </a:r>
             <a:br>
               <a:rPr lang="en-US" cap="small" dirty="0" smtClean="0">
@@ -13929,11 +12832,6 @@
               </a:rPr>
               <a:t>https://github.com/jwooley/RoslynAndYou</a:t>
             </a:r>
-            <a:endParaRPr lang="en-US" cap="small" dirty="0">
-              <a:solidFill>
-                <a:schemeClr val="tx1"/>
-              </a:solidFill>
-            </a:endParaRPr>
           </a:p>
         </p:txBody>
       </p:sp>
@@ -18283,6 +17181,44 @@
               <a:rPr lang="en-US" dirty="0" smtClean="0"/>
               <a:t> </a:t>
             </a:r>
+            <a:endParaRPr lang="en-US" dirty="0" smtClean="0"/>
+          </a:p>
+          <a:p>
+            <a:r>
+              <a:rPr lang="en-US" dirty="0" smtClean="0"/>
+              <a:t>LLILC (</a:t>
+            </a:r>
+            <a:r>
+              <a:rPr lang="en-US" dirty="0"/>
+              <a:t>LLVM for .NET Core</a:t>
+            </a:r>
+            <a:r>
+              <a:rPr lang="en-US" dirty="0" smtClean="0"/>
+              <a:t>): </a:t>
+            </a:r>
+            <a:r>
+              <a:rPr lang="en-US" dirty="0" smtClean="0">
+                <a:hlinkClick r:id="rId7"/>
+              </a:rPr>
+              <a:t>https</a:t>
+            </a:r>
+            <a:r>
+              <a:rPr lang="en-US" dirty="0">
+                <a:hlinkClick r:id="rId7"/>
+              </a:rPr>
+              <a:t>://</a:t>
+            </a:r>
+            <a:r>
+              <a:rPr lang="en-US" dirty="0" smtClean="0">
+                <a:hlinkClick r:id="rId7"/>
+              </a:rPr>
+              <a:t>github.com/dotnet/llilc</a:t>
+            </a:r>
+            <a:r>
+              <a:rPr lang="en-US" dirty="0" smtClean="0"/>
+              <a:t> </a:t>
+            </a:r>
+            <a:endParaRPr lang="en-US" dirty="0" smtClean="0"/>
           </a:p>
           <a:p>
             <a:endParaRPr lang="en-US" dirty="0" smtClean="0"/>

</xml_diff>

<commit_message>
remove legacy libraries that were added inadvertantly.
</commit_message>
<xml_diff>
--- a/RoslynAndYou.pptx
+++ b/RoslynAndYou.pptx
@@ -1679,33 +1679,33 @@
     </dgm:pt>
   </dgm:ptLst>
   <dgm:cxnLst>
+    <dgm:cxn modelId="{A58080E9-33CB-4C07-920E-0A056786FE89}" srcId="{55AF256D-980F-4EAC-BDE3-A1B7BB810149}" destId="{329A6205-D92F-4A22-8653-055AF4549D01}" srcOrd="0" destOrd="0" parTransId="{BEC259D7-C0D1-4807-BF6D-B18A5084B23F}" sibTransId="{26A8870A-A98F-4E04-8A52-D7615622D8D3}"/>
+    <dgm:cxn modelId="{06EF365C-2188-448C-B630-9BC4B2FABD60}" type="presOf" srcId="{95B1ADF6-2F93-4BE7-9AC4-D1E9AB468A86}" destId="{DC734305-151B-44F7-8A31-4DF6B9EFACF5}" srcOrd="0" destOrd="0" presId="urn:microsoft.com/office/officeart/2005/8/layout/chevron2"/>
+    <dgm:cxn modelId="{6B6AEED6-C8AB-41D1-9284-C186433F0B1E}" type="presOf" srcId="{EADE0D2D-1205-40C5-86CE-1D93146D1A90}" destId="{540CB1EA-7FE9-4D73-A499-E9A4351FFD87}" srcOrd="0" destOrd="0" presId="urn:microsoft.com/office/officeart/2005/8/layout/chevron2"/>
+    <dgm:cxn modelId="{CA01A593-1FA6-4083-B431-989E97B542B1}" type="presOf" srcId="{A3920C65-3F7C-48E9-ACE8-6414D7482E18}" destId="{BBC3BD6A-454F-4CAA-A5C0-8F47CE19C2CC}" srcOrd="0" destOrd="0" presId="urn:microsoft.com/office/officeart/2005/8/layout/chevron2"/>
+    <dgm:cxn modelId="{4ED9D936-B292-48D0-8935-08A116E8717A}" type="presOf" srcId="{1002025F-1C72-4A21-ADB8-7F4B762D0701}" destId="{D87B602B-E23A-4814-B38E-6089C0F57C7A}" srcOrd="0" destOrd="0" presId="urn:microsoft.com/office/officeart/2005/8/layout/chevron2"/>
+    <dgm:cxn modelId="{F95291AB-9FCB-45A0-9370-1BE1E020A44C}" type="presOf" srcId="{CED0AB39-B94A-4134-95E2-43EA72704BE0}" destId="{DAD2E2F8-54E6-4FAE-A9BD-86AF88168CB8}" srcOrd="0" destOrd="0" presId="urn:microsoft.com/office/officeart/2005/8/layout/chevron2"/>
+    <dgm:cxn modelId="{0C3B6F2C-FC7D-432A-9C28-77B4A1C9C28E}" srcId="{EE40FFF8-103D-4F45-B85F-403984910D7F}" destId="{55AF256D-980F-4EAC-BDE3-A1B7BB810149}" srcOrd="0" destOrd="0" parTransId="{748A717C-599F-4C3A-B811-C08F8B1B0759}" sibTransId="{A0FA65F2-48E1-4C84-8387-4B40ABD643EF}"/>
+    <dgm:cxn modelId="{4CB8A257-4370-4096-875D-308C3EB6A12E}" srcId="{1F8667CE-1C44-4E08-9A2B-FF616C613456}" destId="{95694C06-2B2B-4047-8F05-8E36FD842531}" srcOrd="0" destOrd="0" parTransId="{94B991CB-22F8-4502-8602-4106C506106C}" sibTransId="{9F3061E0-B093-4D7C-9680-103D4FEDC06A}"/>
     <dgm:cxn modelId="{C6DCB072-4394-4062-AE87-BC3F79818562}" srcId="{1002025F-1C72-4A21-ADB8-7F4B762D0701}" destId="{AC1EF113-D03B-420E-911E-B92C916ACEDF}" srcOrd="0" destOrd="0" parTransId="{3596FEFB-719F-4095-B6C5-079E00E3C72E}" sibTransId="{E3F70FB8-8A18-4458-9266-24A45CFE504C}"/>
+    <dgm:cxn modelId="{69986308-9F57-4347-842D-2BFBFAA33A8D}" srcId="{EE40FFF8-103D-4F45-B85F-403984910D7F}" destId="{A3920C65-3F7C-48E9-ACE8-6414D7482E18}" srcOrd="1" destOrd="0" parTransId="{0F08BE9B-F890-421A-B90E-90EC86276BFA}" sibTransId="{A84EAA2E-6FF3-4307-8D22-5FB6E0659300}"/>
+    <dgm:cxn modelId="{946299B6-2978-4AD5-9265-3EC1C4717D78}" type="presOf" srcId="{1F8667CE-1C44-4E08-9A2B-FF616C613456}" destId="{C8AD4FE8-2A6D-4A55-9C0A-17A337DE34C6}" srcOrd="0" destOrd="0" presId="urn:microsoft.com/office/officeart/2005/8/layout/chevron2"/>
+    <dgm:cxn modelId="{91C181B8-EF46-47FF-908C-8CEFA6F32B8D}" type="presOf" srcId="{7EB9B65E-F1F1-4C0C-BCEF-84E7CC628B93}" destId="{5830255F-49E8-44C9-A5BD-24B9CDC2A666}" srcOrd="0" destOrd="0" presId="urn:microsoft.com/office/officeart/2005/8/layout/chevron2"/>
+    <dgm:cxn modelId="{A4387B6C-47C1-43EA-AB0B-C9634E0707DB}" srcId="{EE40FFF8-103D-4F45-B85F-403984910D7F}" destId="{1002025F-1C72-4A21-ADB8-7F4B762D0701}" srcOrd="6" destOrd="0" parTransId="{765806DF-0E39-44E0-9A16-10384E41AC7A}" sibTransId="{70204279-0190-443C-A74E-BDAC0C260844}"/>
+    <dgm:cxn modelId="{CE4F279D-9FF2-4D7D-9662-E2C36EFB7600}" type="presOf" srcId="{295C1A26-C0BB-4CC5-A7C3-C9BB31F1079B}" destId="{63437E7B-65DF-4A27-B708-B701FB2F2D97}" srcOrd="0" destOrd="0" presId="urn:microsoft.com/office/officeart/2005/8/layout/chevron2"/>
+    <dgm:cxn modelId="{D979ED70-DEDD-4FF2-A9F4-B36066266231}" srcId="{A3920C65-3F7C-48E9-ACE8-6414D7482E18}" destId="{95B1ADF6-2F93-4BE7-9AC4-D1E9AB468A86}" srcOrd="0" destOrd="0" parTransId="{8E7CC16E-DEE7-448C-9AE8-94347153FD45}" sibTransId="{8B39424F-A08A-4296-B69A-35544451D833}"/>
+    <dgm:cxn modelId="{58354AFC-FF9F-4168-953F-3495D229016B}" srcId="{EE40FFF8-103D-4F45-B85F-403984910D7F}" destId="{EADE0D2D-1205-40C5-86CE-1D93146D1A90}" srcOrd="3" destOrd="0" parTransId="{1313A02D-916B-4376-9187-E1513360A3B7}" sibTransId="{FE89EA1D-5BF4-4389-891E-1C4333E940F1}"/>
     <dgm:cxn modelId="{DCD357E6-3B99-4AC3-A81E-1D8E5B28EA4A}" type="presOf" srcId="{329A6205-D92F-4A22-8653-055AF4549D01}" destId="{99404815-EBB5-40EA-B4FB-18C60F71A14A}" srcOrd="0" destOrd="0" presId="urn:microsoft.com/office/officeart/2005/8/layout/chevron2"/>
+    <dgm:cxn modelId="{6C1D7293-C30D-4549-AED5-F126A7367255}" srcId="{EADE0D2D-1205-40C5-86CE-1D93146D1A90}" destId="{CED0AB39-B94A-4134-95E2-43EA72704BE0}" srcOrd="0" destOrd="0" parTransId="{80922B93-8062-40AC-9F4A-4357962A9003}" sibTransId="{CD781B07-49E8-4330-97C4-09871056819B}"/>
+    <dgm:cxn modelId="{37FBB0B3-8481-4EE8-82FF-FE2847EDC146}" srcId="{EE40FFF8-103D-4F45-B85F-403984910D7F}" destId="{7EB9B65E-F1F1-4C0C-BCEF-84E7CC628B93}" srcOrd="4" destOrd="0" parTransId="{C6EC86F0-2776-4AB7-AEC7-E5C672323418}" sibTransId="{E25BEE93-F45D-4AF9-8923-EC981D9554A2}"/>
+    <dgm:cxn modelId="{F232DB0F-D1DA-4851-84BA-3F5473E143D9}" srcId="{EE40FFF8-103D-4F45-B85F-403984910D7F}" destId="{295C1A26-C0BB-4CC5-A7C3-C9BB31F1079B}" srcOrd="5" destOrd="0" parTransId="{CCADCD90-BF8B-4450-868B-55E107F5E97C}" sibTransId="{2FF0FE31-AA20-4E75-AC28-31F2605A195E}"/>
+    <dgm:cxn modelId="{0103D843-07BC-46D7-B5CF-881EB1990E31}" type="presOf" srcId="{55AF256D-980F-4EAC-BDE3-A1B7BB810149}" destId="{FF38E5F5-B2ED-46F9-98AC-B8A051288B43}" srcOrd="0" destOrd="0" presId="urn:microsoft.com/office/officeart/2005/8/layout/chevron2"/>
+    <dgm:cxn modelId="{26FA470A-BC9E-4344-9C68-21FB9BEFE51D}" type="presOf" srcId="{2A98F07E-328C-46E7-8251-0118F4BFB566}" destId="{7A703FAB-2697-4360-9F76-B04086C14C7D}" srcOrd="0" destOrd="0" presId="urn:microsoft.com/office/officeart/2005/8/layout/chevron2"/>
+    <dgm:cxn modelId="{9C44351A-EAC8-4F14-8B59-4465E6F4228A}" type="presOf" srcId="{95694C06-2B2B-4047-8F05-8E36FD842531}" destId="{114B75A6-06AB-4193-B4F9-C42AEDF360ED}" srcOrd="0" destOrd="0" presId="urn:microsoft.com/office/officeart/2005/8/layout/chevron2"/>
+    <dgm:cxn modelId="{3E678A58-A92A-441B-BD75-D4E269FBDAEE}" type="presOf" srcId="{AC1EF113-D03B-420E-911E-B92C916ACEDF}" destId="{37953712-67A3-4E6D-83CD-63697DE27E74}" srcOrd="0" destOrd="0" presId="urn:microsoft.com/office/officeart/2005/8/layout/chevron2"/>
     <dgm:cxn modelId="{003416AB-762C-4B98-B62B-189A70C864B9}" srcId="{7EB9B65E-F1F1-4C0C-BCEF-84E7CC628B93}" destId="{2A98F07E-328C-46E7-8251-0118F4BFB566}" srcOrd="0" destOrd="0" parTransId="{2D9A8C24-217F-4619-992B-B0C2B61B4D2D}" sibTransId="{363DC761-3722-44DA-B104-F9B7A7D09A14}"/>
+    <dgm:cxn modelId="{3FEC02A6-3B33-4CA3-A1B8-B28E86AA8748}" type="presOf" srcId="{EE40FFF8-103D-4F45-B85F-403984910D7F}" destId="{C0F71877-8D45-45C6-ADEB-A07688B38294}" srcOrd="0" destOrd="0" presId="urn:microsoft.com/office/officeart/2005/8/layout/chevron2"/>
     <dgm:cxn modelId="{0EAD68A0-D989-4A37-96EB-6EE2F661AA46}" srcId="{EE40FFF8-103D-4F45-B85F-403984910D7F}" destId="{1F8667CE-1C44-4E08-9A2B-FF616C613456}" srcOrd="2" destOrd="0" parTransId="{EACB439E-3988-4013-BCE0-44C4BC1A809E}" sibTransId="{8A1EDCB2-7721-4B0B-9ECE-0E0736CDE7BE}"/>
-    <dgm:cxn modelId="{9C44351A-EAC8-4F14-8B59-4465E6F4228A}" type="presOf" srcId="{95694C06-2B2B-4047-8F05-8E36FD842531}" destId="{114B75A6-06AB-4193-B4F9-C42AEDF360ED}" srcOrd="0" destOrd="0" presId="urn:microsoft.com/office/officeart/2005/8/layout/chevron2"/>
-    <dgm:cxn modelId="{06EF365C-2188-448C-B630-9BC4B2FABD60}" type="presOf" srcId="{95B1ADF6-2F93-4BE7-9AC4-D1E9AB468A86}" destId="{DC734305-151B-44F7-8A31-4DF6B9EFACF5}" srcOrd="0" destOrd="0" presId="urn:microsoft.com/office/officeart/2005/8/layout/chevron2"/>
-    <dgm:cxn modelId="{CA01A593-1FA6-4083-B431-989E97B542B1}" type="presOf" srcId="{A3920C65-3F7C-48E9-ACE8-6414D7482E18}" destId="{BBC3BD6A-454F-4CAA-A5C0-8F47CE19C2CC}" srcOrd="0" destOrd="0" presId="urn:microsoft.com/office/officeart/2005/8/layout/chevron2"/>
-    <dgm:cxn modelId="{0103D843-07BC-46D7-B5CF-881EB1990E31}" type="presOf" srcId="{55AF256D-980F-4EAC-BDE3-A1B7BB810149}" destId="{FF38E5F5-B2ED-46F9-98AC-B8A051288B43}" srcOrd="0" destOrd="0" presId="urn:microsoft.com/office/officeart/2005/8/layout/chevron2"/>
-    <dgm:cxn modelId="{6B6AEED6-C8AB-41D1-9284-C186433F0B1E}" type="presOf" srcId="{EADE0D2D-1205-40C5-86CE-1D93146D1A90}" destId="{540CB1EA-7FE9-4D73-A499-E9A4351FFD87}" srcOrd="0" destOrd="0" presId="urn:microsoft.com/office/officeart/2005/8/layout/chevron2"/>
-    <dgm:cxn modelId="{A58080E9-33CB-4C07-920E-0A056786FE89}" srcId="{55AF256D-980F-4EAC-BDE3-A1B7BB810149}" destId="{329A6205-D92F-4A22-8653-055AF4549D01}" srcOrd="0" destOrd="0" parTransId="{BEC259D7-C0D1-4807-BF6D-B18A5084B23F}" sibTransId="{26A8870A-A98F-4E04-8A52-D7615622D8D3}"/>
-    <dgm:cxn modelId="{4CB8A257-4370-4096-875D-308C3EB6A12E}" srcId="{1F8667CE-1C44-4E08-9A2B-FF616C613456}" destId="{95694C06-2B2B-4047-8F05-8E36FD842531}" srcOrd="0" destOrd="0" parTransId="{94B991CB-22F8-4502-8602-4106C506106C}" sibTransId="{9F3061E0-B093-4D7C-9680-103D4FEDC06A}"/>
-    <dgm:cxn modelId="{F232DB0F-D1DA-4851-84BA-3F5473E143D9}" srcId="{EE40FFF8-103D-4F45-B85F-403984910D7F}" destId="{295C1A26-C0BB-4CC5-A7C3-C9BB31F1079B}" srcOrd="5" destOrd="0" parTransId="{CCADCD90-BF8B-4450-868B-55E107F5E97C}" sibTransId="{2FF0FE31-AA20-4E75-AC28-31F2605A195E}"/>
-    <dgm:cxn modelId="{58354AFC-FF9F-4168-953F-3495D229016B}" srcId="{EE40FFF8-103D-4F45-B85F-403984910D7F}" destId="{EADE0D2D-1205-40C5-86CE-1D93146D1A90}" srcOrd="3" destOrd="0" parTransId="{1313A02D-916B-4376-9187-E1513360A3B7}" sibTransId="{FE89EA1D-5BF4-4389-891E-1C4333E940F1}"/>
-    <dgm:cxn modelId="{91C181B8-EF46-47FF-908C-8CEFA6F32B8D}" type="presOf" srcId="{7EB9B65E-F1F1-4C0C-BCEF-84E7CC628B93}" destId="{5830255F-49E8-44C9-A5BD-24B9CDC2A666}" srcOrd="0" destOrd="0" presId="urn:microsoft.com/office/officeart/2005/8/layout/chevron2"/>
-    <dgm:cxn modelId="{F95291AB-9FCB-45A0-9370-1BE1E020A44C}" type="presOf" srcId="{CED0AB39-B94A-4134-95E2-43EA72704BE0}" destId="{DAD2E2F8-54E6-4FAE-A9BD-86AF88168CB8}" srcOrd="0" destOrd="0" presId="urn:microsoft.com/office/officeart/2005/8/layout/chevron2"/>
-    <dgm:cxn modelId="{6C1D7293-C30D-4549-AED5-F126A7367255}" srcId="{EADE0D2D-1205-40C5-86CE-1D93146D1A90}" destId="{CED0AB39-B94A-4134-95E2-43EA72704BE0}" srcOrd="0" destOrd="0" parTransId="{80922B93-8062-40AC-9F4A-4357962A9003}" sibTransId="{CD781B07-49E8-4330-97C4-09871056819B}"/>
-    <dgm:cxn modelId="{4ED9D936-B292-48D0-8935-08A116E8717A}" type="presOf" srcId="{1002025F-1C72-4A21-ADB8-7F4B762D0701}" destId="{D87B602B-E23A-4814-B38E-6089C0F57C7A}" srcOrd="0" destOrd="0" presId="urn:microsoft.com/office/officeart/2005/8/layout/chevron2"/>
-    <dgm:cxn modelId="{946299B6-2978-4AD5-9265-3EC1C4717D78}" type="presOf" srcId="{1F8667CE-1C44-4E08-9A2B-FF616C613456}" destId="{C8AD4FE8-2A6D-4A55-9C0A-17A337DE34C6}" srcOrd="0" destOrd="0" presId="urn:microsoft.com/office/officeart/2005/8/layout/chevron2"/>
-    <dgm:cxn modelId="{0C3B6F2C-FC7D-432A-9C28-77B4A1C9C28E}" srcId="{EE40FFF8-103D-4F45-B85F-403984910D7F}" destId="{55AF256D-980F-4EAC-BDE3-A1B7BB810149}" srcOrd="0" destOrd="0" parTransId="{748A717C-599F-4C3A-B811-C08F8B1B0759}" sibTransId="{A0FA65F2-48E1-4C84-8387-4B40ABD643EF}"/>
-    <dgm:cxn modelId="{A4387B6C-47C1-43EA-AB0B-C9634E0707DB}" srcId="{EE40FFF8-103D-4F45-B85F-403984910D7F}" destId="{1002025F-1C72-4A21-ADB8-7F4B762D0701}" srcOrd="6" destOrd="0" parTransId="{765806DF-0E39-44E0-9A16-10384E41AC7A}" sibTransId="{70204279-0190-443C-A74E-BDAC0C260844}"/>
-    <dgm:cxn modelId="{37FBB0B3-8481-4EE8-82FF-FE2847EDC146}" srcId="{EE40FFF8-103D-4F45-B85F-403984910D7F}" destId="{7EB9B65E-F1F1-4C0C-BCEF-84E7CC628B93}" srcOrd="4" destOrd="0" parTransId="{C6EC86F0-2776-4AB7-AEC7-E5C672323418}" sibTransId="{E25BEE93-F45D-4AF9-8923-EC981D9554A2}"/>
-    <dgm:cxn modelId="{3FEC02A6-3B33-4CA3-A1B8-B28E86AA8748}" type="presOf" srcId="{EE40FFF8-103D-4F45-B85F-403984910D7F}" destId="{C0F71877-8D45-45C6-ADEB-A07688B38294}" srcOrd="0" destOrd="0" presId="urn:microsoft.com/office/officeart/2005/8/layout/chevron2"/>
-    <dgm:cxn modelId="{CE4F279D-9FF2-4D7D-9662-E2C36EFB7600}" type="presOf" srcId="{295C1A26-C0BB-4CC5-A7C3-C9BB31F1079B}" destId="{63437E7B-65DF-4A27-B708-B701FB2F2D97}" srcOrd="0" destOrd="0" presId="urn:microsoft.com/office/officeart/2005/8/layout/chevron2"/>
-    <dgm:cxn modelId="{26FA470A-BC9E-4344-9C68-21FB9BEFE51D}" type="presOf" srcId="{2A98F07E-328C-46E7-8251-0118F4BFB566}" destId="{7A703FAB-2697-4360-9F76-B04086C14C7D}" srcOrd="0" destOrd="0" presId="urn:microsoft.com/office/officeart/2005/8/layout/chevron2"/>
-    <dgm:cxn modelId="{D979ED70-DEDD-4FF2-A9F4-B36066266231}" srcId="{A3920C65-3F7C-48E9-ACE8-6414D7482E18}" destId="{95B1ADF6-2F93-4BE7-9AC4-D1E9AB468A86}" srcOrd="0" destOrd="0" parTransId="{8E7CC16E-DEE7-448C-9AE8-94347153FD45}" sibTransId="{8B39424F-A08A-4296-B69A-35544451D833}"/>
-    <dgm:cxn modelId="{69986308-9F57-4347-842D-2BFBFAA33A8D}" srcId="{EE40FFF8-103D-4F45-B85F-403984910D7F}" destId="{A3920C65-3F7C-48E9-ACE8-6414D7482E18}" srcOrd="1" destOrd="0" parTransId="{0F08BE9B-F890-421A-B90E-90EC86276BFA}" sibTransId="{A84EAA2E-6FF3-4307-8D22-5FB6E0659300}"/>
-    <dgm:cxn modelId="{3E678A58-A92A-441B-BD75-D4E269FBDAEE}" type="presOf" srcId="{AC1EF113-D03B-420E-911E-B92C916ACEDF}" destId="{37953712-67A3-4E6D-83CD-63697DE27E74}" srcOrd="0" destOrd="0" presId="urn:microsoft.com/office/officeart/2005/8/layout/chevron2"/>
     <dgm:cxn modelId="{80E9981C-D6AF-4AA0-AE34-95916BB6042D}" type="presParOf" srcId="{C0F71877-8D45-45C6-ADEB-A07688B38294}" destId="{33F818AB-FF01-4241-9AE4-10038E362029}" srcOrd="0" destOrd="0" presId="urn:microsoft.com/office/officeart/2005/8/layout/chevron2"/>
     <dgm:cxn modelId="{BD8631D0-F477-4DAE-87B1-937628472942}" type="presParOf" srcId="{33F818AB-FF01-4241-9AE4-10038E362029}" destId="{FF38E5F5-B2ED-46F9-98AC-B8A051288B43}" srcOrd="0" destOrd="0" presId="urn:microsoft.com/office/officeart/2005/8/layout/chevron2"/>
     <dgm:cxn modelId="{2D223C1E-935B-45DD-ABB9-BBD1CC91D5F5}" type="presParOf" srcId="{33F818AB-FF01-4241-9AE4-10038E362029}" destId="{99404815-EBB5-40EA-B4FB-18C60F71A14A}" srcOrd="1" destOrd="0" presId="urn:microsoft.com/office/officeart/2005/8/layout/chevron2"/>
@@ -3128,7 +3128,7 @@
           <a:p>
             <a:fld id="{FC81B089-160E-404A-8C73-8674F1782EA4}" type="datetimeFigureOut">
               <a:rPr lang="en-US" smtClean="0"/>
-              <a:t>4/26/2015</a:t>
+              <a:t>5/4/2015</a:t>
             </a:fld>
             <a:endParaRPr lang="en-US"/>
           </a:p>
@@ -6197,7 +6197,7 @@
           <a:p>
             <a:fld id="{D2B62928-2648-4210-B25C-2BD7B5FE2C7B}" type="datetimeFigureOut">
               <a:rPr lang="en-US" smtClean="0"/>
-              <a:t>4/26/2015</a:t>
+              <a:t>5/4/2015</a:t>
             </a:fld>
             <a:endParaRPr lang="en-US"/>
           </a:p>
@@ -6710,7 +6710,7 @@
           <a:p>
             <a:fld id="{D2B62928-2648-4210-B25C-2BD7B5FE2C7B}" type="datetimeFigureOut">
               <a:rPr lang="en-US" smtClean="0"/>
-              <a:t>4/26/2015</a:t>
+              <a:t>5/4/2015</a:t>
             </a:fld>
             <a:endParaRPr lang="en-US"/>
           </a:p>
@@ -6885,7 +6885,7 @@
           <a:p>
             <a:fld id="{D2B62928-2648-4210-B25C-2BD7B5FE2C7B}" type="datetimeFigureOut">
               <a:rPr lang="en-US" smtClean="0"/>
-              <a:t>4/26/2015</a:t>
+              <a:t>5/4/2015</a:t>
             </a:fld>
             <a:endParaRPr lang="en-US"/>
           </a:p>
@@ -7050,7 +7050,7 @@
           <a:p>
             <a:fld id="{D2B62928-2648-4210-B25C-2BD7B5FE2C7B}" type="datetimeFigureOut">
               <a:rPr lang="en-US" smtClean="0"/>
-              <a:t>4/26/2015</a:t>
+              <a:t>5/4/2015</a:t>
             </a:fld>
             <a:endParaRPr lang="en-US"/>
           </a:p>
@@ -10174,7 +10174,7 @@
           <a:p>
             <a:fld id="{D2B62928-2648-4210-B25C-2BD7B5FE2C7B}" type="datetimeFigureOut">
               <a:rPr lang="en-US" smtClean="0"/>
-              <a:t>4/26/2015</a:t>
+              <a:t>5/4/2015</a:t>
             </a:fld>
             <a:endParaRPr lang="en-US"/>
           </a:p>
@@ -10457,7 +10457,7 @@
           <a:p>
             <a:fld id="{D2B62928-2648-4210-B25C-2BD7B5FE2C7B}" type="datetimeFigureOut">
               <a:rPr lang="en-US" smtClean="0"/>
-              <a:t>4/26/2015</a:t>
+              <a:t>5/4/2015</a:t>
             </a:fld>
             <a:endParaRPr lang="en-US"/>
           </a:p>
@@ -10874,7 +10874,7 @@
           <a:p>
             <a:fld id="{D2B62928-2648-4210-B25C-2BD7B5FE2C7B}" type="datetimeFigureOut">
               <a:rPr lang="en-US" smtClean="0"/>
-              <a:t>4/26/2015</a:t>
+              <a:t>5/4/2015</a:t>
             </a:fld>
             <a:endParaRPr lang="en-US"/>
           </a:p>
@@ -10987,7 +10987,7 @@
           <a:p>
             <a:fld id="{D2B62928-2648-4210-B25C-2BD7B5FE2C7B}" type="datetimeFigureOut">
               <a:rPr lang="en-US" smtClean="0"/>
-              <a:t>4/26/2015</a:t>
+              <a:t>5/4/2015</a:t>
             </a:fld>
             <a:endParaRPr lang="en-US"/>
           </a:p>
@@ -11077,7 +11077,7 @@
           <a:p>
             <a:fld id="{D2B62928-2648-4210-B25C-2BD7B5FE2C7B}" type="datetimeFigureOut">
               <a:rPr lang="en-US" smtClean="0"/>
-              <a:t>4/26/2015</a:t>
+              <a:t>5/4/2015</a:t>
             </a:fld>
             <a:endParaRPr lang="en-US"/>
           </a:p>
@@ -11252,7 +11252,7 @@
           <a:p>
             <a:fld id="{D2B62928-2648-4210-B25C-2BD7B5FE2C7B}" type="datetimeFigureOut">
               <a:rPr lang="en-US" smtClean="0"/>
-              <a:t>4/26/2015</a:t>
+              <a:t>5/4/2015</a:t>
             </a:fld>
             <a:endParaRPr lang="en-US"/>
           </a:p>
@@ -11738,7 +11738,7 @@
           <a:p>
             <a:fld id="{D2B62928-2648-4210-B25C-2BD7B5FE2C7B}" type="datetimeFigureOut">
               <a:rPr lang="en-US" smtClean="0"/>
-              <a:t>4/26/2015</a:t>
+              <a:t>5/4/2015</a:t>
             </a:fld>
             <a:endParaRPr lang="en-US"/>
           </a:p>
@@ -12290,7 +12290,7 @@
           <a:p>
             <a:fld id="{D2B62928-2648-4210-B25C-2BD7B5FE2C7B}" type="datetimeFigureOut">
               <a:rPr lang="en-US" smtClean="0"/>
-              <a:t>4/26/2015</a:t>
+              <a:t>5/4/2015</a:t>
             </a:fld>
             <a:endParaRPr lang="en-US"/>
           </a:p>
@@ -17046,7 +17046,7 @@
           <a:p>
             <a:r>
               <a:rPr lang="en-US" dirty="0" smtClean="0"/>
-              <a:t>Resources</a:t>
+              <a:t>Roslyn Resources</a:t>
             </a:r>
             <a:endParaRPr lang="en-US" dirty="0"/>
           </a:p>
@@ -17065,7 +17065,7 @@
         <p:spPr/>
         <p:txBody>
           <a:bodyPr>
-            <a:normAutofit/>
+            <a:normAutofit fontScale="92500" lnSpcReduction="20000"/>
           </a:bodyPr>
           <a:lstStyle/>
           <a:p>
@@ -17181,7 +17181,6 @@
               <a:rPr lang="en-US" dirty="0" smtClean="0"/>
               <a:t> </a:t>
             </a:r>
-            <a:endParaRPr lang="en-US" dirty="0" smtClean="0"/>
           </a:p>
           <a:p>
             <a:r>
@@ -17221,6 +17220,69 @@
             <a:endParaRPr lang="en-US" dirty="0" smtClean="0"/>
           </a:p>
           <a:p>
+            <a:r>
+              <a:rPr lang="en-US" dirty="0" smtClean="0"/>
+              <a:t>Roslyn Visualizer: </a:t>
+            </a:r>
+            <a:r>
+              <a:rPr lang="en-US" dirty="0">
+                <a:hlinkClick r:id="rId8"/>
+              </a:rPr>
+              <a:t>https://visualstudiogallery.msdn.microsoft.com/32fe332c-51ad-411a-a74c-9fdbc2a03bb7</a:t>
+            </a:r>
+            <a:r>
+              <a:rPr lang="en-US" dirty="0"/>
+              <a:t> </a:t>
+            </a:r>
+            <a:endParaRPr lang="en-US" dirty="0" smtClean="0"/>
+          </a:p>
+          <a:p>
+            <a:r>
+              <a:rPr lang="en-US" dirty="0" smtClean="0"/>
+              <a:t>Roslyn SDK Templates: </a:t>
+            </a:r>
+            <a:r>
+              <a:rPr lang="en-US" dirty="0">
+                <a:hlinkClick r:id="rId9"/>
+              </a:rPr>
+              <a:t>https://visualstudiogallery.msdn.microsoft.com/e2e07e91-9d0b-4944-ba40-e86bcbec1599</a:t>
+            </a:r>
+            <a:endParaRPr lang="en-US" dirty="0" smtClean="0"/>
+          </a:p>
+          <a:p>
+            <a:r>
+              <a:rPr lang="en-US" dirty="0" smtClean="0"/>
+              <a:t>This presentation: </a:t>
+            </a:r>
+            <a:r>
+              <a:rPr lang="en-US" cap="small" dirty="0">
+                <a:solidFill>
+                  <a:schemeClr val="tx1"/>
+                </a:solidFill>
+                <a:hlinkClick r:id="rId10"/>
+              </a:rPr>
+              <a:t>https://</a:t>
+            </a:r>
+            <a:r>
+              <a:rPr lang="en-US" cap="small" dirty="0" smtClean="0">
+                <a:solidFill>
+                  <a:schemeClr val="tx1"/>
+                </a:solidFill>
+                <a:hlinkClick r:id="rId10"/>
+              </a:rPr>
+              <a:t>github.com/jwooley/RoslynAndYou</a:t>
+            </a:r>
+            <a:r>
+              <a:rPr lang="en-US" cap="small" dirty="0" smtClean="0">
+                <a:solidFill>
+                  <a:schemeClr val="tx1"/>
+                </a:solidFill>
+              </a:rPr>
+              <a:t> </a:t>
+            </a:r>
+            <a:endParaRPr lang="en-US" dirty="0" smtClean="0"/>
+          </a:p>
+          <a:p>
             <a:endParaRPr lang="en-US" dirty="0" smtClean="0"/>
           </a:p>
           <a:p>
@@ -17228,6 +17290,36 @@
           </a:p>
         </p:txBody>
       </p:sp>
+      <p:pic>
+        <p:nvPicPr>
+          <p:cNvPr id="4" name="Picture 3"/>
+          <p:cNvPicPr>
+            <a:picLocks noChangeAspect="1"/>
+          </p:cNvPicPr>
+          <p:nvPr/>
+        </p:nvPicPr>
+        <p:blipFill>
+          <a:blip r:embed="rId11">
+            <a:extLst>
+              <a:ext uri="{28A0092B-C50C-407E-A947-70E740481C1C}">
+                <a14:useLocalDpi xmlns:a14="http://schemas.microsoft.com/office/drawing/2010/main" val="0"/>
+              </a:ext>
+            </a:extLst>
+          </a:blip>
+          <a:stretch>
+            <a:fillRect/>
+          </a:stretch>
+        </p:blipFill>
+        <p:spPr>
+          <a:xfrm>
+            <a:off x="7010400" y="266700"/>
+            <a:ext cx="1905000" cy="1905000"/>
+          </a:xfrm>
+          <a:prstGeom prst="rect">
+            <a:avLst/>
+          </a:prstGeom>
+        </p:spPr>
+      </p:pic>
     </p:spTree>
     <p:extLst>
       <p:ext uri="{BB962C8B-B14F-4D97-AF65-F5344CB8AC3E}">

</xml_diff>

<commit_message>
Update dependencies. Add Roslyn Scripting samples Add more CodeCracker samples
</commit_message>
<xml_diff>
--- a/RoslynAndYou.pptx
+++ b/RoslynAndYou.pptx
@@ -5,7 +5,7 @@
     <p:sldMasterId id="2147483672" r:id="rId1"/>
   </p:sldMasterIdLst>
   <p:notesMasterIdLst>
-    <p:notesMasterId r:id="rId15"/>
+    <p:notesMasterId r:id="rId16"/>
   </p:notesMasterIdLst>
   <p:sldIdLst>
     <p:sldId id="286" r:id="rId2"/>
@@ -13,14 +13,15 @@
     <p:sldId id="304" r:id="rId4"/>
     <p:sldId id="290" r:id="rId5"/>
     <p:sldId id="308" r:id="rId6"/>
-    <p:sldId id="291" r:id="rId7"/>
-    <p:sldId id="289" r:id="rId8"/>
-    <p:sldId id="305" r:id="rId9"/>
-    <p:sldId id="306" r:id="rId10"/>
-    <p:sldId id="307" r:id="rId11"/>
-    <p:sldId id="303" r:id="rId12"/>
-    <p:sldId id="263" r:id="rId13"/>
-    <p:sldId id="287" r:id="rId14"/>
+    <p:sldId id="309" r:id="rId7"/>
+    <p:sldId id="291" r:id="rId8"/>
+    <p:sldId id="289" r:id="rId9"/>
+    <p:sldId id="305" r:id="rId10"/>
+    <p:sldId id="306" r:id="rId11"/>
+    <p:sldId id="307" r:id="rId12"/>
+    <p:sldId id="303" r:id="rId13"/>
+    <p:sldId id="263" r:id="rId14"/>
+    <p:sldId id="287" r:id="rId15"/>
   </p:sldIdLst>
   <p:sldSz cx="12192000" cy="6858000"/>
   <p:notesSz cx="6858000" cy="9144000"/>
@@ -1709,35 +1710,35 @@
     </dgm:pt>
   </dgm:ptLst>
   <dgm:cxnLst>
+    <dgm:cxn modelId="{C6DCB072-4394-4062-AE87-BC3F79818562}" srcId="{1002025F-1C72-4A21-ADB8-7F4B762D0701}" destId="{AC1EF113-D03B-420E-911E-B92C916ACEDF}" srcOrd="0" destOrd="0" parTransId="{3596FEFB-719F-4095-B6C5-079E00E3C72E}" sibTransId="{E3F70FB8-8A18-4458-9266-24A45CFE504C}"/>
+    <dgm:cxn modelId="{DCD357E6-3B99-4AC3-A81E-1D8E5B28EA4A}" type="presOf" srcId="{329A6205-D92F-4A22-8653-055AF4549D01}" destId="{99404815-EBB5-40EA-B4FB-18C60F71A14A}" srcOrd="0" destOrd="0" presId="urn:microsoft.com/office/officeart/2005/8/layout/chevron2"/>
+    <dgm:cxn modelId="{003416AB-762C-4B98-B62B-189A70C864B9}" srcId="{7EB9B65E-F1F1-4C0C-BCEF-84E7CC628B93}" destId="{2A98F07E-328C-46E7-8251-0118F4BFB566}" srcOrd="0" destOrd="0" parTransId="{2D9A8C24-217F-4619-992B-B0C2B61B4D2D}" sibTransId="{363DC761-3722-44DA-B104-F9B7A7D09A14}"/>
+    <dgm:cxn modelId="{0EAD68A0-D989-4A37-96EB-6EE2F661AA46}" srcId="{EE40FFF8-103D-4F45-B85F-403984910D7F}" destId="{1F8667CE-1C44-4E08-9A2B-FF616C613456}" srcOrd="2" destOrd="0" parTransId="{EACB439E-3988-4013-BCE0-44C4BC1A809E}" sibTransId="{8A1EDCB2-7721-4B0B-9ECE-0E0736CDE7BE}"/>
+    <dgm:cxn modelId="{9C44351A-EAC8-4F14-8B59-4465E6F4228A}" type="presOf" srcId="{95694C06-2B2B-4047-8F05-8E36FD842531}" destId="{114B75A6-06AB-4193-B4F9-C42AEDF360ED}" srcOrd="0" destOrd="0" presId="urn:microsoft.com/office/officeart/2005/8/layout/chevron2"/>
+    <dgm:cxn modelId="{0D5AABA5-A419-42AA-AAED-5BD1FF12B65B}" srcId="{295C1A26-C0BB-4CC5-A7C3-C9BB31F1079B}" destId="{A5B00B44-D32B-4A6A-9650-07C7E70EA17D}" srcOrd="0" destOrd="0" parTransId="{40DD1C00-2473-4003-BEC0-C004D7F14797}" sibTransId="{AA12AF86-DBFF-401E-8F90-8794184B09F1}"/>
+    <dgm:cxn modelId="{06EF365C-2188-448C-B630-9BC4B2FABD60}" type="presOf" srcId="{95B1ADF6-2F93-4BE7-9AC4-D1E9AB468A86}" destId="{DC734305-151B-44F7-8A31-4DF6B9EFACF5}" srcOrd="0" destOrd="0" presId="urn:microsoft.com/office/officeart/2005/8/layout/chevron2"/>
+    <dgm:cxn modelId="{CA01A593-1FA6-4083-B431-989E97B542B1}" type="presOf" srcId="{A3920C65-3F7C-48E9-ACE8-6414D7482E18}" destId="{BBC3BD6A-454F-4CAA-A5C0-8F47CE19C2CC}" srcOrd="0" destOrd="0" presId="urn:microsoft.com/office/officeart/2005/8/layout/chevron2"/>
+    <dgm:cxn modelId="{0103D843-07BC-46D7-B5CF-881EB1990E31}" type="presOf" srcId="{55AF256D-980F-4EAC-BDE3-A1B7BB810149}" destId="{FF38E5F5-B2ED-46F9-98AC-B8A051288B43}" srcOrd="0" destOrd="0" presId="urn:microsoft.com/office/officeart/2005/8/layout/chevron2"/>
+    <dgm:cxn modelId="{6B6AEED6-C8AB-41D1-9284-C186433F0B1E}" type="presOf" srcId="{EADE0D2D-1205-40C5-86CE-1D93146D1A90}" destId="{540CB1EA-7FE9-4D73-A499-E9A4351FFD87}" srcOrd="0" destOrd="0" presId="urn:microsoft.com/office/officeart/2005/8/layout/chevron2"/>
     <dgm:cxn modelId="{A58080E9-33CB-4C07-920E-0A056786FE89}" srcId="{55AF256D-980F-4EAC-BDE3-A1B7BB810149}" destId="{329A6205-D92F-4A22-8653-055AF4549D01}" srcOrd="0" destOrd="0" parTransId="{BEC259D7-C0D1-4807-BF6D-B18A5084B23F}" sibTransId="{26A8870A-A98F-4E04-8A52-D7615622D8D3}"/>
-    <dgm:cxn modelId="{06EF365C-2188-448C-B630-9BC4B2FABD60}" type="presOf" srcId="{95B1ADF6-2F93-4BE7-9AC4-D1E9AB468A86}" destId="{DC734305-151B-44F7-8A31-4DF6B9EFACF5}" srcOrd="0" destOrd="0" presId="urn:microsoft.com/office/officeart/2005/8/layout/chevron2"/>
-    <dgm:cxn modelId="{6B6AEED6-C8AB-41D1-9284-C186433F0B1E}" type="presOf" srcId="{EADE0D2D-1205-40C5-86CE-1D93146D1A90}" destId="{540CB1EA-7FE9-4D73-A499-E9A4351FFD87}" srcOrd="0" destOrd="0" presId="urn:microsoft.com/office/officeart/2005/8/layout/chevron2"/>
-    <dgm:cxn modelId="{CA01A593-1FA6-4083-B431-989E97B542B1}" type="presOf" srcId="{A3920C65-3F7C-48E9-ACE8-6414D7482E18}" destId="{BBC3BD6A-454F-4CAA-A5C0-8F47CE19C2CC}" srcOrd="0" destOrd="0" presId="urn:microsoft.com/office/officeart/2005/8/layout/chevron2"/>
+    <dgm:cxn modelId="{4CB8A257-4370-4096-875D-308C3EB6A12E}" srcId="{1F8667CE-1C44-4E08-9A2B-FF616C613456}" destId="{95694C06-2B2B-4047-8F05-8E36FD842531}" srcOrd="0" destOrd="0" parTransId="{94B991CB-22F8-4502-8602-4106C506106C}" sibTransId="{9F3061E0-B093-4D7C-9680-103D4FEDC06A}"/>
+    <dgm:cxn modelId="{F232DB0F-D1DA-4851-84BA-3F5473E143D9}" srcId="{EE40FFF8-103D-4F45-B85F-403984910D7F}" destId="{295C1A26-C0BB-4CC5-A7C3-C9BB31F1079B}" srcOrd="5" destOrd="0" parTransId="{CCADCD90-BF8B-4450-868B-55E107F5E97C}" sibTransId="{2FF0FE31-AA20-4E75-AC28-31F2605A195E}"/>
+    <dgm:cxn modelId="{58354AFC-FF9F-4168-953F-3495D229016B}" srcId="{EE40FFF8-103D-4F45-B85F-403984910D7F}" destId="{EADE0D2D-1205-40C5-86CE-1D93146D1A90}" srcOrd="3" destOrd="0" parTransId="{1313A02D-916B-4376-9187-E1513360A3B7}" sibTransId="{FE89EA1D-5BF4-4389-891E-1C4333E940F1}"/>
+    <dgm:cxn modelId="{91C181B8-EF46-47FF-908C-8CEFA6F32B8D}" type="presOf" srcId="{7EB9B65E-F1F1-4C0C-BCEF-84E7CC628B93}" destId="{5830255F-49E8-44C9-A5BD-24B9CDC2A666}" srcOrd="0" destOrd="0" presId="urn:microsoft.com/office/officeart/2005/8/layout/chevron2"/>
+    <dgm:cxn modelId="{F95291AB-9FCB-45A0-9370-1BE1E020A44C}" type="presOf" srcId="{CED0AB39-B94A-4134-95E2-43EA72704BE0}" destId="{DAD2E2F8-54E6-4FAE-A9BD-86AF88168CB8}" srcOrd="0" destOrd="0" presId="urn:microsoft.com/office/officeart/2005/8/layout/chevron2"/>
+    <dgm:cxn modelId="{6C1D7293-C30D-4549-AED5-F126A7367255}" srcId="{EADE0D2D-1205-40C5-86CE-1D93146D1A90}" destId="{CED0AB39-B94A-4134-95E2-43EA72704BE0}" srcOrd="0" destOrd="0" parTransId="{80922B93-8062-40AC-9F4A-4357962A9003}" sibTransId="{CD781B07-49E8-4330-97C4-09871056819B}"/>
     <dgm:cxn modelId="{4ED9D936-B292-48D0-8935-08A116E8717A}" type="presOf" srcId="{1002025F-1C72-4A21-ADB8-7F4B762D0701}" destId="{D87B602B-E23A-4814-B38E-6089C0F57C7A}" srcOrd="0" destOrd="0" presId="urn:microsoft.com/office/officeart/2005/8/layout/chevron2"/>
-    <dgm:cxn modelId="{F95291AB-9FCB-45A0-9370-1BE1E020A44C}" type="presOf" srcId="{CED0AB39-B94A-4134-95E2-43EA72704BE0}" destId="{DAD2E2F8-54E6-4FAE-A9BD-86AF88168CB8}" srcOrd="0" destOrd="0" presId="urn:microsoft.com/office/officeart/2005/8/layout/chevron2"/>
+    <dgm:cxn modelId="{946299B6-2978-4AD5-9265-3EC1C4717D78}" type="presOf" srcId="{1F8667CE-1C44-4E08-9A2B-FF616C613456}" destId="{C8AD4FE8-2A6D-4A55-9C0A-17A337DE34C6}" srcOrd="0" destOrd="0" presId="urn:microsoft.com/office/officeart/2005/8/layout/chevron2"/>
     <dgm:cxn modelId="{0C3B6F2C-FC7D-432A-9C28-77B4A1C9C28E}" srcId="{EE40FFF8-103D-4F45-B85F-403984910D7F}" destId="{55AF256D-980F-4EAC-BDE3-A1B7BB810149}" srcOrd="0" destOrd="0" parTransId="{748A717C-599F-4C3A-B811-C08F8B1B0759}" sibTransId="{A0FA65F2-48E1-4C84-8387-4B40ABD643EF}"/>
-    <dgm:cxn modelId="{4CB8A257-4370-4096-875D-308C3EB6A12E}" srcId="{1F8667CE-1C44-4E08-9A2B-FF616C613456}" destId="{95694C06-2B2B-4047-8F05-8E36FD842531}" srcOrd="0" destOrd="0" parTransId="{94B991CB-22F8-4502-8602-4106C506106C}" sibTransId="{9F3061E0-B093-4D7C-9680-103D4FEDC06A}"/>
-    <dgm:cxn modelId="{C6DCB072-4394-4062-AE87-BC3F79818562}" srcId="{1002025F-1C72-4A21-ADB8-7F4B762D0701}" destId="{AC1EF113-D03B-420E-911E-B92C916ACEDF}" srcOrd="0" destOrd="0" parTransId="{3596FEFB-719F-4095-B6C5-079E00E3C72E}" sibTransId="{E3F70FB8-8A18-4458-9266-24A45CFE504C}"/>
+    <dgm:cxn modelId="{A4387B6C-47C1-43EA-AB0B-C9634E0707DB}" srcId="{EE40FFF8-103D-4F45-B85F-403984910D7F}" destId="{1002025F-1C72-4A21-ADB8-7F4B762D0701}" srcOrd="6" destOrd="0" parTransId="{765806DF-0E39-44E0-9A16-10384E41AC7A}" sibTransId="{70204279-0190-443C-A74E-BDAC0C260844}"/>
+    <dgm:cxn modelId="{37FBB0B3-8481-4EE8-82FF-FE2847EDC146}" srcId="{EE40FFF8-103D-4F45-B85F-403984910D7F}" destId="{7EB9B65E-F1F1-4C0C-BCEF-84E7CC628B93}" srcOrd="4" destOrd="0" parTransId="{C6EC86F0-2776-4AB7-AEC7-E5C672323418}" sibTransId="{E25BEE93-F45D-4AF9-8923-EC981D9554A2}"/>
+    <dgm:cxn modelId="{3FEC02A6-3B33-4CA3-A1B8-B28E86AA8748}" type="presOf" srcId="{EE40FFF8-103D-4F45-B85F-403984910D7F}" destId="{C0F71877-8D45-45C6-ADEB-A07688B38294}" srcOrd="0" destOrd="0" presId="urn:microsoft.com/office/officeart/2005/8/layout/chevron2"/>
+    <dgm:cxn modelId="{CE4F279D-9FF2-4D7D-9662-E2C36EFB7600}" type="presOf" srcId="{295C1A26-C0BB-4CC5-A7C3-C9BB31F1079B}" destId="{63437E7B-65DF-4A27-B708-B701FB2F2D97}" srcOrd="0" destOrd="0" presId="urn:microsoft.com/office/officeart/2005/8/layout/chevron2"/>
+    <dgm:cxn modelId="{26FA470A-BC9E-4344-9C68-21FB9BEFE51D}" type="presOf" srcId="{2A98F07E-328C-46E7-8251-0118F4BFB566}" destId="{7A703FAB-2697-4360-9F76-B04086C14C7D}" srcOrd="0" destOrd="0" presId="urn:microsoft.com/office/officeart/2005/8/layout/chevron2"/>
+    <dgm:cxn modelId="{D979ED70-DEDD-4FF2-A9F4-B36066266231}" srcId="{A3920C65-3F7C-48E9-ACE8-6414D7482E18}" destId="{95B1ADF6-2F93-4BE7-9AC4-D1E9AB468A86}" srcOrd="0" destOrd="0" parTransId="{8E7CC16E-DEE7-448C-9AE8-94347153FD45}" sibTransId="{8B39424F-A08A-4296-B69A-35544451D833}"/>
     <dgm:cxn modelId="{69986308-9F57-4347-842D-2BFBFAA33A8D}" srcId="{EE40FFF8-103D-4F45-B85F-403984910D7F}" destId="{A3920C65-3F7C-48E9-ACE8-6414D7482E18}" srcOrd="1" destOrd="0" parTransId="{0F08BE9B-F890-421A-B90E-90EC86276BFA}" sibTransId="{A84EAA2E-6FF3-4307-8D22-5FB6E0659300}"/>
-    <dgm:cxn modelId="{946299B6-2978-4AD5-9265-3EC1C4717D78}" type="presOf" srcId="{1F8667CE-1C44-4E08-9A2B-FF616C613456}" destId="{C8AD4FE8-2A6D-4A55-9C0A-17A337DE34C6}" srcOrd="0" destOrd="0" presId="urn:microsoft.com/office/officeart/2005/8/layout/chevron2"/>
-    <dgm:cxn modelId="{0D5AABA5-A419-42AA-AAED-5BD1FF12B65B}" srcId="{295C1A26-C0BB-4CC5-A7C3-C9BB31F1079B}" destId="{A5B00B44-D32B-4A6A-9650-07C7E70EA17D}" srcOrd="0" destOrd="0" parTransId="{40DD1C00-2473-4003-BEC0-C004D7F14797}" sibTransId="{AA12AF86-DBFF-401E-8F90-8794184B09F1}"/>
-    <dgm:cxn modelId="{91C181B8-EF46-47FF-908C-8CEFA6F32B8D}" type="presOf" srcId="{7EB9B65E-F1F1-4C0C-BCEF-84E7CC628B93}" destId="{5830255F-49E8-44C9-A5BD-24B9CDC2A666}" srcOrd="0" destOrd="0" presId="urn:microsoft.com/office/officeart/2005/8/layout/chevron2"/>
-    <dgm:cxn modelId="{A4387B6C-47C1-43EA-AB0B-C9634E0707DB}" srcId="{EE40FFF8-103D-4F45-B85F-403984910D7F}" destId="{1002025F-1C72-4A21-ADB8-7F4B762D0701}" srcOrd="6" destOrd="0" parTransId="{765806DF-0E39-44E0-9A16-10384E41AC7A}" sibTransId="{70204279-0190-443C-A74E-BDAC0C260844}"/>
-    <dgm:cxn modelId="{CE4F279D-9FF2-4D7D-9662-E2C36EFB7600}" type="presOf" srcId="{295C1A26-C0BB-4CC5-A7C3-C9BB31F1079B}" destId="{63437E7B-65DF-4A27-B708-B701FB2F2D97}" srcOrd="0" destOrd="0" presId="urn:microsoft.com/office/officeart/2005/8/layout/chevron2"/>
-    <dgm:cxn modelId="{D979ED70-DEDD-4FF2-A9F4-B36066266231}" srcId="{A3920C65-3F7C-48E9-ACE8-6414D7482E18}" destId="{95B1ADF6-2F93-4BE7-9AC4-D1E9AB468A86}" srcOrd="0" destOrd="0" parTransId="{8E7CC16E-DEE7-448C-9AE8-94347153FD45}" sibTransId="{8B39424F-A08A-4296-B69A-35544451D833}"/>
-    <dgm:cxn modelId="{58354AFC-FF9F-4168-953F-3495D229016B}" srcId="{EE40FFF8-103D-4F45-B85F-403984910D7F}" destId="{EADE0D2D-1205-40C5-86CE-1D93146D1A90}" srcOrd="3" destOrd="0" parTransId="{1313A02D-916B-4376-9187-E1513360A3B7}" sibTransId="{FE89EA1D-5BF4-4389-891E-1C4333E940F1}"/>
-    <dgm:cxn modelId="{DCD357E6-3B99-4AC3-A81E-1D8E5B28EA4A}" type="presOf" srcId="{329A6205-D92F-4A22-8653-055AF4549D01}" destId="{99404815-EBB5-40EA-B4FB-18C60F71A14A}" srcOrd="0" destOrd="0" presId="urn:microsoft.com/office/officeart/2005/8/layout/chevron2"/>
-    <dgm:cxn modelId="{6C1D7293-C30D-4549-AED5-F126A7367255}" srcId="{EADE0D2D-1205-40C5-86CE-1D93146D1A90}" destId="{CED0AB39-B94A-4134-95E2-43EA72704BE0}" srcOrd="0" destOrd="0" parTransId="{80922B93-8062-40AC-9F4A-4357962A9003}" sibTransId="{CD781B07-49E8-4330-97C4-09871056819B}"/>
-    <dgm:cxn modelId="{37FBB0B3-8481-4EE8-82FF-FE2847EDC146}" srcId="{EE40FFF8-103D-4F45-B85F-403984910D7F}" destId="{7EB9B65E-F1F1-4C0C-BCEF-84E7CC628B93}" srcOrd="4" destOrd="0" parTransId="{C6EC86F0-2776-4AB7-AEC7-E5C672323418}" sibTransId="{E25BEE93-F45D-4AF9-8923-EC981D9554A2}"/>
-    <dgm:cxn modelId="{F232DB0F-D1DA-4851-84BA-3F5473E143D9}" srcId="{EE40FFF8-103D-4F45-B85F-403984910D7F}" destId="{295C1A26-C0BB-4CC5-A7C3-C9BB31F1079B}" srcOrd="5" destOrd="0" parTransId="{CCADCD90-BF8B-4450-868B-55E107F5E97C}" sibTransId="{2FF0FE31-AA20-4E75-AC28-31F2605A195E}"/>
-    <dgm:cxn modelId="{0103D843-07BC-46D7-B5CF-881EB1990E31}" type="presOf" srcId="{55AF256D-980F-4EAC-BDE3-A1B7BB810149}" destId="{FF38E5F5-B2ED-46F9-98AC-B8A051288B43}" srcOrd="0" destOrd="0" presId="urn:microsoft.com/office/officeart/2005/8/layout/chevron2"/>
-    <dgm:cxn modelId="{26FA470A-BC9E-4344-9C68-21FB9BEFE51D}" type="presOf" srcId="{2A98F07E-328C-46E7-8251-0118F4BFB566}" destId="{7A703FAB-2697-4360-9F76-B04086C14C7D}" srcOrd="0" destOrd="0" presId="urn:microsoft.com/office/officeart/2005/8/layout/chevron2"/>
-    <dgm:cxn modelId="{9C44351A-EAC8-4F14-8B59-4465E6F4228A}" type="presOf" srcId="{95694C06-2B2B-4047-8F05-8E36FD842531}" destId="{114B75A6-06AB-4193-B4F9-C42AEDF360ED}" srcOrd="0" destOrd="0" presId="urn:microsoft.com/office/officeart/2005/8/layout/chevron2"/>
     <dgm:cxn modelId="{A8D72F47-3DFC-4DF0-A79B-D8F9BFA00820}" type="presOf" srcId="{A5B00B44-D32B-4A6A-9650-07C7E70EA17D}" destId="{A736080A-6712-4C93-9E27-BF60389BE78D}" srcOrd="0" destOrd="0" presId="urn:microsoft.com/office/officeart/2005/8/layout/chevron2"/>
     <dgm:cxn modelId="{3E678A58-A92A-441B-BD75-D4E269FBDAEE}" type="presOf" srcId="{AC1EF113-D03B-420E-911E-B92C916ACEDF}" destId="{37953712-67A3-4E6D-83CD-63697DE27E74}" srcOrd="0" destOrd="0" presId="urn:microsoft.com/office/officeart/2005/8/layout/chevron2"/>
-    <dgm:cxn modelId="{003416AB-762C-4B98-B62B-189A70C864B9}" srcId="{7EB9B65E-F1F1-4C0C-BCEF-84E7CC628B93}" destId="{2A98F07E-328C-46E7-8251-0118F4BFB566}" srcOrd="0" destOrd="0" parTransId="{2D9A8C24-217F-4619-992B-B0C2B61B4D2D}" sibTransId="{363DC761-3722-44DA-B104-F9B7A7D09A14}"/>
-    <dgm:cxn modelId="{3FEC02A6-3B33-4CA3-A1B8-B28E86AA8748}" type="presOf" srcId="{EE40FFF8-103D-4F45-B85F-403984910D7F}" destId="{C0F71877-8D45-45C6-ADEB-A07688B38294}" srcOrd="0" destOrd="0" presId="urn:microsoft.com/office/officeart/2005/8/layout/chevron2"/>
-    <dgm:cxn modelId="{0EAD68A0-D989-4A37-96EB-6EE2F661AA46}" srcId="{EE40FFF8-103D-4F45-B85F-403984910D7F}" destId="{1F8667CE-1C44-4E08-9A2B-FF616C613456}" srcOrd="2" destOrd="0" parTransId="{EACB439E-3988-4013-BCE0-44C4BC1A809E}" sibTransId="{8A1EDCB2-7721-4B0B-9ECE-0E0736CDE7BE}"/>
     <dgm:cxn modelId="{80E9981C-D6AF-4AA0-AE34-95916BB6042D}" type="presParOf" srcId="{C0F71877-8D45-45C6-ADEB-A07688B38294}" destId="{33F818AB-FF01-4241-9AE4-10038E362029}" srcOrd="0" destOrd="0" presId="urn:microsoft.com/office/officeart/2005/8/layout/chevron2"/>
     <dgm:cxn modelId="{BD8631D0-F477-4DAE-87B1-937628472942}" type="presParOf" srcId="{33F818AB-FF01-4241-9AE4-10038E362029}" destId="{FF38E5F5-B2ED-46F9-98AC-B8A051288B43}" srcOrd="0" destOrd="0" presId="urn:microsoft.com/office/officeart/2005/8/layout/chevron2"/>
     <dgm:cxn modelId="{2D223C1E-935B-45DD-ABB9-BBD1CC91D5F5}" type="presParOf" srcId="{33F818AB-FF01-4241-9AE4-10038E362029}" destId="{99404815-EBB5-40EA-B4FB-18C60F71A14A}" srcOrd="1" destOrd="0" presId="urn:microsoft.com/office/officeart/2005/8/layout/chevron2"/>
@@ -4270,7 +4271,7 @@
           <a:p>
             <a:fld id="{FC81B089-160E-404A-8C73-8674F1782EA4}" type="datetimeFigureOut">
               <a:rPr lang="en-US" smtClean="0"/>
-              <a:t>8/21/2015</a:t>
+              <a:t>2/12/2016</a:t>
             </a:fld>
             <a:endParaRPr lang="en-US"/>
           </a:p>
@@ -7339,7 +7340,7 @@
           <a:p>
             <a:fld id="{D2B62928-2648-4210-B25C-2BD7B5FE2C7B}" type="datetimeFigureOut">
               <a:rPr lang="en-US" smtClean="0"/>
-              <a:t>8/21/2015</a:t>
+              <a:t>2/12/2016</a:t>
             </a:fld>
             <a:endParaRPr lang="en-US"/>
           </a:p>
@@ -7852,7 +7853,7 @@
           <a:p>
             <a:fld id="{D2B62928-2648-4210-B25C-2BD7B5FE2C7B}" type="datetimeFigureOut">
               <a:rPr lang="en-US" smtClean="0"/>
-              <a:t>8/21/2015</a:t>
+              <a:t>2/12/2016</a:t>
             </a:fld>
             <a:endParaRPr lang="en-US"/>
           </a:p>
@@ -8027,7 +8028,7 @@
           <a:p>
             <a:fld id="{D2B62928-2648-4210-B25C-2BD7B5FE2C7B}" type="datetimeFigureOut">
               <a:rPr lang="en-US" smtClean="0"/>
-              <a:t>8/21/2015</a:t>
+              <a:t>2/12/2016</a:t>
             </a:fld>
             <a:endParaRPr lang="en-US"/>
           </a:p>
@@ -8192,7 +8193,7 @@
           <a:p>
             <a:fld id="{D2B62928-2648-4210-B25C-2BD7B5FE2C7B}" type="datetimeFigureOut">
               <a:rPr lang="en-US" smtClean="0"/>
-              <a:t>8/21/2015</a:t>
+              <a:t>2/12/2016</a:t>
             </a:fld>
             <a:endParaRPr lang="en-US"/>
           </a:p>
@@ -11316,7 +11317,7 @@
           <a:p>
             <a:fld id="{D2B62928-2648-4210-B25C-2BD7B5FE2C7B}" type="datetimeFigureOut">
               <a:rPr lang="en-US" smtClean="0"/>
-              <a:t>8/21/2015</a:t>
+              <a:t>2/12/2016</a:t>
             </a:fld>
             <a:endParaRPr lang="en-US"/>
           </a:p>
@@ -11599,7 +11600,7 @@
           <a:p>
             <a:fld id="{D2B62928-2648-4210-B25C-2BD7B5FE2C7B}" type="datetimeFigureOut">
               <a:rPr lang="en-US" smtClean="0"/>
-              <a:t>8/21/2015</a:t>
+              <a:t>2/12/2016</a:t>
             </a:fld>
             <a:endParaRPr lang="en-US"/>
           </a:p>
@@ -12016,7 +12017,7 @@
           <a:p>
             <a:fld id="{D2B62928-2648-4210-B25C-2BD7B5FE2C7B}" type="datetimeFigureOut">
               <a:rPr lang="en-US" smtClean="0"/>
-              <a:t>8/21/2015</a:t>
+              <a:t>2/12/2016</a:t>
             </a:fld>
             <a:endParaRPr lang="en-US"/>
           </a:p>
@@ -12129,7 +12130,7 @@
           <a:p>
             <a:fld id="{D2B62928-2648-4210-B25C-2BD7B5FE2C7B}" type="datetimeFigureOut">
               <a:rPr lang="en-US" smtClean="0"/>
-              <a:t>8/21/2015</a:t>
+              <a:t>2/12/2016</a:t>
             </a:fld>
             <a:endParaRPr lang="en-US"/>
           </a:p>
@@ -12219,7 +12220,7 @@
           <a:p>
             <a:fld id="{D2B62928-2648-4210-B25C-2BD7B5FE2C7B}" type="datetimeFigureOut">
               <a:rPr lang="en-US" smtClean="0"/>
-              <a:t>8/21/2015</a:t>
+              <a:t>2/12/2016</a:t>
             </a:fld>
             <a:endParaRPr lang="en-US"/>
           </a:p>
@@ -12394,7 +12395,7 @@
           <a:p>
             <a:fld id="{D2B62928-2648-4210-B25C-2BD7B5FE2C7B}" type="datetimeFigureOut">
               <a:rPr lang="en-US" smtClean="0"/>
-              <a:t>8/21/2015</a:t>
+              <a:t>2/12/2016</a:t>
             </a:fld>
             <a:endParaRPr lang="en-US"/>
           </a:p>
@@ -12880,7 +12881,7 @@
           <a:p>
             <a:fld id="{D2B62928-2648-4210-B25C-2BD7B5FE2C7B}" type="datetimeFigureOut">
               <a:rPr lang="en-US" smtClean="0"/>
-              <a:t>8/21/2015</a:t>
+              <a:t>2/12/2016</a:t>
             </a:fld>
             <a:endParaRPr lang="en-US"/>
           </a:p>
@@ -13432,7 +13433,7 @@
           <a:p>
             <a:fld id="{D2B62928-2648-4210-B25C-2BD7B5FE2C7B}" type="datetimeFigureOut">
               <a:rPr lang="en-US" smtClean="0"/>
-              <a:t>8/21/2015</a:t>
+              <a:t>2/12/2016</a:t>
             </a:fld>
             <a:endParaRPr lang="en-US"/>
           </a:p>
@@ -14318,17 +14319,1820 @@
   <p:clrMapOvr>
     <a:masterClrMapping/>
   </p:clrMapOvr>
+</p:sld>
+</file>
+
+<file path=ppt/slides/slide10.xml><?xml version="1.0" encoding="utf-8"?>
+<p:sld xmlns:a="http://schemas.openxmlformats.org/drawingml/2006/main" xmlns:r="http://schemas.openxmlformats.org/officeDocument/2006/relationships" xmlns:p="http://schemas.openxmlformats.org/presentationml/2006/main">
+  <p:cSld>
+    <p:spTree>
+      <p:nvGrpSpPr>
+        <p:cNvPr id="1" name=""/>
+        <p:cNvGrpSpPr/>
+        <p:nvPr/>
+      </p:nvGrpSpPr>
+      <p:grpSpPr>
+        <a:xfrm>
+          <a:off x="0" y="0"/>
+          <a:ext cx="0" cy="0"/>
+          <a:chOff x="0" y="0"/>
+          <a:chExt cx="0" cy="0"/>
+        </a:xfrm>
+      </p:grpSpPr>
+      <p:sp>
+        <p:nvSpPr>
+          <p:cNvPr id="2" name="Title 1"/>
+          <p:cNvSpPr>
+            <a:spLocks noGrp="1"/>
+          </p:cNvSpPr>
+          <p:nvPr>
+            <p:ph type="title"/>
+          </p:nvPr>
+        </p:nvSpPr>
+        <p:spPr/>
+        <p:txBody>
+          <a:bodyPr/>
+          <a:lstStyle/>
+          <a:p>
+            <a:r>
+              <a:rPr lang="en-US" dirty="0" smtClean="0"/>
+              <a:t>Custom Diagnostic - Analyzer</a:t>
+            </a:r>
+            <a:endParaRPr lang="en-US" dirty="0"/>
+          </a:p>
+        </p:txBody>
+      </p:sp>
+      <p:sp>
+        <p:nvSpPr>
+          <p:cNvPr id="3" name="Content Placeholder 2"/>
+          <p:cNvSpPr>
+            <a:spLocks noGrp="1"/>
+          </p:cNvSpPr>
+          <p:nvPr>
+            <p:ph idx="1"/>
+          </p:nvPr>
+        </p:nvSpPr>
+        <p:spPr>
+          <a:solidFill>
+            <a:schemeClr val="tx1"/>
+          </a:solidFill>
+        </p:spPr>
+        <p:txBody>
+          <a:bodyPr>
+            <a:normAutofit/>
+          </a:bodyPr>
+          <a:lstStyle/>
+          <a:p>
+            <a:pPr marL="0" indent="0">
+              <a:buNone/>
+            </a:pPr>
+            <a:r>
+              <a:rPr lang="en-US" sz="1600" dirty="0">
+                <a:solidFill>
+                  <a:srgbClr val="000000"/>
+                </a:solidFill>
+                <a:highlight>
+                  <a:srgbClr val="FFFFFF"/>
+                </a:highlight>
+                <a:latin typeface="Consolas" panose="020B0609020204030204" pitchFamily="49" charset="0"/>
+              </a:rPr>
+              <a:t>[</a:t>
+            </a:r>
+            <a:r>
+              <a:rPr lang="en-US" sz="1600" dirty="0" err="1">
+                <a:solidFill>
+                  <a:srgbClr val="2B91AF"/>
+                </a:solidFill>
+                <a:highlight>
+                  <a:srgbClr val="FFFFFF"/>
+                </a:highlight>
+                <a:latin typeface="Consolas" panose="020B0609020204030204" pitchFamily="49" charset="0"/>
+              </a:rPr>
+              <a:t>DiagnosticAnalyzer</a:t>
+            </a:r>
+            <a:r>
+              <a:rPr lang="en-US" sz="1600" dirty="0">
+                <a:solidFill>
+                  <a:srgbClr val="000000"/>
+                </a:solidFill>
+                <a:highlight>
+                  <a:srgbClr val="FFFFFF"/>
+                </a:highlight>
+                <a:latin typeface="Consolas" panose="020B0609020204030204" pitchFamily="49" charset="0"/>
+              </a:rPr>
+              <a:t>(</a:t>
+            </a:r>
+            <a:r>
+              <a:rPr lang="en-US" sz="1600" dirty="0" err="1">
+                <a:solidFill>
+                  <a:srgbClr val="2B91AF"/>
+                </a:solidFill>
+                <a:highlight>
+                  <a:srgbClr val="FFFFFF"/>
+                </a:highlight>
+                <a:latin typeface="Consolas" panose="020B0609020204030204" pitchFamily="49" charset="0"/>
+              </a:rPr>
+              <a:t>LanguageNames</a:t>
+            </a:r>
+            <a:r>
+              <a:rPr lang="en-US" sz="1600" dirty="0" err="1">
+                <a:solidFill>
+                  <a:srgbClr val="000000"/>
+                </a:solidFill>
+                <a:highlight>
+                  <a:srgbClr val="FFFFFF"/>
+                </a:highlight>
+                <a:latin typeface="Consolas" panose="020B0609020204030204" pitchFamily="49" charset="0"/>
+              </a:rPr>
+              <a:t>.CSharp</a:t>
+            </a:r>
+            <a:r>
+              <a:rPr lang="en-US" sz="1600" dirty="0">
+                <a:solidFill>
+                  <a:srgbClr val="000000"/>
+                </a:solidFill>
+                <a:highlight>
+                  <a:srgbClr val="FFFFFF"/>
+                </a:highlight>
+                <a:latin typeface="Consolas" panose="020B0609020204030204" pitchFamily="49" charset="0"/>
+              </a:rPr>
+              <a:t>)]</a:t>
+            </a:r>
+          </a:p>
+          <a:p>
+            <a:pPr marL="0" indent="0">
+              <a:buNone/>
+            </a:pPr>
+            <a:r>
+              <a:rPr lang="en-US" sz="1600" dirty="0">
+                <a:solidFill>
+                  <a:srgbClr val="0000FF"/>
+                </a:solidFill>
+                <a:highlight>
+                  <a:srgbClr val="FFFFFF"/>
+                </a:highlight>
+                <a:latin typeface="Consolas" panose="020B0609020204030204" pitchFamily="49" charset="0"/>
+              </a:rPr>
+              <a:t>public</a:t>
+            </a:r>
+            <a:r>
+              <a:rPr lang="en-US" sz="1600" dirty="0">
+                <a:solidFill>
+                  <a:srgbClr val="000000"/>
+                </a:solidFill>
+                <a:highlight>
+                  <a:srgbClr val="FFFFFF"/>
+                </a:highlight>
+                <a:latin typeface="Consolas" panose="020B0609020204030204" pitchFamily="49" charset="0"/>
+              </a:rPr>
+              <a:t> </a:t>
+            </a:r>
+            <a:r>
+              <a:rPr lang="en-US" sz="1600" dirty="0">
+                <a:solidFill>
+                  <a:srgbClr val="0000FF"/>
+                </a:solidFill>
+                <a:highlight>
+                  <a:srgbClr val="FFFFFF"/>
+                </a:highlight>
+                <a:latin typeface="Consolas" panose="020B0609020204030204" pitchFamily="49" charset="0"/>
+              </a:rPr>
+              <a:t>class</a:t>
+            </a:r>
+            <a:r>
+              <a:rPr lang="en-US" sz="1600" dirty="0">
+                <a:solidFill>
+                  <a:srgbClr val="000000"/>
+                </a:solidFill>
+                <a:highlight>
+                  <a:srgbClr val="FFFFFF"/>
+                </a:highlight>
+                <a:latin typeface="Consolas" panose="020B0609020204030204" pitchFamily="49" charset="0"/>
+              </a:rPr>
+              <a:t> </a:t>
+            </a:r>
+            <a:r>
+              <a:rPr lang="en-US" sz="1600" dirty="0" err="1">
+                <a:solidFill>
+                  <a:srgbClr val="2B91AF"/>
+                </a:solidFill>
+                <a:highlight>
+                  <a:srgbClr val="FFFFFF"/>
+                </a:highlight>
+                <a:latin typeface="Consolas" panose="020B0609020204030204" pitchFamily="49" charset="0"/>
+              </a:rPr>
+              <a:t>WebApiControllerNamingConventionAnalyzer</a:t>
+            </a:r>
+            <a:r>
+              <a:rPr lang="en-US" sz="1600" dirty="0">
+                <a:solidFill>
+                  <a:srgbClr val="000000"/>
+                </a:solidFill>
+                <a:highlight>
+                  <a:srgbClr val="FFFFFF"/>
+                </a:highlight>
+                <a:latin typeface="Consolas" panose="020B0609020204030204" pitchFamily="49" charset="0"/>
+              </a:rPr>
+              <a:t> : 	</a:t>
+            </a:r>
+            <a:r>
+              <a:rPr lang="en-US" sz="1600" dirty="0" err="1">
+                <a:solidFill>
+                  <a:srgbClr val="2B91AF"/>
+                </a:solidFill>
+                <a:highlight>
+                  <a:srgbClr val="FFFFFF"/>
+                </a:highlight>
+                <a:latin typeface="Consolas" panose="020B0609020204030204" pitchFamily="49" charset="0"/>
+              </a:rPr>
+              <a:t>DiagnosticAnalyzer</a:t>
+            </a:r>
+            <a:endParaRPr lang="en-US" sz="1600" dirty="0">
+              <a:solidFill>
+                <a:srgbClr val="000000"/>
+              </a:solidFill>
+              <a:highlight>
+                <a:srgbClr val="FFFFFF"/>
+              </a:highlight>
+              <a:latin typeface="Consolas" panose="020B0609020204030204" pitchFamily="49" charset="0"/>
+            </a:endParaRPr>
+          </a:p>
+          <a:p>
+            <a:pPr marL="0" indent="0">
+              <a:buNone/>
+            </a:pPr>
+            <a:r>
+              <a:rPr lang="en-US" sz="1600" dirty="0">
+                <a:solidFill>
+                  <a:srgbClr val="000000"/>
+                </a:solidFill>
+                <a:highlight>
+                  <a:srgbClr val="FFFFFF"/>
+                </a:highlight>
+                <a:latin typeface="Consolas" panose="020B0609020204030204" pitchFamily="49" charset="0"/>
+              </a:rPr>
+              <a:t>{</a:t>
+            </a:r>
+          </a:p>
+          <a:p>
+            <a:pPr marL="0" indent="0">
+              <a:buNone/>
+            </a:pPr>
+            <a:r>
+              <a:rPr lang="en-US" sz="1600" dirty="0">
+                <a:solidFill>
+                  <a:srgbClr val="0000FF"/>
+                </a:solidFill>
+                <a:highlight>
+                  <a:srgbClr val="FFFFFF"/>
+                </a:highlight>
+                <a:latin typeface="Consolas" panose="020B0609020204030204" pitchFamily="49" charset="0"/>
+              </a:rPr>
+              <a:t>    string</a:t>
+            </a:r>
+            <a:r>
+              <a:rPr lang="en-US" sz="1600" dirty="0">
+                <a:solidFill>
+                  <a:srgbClr val="000000"/>
+                </a:solidFill>
+                <a:highlight>
+                  <a:srgbClr val="FFFFFF"/>
+                </a:highlight>
+                <a:latin typeface="Consolas" panose="020B0609020204030204" pitchFamily="49" charset="0"/>
+              </a:rPr>
+              <a:t> </a:t>
+            </a:r>
+            <a:r>
+              <a:rPr lang="en-US" sz="1600" dirty="0" err="1">
+                <a:solidFill>
+                  <a:srgbClr val="000000"/>
+                </a:solidFill>
+                <a:highlight>
+                  <a:srgbClr val="FFFFFF"/>
+                </a:highlight>
+                <a:latin typeface="Consolas" panose="020B0609020204030204" pitchFamily="49" charset="0"/>
+              </a:rPr>
+              <a:t>DiagnosticId</a:t>
+            </a:r>
+            <a:r>
+              <a:rPr lang="en-US" sz="1600" dirty="0">
+                <a:solidFill>
+                  <a:srgbClr val="000000"/>
+                </a:solidFill>
+                <a:highlight>
+                  <a:srgbClr val="FFFFFF"/>
+                </a:highlight>
+                <a:latin typeface="Consolas" panose="020B0609020204030204" pitchFamily="49" charset="0"/>
+              </a:rPr>
+              <a:t> = </a:t>
+            </a:r>
+            <a:r>
+              <a:rPr lang="en-US" sz="1600" dirty="0">
+                <a:solidFill>
+                  <a:srgbClr val="A31515"/>
+                </a:solidFill>
+                <a:highlight>
+                  <a:srgbClr val="FFFFFF"/>
+                </a:highlight>
+                <a:latin typeface="Consolas" panose="020B0609020204030204" pitchFamily="49" charset="0"/>
+              </a:rPr>
+              <a:t>“WA0001"</a:t>
+            </a:r>
+            <a:r>
+              <a:rPr lang="en-US" sz="1600" dirty="0">
+                <a:solidFill>
+                  <a:srgbClr val="000000"/>
+                </a:solidFill>
+                <a:highlight>
+                  <a:srgbClr val="FFFFFF"/>
+                </a:highlight>
+                <a:latin typeface="Consolas" panose="020B0609020204030204" pitchFamily="49" charset="0"/>
+              </a:rPr>
+              <a:t>;</a:t>
+            </a:r>
+          </a:p>
+          <a:p>
+            <a:pPr marL="0" indent="0">
+              <a:buNone/>
+            </a:pPr>
+            <a:r>
+              <a:rPr lang="en-US" sz="1600" dirty="0">
+                <a:solidFill>
+                  <a:srgbClr val="0000FF"/>
+                </a:solidFill>
+                <a:highlight>
+                  <a:srgbClr val="FFFFFF"/>
+                </a:highlight>
+                <a:latin typeface="Consolas" panose="020B0609020204030204" pitchFamily="49" charset="0"/>
+              </a:rPr>
+              <a:t>    string</a:t>
+            </a:r>
+            <a:r>
+              <a:rPr lang="en-US" sz="1600" dirty="0">
+                <a:solidFill>
+                  <a:srgbClr val="000000"/>
+                </a:solidFill>
+                <a:highlight>
+                  <a:srgbClr val="FFFFFF"/>
+                </a:highlight>
+                <a:latin typeface="Consolas" panose="020B0609020204030204" pitchFamily="49" charset="0"/>
+              </a:rPr>
+              <a:t> Description = </a:t>
+            </a:r>
+            <a:r>
+              <a:rPr lang="en-US" sz="1600" dirty="0">
+                <a:solidFill>
+                  <a:srgbClr val="A31515"/>
+                </a:solidFill>
+                <a:highlight>
+                  <a:srgbClr val="FFFFFF"/>
+                </a:highlight>
+                <a:latin typeface="Consolas" panose="020B0609020204030204" pitchFamily="49" charset="0"/>
+              </a:rPr>
+              <a:t>"Controller type should end in 'Controller'"</a:t>
+            </a:r>
+            <a:r>
+              <a:rPr lang="en-US" sz="1600" dirty="0">
+                <a:solidFill>
+                  <a:srgbClr val="000000"/>
+                </a:solidFill>
+                <a:highlight>
+                  <a:srgbClr val="FFFFFF"/>
+                </a:highlight>
+                <a:latin typeface="Consolas" panose="020B0609020204030204" pitchFamily="49" charset="0"/>
+              </a:rPr>
+              <a:t>;</a:t>
+            </a:r>
+          </a:p>
+          <a:p>
+            <a:pPr marL="0" indent="0">
+              <a:buNone/>
+            </a:pPr>
+            <a:r>
+              <a:rPr lang="en-US" sz="1600" dirty="0">
+                <a:solidFill>
+                  <a:srgbClr val="0000FF"/>
+                </a:solidFill>
+                <a:highlight>
+                  <a:srgbClr val="FFFFFF"/>
+                </a:highlight>
+                <a:latin typeface="Consolas" panose="020B0609020204030204" pitchFamily="49" charset="0"/>
+              </a:rPr>
+              <a:t>    string</a:t>
+            </a:r>
+            <a:r>
+              <a:rPr lang="en-US" sz="1600" dirty="0">
+                <a:solidFill>
+                  <a:srgbClr val="000000"/>
+                </a:solidFill>
+                <a:highlight>
+                  <a:srgbClr val="FFFFFF"/>
+                </a:highlight>
+                <a:latin typeface="Consolas" panose="020B0609020204030204" pitchFamily="49" charset="0"/>
+              </a:rPr>
+              <a:t> </a:t>
+            </a:r>
+            <a:r>
+              <a:rPr lang="en-US" sz="1600" dirty="0" err="1">
+                <a:solidFill>
+                  <a:srgbClr val="000000"/>
+                </a:solidFill>
+                <a:highlight>
+                  <a:srgbClr val="FFFFFF"/>
+                </a:highlight>
+                <a:latin typeface="Consolas" panose="020B0609020204030204" pitchFamily="49" charset="0"/>
+              </a:rPr>
+              <a:t>MessageFormat</a:t>
+            </a:r>
+            <a:r>
+              <a:rPr lang="en-US" sz="1600" dirty="0">
+                <a:solidFill>
+                  <a:srgbClr val="000000"/>
+                </a:solidFill>
+                <a:highlight>
+                  <a:srgbClr val="FFFFFF"/>
+                </a:highlight>
+                <a:latin typeface="Consolas" panose="020B0609020204030204" pitchFamily="49" charset="0"/>
+              </a:rPr>
+              <a:t> = </a:t>
+            </a:r>
+            <a:r>
+              <a:rPr lang="en-US" sz="1600" dirty="0">
+                <a:solidFill>
+                  <a:srgbClr val="A31515"/>
+                </a:solidFill>
+                <a:highlight>
+                  <a:srgbClr val="FFFFFF"/>
+                </a:highlight>
+                <a:latin typeface="Consolas" panose="020B0609020204030204" pitchFamily="49" charset="0"/>
+              </a:rPr>
+              <a:t>"Type name '{0}' does not end in Controller"</a:t>
+            </a:r>
+            <a:r>
+              <a:rPr lang="en-US" sz="1600" dirty="0">
+                <a:solidFill>
+                  <a:srgbClr val="000000"/>
+                </a:solidFill>
+                <a:highlight>
+                  <a:srgbClr val="FFFFFF"/>
+                </a:highlight>
+                <a:latin typeface="Consolas" panose="020B0609020204030204" pitchFamily="49" charset="0"/>
+              </a:rPr>
+              <a:t>;</a:t>
+            </a:r>
+          </a:p>
+          <a:p>
+            <a:pPr marL="0" indent="0">
+              <a:buNone/>
+            </a:pPr>
+            <a:r>
+              <a:rPr lang="en-US" sz="1600" dirty="0">
+                <a:solidFill>
+                  <a:srgbClr val="000000"/>
+                </a:solidFill>
+                <a:highlight>
+                  <a:srgbClr val="FFFFFF"/>
+                </a:highlight>
+                <a:latin typeface="Consolas" panose="020B0609020204030204" pitchFamily="49" charset="0"/>
+              </a:rPr>
+              <a:t>    </a:t>
+            </a:r>
+            <a:r>
+              <a:rPr lang="en-US" sz="1600" dirty="0">
+                <a:solidFill>
+                  <a:srgbClr val="0000FF"/>
+                </a:solidFill>
+                <a:highlight>
+                  <a:srgbClr val="FFFFFF"/>
+                </a:highlight>
+                <a:latin typeface="Consolas" panose="020B0609020204030204" pitchFamily="49" charset="0"/>
+              </a:rPr>
+              <a:t>internal</a:t>
+            </a:r>
+            <a:r>
+              <a:rPr lang="en-US" sz="1600" dirty="0">
+                <a:solidFill>
+                  <a:srgbClr val="000000"/>
+                </a:solidFill>
+                <a:highlight>
+                  <a:srgbClr val="FFFFFF"/>
+                </a:highlight>
+                <a:latin typeface="Consolas" panose="020B0609020204030204" pitchFamily="49" charset="0"/>
+              </a:rPr>
+              <a:t> </a:t>
+            </a:r>
+            <a:r>
+              <a:rPr lang="en-US" sz="1600" dirty="0" err="1">
+                <a:solidFill>
+                  <a:srgbClr val="0000FF"/>
+                </a:solidFill>
+                <a:highlight>
+                  <a:srgbClr val="FFFFFF"/>
+                </a:highlight>
+                <a:latin typeface="Consolas" panose="020B0609020204030204" pitchFamily="49" charset="0"/>
+              </a:rPr>
+              <a:t>const</a:t>
+            </a:r>
+            <a:r>
+              <a:rPr lang="en-US" sz="1600" dirty="0">
+                <a:solidFill>
+                  <a:srgbClr val="000000"/>
+                </a:solidFill>
+                <a:highlight>
+                  <a:srgbClr val="FFFFFF"/>
+                </a:highlight>
+                <a:latin typeface="Consolas" panose="020B0609020204030204" pitchFamily="49" charset="0"/>
+              </a:rPr>
+              <a:t> </a:t>
+            </a:r>
+            <a:r>
+              <a:rPr lang="en-US" sz="1600" dirty="0">
+                <a:solidFill>
+                  <a:srgbClr val="0000FF"/>
+                </a:solidFill>
+                <a:highlight>
+                  <a:srgbClr val="FFFFFF"/>
+                </a:highlight>
+                <a:latin typeface="Consolas" panose="020B0609020204030204" pitchFamily="49" charset="0"/>
+              </a:rPr>
+              <a:t>string</a:t>
+            </a:r>
+            <a:r>
+              <a:rPr lang="en-US" sz="1600" dirty="0">
+                <a:solidFill>
+                  <a:srgbClr val="000000"/>
+                </a:solidFill>
+                <a:highlight>
+                  <a:srgbClr val="FFFFFF"/>
+                </a:highlight>
+                <a:latin typeface="Consolas" panose="020B0609020204030204" pitchFamily="49" charset="0"/>
+              </a:rPr>
+              <a:t> Category = </a:t>
+            </a:r>
+            <a:r>
+              <a:rPr lang="en-US" sz="1600" dirty="0">
+                <a:solidFill>
+                  <a:srgbClr val="A31515"/>
+                </a:solidFill>
+                <a:highlight>
+                  <a:srgbClr val="FFFFFF"/>
+                </a:highlight>
+                <a:latin typeface="Consolas" panose="020B0609020204030204" pitchFamily="49" charset="0"/>
+              </a:rPr>
+              <a:t>"Naming"</a:t>
+            </a:r>
+            <a:r>
+              <a:rPr lang="en-US" sz="1600" dirty="0">
+                <a:solidFill>
+                  <a:srgbClr val="000000"/>
+                </a:solidFill>
+                <a:highlight>
+                  <a:srgbClr val="FFFFFF"/>
+                </a:highlight>
+                <a:latin typeface="Consolas" panose="020B0609020204030204" pitchFamily="49" charset="0"/>
+              </a:rPr>
+              <a:t>;</a:t>
+            </a:r>
+          </a:p>
+          <a:p>
+            <a:pPr marL="0" indent="0">
+              <a:buNone/>
+            </a:pPr>
+            <a:r>
+              <a:rPr lang="en-US" sz="1600" dirty="0">
+                <a:solidFill>
+                  <a:srgbClr val="000000"/>
+                </a:solidFill>
+                <a:highlight>
+                  <a:srgbClr val="FFFFFF"/>
+                </a:highlight>
+                <a:latin typeface="Consolas" panose="020B0609020204030204" pitchFamily="49" charset="0"/>
+              </a:rPr>
+              <a:t>    </a:t>
+            </a:r>
+            <a:r>
+              <a:rPr lang="en-US" sz="1600" dirty="0">
+                <a:solidFill>
+                  <a:srgbClr val="0000FF"/>
+                </a:solidFill>
+                <a:highlight>
+                  <a:srgbClr val="FFFFFF"/>
+                </a:highlight>
+                <a:latin typeface="Consolas" panose="020B0609020204030204" pitchFamily="49" charset="0"/>
+              </a:rPr>
+              <a:t>private</a:t>
+            </a:r>
+            <a:r>
+              <a:rPr lang="en-US" sz="1600" dirty="0">
+                <a:solidFill>
+                  <a:srgbClr val="000000"/>
+                </a:solidFill>
+                <a:highlight>
+                  <a:srgbClr val="FFFFFF"/>
+                </a:highlight>
+                <a:latin typeface="Consolas" panose="020B0609020204030204" pitchFamily="49" charset="0"/>
+              </a:rPr>
+              <a:t> </a:t>
+            </a:r>
+            <a:r>
+              <a:rPr lang="en-US" sz="1600" dirty="0">
+                <a:solidFill>
+                  <a:srgbClr val="0000FF"/>
+                </a:solidFill>
+                <a:highlight>
+                  <a:srgbClr val="FFFFFF"/>
+                </a:highlight>
+                <a:latin typeface="Consolas" panose="020B0609020204030204" pitchFamily="49" charset="0"/>
+              </a:rPr>
+              <a:t>static</a:t>
+            </a:r>
+            <a:r>
+              <a:rPr lang="en-US" sz="1600" dirty="0">
+                <a:solidFill>
+                  <a:srgbClr val="000000"/>
+                </a:solidFill>
+                <a:highlight>
+                  <a:srgbClr val="FFFFFF"/>
+                </a:highlight>
+                <a:latin typeface="Consolas" panose="020B0609020204030204" pitchFamily="49" charset="0"/>
+              </a:rPr>
+              <a:t> </a:t>
+            </a:r>
+            <a:r>
+              <a:rPr lang="en-US" sz="1600" dirty="0" err="1">
+                <a:solidFill>
+                  <a:srgbClr val="2B91AF"/>
+                </a:solidFill>
+                <a:highlight>
+                  <a:srgbClr val="FFFFFF"/>
+                </a:highlight>
+                <a:latin typeface="Consolas" panose="020B0609020204030204" pitchFamily="49" charset="0"/>
+              </a:rPr>
+              <a:t>DiagnosticDescriptor</a:t>
+            </a:r>
+            <a:r>
+              <a:rPr lang="en-US" sz="1600" dirty="0">
+                <a:solidFill>
+                  <a:srgbClr val="000000"/>
+                </a:solidFill>
+                <a:highlight>
+                  <a:srgbClr val="FFFFFF"/>
+                </a:highlight>
+                <a:latin typeface="Consolas" panose="020B0609020204030204" pitchFamily="49" charset="0"/>
+              </a:rPr>
+              <a:t> Rule = </a:t>
+            </a:r>
+            <a:r>
+              <a:rPr lang="en-US" sz="1600" dirty="0">
+                <a:solidFill>
+                  <a:srgbClr val="0000FF"/>
+                </a:solidFill>
+                <a:highlight>
+                  <a:srgbClr val="FFFFFF"/>
+                </a:highlight>
+                <a:latin typeface="Consolas" panose="020B0609020204030204" pitchFamily="49" charset="0"/>
+              </a:rPr>
+              <a:t>new</a:t>
+            </a:r>
+            <a:r>
+              <a:rPr lang="en-US" sz="1600" dirty="0">
+                <a:solidFill>
+                  <a:srgbClr val="000000"/>
+                </a:solidFill>
+                <a:highlight>
+                  <a:srgbClr val="FFFFFF"/>
+                </a:highlight>
+                <a:latin typeface="Consolas" panose="020B0609020204030204" pitchFamily="49" charset="0"/>
+              </a:rPr>
+              <a:t> </a:t>
+            </a:r>
+            <a:r>
+              <a:rPr lang="en-US" sz="1600" dirty="0" err="1">
+                <a:solidFill>
+                  <a:srgbClr val="2B91AF"/>
+                </a:solidFill>
+                <a:highlight>
+                  <a:srgbClr val="FFFFFF"/>
+                </a:highlight>
+                <a:latin typeface="Consolas" panose="020B0609020204030204" pitchFamily="49" charset="0"/>
+              </a:rPr>
+              <a:t>DiagnosticDescriptor</a:t>
+            </a:r>
+            <a:r>
+              <a:rPr lang="en-US" sz="1600" dirty="0">
+                <a:solidFill>
+                  <a:srgbClr val="000000"/>
+                </a:solidFill>
+                <a:highlight>
+                  <a:srgbClr val="FFFFFF"/>
+                </a:highlight>
+                <a:latin typeface="Consolas" panose="020B0609020204030204" pitchFamily="49" charset="0"/>
+              </a:rPr>
+              <a:t>(</a:t>
+            </a:r>
+          </a:p>
+          <a:p>
+            <a:pPr marL="0" indent="0">
+              <a:buNone/>
+            </a:pPr>
+            <a:r>
+              <a:rPr lang="en-US" sz="1600" dirty="0">
+                <a:solidFill>
+                  <a:srgbClr val="000000"/>
+                </a:solidFill>
+                <a:highlight>
+                  <a:srgbClr val="FFFFFF"/>
+                </a:highlight>
+                <a:latin typeface="Consolas" panose="020B0609020204030204" pitchFamily="49" charset="0"/>
+              </a:rPr>
+              <a:t>        </a:t>
+            </a:r>
+            <a:r>
+              <a:rPr lang="en-US" sz="1600" dirty="0" err="1">
+                <a:solidFill>
+                  <a:srgbClr val="000000"/>
+                </a:solidFill>
+                <a:highlight>
+                  <a:srgbClr val="FFFFFF"/>
+                </a:highlight>
+                <a:latin typeface="Consolas" panose="020B0609020204030204" pitchFamily="49" charset="0"/>
+              </a:rPr>
+              <a:t>DiagnosticId</a:t>
+            </a:r>
+            <a:r>
+              <a:rPr lang="en-US" sz="1600" dirty="0">
+                <a:solidFill>
+                  <a:srgbClr val="000000"/>
+                </a:solidFill>
+                <a:highlight>
+                  <a:srgbClr val="FFFFFF"/>
+                </a:highlight>
+                <a:latin typeface="Consolas" panose="020B0609020204030204" pitchFamily="49" charset="0"/>
+              </a:rPr>
+              <a:t>, Description, </a:t>
+            </a:r>
+            <a:r>
+              <a:rPr lang="en-US" sz="1600" dirty="0" err="1">
+                <a:solidFill>
+                  <a:srgbClr val="000000"/>
+                </a:solidFill>
+                <a:highlight>
+                  <a:srgbClr val="FFFFFF"/>
+                </a:highlight>
+                <a:latin typeface="Consolas" panose="020B0609020204030204" pitchFamily="49" charset="0"/>
+              </a:rPr>
+              <a:t>MessageFormat</a:t>
+            </a:r>
+            <a:r>
+              <a:rPr lang="en-US" sz="1600" dirty="0">
+                <a:solidFill>
+                  <a:srgbClr val="000000"/>
+                </a:solidFill>
+                <a:highlight>
+                  <a:srgbClr val="FFFFFF"/>
+                </a:highlight>
+                <a:latin typeface="Consolas" panose="020B0609020204030204" pitchFamily="49" charset="0"/>
+              </a:rPr>
+              <a:t>, Category,</a:t>
+            </a:r>
+          </a:p>
+          <a:p>
+            <a:pPr marL="0" indent="0">
+              <a:buNone/>
+            </a:pPr>
+            <a:r>
+              <a:rPr lang="en-US" sz="1600" dirty="0">
+                <a:solidFill>
+                  <a:srgbClr val="000000"/>
+                </a:solidFill>
+                <a:highlight>
+                  <a:srgbClr val="FFFFFF"/>
+                </a:highlight>
+                <a:latin typeface="Consolas" panose="020B0609020204030204" pitchFamily="49" charset="0"/>
+              </a:rPr>
+              <a:t>        </a:t>
+            </a:r>
+            <a:r>
+              <a:rPr lang="en-US" sz="1600" dirty="0" err="1">
+                <a:solidFill>
+                  <a:srgbClr val="2B91AF"/>
+                </a:solidFill>
+                <a:highlight>
+                  <a:srgbClr val="FFFFFF"/>
+                </a:highlight>
+                <a:latin typeface="Consolas" panose="020B0609020204030204" pitchFamily="49" charset="0"/>
+              </a:rPr>
+              <a:t>DiagnosticSeverity</a:t>
+            </a:r>
+            <a:r>
+              <a:rPr lang="en-US" sz="1600" dirty="0" err="1">
+                <a:solidFill>
+                  <a:srgbClr val="000000"/>
+                </a:solidFill>
+                <a:highlight>
+                  <a:srgbClr val="FFFFFF"/>
+                </a:highlight>
+                <a:latin typeface="Consolas" panose="020B0609020204030204" pitchFamily="49" charset="0"/>
+              </a:rPr>
+              <a:t>.Warning</a:t>
+            </a:r>
+            <a:r>
+              <a:rPr lang="en-US" sz="1600" dirty="0">
+                <a:solidFill>
+                  <a:srgbClr val="000000"/>
+                </a:solidFill>
+                <a:highlight>
+                  <a:srgbClr val="FFFFFF"/>
+                </a:highlight>
+                <a:latin typeface="Consolas" panose="020B0609020204030204" pitchFamily="49" charset="0"/>
+              </a:rPr>
+              <a:t>, </a:t>
+            </a:r>
+            <a:r>
+              <a:rPr lang="en-US" sz="1600" dirty="0">
+                <a:solidFill>
+                  <a:srgbClr val="0000FF"/>
+                </a:solidFill>
+                <a:highlight>
+                  <a:srgbClr val="FFFFFF"/>
+                </a:highlight>
+                <a:latin typeface="Consolas" panose="020B0609020204030204" pitchFamily="49" charset="0"/>
+              </a:rPr>
+              <a:t>true</a:t>
+            </a:r>
+            <a:r>
+              <a:rPr lang="en-US" sz="1600" dirty="0">
+                <a:solidFill>
+                  <a:srgbClr val="000000"/>
+                </a:solidFill>
+                <a:highlight>
+                  <a:srgbClr val="FFFFFF"/>
+                </a:highlight>
+                <a:latin typeface="Consolas" panose="020B0609020204030204" pitchFamily="49" charset="0"/>
+              </a:rPr>
+              <a:t>);</a:t>
+            </a:r>
+          </a:p>
+          <a:p>
+            <a:pPr marL="0" indent="0">
+              <a:buNone/>
+            </a:pPr>
+            <a:endParaRPr lang="en-US" sz="1600" dirty="0">
+              <a:solidFill>
+                <a:srgbClr val="000000"/>
+              </a:solidFill>
+              <a:highlight>
+                <a:srgbClr val="FFFFFF"/>
+              </a:highlight>
+              <a:latin typeface="Consolas" panose="020B0609020204030204" pitchFamily="49" charset="0"/>
+            </a:endParaRPr>
+          </a:p>
+          <a:p>
+            <a:pPr marL="0" indent="0">
+              <a:buNone/>
+            </a:pPr>
+            <a:r>
+              <a:rPr lang="en-US" sz="1600" dirty="0">
+                <a:solidFill>
+                  <a:srgbClr val="000000"/>
+                </a:solidFill>
+                <a:highlight>
+                  <a:srgbClr val="FFFFFF"/>
+                </a:highlight>
+                <a:latin typeface="Consolas" panose="020B0609020204030204" pitchFamily="49" charset="0"/>
+              </a:rPr>
+              <a:t>    // Add implementation</a:t>
+            </a:r>
+          </a:p>
+          <a:p>
+            <a:pPr marL="0" indent="0">
+              <a:buNone/>
+            </a:pPr>
+            <a:r>
+              <a:rPr lang="en-US" sz="1600" dirty="0">
+                <a:solidFill>
+                  <a:srgbClr val="000000"/>
+                </a:solidFill>
+                <a:highlight>
+                  <a:srgbClr val="FFFFFF"/>
+                </a:highlight>
+                <a:latin typeface="Consolas" panose="020B0609020204030204" pitchFamily="49" charset="0"/>
+              </a:rPr>
+              <a:t>}</a:t>
+            </a:r>
+            <a:endParaRPr lang="en-US" sz="1600" dirty="0"/>
+          </a:p>
+        </p:txBody>
+      </p:sp>
+      <p:sp>
+        <p:nvSpPr>
+          <p:cNvPr id="4" name="TextBox 3"/>
+          <p:cNvSpPr txBox="1"/>
+          <p:nvPr/>
+        </p:nvSpPr>
+        <p:spPr>
+          <a:xfrm>
+            <a:off x="1981200" y="2667000"/>
+            <a:ext cx="8229600" cy="3970318"/>
+          </a:xfrm>
+          <a:prstGeom prst="rect">
+            <a:avLst/>
+          </a:prstGeom>
+          <a:solidFill>
+            <a:schemeClr val="tx1"/>
+          </a:solidFill>
+        </p:spPr>
+        <p:txBody>
+          <a:bodyPr wrap="square" rtlCol="0">
+            <a:spAutoFit/>
+          </a:bodyPr>
+          <a:lstStyle/>
+          <a:p>
+            <a:r>
+              <a:rPr lang="en-US" dirty="0">
+                <a:solidFill>
+                  <a:srgbClr val="0000FF"/>
+                </a:solidFill>
+                <a:highlight>
+                  <a:srgbClr val="FFFFFF"/>
+                </a:highlight>
+                <a:latin typeface="Consolas" panose="020B0609020204030204" pitchFamily="49" charset="0"/>
+              </a:rPr>
+              <a:t>private</a:t>
+            </a:r>
+            <a:r>
+              <a:rPr lang="en-US" dirty="0">
+                <a:solidFill>
+                  <a:srgbClr val="000000"/>
+                </a:solidFill>
+                <a:highlight>
+                  <a:srgbClr val="FFFFFF"/>
+                </a:highlight>
+                <a:latin typeface="Consolas" panose="020B0609020204030204" pitchFamily="49" charset="0"/>
+              </a:rPr>
+              <a:t> </a:t>
+            </a:r>
+            <a:r>
+              <a:rPr lang="en-US" dirty="0">
+                <a:solidFill>
+                  <a:srgbClr val="0000FF"/>
+                </a:solidFill>
+                <a:highlight>
+                  <a:srgbClr val="FFFFFF"/>
+                </a:highlight>
+                <a:latin typeface="Consolas" panose="020B0609020204030204" pitchFamily="49" charset="0"/>
+              </a:rPr>
+              <a:t>void</a:t>
+            </a:r>
+            <a:r>
+              <a:rPr lang="en-US" dirty="0">
+                <a:solidFill>
+                  <a:srgbClr val="000000"/>
+                </a:solidFill>
+                <a:highlight>
+                  <a:srgbClr val="FFFFFF"/>
+                </a:highlight>
+                <a:latin typeface="Consolas" panose="020B0609020204030204" pitchFamily="49" charset="0"/>
+              </a:rPr>
+              <a:t> Analyzer(</a:t>
+            </a:r>
+            <a:r>
+              <a:rPr lang="en-US" dirty="0" err="1">
+                <a:solidFill>
+                  <a:srgbClr val="2B91AF"/>
+                </a:solidFill>
+                <a:highlight>
+                  <a:srgbClr val="FFFFFF"/>
+                </a:highlight>
+                <a:latin typeface="Consolas" panose="020B0609020204030204" pitchFamily="49" charset="0"/>
+              </a:rPr>
+              <a:t>SymbolAnalysisContext</a:t>
+            </a:r>
+            <a:r>
+              <a:rPr lang="en-US" dirty="0">
+                <a:solidFill>
+                  <a:srgbClr val="000000"/>
+                </a:solidFill>
+                <a:highlight>
+                  <a:srgbClr val="FFFFFF"/>
+                </a:highlight>
+                <a:latin typeface="Consolas" panose="020B0609020204030204" pitchFamily="49" charset="0"/>
+              </a:rPr>
+              <a:t> context)</a:t>
+            </a:r>
+          </a:p>
+          <a:p>
+            <a:r>
+              <a:rPr lang="en-US" dirty="0">
+                <a:solidFill>
+                  <a:srgbClr val="000000"/>
+                </a:solidFill>
+                <a:highlight>
+                  <a:srgbClr val="FFFFFF"/>
+                </a:highlight>
+                <a:latin typeface="Consolas" panose="020B0609020204030204" pitchFamily="49" charset="0"/>
+              </a:rPr>
+              <a:t>{</a:t>
+            </a:r>
+          </a:p>
+          <a:p>
+            <a:r>
+              <a:rPr lang="en-US" dirty="0">
+                <a:solidFill>
+                  <a:srgbClr val="000000"/>
+                </a:solidFill>
+                <a:highlight>
+                  <a:srgbClr val="FFFFFF"/>
+                </a:highlight>
+                <a:latin typeface="Consolas" panose="020B0609020204030204" pitchFamily="49" charset="0"/>
+              </a:rPr>
+              <a:t>    </a:t>
+            </a:r>
+            <a:r>
+              <a:rPr lang="en-US" dirty="0" err="1">
+                <a:solidFill>
+                  <a:srgbClr val="0000FF"/>
+                </a:solidFill>
+                <a:highlight>
+                  <a:srgbClr val="FFFFFF"/>
+                </a:highlight>
+                <a:latin typeface="Consolas" panose="020B0609020204030204" pitchFamily="49" charset="0"/>
+              </a:rPr>
+              <a:t>var</a:t>
+            </a:r>
+            <a:r>
+              <a:rPr lang="en-US" dirty="0">
+                <a:solidFill>
+                  <a:srgbClr val="000000"/>
+                </a:solidFill>
+                <a:highlight>
+                  <a:srgbClr val="FFFFFF"/>
+                </a:highlight>
+                <a:latin typeface="Consolas" panose="020B0609020204030204" pitchFamily="49" charset="0"/>
+              </a:rPr>
+              <a:t> symbol = (</a:t>
+            </a:r>
+            <a:r>
+              <a:rPr lang="en-US" dirty="0" err="1">
+                <a:solidFill>
+                  <a:srgbClr val="2B91AF"/>
+                </a:solidFill>
+                <a:highlight>
+                  <a:srgbClr val="FFFFFF"/>
+                </a:highlight>
+                <a:latin typeface="Consolas" panose="020B0609020204030204" pitchFamily="49" charset="0"/>
+              </a:rPr>
+              <a:t>INamedTypeSymbol</a:t>
+            </a:r>
+            <a:r>
+              <a:rPr lang="en-US" dirty="0">
+                <a:solidFill>
+                  <a:srgbClr val="000000"/>
+                </a:solidFill>
+                <a:highlight>
+                  <a:srgbClr val="FFFFFF"/>
+                </a:highlight>
+                <a:latin typeface="Consolas" panose="020B0609020204030204" pitchFamily="49" charset="0"/>
+              </a:rPr>
+              <a:t>)</a:t>
+            </a:r>
+            <a:r>
+              <a:rPr lang="en-US" dirty="0" err="1">
+                <a:solidFill>
+                  <a:srgbClr val="000000"/>
+                </a:solidFill>
+                <a:highlight>
+                  <a:srgbClr val="FFFFFF"/>
+                </a:highlight>
+                <a:latin typeface="Consolas" panose="020B0609020204030204" pitchFamily="49" charset="0"/>
+              </a:rPr>
+              <a:t>context.Symbol</a:t>
+            </a:r>
+            <a:r>
+              <a:rPr lang="en-US" dirty="0">
+                <a:solidFill>
+                  <a:srgbClr val="000000"/>
+                </a:solidFill>
+                <a:highlight>
+                  <a:srgbClr val="FFFFFF"/>
+                </a:highlight>
+                <a:latin typeface="Consolas" panose="020B0609020204030204" pitchFamily="49" charset="0"/>
+              </a:rPr>
+              <a:t>;</a:t>
+            </a:r>
+          </a:p>
+          <a:p>
+            <a:r>
+              <a:rPr lang="en-US" dirty="0">
+                <a:solidFill>
+                  <a:srgbClr val="000000"/>
+                </a:solidFill>
+                <a:highlight>
+                  <a:srgbClr val="FFFFFF"/>
+                </a:highlight>
+                <a:latin typeface="Consolas" panose="020B0609020204030204" pitchFamily="49" charset="0"/>
+              </a:rPr>
+              <a:t>    </a:t>
+            </a:r>
+            <a:r>
+              <a:rPr lang="en-US" dirty="0">
+                <a:solidFill>
+                  <a:srgbClr val="0000FF"/>
+                </a:solidFill>
+                <a:highlight>
+                  <a:srgbClr val="FFFFFF"/>
+                </a:highlight>
+                <a:latin typeface="Consolas" panose="020B0609020204030204" pitchFamily="49" charset="0"/>
+              </a:rPr>
+              <a:t>if</a:t>
+            </a:r>
+            <a:r>
+              <a:rPr lang="en-US" dirty="0">
+                <a:solidFill>
+                  <a:srgbClr val="000000"/>
+                </a:solidFill>
+                <a:highlight>
+                  <a:srgbClr val="FFFFFF"/>
+                </a:highlight>
+                <a:latin typeface="Consolas" panose="020B0609020204030204" pitchFamily="49" charset="0"/>
+              </a:rPr>
+              <a:t> (</a:t>
+            </a:r>
+            <a:r>
+              <a:rPr lang="en-US" dirty="0" err="1">
+                <a:solidFill>
+                  <a:srgbClr val="000000"/>
+                </a:solidFill>
+                <a:highlight>
+                  <a:srgbClr val="FFFFFF"/>
+                </a:highlight>
+                <a:latin typeface="Consolas" panose="020B0609020204030204" pitchFamily="49" charset="0"/>
+              </a:rPr>
+              <a:t>symbol.BaseType</a:t>
+            </a:r>
+            <a:r>
+              <a:rPr lang="en-US" dirty="0">
+                <a:solidFill>
+                  <a:srgbClr val="000000"/>
+                </a:solidFill>
+                <a:highlight>
+                  <a:srgbClr val="FFFFFF"/>
+                </a:highlight>
+                <a:latin typeface="Consolas" panose="020B0609020204030204" pitchFamily="49" charset="0"/>
+              </a:rPr>
+              <a:t> == </a:t>
+            </a:r>
+            <a:r>
+              <a:rPr lang="en-US" dirty="0">
+                <a:solidFill>
+                  <a:srgbClr val="0000FF"/>
+                </a:solidFill>
+                <a:highlight>
+                  <a:srgbClr val="FFFFFF"/>
+                </a:highlight>
+                <a:latin typeface="Consolas" panose="020B0609020204030204" pitchFamily="49" charset="0"/>
+              </a:rPr>
+              <a:t>null</a:t>
+            </a:r>
+            <a:r>
+              <a:rPr lang="en-US" dirty="0">
+                <a:solidFill>
+                  <a:srgbClr val="000000"/>
+                </a:solidFill>
+                <a:highlight>
+                  <a:srgbClr val="FFFFFF"/>
+                </a:highlight>
+                <a:latin typeface="Consolas" panose="020B0609020204030204" pitchFamily="49" charset="0"/>
+              </a:rPr>
+              <a:t>) </a:t>
+            </a:r>
+            <a:r>
+              <a:rPr lang="en-US" dirty="0">
+                <a:solidFill>
+                  <a:srgbClr val="0000FF"/>
+                </a:solidFill>
+                <a:highlight>
+                  <a:srgbClr val="FFFFFF"/>
+                </a:highlight>
+                <a:latin typeface="Consolas" panose="020B0609020204030204" pitchFamily="49" charset="0"/>
+              </a:rPr>
+              <a:t>return</a:t>
+            </a:r>
+            <a:r>
+              <a:rPr lang="en-US" dirty="0">
+                <a:solidFill>
+                  <a:srgbClr val="000000"/>
+                </a:solidFill>
+                <a:highlight>
+                  <a:srgbClr val="FFFFFF"/>
+                </a:highlight>
+                <a:latin typeface="Consolas" panose="020B0609020204030204" pitchFamily="49" charset="0"/>
+              </a:rPr>
+              <a:t>;</a:t>
+            </a:r>
+          </a:p>
+          <a:p>
+            <a:endParaRPr lang="en-US" dirty="0">
+              <a:solidFill>
+                <a:srgbClr val="000000"/>
+              </a:solidFill>
+              <a:highlight>
+                <a:srgbClr val="FFFFFF"/>
+              </a:highlight>
+              <a:latin typeface="Consolas" panose="020B0609020204030204" pitchFamily="49" charset="0"/>
+            </a:endParaRPr>
+          </a:p>
+          <a:p>
+            <a:r>
+              <a:rPr lang="en-US" dirty="0">
+                <a:solidFill>
+                  <a:srgbClr val="000000"/>
+                </a:solidFill>
+                <a:highlight>
+                  <a:srgbClr val="FFFFFF"/>
+                </a:highlight>
+                <a:latin typeface="Consolas" panose="020B0609020204030204" pitchFamily="49" charset="0"/>
+              </a:rPr>
+              <a:t>    </a:t>
+            </a:r>
+            <a:r>
+              <a:rPr lang="en-US" dirty="0">
+                <a:solidFill>
+                  <a:srgbClr val="0000FF"/>
+                </a:solidFill>
+                <a:highlight>
+                  <a:srgbClr val="FFFFFF"/>
+                </a:highlight>
+                <a:latin typeface="Consolas" panose="020B0609020204030204" pitchFamily="49" charset="0"/>
+              </a:rPr>
+              <a:t>if</a:t>
+            </a:r>
+            <a:r>
+              <a:rPr lang="en-US" dirty="0">
+                <a:solidFill>
+                  <a:srgbClr val="000000"/>
+                </a:solidFill>
+                <a:highlight>
+                  <a:srgbClr val="FFFFFF"/>
+                </a:highlight>
+                <a:latin typeface="Consolas" panose="020B0609020204030204" pitchFamily="49" charset="0"/>
+              </a:rPr>
+              <a:t> ((</a:t>
+            </a:r>
+            <a:r>
+              <a:rPr lang="en-US" dirty="0" err="1">
+                <a:solidFill>
+                  <a:srgbClr val="000000"/>
+                </a:solidFill>
+                <a:highlight>
+                  <a:srgbClr val="FFFFFF"/>
+                </a:highlight>
+                <a:latin typeface="Consolas" panose="020B0609020204030204" pitchFamily="49" charset="0"/>
+              </a:rPr>
+              <a:t>symbol.BaseType.Name</a:t>
+            </a:r>
+            <a:r>
+              <a:rPr lang="en-US" dirty="0">
+                <a:solidFill>
+                  <a:srgbClr val="000000"/>
+                </a:solidFill>
+                <a:highlight>
+                  <a:srgbClr val="FFFFFF"/>
+                </a:highlight>
+                <a:latin typeface="Consolas" panose="020B0609020204030204" pitchFamily="49" charset="0"/>
+              </a:rPr>
+              <a:t> == </a:t>
+            </a:r>
+            <a:r>
+              <a:rPr lang="en-US" dirty="0">
+                <a:solidFill>
+                  <a:srgbClr val="A31515"/>
+                </a:solidFill>
+                <a:highlight>
+                  <a:srgbClr val="FFFFFF"/>
+                </a:highlight>
+                <a:latin typeface="Consolas" panose="020B0609020204030204" pitchFamily="49" charset="0"/>
+              </a:rPr>
+              <a:t>"Controller"</a:t>
+            </a:r>
+            <a:r>
+              <a:rPr lang="en-US" dirty="0">
+                <a:solidFill>
+                  <a:srgbClr val="000000"/>
+                </a:solidFill>
+                <a:highlight>
+                  <a:srgbClr val="FFFFFF"/>
+                </a:highlight>
+                <a:latin typeface="Consolas" panose="020B0609020204030204" pitchFamily="49" charset="0"/>
+              </a:rPr>
+              <a:t> </a:t>
+            </a:r>
+          </a:p>
+          <a:p>
+            <a:r>
+              <a:rPr lang="en-US" dirty="0">
+                <a:solidFill>
+                  <a:srgbClr val="000000"/>
+                </a:solidFill>
+                <a:highlight>
+                  <a:srgbClr val="FFFFFF"/>
+                </a:highlight>
+                <a:latin typeface="Consolas" panose="020B0609020204030204" pitchFamily="49" charset="0"/>
+              </a:rPr>
+              <a:t>      || </a:t>
+            </a:r>
+            <a:r>
+              <a:rPr lang="en-US" dirty="0" err="1">
+                <a:solidFill>
+                  <a:srgbClr val="000000"/>
+                </a:solidFill>
+                <a:highlight>
+                  <a:srgbClr val="FFFFFF"/>
+                </a:highlight>
+                <a:latin typeface="Consolas" panose="020B0609020204030204" pitchFamily="49" charset="0"/>
+              </a:rPr>
+              <a:t>symbol.BaseType.Name</a:t>
+            </a:r>
+            <a:r>
+              <a:rPr lang="en-US" dirty="0">
+                <a:solidFill>
+                  <a:srgbClr val="000000"/>
+                </a:solidFill>
+                <a:highlight>
+                  <a:srgbClr val="FFFFFF"/>
+                </a:highlight>
+                <a:latin typeface="Consolas" panose="020B0609020204030204" pitchFamily="49" charset="0"/>
+              </a:rPr>
+              <a:t> == </a:t>
+            </a:r>
+            <a:r>
+              <a:rPr lang="en-US" dirty="0">
+                <a:solidFill>
+                  <a:srgbClr val="A31515"/>
+                </a:solidFill>
+                <a:highlight>
+                  <a:srgbClr val="FFFFFF"/>
+                </a:highlight>
+                <a:latin typeface="Consolas" panose="020B0609020204030204" pitchFamily="49" charset="0"/>
+              </a:rPr>
+              <a:t>"</a:t>
+            </a:r>
+            <a:r>
+              <a:rPr lang="en-US" dirty="0" err="1">
+                <a:solidFill>
+                  <a:srgbClr val="A31515"/>
+                </a:solidFill>
+                <a:highlight>
+                  <a:srgbClr val="FFFFFF"/>
+                </a:highlight>
+                <a:latin typeface="Consolas" panose="020B0609020204030204" pitchFamily="49" charset="0"/>
+              </a:rPr>
+              <a:t>ApiController</a:t>
+            </a:r>
+            <a:r>
+              <a:rPr lang="en-US" dirty="0">
+                <a:solidFill>
+                  <a:srgbClr val="A31515"/>
+                </a:solidFill>
+                <a:highlight>
+                  <a:srgbClr val="FFFFFF"/>
+                </a:highlight>
+                <a:latin typeface="Consolas" panose="020B0609020204030204" pitchFamily="49" charset="0"/>
+              </a:rPr>
+              <a:t>"</a:t>
+            </a:r>
+            <a:r>
+              <a:rPr lang="en-US" dirty="0">
+                <a:solidFill>
+                  <a:srgbClr val="000000"/>
+                </a:solidFill>
+                <a:highlight>
+                  <a:srgbClr val="FFFFFF"/>
+                </a:highlight>
+                <a:latin typeface="Consolas" panose="020B0609020204030204" pitchFamily="49" charset="0"/>
+              </a:rPr>
+              <a:t>)</a:t>
+            </a:r>
+          </a:p>
+          <a:p>
+            <a:r>
+              <a:rPr lang="en-US" dirty="0">
+                <a:solidFill>
+                  <a:srgbClr val="000000"/>
+                </a:solidFill>
+                <a:highlight>
+                  <a:srgbClr val="FFFFFF"/>
+                </a:highlight>
+                <a:latin typeface="Consolas" panose="020B0609020204030204" pitchFamily="49" charset="0"/>
+              </a:rPr>
+              <a:t>      &amp;&amp; !</a:t>
+            </a:r>
+            <a:r>
+              <a:rPr lang="en-US" dirty="0" err="1">
+                <a:solidFill>
+                  <a:srgbClr val="000000"/>
+                </a:solidFill>
+                <a:highlight>
+                  <a:srgbClr val="FFFFFF"/>
+                </a:highlight>
+                <a:latin typeface="Consolas" panose="020B0609020204030204" pitchFamily="49" charset="0"/>
+              </a:rPr>
+              <a:t>symbol.Name.EndsWith</a:t>
+            </a:r>
+            <a:r>
+              <a:rPr lang="en-US" dirty="0">
+                <a:solidFill>
+                  <a:srgbClr val="000000"/>
+                </a:solidFill>
+                <a:highlight>
+                  <a:srgbClr val="FFFFFF"/>
+                </a:highlight>
+                <a:latin typeface="Consolas" panose="020B0609020204030204" pitchFamily="49" charset="0"/>
+              </a:rPr>
+              <a:t>(</a:t>
+            </a:r>
+            <a:r>
+              <a:rPr lang="en-US" dirty="0">
+                <a:solidFill>
+                  <a:srgbClr val="A31515"/>
+                </a:solidFill>
+                <a:highlight>
+                  <a:srgbClr val="FFFFFF"/>
+                </a:highlight>
+                <a:latin typeface="Consolas" panose="020B0609020204030204" pitchFamily="49" charset="0"/>
+              </a:rPr>
+              <a:t>"Controller"</a:t>
+            </a:r>
+            <a:r>
+              <a:rPr lang="en-US" dirty="0">
+                <a:solidFill>
+                  <a:srgbClr val="000000"/>
+                </a:solidFill>
+                <a:highlight>
+                  <a:srgbClr val="FFFFFF"/>
+                </a:highlight>
+                <a:latin typeface="Consolas" panose="020B0609020204030204" pitchFamily="49" charset="0"/>
+              </a:rPr>
+              <a:t>))</a:t>
+            </a:r>
+          </a:p>
+          <a:p>
+            <a:r>
+              <a:rPr lang="en-US" dirty="0">
+                <a:solidFill>
+                  <a:srgbClr val="000000"/>
+                </a:solidFill>
+                <a:highlight>
+                  <a:srgbClr val="FFFFFF"/>
+                </a:highlight>
+                <a:latin typeface="Consolas" panose="020B0609020204030204" pitchFamily="49" charset="0"/>
+              </a:rPr>
+              <a:t>    {</a:t>
+            </a:r>
+          </a:p>
+          <a:p>
+            <a:r>
+              <a:rPr lang="en-US" dirty="0">
+                <a:solidFill>
+                  <a:srgbClr val="000000"/>
+                </a:solidFill>
+                <a:highlight>
+                  <a:srgbClr val="FFFFFF"/>
+                </a:highlight>
+                <a:latin typeface="Consolas" panose="020B0609020204030204" pitchFamily="49" charset="0"/>
+              </a:rPr>
+              <a:t>        </a:t>
+            </a:r>
+            <a:r>
+              <a:rPr lang="en-US" dirty="0" err="1">
+                <a:solidFill>
+                  <a:srgbClr val="0000FF"/>
+                </a:solidFill>
+                <a:highlight>
+                  <a:srgbClr val="FFFFFF"/>
+                </a:highlight>
+                <a:latin typeface="Consolas" panose="020B0609020204030204" pitchFamily="49" charset="0"/>
+              </a:rPr>
+              <a:t>var</a:t>
+            </a:r>
+            <a:r>
+              <a:rPr lang="en-US" dirty="0">
+                <a:solidFill>
+                  <a:srgbClr val="000000"/>
+                </a:solidFill>
+                <a:highlight>
+                  <a:srgbClr val="FFFFFF"/>
+                </a:highlight>
+                <a:latin typeface="Consolas" panose="020B0609020204030204" pitchFamily="49" charset="0"/>
+              </a:rPr>
+              <a:t> diagnostic = </a:t>
+            </a:r>
+            <a:r>
+              <a:rPr lang="en-US" dirty="0" err="1">
+                <a:solidFill>
+                  <a:srgbClr val="2B91AF"/>
+                </a:solidFill>
+                <a:highlight>
+                  <a:srgbClr val="FFFFFF"/>
+                </a:highlight>
+                <a:latin typeface="Consolas" panose="020B0609020204030204" pitchFamily="49" charset="0"/>
+              </a:rPr>
+              <a:t>Diagnostic</a:t>
+            </a:r>
+            <a:r>
+              <a:rPr lang="en-US" dirty="0" err="1">
+                <a:solidFill>
+                  <a:srgbClr val="000000"/>
+                </a:solidFill>
+                <a:highlight>
+                  <a:srgbClr val="FFFFFF"/>
+                </a:highlight>
+                <a:latin typeface="Consolas" panose="020B0609020204030204" pitchFamily="49" charset="0"/>
+              </a:rPr>
+              <a:t>.Create</a:t>
+            </a:r>
+            <a:r>
+              <a:rPr lang="en-US" dirty="0">
+                <a:solidFill>
+                  <a:srgbClr val="000000"/>
+                </a:solidFill>
+                <a:highlight>
+                  <a:srgbClr val="FFFFFF"/>
+                </a:highlight>
+                <a:latin typeface="Consolas" panose="020B0609020204030204" pitchFamily="49" charset="0"/>
+              </a:rPr>
+              <a:t>(</a:t>
+            </a:r>
+          </a:p>
+          <a:p>
+            <a:r>
+              <a:rPr lang="en-US" dirty="0">
+                <a:solidFill>
+                  <a:srgbClr val="000000"/>
+                </a:solidFill>
+                <a:highlight>
+                  <a:srgbClr val="FFFFFF"/>
+                </a:highlight>
+                <a:latin typeface="Consolas" panose="020B0609020204030204" pitchFamily="49" charset="0"/>
+              </a:rPr>
+              <a:t>            Rule, </a:t>
+            </a:r>
+            <a:r>
+              <a:rPr lang="en-US" dirty="0" err="1">
+                <a:solidFill>
+                  <a:srgbClr val="000000"/>
+                </a:solidFill>
+                <a:highlight>
+                  <a:srgbClr val="FFFFFF"/>
+                </a:highlight>
+                <a:latin typeface="Consolas" panose="020B0609020204030204" pitchFamily="49" charset="0"/>
+              </a:rPr>
+              <a:t>symbol.Locations</a:t>
+            </a:r>
+            <a:r>
+              <a:rPr lang="en-US" dirty="0">
+                <a:solidFill>
+                  <a:srgbClr val="000000"/>
+                </a:solidFill>
+                <a:highlight>
+                  <a:srgbClr val="FFFFFF"/>
+                </a:highlight>
+                <a:latin typeface="Consolas" panose="020B0609020204030204" pitchFamily="49" charset="0"/>
+              </a:rPr>
+              <a:t>[0], </a:t>
+            </a:r>
+            <a:r>
+              <a:rPr lang="en-US" dirty="0" err="1">
+                <a:solidFill>
+                  <a:srgbClr val="000000"/>
+                </a:solidFill>
+                <a:highlight>
+                  <a:srgbClr val="FFFFFF"/>
+                </a:highlight>
+                <a:latin typeface="Consolas" panose="020B0609020204030204" pitchFamily="49" charset="0"/>
+              </a:rPr>
+              <a:t>symbol.Name</a:t>
+            </a:r>
+            <a:r>
+              <a:rPr lang="en-US" dirty="0">
+                <a:solidFill>
+                  <a:srgbClr val="000000"/>
+                </a:solidFill>
+                <a:highlight>
+                  <a:srgbClr val="FFFFFF"/>
+                </a:highlight>
+                <a:latin typeface="Consolas" panose="020B0609020204030204" pitchFamily="49" charset="0"/>
+              </a:rPr>
+              <a:t>);</a:t>
+            </a:r>
+          </a:p>
+          <a:p>
+            <a:r>
+              <a:rPr lang="en-US" dirty="0">
+                <a:solidFill>
+                  <a:srgbClr val="000000"/>
+                </a:solidFill>
+                <a:highlight>
+                  <a:srgbClr val="FFFFFF"/>
+                </a:highlight>
+                <a:latin typeface="Consolas" panose="020B0609020204030204" pitchFamily="49" charset="0"/>
+              </a:rPr>
+              <a:t>        </a:t>
+            </a:r>
+            <a:r>
+              <a:rPr lang="en-US" dirty="0" err="1">
+                <a:solidFill>
+                  <a:srgbClr val="000000"/>
+                </a:solidFill>
+                <a:highlight>
+                  <a:srgbClr val="FFFFFF"/>
+                </a:highlight>
+                <a:latin typeface="Consolas" panose="020B0609020204030204" pitchFamily="49" charset="0"/>
+              </a:rPr>
+              <a:t>context.ReportDiagnostic</a:t>
+            </a:r>
+            <a:r>
+              <a:rPr lang="en-US" dirty="0">
+                <a:solidFill>
+                  <a:srgbClr val="000000"/>
+                </a:solidFill>
+                <a:highlight>
+                  <a:srgbClr val="FFFFFF"/>
+                </a:highlight>
+                <a:latin typeface="Consolas" panose="020B0609020204030204" pitchFamily="49" charset="0"/>
+              </a:rPr>
+              <a:t>(diagnostic);</a:t>
+            </a:r>
+          </a:p>
+          <a:p>
+            <a:r>
+              <a:rPr lang="en-US" dirty="0">
+                <a:solidFill>
+                  <a:srgbClr val="000000"/>
+                </a:solidFill>
+                <a:highlight>
+                  <a:srgbClr val="FFFFFF"/>
+                </a:highlight>
+                <a:latin typeface="Consolas" panose="020B0609020204030204" pitchFamily="49" charset="0"/>
+              </a:rPr>
+              <a:t>    }</a:t>
+            </a:r>
+          </a:p>
+          <a:p>
+            <a:r>
+              <a:rPr lang="en-US" dirty="0">
+                <a:solidFill>
+                  <a:srgbClr val="000000"/>
+                </a:solidFill>
+                <a:highlight>
+                  <a:srgbClr val="FFFFFF"/>
+                </a:highlight>
+                <a:latin typeface="Consolas" panose="020B0609020204030204" pitchFamily="49" charset="0"/>
+              </a:rPr>
+              <a:t>}</a:t>
+            </a:r>
+            <a:endParaRPr lang="en-US" dirty="0"/>
+          </a:p>
+        </p:txBody>
+      </p:sp>
+    </p:spTree>
+    <p:extLst>
+      <p:ext uri="{BB962C8B-B14F-4D97-AF65-F5344CB8AC3E}">
+        <p14:creationId xmlns:p14="http://schemas.microsoft.com/office/powerpoint/2010/main" val="908995456"/>
+      </p:ext>
+    </p:extLst>
+  </p:cSld>
+  <p:clrMapOvr>
+    <a:masterClrMapping/>
+  </p:clrMapOvr>
   <p:timing>
     <p:tnLst>
       <p:par>
-        <p:cTn id="1" dur="indefinite" restart="never" nodeType="tmRoot"/>
+        <p:cTn id="1" dur="indefinite" restart="never" nodeType="tmRoot">
+          <p:childTnLst>
+            <p:seq concurrent="1" nextAc="seek">
+              <p:cTn id="2" dur="indefinite" nodeType="mainSeq">
+                <p:childTnLst>
+                  <p:par>
+                    <p:cTn id="3" fill="hold">
+                      <p:stCondLst>
+                        <p:cond delay="indefinite"/>
+                      </p:stCondLst>
+                      <p:childTnLst>
+                        <p:par>
+                          <p:cTn id="4" fill="hold">
+                            <p:stCondLst>
+                              <p:cond delay="0"/>
+                            </p:stCondLst>
+                            <p:childTnLst>
+                              <p:par>
+                                <p:cTn id="5" presetID="2" presetClass="entr" presetSubtype="4" fill="hold" grpId="0" nodeType="clickEffect">
+                                  <p:stCondLst>
+                                    <p:cond delay="0"/>
+                                  </p:stCondLst>
+                                  <p:childTnLst>
+                                    <p:set>
+                                      <p:cBhvr>
+                                        <p:cTn id="6" dur="1" fill="hold">
+                                          <p:stCondLst>
+                                            <p:cond delay="0"/>
+                                          </p:stCondLst>
+                                        </p:cTn>
+                                        <p:tgtEl>
+                                          <p:spTgt spid="4"/>
+                                        </p:tgtEl>
+                                        <p:attrNameLst>
+                                          <p:attrName>style.visibility</p:attrName>
+                                        </p:attrNameLst>
+                                      </p:cBhvr>
+                                      <p:to>
+                                        <p:strVal val="visible"/>
+                                      </p:to>
+                                    </p:set>
+                                    <p:anim calcmode="lin" valueType="num">
+                                      <p:cBhvr additive="base">
+                                        <p:cTn id="7" dur="500" fill="hold"/>
+                                        <p:tgtEl>
+                                          <p:spTgt spid="4"/>
+                                        </p:tgtEl>
+                                        <p:attrNameLst>
+                                          <p:attrName>ppt_x</p:attrName>
+                                        </p:attrNameLst>
+                                      </p:cBhvr>
+                                      <p:tavLst>
+                                        <p:tav tm="0">
+                                          <p:val>
+                                            <p:strVal val="#ppt_x"/>
+                                          </p:val>
+                                        </p:tav>
+                                        <p:tav tm="100000">
+                                          <p:val>
+                                            <p:strVal val="#ppt_x"/>
+                                          </p:val>
+                                        </p:tav>
+                                      </p:tavLst>
+                                    </p:anim>
+                                    <p:anim calcmode="lin" valueType="num">
+                                      <p:cBhvr additive="base">
+                                        <p:cTn id="8" dur="500" fill="hold"/>
+                                        <p:tgtEl>
+                                          <p:spTgt spid="4"/>
+                                        </p:tgtEl>
+                                        <p:attrNameLst>
+                                          <p:attrName>ppt_y</p:attrName>
+                                        </p:attrNameLst>
+                                      </p:cBhvr>
+                                      <p:tavLst>
+                                        <p:tav tm="0">
+                                          <p:val>
+                                            <p:strVal val="1+#ppt_h/2"/>
+                                          </p:val>
+                                        </p:tav>
+                                        <p:tav tm="100000">
+                                          <p:val>
+                                            <p:strVal val="#ppt_y"/>
+                                          </p:val>
+                                        </p:tav>
+                                      </p:tavLst>
+                                    </p:anim>
+                                  </p:childTnLst>
+                                </p:cTn>
+                              </p:par>
+                            </p:childTnLst>
+                          </p:cTn>
+                        </p:par>
+                      </p:childTnLst>
+                    </p:cTn>
+                  </p:par>
+                </p:childTnLst>
+              </p:cTn>
+              <p:prevCondLst>
+                <p:cond evt="onPrev" delay="0">
+                  <p:tgtEl>
+                    <p:sldTgt/>
+                  </p:tgtEl>
+                </p:cond>
+              </p:prevCondLst>
+              <p:nextCondLst>
+                <p:cond evt="onNext" delay="0">
+                  <p:tgtEl>
+                    <p:sldTgt/>
+                  </p:tgtEl>
+                </p:cond>
+              </p:nextCondLst>
+            </p:seq>
+          </p:childTnLst>
+        </p:cTn>
       </p:par>
     </p:tnLst>
+    <p:bldLst>
+      <p:bldP spid="4" grpId="0" animBg="1"/>
+    </p:bldLst>
   </p:timing>
 </p:sld>
 </file>
 
-<file path=ppt/slides/slide10.xml><?xml version="1.0" encoding="utf-8"?>
+<file path=ppt/slides/slide11.xml><?xml version="1.0" encoding="utf-8"?>
 <p:sld xmlns:a="http://schemas.openxmlformats.org/drawingml/2006/main" xmlns:r="http://schemas.openxmlformats.org/officeDocument/2006/relationships" xmlns:p="http://schemas.openxmlformats.org/presentationml/2006/main">
   <p:cSld>
     <p:spTree>
@@ -17712,7 +19516,7 @@
 </p:sld>
 </file>
 
-<file path=ppt/slides/slide11.xml><?xml version="1.0" encoding="utf-8"?>
+<file path=ppt/slides/slide12.xml><?xml version="1.0" encoding="utf-8"?>
 <p:sld xmlns:a="http://schemas.openxmlformats.org/drawingml/2006/main" xmlns:r="http://schemas.openxmlformats.org/officeDocument/2006/relationships" xmlns:p="http://schemas.openxmlformats.org/presentationml/2006/main">
   <p:cSld>
     <p:spTree>
@@ -17877,17 +19681,10 @@
   <p:clrMapOvr>
     <a:masterClrMapping/>
   </p:clrMapOvr>
-  <p:timing>
-    <p:tnLst>
-      <p:par>
-        <p:cTn id="1" dur="indefinite" restart="never" nodeType="tmRoot"/>
-      </p:par>
-    </p:tnLst>
-  </p:timing>
 </p:sld>
 </file>
 
-<file path=ppt/slides/slide12.xml><?xml version="1.0" encoding="utf-8"?>
+<file path=ppt/slides/slide13.xml><?xml version="1.0" encoding="utf-8"?>
 <p:sld xmlns:a="http://schemas.openxmlformats.org/drawingml/2006/main" xmlns:r="http://schemas.openxmlformats.org/officeDocument/2006/relationships" xmlns:p="http://schemas.openxmlformats.org/presentationml/2006/main">
   <p:cSld>
     <p:spTree>
@@ -18204,17 +20001,10 @@
   <p:clrMapOvr>
     <a:masterClrMapping/>
   </p:clrMapOvr>
-  <p:timing>
-    <p:tnLst>
-      <p:par>
-        <p:cTn id="1" dur="indefinite" restart="never" nodeType="tmRoot"/>
-      </p:par>
-    </p:tnLst>
-  </p:timing>
 </p:sld>
 </file>
 
-<file path=ppt/slides/slide13.xml><?xml version="1.0" encoding="utf-8"?>
+<file path=ppt/slides/slide14.xml><?xml version="1.0" encoding="utf-8"?>
 <p:sld xmlns:a="http://schemas.openxmlformats.org/drawingml/2006/main" xmlns:r="http://schemas.openxmlformats.org/officeDocument/2006/relationships" xmlns:p="http://schemas.openxmlformats.org/presentationml/2006/main">
   <p:cSld>
     <p:spTree>
@@ -18720,13 +20510,6 @@
   <p:clrMapOvr>
     <a:masterClrMapping/>
   </p:clrMapOvr>
-  <p:timing>
-    <p:tnLst>
-      <p:par>
-        <p:cTn id="1" dur="indefinite" restart="never" nodeType="tmRoot"/>
-      </p:par>
-    </p:tnLst>
-  </p:timing>
 </p:sld>
 </file>
 
@@ -18831,13 +20614,6 @@
   <p:clrMapOvr>
     <a:masterClrMapping/>
   </p:clrMapOvr>
-  <p:timing>
-    <p:tnLst>
-      <p:par>
-        <p:cTn id="1" dur="indefinite" restart="never" nodeType="tmRoot"/>
-      </p:par>
-    </p:tnLst>
-  </p:timing>
 </p:sld>
 </file>
 
@@ -18953,13 +20729,6 @@
   <p:clrMapOvr>
     <a:masterClrMapping/>
   </p:clrMapOvr>
-  <p:timing>
-    <p:tnLst>
-      <p:par>
-        <p:cTn id="1" dur="indefinite" restart="never" nodeType="tmRoot"/>
-      </p:par>
-    </p:tnLst>
-  </p:timing>
 </p:sld>
 </file>
 
@@ -25113,6 +26882,153 @@
       </p:grpSpPr>
       <p:sp>
         <p:nvSpPr>
+          <p:cNvPr id="3" name="Content Placeholder 2"/>
+          <p:cNvSpPr>
+            <a:spLocks noGrp="1"/>
+          </p:cNvSpPr>
+          <p:nvPr>
+            <p:ph idx="1"/>
+          </p:nvPr>
+        </p:nvSpPr>
+        <p:spPr>
+          <a:xfrm>
+            <a:off x="609600" y="5715000"/>
+            <a:ext cx="10972800" cy="944564"/>
+          </a:xfrm>
+        </p:spPr>
+        <p:txBody>
+          <a:bodyPr/>
+          <a:lstStyle/>
+          <a:p>
+            <a:pPr algn="ctr"/>
+            <a:r>
+              <a:rPr lang="en-US" dirty="0"/>
+              <a:t>C#7 proposals - </a:t>
+            </a:r>
+            <a:r>
+              <a:rPr lang="en-US" dirty="0">
+                <a:hlinkClick r:id="rId2"/>
+              </a:rPr>
+              <a:t>https://</a:t>
+            </a:r>
+            <a:r>
+              <a:rPr lang="en-US" dirty="0" smtClean="0">
+                <a:hlinkClick r:id="rId2"/>
+              </a:rPr>
+              <a:t>github.com/dotnet/roslyn/issues/2136</a:t>
+            </a:r>
+            <a:r>
+              <a:rPr lang="en-US" dirty="0" smtClean="0"/>
+              <a:t> </a:t>
+            </a:r>
+            <a:endParaRPr lang="en-US" dirty="0"/>
+          </a:p>
+        </p:txBody>
+      </p:sp>
+      <p:pic>
+        <p:nvPicPr>
+          <p:cNvPr id="4" name="Picture 3"/>
+          <p:cNvPicPr>
+            <a:picLocks noChangeAspect="1"/>
+          </p:cNvPicPr>
+          <p:nvPr/>
+        </p:nvPicPr>
+        <p:blipFill>
+          <a:blip r:embed="rId3">
+            <a:extLst>
+              <a:ext uri="{28A0092B-C50C-407E-A947-70E740481C1C}">
+                <a14:useLocalDpi xmlns:a14="http://schemas.microsoft.com/office/drawing/2010/main" val="0"/>
+              </a:ext>
+            </a:extLst>
+          </a:blip>
+          <a:stretch>
+            <a:fillRect/>
+          </a:stretch>
+        </p:blipFill>
+        <p:spPr>
+          <a:xfrm>
+            <a:off x="1752600" y="533400"/>
+            <a:ext cx="8686800" cy="5119007"/>
+          </a:xfrm>
+          <a:prstGeom prst="rect">
+            <a:avLst/>
+          </a:prstGeom>
+        </p:spPr>
+      </p:pic>
+      <p:sp>
+        <p:nvSpPr>
+          <p:cNvPr id="6" name="TextBox 5"/>
+          <p:cNvSpPr txBox="1"/>
+          <p:nvPr/>
+        </p:nvSpPr>
+        <p:spPr>
+          <a:xfrm rot="21291473">
+            <a:off x="6736310" y="1300895"/>
+            <a:ext cx="1874186" cy="923330"/>
+          </a:xfrm>
+          <a:prstGeom prst="rect">
+            <a:avLst/>
+          </a:prstGeom>
+          <a:solidFill>
+            <a:schemeClr val="tx1"/>
+          </a:solidFill>
+        </p:spPr>
+        <p:txBody>
+          <a:bodyPr wrap="square" rtlCol="0">
+            <a:spAutoFit/>
+          </a:bodyPr>
+          <a:lstStyle/>
+          <a:p>
+            <a:r>
+              <a:rPr lang="en-US" sz="5400" dirty="0" smtClean="0">
+                <a:solidFill>
+                  <a:schemeClr val="bg1"/>
+                </a:solidFill>
+                <a:latin typeface="Berlin Sans FB" panose="020E0602020502020306" pitchFamily="34" charset="0"/>
+              </a:rPr>
+              <a:t>C# 7</a:t>
+            </a:r>
+            <a:endParaRPr lang="en-US" sz="5400" dirty="0">
+              <a:solidFill>
+                <a:schemeClr val="bg1"/>
+              </a:solidFill>
+              <a:latin typeface="Berlin Sans FB" panose="020E0602020502020306" pitchFamily="34" charset="0"/>
+            </a:endParaRPr>
+          </a:p>
+        </p:txBody>
+      </p:sp>
+    </p:spTree>
+    <p:extLst>
+      <p:ext uri="{BB962C8B-B14F-4D97-AF65-F5344CB8AC3E}">
+        <p14:creationId xmlns:p14="http://schemas.microsoft.com/office/powerpoint/2010/main" val="2091754440"/>
+      </p:ext>
+    </p:extLst>
+  </p:cSld>
+  <p:clrMapOvr>
+    <a:masterClrMapping/>
+  </p:clrMapOvr>
+</p:sld>
+</file>
+
+<file path=ppt/slides/slide7.xml><?xml version="1.0" encoding="utf-8"?>
+<p:sld xmlns:a="http://schemas.openxmlformats.org/drawingml/2006/main" xmlns:r="http://schemas.openxmlformats.org/officeDocument/2006/relationships" xmlns:p="http://schemas.openxmlformats.org/presentationml/2006/main">
+  <p:cSld>
+    <p:spTree>
+      <p:nvGrpSpPr>
+        <p:cNvPr id="1" name=""/>
+        <p:cNvGrpSpPr/>
+        <p:nvPr/>
+      </p:nvGrpSpPr>
+      <p:grpSpPr>
+        <a:xfrm>
+          <a:off x="0" y="0"/>
+          <a:ext cx="0" cy="0"/>
+          <a:chOff x="0" y="0"/>
+          <a:chExt cx="0" cy="0"/>
+        </a:xfrm>
+      </p:grpSpPr>
+      <p:sp>
+        <p:nvSpPr>
           <p:cNvPr id="18" name="Flowchart: Internal Storage 17"/>
           <p:cNvSpPr/>
           <p:nvPr/>
@@ -25853,7 +27769,7 @@
 </p:sld>
 </file>
 
-<file path=ppt/slides/slide7.xml><?xml version="1.0" encoding="utf-8"?>
+<file path=ppt/slides/slide8.xml><?xml version="1.0" encoding="utf-8"?>
 <p:sld xmlns:a="http://schemas.openxmlformats.org/drawingml/2006/main" xmlns:r="http://schemas.openxmlformats.org/officeDocument/2006/relationships" xmlns:p="http://schemas.openxmlformats.org/presentationml/2006/main">
   <p:cSld>
     <p:spTree>
@@ -26178,17 +28094,10 @@
   <p:clrMapOvr>
     <a:masterClrMapping/>
   </p:clrMapOvr>
-  <p:timing>
-    <p:tnLst>
-      <p:par>
-        <p:cTn id="1" dur="indefinite" restart="never" nodeType="tmRoot"/>
-      </p:par>
-    </p:tnLst>
-  </p:timing>
 </p:sld>
 </file>
 
-<file path=ppt/slides/slide8.xml><?xml version="1.0" encoding="utf-8"?>
+<file path=ppt/slides/slide9.xml><?xml version="1.0" encoding="utf-8"?>
 <p:sld xmlns:a="http://schemas.openxmlformats.org/drawingml/2006/main" xmlns:r="http://schemas.openxmlformats.org/officeDocument/2006/relationships" xmlns:p="http://schemas.openxmlformats.org/presentationml/2006/main">
   <p:cSld>
     <p:spTree>
@@ -27954,1816 +29863,6 @@
       <p:bldP spid="3" grpId="0" animBg="1"/>
       <p:bldP spid="8" grpId="0" animBg="1"/>
       <p:bldP spid="8" grpId="1" animBg="1"/>
-    </p:bldLst>
-  </p:timing>
-</p:sld>
-</file>
-
-<file path=ppt/slides/slide9.xml><?xml version="1.0" encoding="utf-8"?>
-<p:sld xmlns:a="http://schemas.openxmlformats.org/drawingml/2006/main" xmlns:r="http://schemas.openxmlformats.org/officeDocument/2006/relationships" xmlns:p="http://schemas.openxmlformats.org/presentationml/2006/main">
-  <p:cSld>
-    <p:spTree>
-      <p:nvGrpSpPr>
-        <p:cNvPr id="1" name=""/>
-        <p:cNvGrpSpPr/>
-        <p:nvPr/>
-      </p:nvGrpSpPr>
-      <p:grpSpPr>
-        <a:xfrm>
-          <a:off x="0" y="0"/>
-          <a:ext cx="0" cy="0"/>
-          <a:chOff x="0" y="0"/>
-          <a:chExt cx="0" cy="0"/>
-        </a:xfrm>
-      </p:grpSpPr>
-      <p:sp>
-        <p:nvSpPr>
-          <p:cNvPr id="2" name="Title 1"/>
-          <p:cNvSpPr>
-            <a:spLocks noGrp="1"/>
-          </p:cNvSpPr>
-          <p:nvPr>
-            <p:ph type="title"/>
-          </p:nvPr>
-        </p:nvSpPr>
-        <p:spPr/>
-        <p:txBody>
-          <a:bodyPr/>
-          <a:lstStyle/>
-          <a:p>
-            <a:r>
-              <a:rPr lang="en-US" dirty="0" smtClean="0"/>
-              <a:t>Custom Diagnostic - Analyzer</a:t>
-            </a:r>
-            <a:endParaRPr lang="en-US" dirty="0"/>
-          </a:p>
-        </p:txBody>
-      </p:sp>
-      <p:sp>
-        <p:nvSpPr>
-          <p:cNvPr id="3" name="Content Placeholder 2"/>
-          <p:cNvSpPr>
-            <a:spLocks noGrp="1"/>
-          </p:cNvSpPr>
-          <p:nvPr>
-            <p:ph idx="1"/>
-          </p:nvPr>
-        </p:nvSpPr>
-        <p:spPr>
-          <a:solidFill>
-            <a:schemeClr val="tx1"/>
-          </a:solidFill>
-        </p:spPr>
-        <p:txBody>
-          <a:bodyPr>
-            <a:normAutofit/>
-          </a:bodyPr>
-          <a:lstStyle/>
-          <a:p>
-            <a:pPr marL="0" indent="0">
-              <a:buNone/>
-            </a:pPr>
-            <a:r>
-              <a:rPr lang="en-US" sz="1600" dirty="0">
-                <a:solidFill>
-                  <a:srgbClr val="000000"/>
-                </a:solidFill>
-                <a:highlight>
-                  <a:srgbClr val="FFFFFF"/>
-                </a:highlight>
-                <a:latin typeface="Consolas" panose="020B0609020204030204" pitchFamily="49" charset="0"/>
-              </a:rPr>
-              <a:t>[</a:t>
-            </a:r>
-            <a:r>
-              <a:rPr lang="en-US" sz="1600" dirty="0" err="1">
-                <a:solidFill>
-                  <a:srgbClr val="2B91AF"/>
-                </a:solidFill>
-                <a:highlight>
-                  <a:srgbClr val="FFFFFF"/>
-                </a:highlight>
-                <a:latin typeface="Consolas" panose="020B0609020204030204" pitchFamily="49" charset="0"/>
-              </a:rPr>
-              <a:t>DiagnosticAnalyzer</a:t>
-            </a:r>
-            <a:r>
-              <a:rPr lang="en-US" sz="1600" dirty="0">
-                <a:solidFill>
-                  <a:srgbClr val="000000"/>
-                </a:solidFill>
-                <a:highlight>
-                  <a:srgbClr val="FFFFFF"/>
-                </a:highlight>
-                <a:latin typeface="Consolas" panose="020B0609020204030204" pitchFamily="49" charset="0"/>
-              </a:rPr>
-              <a:t>(</a:t>
-            </a:r>
-            <a:r>
-              <a:rPr lang="en-US" sz="1600" dirty="0" err="1">
-                <a:solidFill>
-                  <a:srgbClr val="2B91AF"/>
-                </a:solidFill>
-                <a:highlight>
-                  <a:srgbClr val="FFFFFF"/>
-                </a:highlight>
-                <a:latin typeface="Consolas" panose="020B0609020204030204" pitchFamily="49" charset="0"/>
-              </a:rPr>
-              <a:t>LanguageNames</a:t>
-            </a:r>
-            <a:r>
-              <a:rPr lang="en-US" sz="1600" dirty="0" err="1">
-                <a:solidFill>
-                  <a:srgbClr val="000000"/>
-                </a:solidFill>
-                <a:highlight>
-                  <a:srgbClr val="FFFFFF"/>
-                </a:highlight>
-                <a:latin typeface="Consolas" panose="020B0609020204030204" pitchFamily="49" charset="0"/>
-              </a:rPr>
-              <a:t>.CSharp</a:t>
-            </a:r>
-            <a:r>
-              <a:rPr lang="en-US" sz="1600" dirty="0">
-                <a:solidFill>
-                  <a:srgbClr val="000000"/>
-                </a:solidFill>
-                <a:highlight>
-                  <a:srgbClr val="FFFFFF"/>
-                </a:highlight>
-                <a:latin typeface="Consolas" panose="020B0609020204030204" pitchFamily="49" charset="0"/>
-              </a:rPr>
-              <a:t>)]</a:t>
-            </a:r>
-          </a:p>
-          <a:p>
-            <a:pPr marL="0" indent="0">
-              <a:buNone/>
-            </a:pPr>
-            <a:r>
-              <a:rPr lang="en-US" sz="1600" dirty="0">
-                <a:solidFill>
-                  <a:srgbClr val="0000FF"/>
-                </a:solidFill>
-                <a:highlight>
-                  <a:srgbClr val="FFFFFF"/>
-                </a:highlight>
-                <a:latin typeface="Consolas" panose="020B0609020204030204" pitchFamily="49" charset="0"/>
-              </a:rPr>
-              <a:t>public</a:t>
-            </a:r>
-            <a:r>
-              <a:rPr lang="en-US" sz="1600" dirty="0">
-                <a:solidFill>
-                  <a:srgbClr val="000000"/>
-                </a:solidFill>
-                <a:highlight>
-                  <a:srgbClr val="FFFFFF"/>
-                </a:highlight>
-                <a:latin typeface="Consolas" panose="020B0609020204030204" pitchFamily="49" charset="0"/>
-              </a:rPr>
-              <a:t> </a:t>
-            </a:r>
-            <a:r>
-              <a:rPr lang="en-US" sz="1600" dirty="0">
-                <a:solidFill>
-                  <a:srgbClr val="0000FF"/>
-                </a:solidFill>
-                <a:highlight>
-                  <a:srgbClr val="FFFFFF"/>
-                </a:highlight>
-                <a:latin typeface="Consolas" panose="020B0609020204030204" pitchFamily="49" charset="0"/>
-              </a:rPr>
-              <a:t>class</a:t>
-            </a:r>
-            <a:r>
-              <a:rPr lang="en-US" sz="1600" dirty="0">
-                <a:solidFill>
-                  <a:srgbClr val="000000"/>
-                </a:solidFill>
-                <a:highlight>
-                  <a:srgbClr val="FFFFFF"/>
-                </a:highlight>
-                <a:latin typeface="Consolas" panose="020B0609020204030204" pitchFamily="49" charset="0"/>
-              </a:rPr>
-              <a:t> </a:t>
-            </a:r>
-            <a:r>
-              <a:rPr lang="en-US" sz="1600" dirty="0" err="1">
-                <a:solidFill>
-                  <a:srgbClr val="2B91AF"/>
-                </a:solidFill>
-                <a:highlight>
-                  <a:srgbClr val="FFFFFF"/>
-                </a:highlight>
-                <a:latin typeface="Consolas" panose="020B0609020204030204" pitchFamily="49" charset="0"/>
-              </a:rPr>
-              <a:t>WebApiControllerNamingConventionAnalyzer</a:t>
-            </a:r>
-            <a:r>
-              <a:rPr lang="en-US" sz="1600" dirty="0">
-                <a:solidFill>
-                  <a:srgbClr val="000000"/>
-                </a:solidFill>
-                <a:highlight>
-                  <a:srgbClr val="FFFFFF"/>
-                </a:highlight>
-                <a:latin typeface="Consolas" panose="020B0609020204030204" pitchFamily="49" charset="0"/>
-              </a:rPr>
-              <a:t> : 	</a:t>
-            </a:r>
-            <a:r>
-              <a:rPr lang="en-US" sz="1600" dirty="0" err="1">
-                <a:solidFill>
-                  <a:srgbClr val="2B91AF"/>
-                </a:solidFill>
-                <a:highlight>
-                  <a:srgbClr val="FFFFFF"/>
-                </a:highlight>
-                <a:latin typeface="Consolas" panose="020B0609020204030204" pitchFamily="49" charset="0"/>
-              </a:rPr>
-              <a:t>DiagnosticAnalyzer</a:t>
-            </a:r>
-            <a:endParaRPr lang="en-US" sz="1600" dirty="0">
-              <a:solidFill>
-                <a:srgbClr val="000000"/>
-              </a:solidFill>
-              <a:highlight>
-                <a:srgbClr val="FFFFFF"/>
-              </a:highlight>
-              <a:latin typeface="Consolas" panose="020B0609020204030204" pitchFamily="49" charset="0"/>
-            </a:endParaRPr>
-          </a:p>
-          <a:p>
-            <a:pPr marL="0" indent="0">
-              <a:buNone/>
-            </a:pPr>
-            <a:r>
-              <a:rPr lang="en-US" sz="1600" dirty="0">
-                <a:solidFill>
-                  <a:srgbClr val="000000"/>
-                </a:solidFill>
-                <a:highlight>
-                  <a:srgbClr val="FFFFFF"/>
-                </a:highlight>
-                <a:latin typeface="Consolas" panose="020B0609020204030204" pitchFamily="49" charset="0"/>
-              </a:rPr>
-              <a:t>{</a:t>
-            </a:r>
-          </a:p>
-          <a:p>
-            <a:pPr marL="0" indent="0">
-              <a:buNone/>
-            </a:pPr>
-            <a:r>
-              <a:rPr lang="en-US" sz="1600" dirty="0">
-                <a:solidFill>
-                  <a:srgbClr val="0000FF"/>
-                </a:solidFill>
-                <a:highlight>
-                  <a:srgbClr val="FFFFFF"/>
-                </a:highlight>
-                <a:latin typeface="Consolas" panose="020B0609020204030204" pitchFamily="49" charset="0"/>
-              </a:rPr>
-              <a:t>    string</a:t>
-            </a:r>
-            <a:r>
-              <a:rPr lang="en-US" sz="1600" dirty="0">
-                <a:solidFill>
-                  <a:srgbClr val="000000"/>
-                </a:solidFill>
-                <a:highlight>
-                  <a:srgbClr val="FFFFFF"/>
-                </a:highlight>
-                <a:latin typeface="Consolas" panose="020B0609020204030204" pitchFamily="49" charset="0"/>
-              </a:rPr>
-              <a:t> </a:t>
-            </a:r>
-            <a:r>
-              <a:rPr lang="en-US" sz="1600" dirty="0" err="1">
-                <a:solidFill>
-                  <a:srgbClr val="000000"/>
-                </a:solidFill>
-                <a:highlight>
-                  <a:srgbClr val="FFFFFF"/>
-                </a:highlight>
-                <a:latin typeface="Consolas" panose="020B0609020204030204" pitchFamily="49" charset="0"/>
-              </a:rPr>
-              <a:t>DiagnosticId</a:t>
-            </a:r>
-            <a:r>
-              <a:rPr lang="en-US" sz="1600" dirty="0">
-                <a:solidFill>
-                  <a:srgbClr val="000000"/>
-                </a:solidFill>
-                <a:highlight>
-                  <a:srgbClr val="FFFFFF"/>
-                </a:highlight>
-                <a:latin typeface="Consolas" panose="020B0609020204030204" pitchFamily="49" charset="0"/>
-              </a:rPr>
-              <a:t> = </a:t>
-            </a:r>
-            <a:r>
-              <a:rPr lang="en-US" sz="1600" dirty="0">
-                <a:solidFill>
-                  <a:srgbClr val="A31515"/>
-                </a:solidFill>
-                <a:highlight>
-                  <a:srgbClr val="FFFFFF"/>
-                </a:highlight>
-                <a:latin typeface="Consolas" panose="020B0609020204030204" pitchFamily="49" charset="0"/>
-              </a:rPr>
-              <a:t>“WA0001"</a:t>
-            </a:r>
-            <a:r>
-              <a:rPr lang="en-US" sz="1600" dirty="0">
-                <a:solidFill>
-                  <a:srgbClr val="000000"/>
-                </a:solidFill>
-                <a:highlight>
-                  <a:srgbClr val="FFFFFF"/>
-                </a:highlight>
-                <a:latin typeface="Consolas" panose="020B0609020204030204" pitchFamily="49" charset="0"/>
-              </a:rPr>
-              <a:t>;</a:t>
-            </a:r>
-          </a:p>
-          <a:p>
-            <a:pPr marL="0" indent="0">
-              <a:buNone/>
-            </a:pPr>
-            <a:r>
-              <a:rPr lang="en-US" sz="1600" dirty="0">
-                <a:solidFill>
-                  <a:srgbClr val="0000FF"/>
-                </a:solidFill>
-                <a:highlight>
-                  <a:srgbClr val="FFFFFF"/>
-                </a:highlight>
-                <a:latin typeface="Consolas" panose="020B0609020204030204" pitchFamily="49" charset="0"/>
-              </a:rPr>
-              <a:t>    string</a:t>
-            </a:r>
-            <a:r>
-              <a:rPr lang="en-US" sz="1600" dirty="0">
-                <a:solidFill>
-                  <a:srgbClr val="000000"/>
-                </a:solidFill>
-                <a:highlight>
-                  <a:srgbClr val="FFFFFF"/>
-                </a:highlight>
-                <a:latin typeface="Consolas" panose="020B0609020204030204" pitchFamily="49" charset="0"/>
-              </a:rPr>
-              <a:t> Description = </a:t>
-            </a:r>
-            <a:r>
-              <a:rPr lang="en-US" sz="1600" dirty="0">
-                <a:solidFill>
-                  <a:srgbClr val="A31515"/>
-                </a:solidFill>
-                <a:highlight>
-                  <a:srgbClr val="FFFFFF"/>
-                </a:highlight>
-                <a:latin typeface="Consolas" panose="020B0609020204030204" pitchFamily="49" charset="0"/>
-              </a:rPr>
-              <a:t>"Controller type should end in 'Controller'"</a:t>
-            </a:r>
-            <a:r>
-              <a:rPr lang="en-US" sz="1600" dirty="0">
-                <a:solidFill>
-                  <a:srgbClr val="000000"/>
-                </a:solidFill>
-                <a:highlight>
-                  <a:srgbClr val="FFFFFF"/>
-                </a:highlight>
-                <a:latin typeface="Consolas" panose="020B0609020204030204" pitchFamily="49" charset="0"/>
-              </a:rPr>
-              <a:t>;</a:t>
-            </a:r>
-          </a:p>
-          <a:p>
-            <a:pPr marL="0" indent="0">
-              <a:buNone/>
-            </a:pPr>
-            <a:r>
-              <a:rPr lang="en-US" sz="1600" dirty="0">
-                <a:solidFill>
-                  <a:srgbClr val="0000FF"/>
-                </a:solidFill>
-                <a:highlight>
-                  <a:srgbClr val="FFFFFF"/>
-                </a:highlight>
-                <a:latin typeface="Consolas" panose="020B0609020204030204" pitchFamily="49" charset="0"/>
-              </a:rPr>
-              <a:t>    string</a:t>
-            </a:r>
-            <a:r>
-              <a:rPr lang="en-US" sz="1600" dirty="0">
-                <a:solidFill>
-                  <a:srgbClr val="000000"/>
-                </a:solidFill>
-                <a:highlight>
-                  <a:srgbClr val="FFFFFF"/>
-                </a:highlight>
-                <a:latin typeface="Consolas" panose="020B0609020204030204" pitchFamily="49" charset="0"/>
-              </a:rPr>
-              <a:t> </a:t>
-            </a:r>
-            <a:r>
-              <a:rPr lang="en-US" sz="1600" dirty="0" err="1">
-                <a:solidFill>
-                  <a:srgbClr val="000000"/>
-                </a:solidFill>
-                <a:highlight>
-                  <a:srgbClr val="FFFFFF"/>
-                </a:highlight>
-                <a:latin typeface="Consolas" panose="020B0609020204030204" pitchFamily="49" charset="0"/>
-              </a:rPr>
-              <a:t>MessageFormat</a:t>
-            </a:r>
-            <a:r>
-              <a:rPr lang="en-US" sz="1600" dirty="0">
-                <a:solidFill>
-                  <a:srgbClr val="000000"/>
-                </a:solidFill>
-                <a:highlight>
-                  <a:srgbClr val="FFFFFF"/>
-                </a:highlight>
-                <a:latin typeface="Consolas" panose="020B0609020204030204" pitchFamily="49" charset="0"/>
-              </a:rPr>
-              <a:t> = </a:t>
-            </a:r>
-            <a:r>
-              <a:rPr lang="en-US" sz="1600" dirty="0">
-                <a:solidFill>
-                  <a:srgbClr val="A31515"/>
-                </a:solidFill>
-                <a:highlight>
-                  <a:srgbClr val="FFFFFF"/>
-                </a:highlight>
-                <a:latin typeface="Consolas" panose="020B0609020204030204" pitchFamily="49" charset="0"/>
-              </a:rPr>
-              <a:t>"Type name '{0}' does not end in Controller"</a:t>
-            </a:r>
-            <a:r>
-              <a:rPr lang="en-US" sz="1600" dirty="0">
-                <a:solidFill>
-                  <a:srgbClr val="000000"/>
-                </a:solidFill>
-                <a:highlight>
-                  <a:srgbClr val="FFFFFF"/>
-                </a:highlight>
-                <a:latin typeface="Consolas" panose="020B0609020204030204" pitchFamily="49" charset="0"/>
-              </a:rPr>
-              <a:t>;</a:t>
-            </a:r>
-          </a:p>
-          <a:p>
-            <a:pPr marL="0" indent="0">
-              <a:buNone/>
-            </a:pPr>
-            <a:r>
-              <a:rPr lang="en-US" sz="1600" dirty="0">
-                <a:solidFill>
-                  <a:srgbClr val="000000"/>
-                </a:solidFill>
-                <a:highlight>
-                  <a:srgbClr val="FFFFFF"/>
-                </a:highlight>
-                <a:latin typeface="Consolas" panose="020B0609020204030204" pitchFamily="49" charset="0"/>
-              </a:rPr>
-              <a:t>    </a:t>
-            </a:r>
-            <a:r>
-              <a:rPr lang="en-US" sz="1600" dirty="0">
-                <a:solidFill>
-                  <a:srgbClr val="0000FF"/>
-                </a:solidFill>
-                <a:highlight>
-                  <a:srgbClr val="FFFFFF"/>
-                </a:highlight>
-                <a:latin typeface="Consolas" panose="020B0609020204030204" pitchFamily="49" charset="0"/>
-              </a:rPr>
-              <a:t>internal</a:t>
-            </a:r>
-            <a:r>
-              <a:rPr lang="en-US" sz="1600" dirty="0">
-                <a:solidFill>
-                  <a:srgbClr val="000000"/>
-                </a:solidFill>
-                <a:highlight>
-                  <a:srgbClr val="FFFFFF"/>
-                </a:highlight>
-                <a:latin typeface="Consolas" panose="020B0609020204030204" pitchFamily="49" charset="0"/>
-              </a:rPr>
-              <a:t> </a:t>
-            </a:r>
-            <a:r>
-              <a:rPr lang="en-US" sz="1600" dirty="0" err="1">
-                <a:solidFill>
-                  <a:srgbClr val="0000FF"/>
-                </a:solidFill>
-                <a:highlight>
-                  <a:srgbClr val="FFFFFF"/>
-                </a:highlight>
-                <a:latin typeface="Consolas" panose="020B0609020204030204" pitchFamily="49" charset="0"/>
-              </a:rPr>
-              <a:t>const</a:t>
-            </a:r>
-            <a:r>
-              <a:rPr lang="en-US" sz="1600" dirty="0">
-                <a:solidFill>
-                  <a:srgbClr val="000000"/>
-                </a:solidFill>
-                <a:highlight>
-                  <a:srgbClr val="FFFFFF"/>
-                </a:highlight>
-                <a:latin typeface="Consolas" panose="020B0609020204030204" pitchFamily="49" charset="0"/>
-              </a:rPr>
-              <a:t> </a:t>
-            </a:r>
-            <a:r>
-              <a:rPr lang="en-US" sz="1600" dirty="0">
-                <a:solidFill>
-                  <a:srgbClr val="0000FF"/>
-                </a:solidFill>
-                <a:highlight>
-                  <a:srgbClr val="FFFFFF"/>
-                </a:highlight>
-                <a:latin typeface="Consolas" panose="020B0609020204030204" pitchFamily="49" charset="0"/>
-              </a:rPr>
-              <a:t>string</a:t>
-            </a:r>
-            <a:r>
-              <a:rPr lang="en-US" sz="1600" dirty="0">
-                <a:solidFill>
-                  <a:srgbClr val="000000"/>
-                </a:solidFill>
-                <a:highlight>
-                  <a:srgbClr val="FFFFFF"/>
-                </a:highlight>
-                <a:latin typeface="Consolas" panose="020B0609020204030204" pitchFamily="49" charset="0"/>
-              </a:rPr>
-              <a:t> Category = </a:t>
-            </a:r>
-            <a:r>
-              <a:rPr lang="en-US" sz="1600" dirty="0">
-                <a:solidFill>
-                  <a:srgbClr val="A31515"/>
-                </a:solidFill>
-                <a:highlight>
-                  <a:srgbClr val="FFFFFF"/>
-                </a:highlight>
-                <a:latin typeface="Consolas" panose="020B0609020204030204" pitchFamily="49" charset="0"/>
-              </a:rPr>
-              <a:t>"Naming"</a:t>
-            </a:r>
-            <a:r>
-              <a:rPr lang="en-US" sz="1600" dirty="0">
-                <a:solidFill>
-                  <a:srgbClr val="000000"/>
-                </a:solidFill>
-                <a:highlight>
-                  <a:srgbClr val="FFFFFF"/>
-                </a:highlight>
-                <a:latin typeface="Consolas" panose="020B0609020204030204" pitchFamily="49" charset="0"/>
-              </a:rPr>
-              <a:t>;</a:t>
-            </a:r>
-          </a:p>
-          <a:p>
-            <a:pPr marL="0" indent="0">
-              <a:buNone/>
-            </a:pPr>
-            <a:r>
-              <a:rPr lang="en-US" sz="1600" dirty="0">
-                <a:solidFill>
-                  <a:srgbClr val="000000"/>
-                </a:solidFill>
-                <a:highlight>
-                  <a:srgbClr val="FFFFFF"/>
-                </a:highlight>
-                <a:latin typeface="Consolas" panose="020B0609020204030204" pitchFamily="49" charset="0"/>
-              </a:rPr>
-              <a:t>    </a:t>
-            </a:r>
-            <a:r>
-              <a:rPr lang="en-US" sz="1600" dirty="0">
-                <a:solidFill>
-                  <a:srgbClr val="0000FF"/>
-                </a:solidFill>
-                <a:highlight>
-                  <a:srgbClr val="FFFFFF"/>
-                </a:highlight>
-                <a:latin typeface="Consolas" panose="020B0609020204030204" pitchFamily="49" charset="0"/>
-              </a:rPr>
-              <a:t>private</a:t>
-            </a:r>
-            <a:r>
-              <a:rPr lang="en-US" sz="1600" dirty="0">
-                <a:solidFill>
-                  <a:srgbClr val="000000"/>
-                </a:solidFill>
-                <a:highlight>
-                  <a:srgbClr val="FFFFFF"/>
-                </a:highlight>
-                <a:latin typeface="Consolas" panose="020B0609020204030204" pitchFamily="49" charset="0"/>
-              </a:rPr>
-              <a:t> </a:t>
-            </a:r>
-            <a:r>
-              <a:rPr lang="en-US" sz="1600" dirty="0">
-                <a:solidFill>
-                  <a:srgbClr val="0000FF"/>
-                </a:solidFill>
-                <a:highlight>
-                  <a:srgbClr val="FFFFFF"/>
-                </a:highlight>
-                <a:latin typeface="Consolas" panose="020B0609020204030204" pitchFamily="49" charset="0"/>
-              </a:rPr>
-              <a:t>static</a:t>
-            </a:r>
-            <a:r>
-              <a:rPr lang="en-US" sz="1600" dirty="0">
-                <a:solidFill>
-                  <a:srgbClr val="000000"/>
-                </a:solidFill>
-                <a:highlight>
-                  <a:srgbClr val="FFFFFF"/>
-                </a:highlight>
-                <a:latin typeface="Consolas" panose="020B0609020204030204" pitchFamily="49" charset="0"/>
-              </a:rPr>
-              <a:t> </a:t>
-            </a:r>
-            <a:r>
-              <a:rPr lang="en-US" sz="1600" dirty="0" err="1">
-                <a:solidFill>
-                  <a:srgbClr val="2B91AF"/>
-                </a:solidFill>
-                <a:highlight>
-                  <a:srgbClr val="FFFFFF"/>
-                </a:highlight>
-                <a:latin typeface="Consolas" panose="020B0609020204030204" pitchFamily="49" charset="0"/>
-              </a:rPr>
-              <a:t>DiagnosticDescriptor</a:t>
-            </a:r>
-            <a:r>
-              <a:rPr lang="en-US" sz="1600" dirty="0">
-                <a:solidFill>
-                  <a:srgbClr val="000000"/>
-                </a:solidFill>
-                <a:highlight>
-                  <a:srgbClr val="FFFFFF"/>
-                </a:highlight>
-                <a:latin typeface="Consolas" panose="020B0609020204030204" pitchFamily="49" charset="0"/>
-              </a:rPr>
-              <a:t> Rule = </a:t>
-            </a:r>
-            <a:r>
-              <a:rPr lang="en-US" sz="1600" dirty="0">
-                <a:solidFill>
-                  <a:srgbClr val="0000FF"/>
-                </a:solidFill>
-                <a:highlight>
-                  <a:srgbClr val="FFFFFF"/>
-                </a:highlight>
-                <a:latin typeface="Consolas" panose="020B0609020204030204" pitchFamily="49" charset="0"/>
-              </a:rPr>
-              <a:t>new</a:t>
-            </a:r>
-            <a:r>
-              <a:rPr lang="en-US" sz="1600" dirty="0">
-                <a:solidFill>
-                  <a:srgbClr val="000000"/>
-                </a:solidFill>
-                <a:highlight>
-                  <a:srgbClr val="FFFFFF"/>
-                </a:highlight>
-                <a:latin typeface="Consolas" panose="020B0609020204030204" pitchFamily="49" charset="0"/>
-              </a:rPr>
-              <a:t> </a:t>
-            </a:r>
-            <a:r>
-              <a:rPr lang="en-US" sz="1600" dirty="0" err="1">
-                <a:solidFill>
-                  <a:srgbClr val="2B91AF"/>
-                </a:solidFill>
-                <a:highlight>
-                  <a:srgbClr val="FFFFFF"/>
-                </a:highlight>
-                <a:latin typeface="Consolas" panose="020B0609020204030204" pitchFamily="49" charset="0"/>
-              </a:rPr>
-              <a:t>DiagnosticDescriptor</a:t>
-            </a:r>
-            <a:r>
-              <a:rPr lang="en-US" sz="1600" dirty="0">
-                <a:solidFill>
-                  <a:srgbClr val="000000"/>
-                </a:solidFill>
-                <a:highlight>
-                  <a:srgbClr val="FFFFFF"/>
-                </a:highlight>
-                <a:latin typeface="Consolas" panose="020B0609020204030204" pitchFamily="49" charset="0"/>
-              </a:rPr>
-              <a:t>(</a:t>
-            </a:r>
-          </a:p>
-          <a:p>
-            <a:pPr marL="0" indent="0">
-              <a:buNone/>
-            </a:pPr>
-            <a:r>
-              <a:rPr lang="en-US" sz="1600" dirty="0">
-                <a:solidFill>
-                  <a:srgbClr val="000000"/>
-                </a:solidFill>
-                <a:highlight>
-                  <a:srgbClr val="FFFFFF"/>
-                </a:highlight>
-                <a:latin typeface="Consolas" panose="020B0609020204030204" pitchFamily="49" charset="0"/>
-              </a:rPr>
-              <a:t>        </a:t>
-            </a:r>
-            <a:r>
-              <a:rPr lang="en-US" sz="1600" dirty="0" err="1">
-                <a:solidFill>
-                  <a:srgbClr val="000000"/>
-                </a:solidFill>
-                <a:highlight>
-                  <a:srgbClr val="FFFFFF"/>
-                </a:highlight>
-                <a:latin typeface="Consolas" panose="020B0609020204030204" pitchFamily="49" charset="0"/>
-              </a:rPr>
-              <a:t>DiagnosticId</a:t>
-            </a:r>
-            <a:r>
-              <a:rPr lang="en-US" sz="1600" dirty="0">
-                <a:solidFill>
-                  <a:srgbClr val="000000"/>
-                </a:solidFill>
-                <a:highlight>
-                  <a:srgbClr val="FFFFFF"/>
-                </a:highlight>
-                <a:latin typeface="Consolas" panose="020B0609020204030204" pitchFamily="49" charset="0"/>
-              </a:rPr>
-              <a:t>, Description, </a:t>
-            </a:r>
-            <a:r>
-              <a:rPr lang="en-US" sz="1600" dirty="0" err="1">
-                <a:solidFill>
-                  <a:srgbClr val="000000"/>
-                </a:solidFill>
-                <a:highlight>
-                  <a:srgbClr val="FFFFFF"/>
-                </a:highlight>
-                <a:latin typeface="Consolas" panose="020B0609020204030204" pitchFamily="49" charset="0"/>
-              </a:rPr>
-              <a:t>MessageFormat</a:t>
-            </a:r>
-            <a:r>
-              <a:rPr lang="en-US" sz="1600" dirty="0">
-                <a:solidFill>
-                  <a:srgbClr val="000000"/>
-                </a:solidFill>
-                <a:highlight>
-                  <a:srgbClr val="FFFFFF"/>
-                </a:highlight>
-                <a:latin typeface="Consolas" panose="020B0609020204030204" pitchFamily="49" charset="0"/>
-              </a:rPr>
-              <a:t>, Category,</a:t>
-            </a:r>
-          </a:p>
-          <a:p>
-            <a:pPr marL="0" indent="0">
-              <a:buNone/>
-            </a:pPr>
-            <a:r>
-              <a:rPr lang="en-US" sz="1600" dirty="0">
-                <a:solidFill>
-                  <a:srgbClr val="000000"/>
-                </a:solidFill>
-                <a:highlight>
-                  <a:srgbClr val="FFFFFF"/>
-                </a:highlight>
-                <a:latin typeface="Consolas" panose="020B0609020204030204" pitchFamily="49" charset="0"/>
-              </a:rPr>
-              <a:t>        </a:t>
-            </a:r>
-            <a:r>
-              <a:rPr lang="en-US" sz="1600" dirty="0" err="1">
-                <a:solidFill>
-                  <a:srgbClr val="2B91AF"/>
-                </a:solidFill>
-                <a:highlight>
-                  <a:srgbClr val="FFFFFF"/>
-                </a:highlight>
-                <a:latin typeface="Consolas" panose="020B0609020204030204" pitchFamily="49" charset="0"/>
-              </a:rPr>
-              <a:t>DiagnosticSeverity</a:t>
-            </a:r>
-            <a:r>
-              <a:rPr lang="en-US" sz="1600" dirty="0" err="1">
-                <a:solidFill>
-                  <a:srgbClr val="000000"/>
-                </a:solidFill>
-                <a:highlight>
-                  <a:srgbClr val="FFFFFF"/>
-                </a:highlight>
-                <a:latin typeface="Consolas" panose="020B0609020204030204" pitchFamily="49" charset="0"/>
-              </a:rPr>
-              <a:t>.Warning</a:t>
-            </a:r>
-            <a:r>
-              <a:rPr lang="en-US" sz="1600" dirty="0">
-                <a:solidFill>
-                  <a:srgbClr val="000000"/>
-                </a:solidFill>
-                <a:highlight>
-                  <a:srgbClr val="FFFFFF"/>
-                </a:highlight>
-                <a:latin typeface="Consolas" panose="020B0609020204030204" pitchFamily="49" charset="0"/>
-              </a:rPr>
-              <a:t>, </a:t>
-            </a:r>
-            <a:r>
-              <a:rPr lang="en-US" sz="1600" dirty="0">
-                <a:solidFill>
-                  <a:srgbClr val="0000FF"/>
-                </a:solidFill>
-                <a:highlight>
-                  <a:srgbClr val="FFFFFF"/>
-                </a:highlight>
-                <a:latin typeface="Consolas" panose="020B0609020204030204" pitchFamily="49" charset="0"/>
-              </a:rPr>
-              <a:t>true</a:t>
-            </a:r>
-            <a:r>
-              <a:rPr lang="en-US" sz="1600" dirty="0">
-                <a:solidFill>
-                  <a:srgbClr val="000000"/>
-                </a:solidFill>
-                <a:highlight>
-                  <a:srgbClr val="FFFFFF"/>
-                </a:highlight>
-                <a:latin typeface="Consolas" panose="020B0609020204030204" pitchFamily="49" charset="0"/>
-              </a:rPr>
-              <a:t>);</a:t>
-            </a:r>
-          </a:p>
-          <a:p>
-            <a:pPr marL="0" indent="0">
-              <a:buNone/>
-            </a:pPr>
-            <a:endParaRPr lang="en-US" sz="1600" dirty="0">
-              <a:solidFill>
-                <a:srgbClr val="000000"/>
-              </a:solidFill>
-              <a:highlight>
-                <a:srgbClr val="FFFFFF"/>
-              </a:highlight>
-              <a:latin typeface="Consolas" panose="020B0609020204030204" pitchFamily="49" charset="0"/>
-            </a:endParaRPr>
-          </a:p>
-          <a:p>
-            <a:pPr marL="0" indent="0">
-              <a:buNone/>
-            </a:pPr>
-            <a:r>
-              <a:rPr lang="en-US" sz="1600" dirty="0">
-                <a:solidFill>
-                  <a:srgbClr val="000000"/>
-                </a:solidFill>
-                <a:highlight>
-                  <a:srgbClr val="FFFFFF"/>
-                </a:highlight>
-                <a:latin typeface="Consolas" panose="020B0609020204030204" pitchFamily="49" charset="0"/>
-              </a:rPr>
-              <a:t>    // Add implementation</a:t>
-            </a:r>
-          </a:p>
-          <a:p>
-            <a:pPr marL="0" indent="0">
-              <a:buNone/>
-            </a:pPr>
-            <a:r>
-              <a:rPr lang="en-US" sz="1600" dirty="0">
-                <a:solidFill>
-                  <a:srgbClr val="000000"/>
-                </a:solidFill>
-                <a:highlight>
-                  <a:srgbClr val="FFFFFF"/>
-                </a:highlight>
-                <a:latin typeface="Consolas" panose="020B0609020204030204" pitchFamily="49" charset="0"/>
-              </a:rPr>
-              <a:t>}</a:t>
-            </a:r>
-            <a:endParaRPr lang="en-US" sz="1600" dirty="0"/>
-          </a:p>
-        </p:txBody>
-      </p:sp>
-      <p:sp>
-        <p:nvSpPr>
-          <p:cNvPr id="4" name="TextBox 3"/>
-          <p:cNvSpPr txBox="1"/>
-          <p:nvPr/>
-        </p:nvSpPr>
-        <p:spPr>
-          <a:xfrm>
-            <a:off x="1981200" y="2667000"/>
-            <a:ext cx="8229600" cy="3970318"/>
-          </a:xfrm>
-          <a:prstGeom prst="rect">
-            <a:avLst/>
-          </a:prstGeom>
-          <a:solidFill>
-            <a:schemeClr val="tx1"/>
-          </a:solidFill>
-        </p:spPr>
-        <p:txBody>
-          <a:bodyPr wrap="square" rtlCol="0">
-            <a:spAutoFit/>
-          </a:bodyPr>
-          <a:lstStyle/>
-          <a:p>
-            <a:r>
-              <a:rPr lang="en-US" dirty="0">
-                <a:solidFill>
-                  <a:srgbClr val="0000FF"/>
-                </a:solidFill>
-                <a:highlight>
-                  <a:srgbClr val="FFFFFF"/>
-                </a:highlight>
-                <a:latin typeface="Consolas" panose="020B0609020204030204" pitchFamily="49" charset="0"/>
-              </a:rPr>
-              <a:t>private</a:t>
-            </a:r>
-            <a:r>
-              <a:rPr lang="en-US" dirty="0">
-                <a:solidFill>
-                  <a:srgbClr val="000000"/>
-                </a:solidFill>
-                <a:highlight>
-                  <a:srgbClr val="FFFFFF"/>
-                </a:highlight>
-                <a:latin typeface="Consolas" panose="020B0609020204030204" pitchFamily="49" charset="0"/>
-              </a:rPr>
-              <a:t> </a:t>
-            </a:r>
-            <a:r>
-              <a:rPr lang="en-US" dirty="0">
-                <a:solidFill>
-                  <a:srgbClr val="0000FF"/>
-                </a:solidFill>
-                <a:highlight>
-                  <a:srgbClr val="FFFFFF"/>
-                </a:highlight>
-                <a:latin typeface="Consolas" panose="020B0609020204030204" pitchFamily="49" charset="0"/>
-              </a:rPr>
-              <a:t>void</a:t>
-            </a:r>
-            <a:r>
-              <a:rPr lang="en-US" dirty="0">
-                <a:solidFill>
-                  <a:srgbClr val="000000"/>
-                </a:solidFill>
-                <a:highlight>
-                  <a:srgbClr val="FFFFFF"/>
-                </a:highlight>
-                <a:latin typeface="Consolas" panose="020B0609020204030204" pitchFamily="49" charset="0"/>
-              </a:rPr>
-              <a:t> Analyzer(</a:t>
-            </a:r>
-            <a:r>
-              <a:rPr lang="en-US" dirty="0" err="1">
-                <a:solidFill>
-                  <a:srgbClr val="2B91AF"/>
-                </a:solidFill>
-                <a:highlight>
-                  <a:srgbClr val="FFFFFF"/>
-                </a:highlight>
-                <a:latin typeface="Consolas" panose="020B0609020204030204" pitchFamily="49" charset="0"/>
-              </a:rPr>
-              <a:t>SymbolAnalysisContext</a:t>
-            </a:r>
-            <a:r>
-              <a:rPr lang="en-US" dirty="0">
-                <a:solidFill>
-                  <a:srgbClr val="000000"/>
-                </a:solidFill>
-                <a:highlight>
-                  <a:srgbClr val="FFFFFF"/>
-                </a:highlight>
-                <a:latin typeface="Consolas" panose="020B0609020204030204" pitchFamily="49" charset="0"/>
-              </a:rPr>
-              <a:t> context)</a:t>
-            </a:r>
-          </a:p>
-          <a:p>
-            <a:r>
-              <a:rPr lang="en-US" dirty="0">
-                <a:solidFill>
-                  <a:srgbClr val="000000"/>
-                </a:solidFill>
-                <a:highlight>
-                  <a:srgbClr val="FFFFFF"/>
-                </a:highlight>
-                <a:latin typeface="Consolas" panose="020B0609020204030204" pitchFamily="49" charset="0"/>
-              </a:rPr>
-              <a:t>{</a:t>
-            </a:r>
-          </a:p>
-          <a:p>
-            <a:r>
-              <a:rPr lang="en-US" dirty="0">
-                <a:solidFill>
-                  <a:srgbClr val="000000"/>
-                </a:solidFill>
-                <a:highlight>
-                  <a:srgbClr val="FFFFFF"/>
-                </a:highlight>
-                <a:latin typeface="Consolas" panose="020B0609020204030204" pitchFamily="49" charset="0"/>
-              </a:rPr>
-              <a:t>    </a:t>
-            </a:r>
-            <a:r>
-              <a:rPr lang="en-US" dirty="0" err="1">
-                <a:solidFill>
-                  <a:srgbClr val="0000FF"/>
-                </a:solidFill>
-                <a:highlight>
-                  <a:srgbClr val="FFFFFF"/>
-                </a:highlight>
-                <a:latin typeface="Consolas" panose="020B0609020204030204" pitchFamily="49" charset="0"/>
-              </a:rPr>
-              <a:t>var</a:t>
-            </a:r>
-            <a:r>
-              <a:rPr lang="en-US" dirty="0">
-                <a:solidFill>
-                  <a:srgbClr val="000000"/>
-                </a:solidFill>
-                <a:highlight>
-                  <a:srgbClr val="FFFFFF"/>
-                </a:highlight>
-                <a:latin typeface="Consolas" panose="020B0609020204030204" pitchFamily="49" charset="0"/>
-              </a:rPr>
-              <a:t> symbol = (</a:t>
-            </a:r>
-            <a:r>
-              <a:rPr lang="en-US" dirty="0" err="1">
-                <a:solidFill>
-                  <a:srgbClr val="2B91AF"/>
-                </a:solidFill>
-                <a:highlight>
-                  <a:srgbClr val="FFFFFF"/>
-                </a:highlight>
-                <a:latin typeface="Consolas" panose="020B0609020204030204" pitchFamily="49" charset="0"/>
-              </a:rPr>
-              <a:t>INamedTypeSymbol</a:t>
-            </a:r>
-            <a:r>
-              <a:rPr lang="en-US" dirty="0">
-                <a:solidFill>
-                  <a:srgbClr val="000000"/>
-                </a:solidFill>
-                <a:highlight>
-                  <a:srgbClr val="FFFFFF"/>
-                </a:highlight>
-                <a:latin typeface="Consolas" panose="020B0609020204030204" pitchFamily="49" charset="0"/>
-              </a:rPr>
-              <a:t>)</a:t>
-            </a:r>
-            <a:r>
-              <a:rPr lang="en-US" dirty="0" err="1">
-                <a:solidFill>
-                  <a:srgbClr val="000000"/>
-                </a:solidFill>
-                <a:highlight>
-                  <a:srgbClr val="FFFFFF"/>
-                </a:highlight>
-                <a:latin typeface="Consolas" panose="020B0609020204030204" pitchFamily="49" charset="0"/>
-              </a:rPr>
-              <a:t>context.Symbol</a:t>
-            </a:r>
-            <a:r>
-              <a:rPr lang="en-US" dirty="0">
-                <a:solidFill>
-                  <a:srgbClr val="000000"/>
-                </a:solidFill>
-                <a:highlight>
-                  <a:srgbClr val="FFFFFF"/>
-                </a:highlight>
-                <a:latin typeface="Consolas" panose="020B0609020204030204" pitchFamily="49" charset="0"/>
-              </a:rPr>
-              <a:t>;</a:t>
-            </a:r>
-          </a:p>
-          <a:p>
-            <a:r>
-              <a:rPr lang="en-US" dirty="0">
-                <a:solidFill>
-                  <a:srgbClr val="000000"/>
-                </a:solidFill>
-                <a:highlight>
-                  <a:srgbClr val="FFFFFF"/>
-                </a:highlight>
-                <a:latin typeface="Consolas" panose="020B0609020204030204" pitchFamily="49" charset="0"/>
-              </a:rPr>
-              <a:t>    </a:t>
-            </a:r>
-            <a:r>
-              <a:rPr lang="en-US" dirty="0">
-                <a:solidFill>
-                  <a:srgbClr val="0000FF"/>
-                </a:solidFill>
-                <a:highlight>
-                  <a:srgbClr val="FFFFFF"/>
-                </a:highlight>
-                <a:latin typeface="Consolas" panose="020B0609020204030204" pitchFamily="49" charset="0"/>
-              </a:rPr>
-              <a:t>if</a:t>
-            </a:r>
-            <a:r>
-              <a:rPr lang="en-US" dirty="0">
-                <a:solidFill>
-                  <a:srgbClr val="000000"/>
-                </a:solidFill>
-                <a:highlight>
-                  <a:srgbClr val="FFFFFF"/>
-                </a:highlight>
-                <a:latin typeface="Consolas" panose="020B0609020204030204" pitchFamily="49" charset="0"/>
-              </a:rPr>
-              <a:t> (</a:t>
-            </a:r>
-            <a:r>
-              <a:rPr lang="en-US" dirty="0" err="1">
-                <a:solidFill>
-                  <a:srgbClr val="000000"/>
-                </a:solidFill>
-                <a:highlight>
-                  <a:srgbClr val="FFFFFF"/>
-                </a:highlight>
-                <a:latin typeface="Consolas" panose="020B0609020204030204" pitchFamily="49" charset="0"/>
-              </a:rPr>
-              <a:t>symbol.BaseType</a:t>
-            </a:r>
-            <a:r>
-              <a:rPr lang="en-US" dirty="0">
-                <a:solidFill>
-                  <a:srgbClr val="000000"/>
-                </a:solidFill>
-                <a:highlight>
-                  <a:srgbClr val="FFFFFF"/>
-                </a:highlight>
-                <a:latin typeface="Consolas" panose="020B0609020204030204" pitchFamily="49" charset="0"/>
-              </a:rPr>
-              <a:t> == </a:t>
-            </a:r>
-            <a:r>
-              <a:rPr lang="en-US" dirty="0">
-                <a:solidFill>
-                  <a:srgbClr val="0000FF"/>
-                </a:solidFill>
-                <a:highlight>
-                  <a:srgbClr val="FFFFFF"/>
-                </a:highlight>
-                <a:latin typeface="Consolas" panose="020B0609020204030204" pitchFamily="49" charset="0"/>
-              </a:rPr>
-              <a:t>null</a:t>
-            </a:r>
-            <a:r>
-              <a:rPr lang="en-US" dirty="0">
-                <a:solidFill>
-                  <a:srgbClr val="000000"/>
-                </a:solidFill>
-                <a:highlight>
-                  <a:srgbClr val="FFFFFF"/>
-                </a:highlight>
-                <a:latin typeface="Consolas" panose="020B0609020204030204" pitchFamily="49" charset="0"/>
-              </a:rPr>
-              <a:t>) </a:t>
-            </a:r>
-            <a:r>
-              <a:rPr lang="en-US" dirty="0">
-                <a:solidFill>
-                  <a:srgbClr val="0000FF"/>
-                </a:solidFill>
-                <a:highlight>
-                  <a:srgbClr val="FFFFFF"/>
-                </a:highlight>
-                <a:latin typeface="Consolas" panose="020B0609020204030204" pitchFamily="49" charset="0"/>
-              </a:rPr>
-              <a:t>return</a:t>
-            </a:r>
-            <a:r>
-              <a:rPr lang="en-US" dirty="0">
-                <a:solidFill>
-                  <a:srgbClr val="000000"/>
-                </a:solidFill>
-                <a:highlight>
-                  <a:srgbClr val="FFFFFF"/>
-                </a:highlight>
-                <a:latin typeface="Consolas" panose="020B0609020204030204" pitchFamily="49" charset="0"/>
-              </a:rPr>
-              <a:t>;</a:t>
-            </a:r>
-          </a:p>
-          <a:p>
-            <a:endParaRPr lang="en-US" dirty="0">
-              <a:solidFill>
-                <a:srgbClr val="000000"/>
-              </a:solidFill>
-              <a:highlight>
-                <a:srgbClr val="FFFFFF"/>
-              </a:highlight>
-              <a:latin typeface="Consolas" panose="020B0609020204030204" pitchFamily="49" charset="0"/>
-            </a:endParaRPr>
-          </a:p>
-          <a:p>
-            <a:r>
-              <a:rPr lang="en-US" dirty="0">
-                <a:solidFill>
-                  <a:srgbClr val="000000"/>
-                </a:solidFill>
-                <a:highlight>
-                  <a:srgbClr val="FFFFFF"/>
-                </a:highlight>
-                <a:latin typeface="Consolas" panose="020B0609020204030204" pitchFamily="49" charset="0"/>
-              </a:rPr>
-              <a:t>    </a:t>
-            </a:r>
-            <a:r>
-              <a:rPr lang="en-US" dirty="0">
-                <a:solidFill>
-                  <a:srgbClr val="0000FF"/>
-                </a:solidFill>
-                <a:highlight>
-                  <a:srgbClr val="FFFFFF"/>
-                </a:highlight>
-                <a:latin typeface="Consolas" panose="020B0609020204030204" pitchFamily="49" charset="0"/>
-              </a:rPr>
-              <a:t>if</a:t>
-            </a:r>
-            <a:r>
-              <a:rPr lang="en-US" dirty="0">
-                <a:solidFill>
-                  <a:srgbClr val="000000"/>
-                </a:solidFill>
-                <a:highlight>
-                  <a:srgbClr val="FFFFFF"/>
-                </a:highlight>
-                <a:latin typeface="Consolas" panose="020B0609020204030204" pitchFamily="49" charset="0"/>
-              </a:rPr>
-              <a:t> ((</a:t>
-            </a:r>
-            <a:r>
-              <a:rPr lang="en-US" dirty="0" err="1">
-                <a:solidFill>
-                  <a:srgbClr val="000000"/>
-                </a:solidFill>
-                <a:highlight>
-                  <a:srgbClr val="FFFFFF"/>
-                </a:highlight>
-                <a:latin typeface="Consolas" panose="020B0609020204030204" pitchFamily="49" charset="0"/>
-              </a:rPr>
-              <a:t>symbol.BaseType.Name</a:t>
-            </a:r>
-            <a:r>
-              <a:rPr lang="en-US" dirty="0">
-                <a:solidFill>
-                  <a:srgbClr val="000000"/>
-                </a:solidFill>
-                <a:highlight>
-                  <a:srgbClr val="FFFFFF"/>
-                </a:highlight>
-                <a:latin typeface="Consolas" panose="020B0609020204030204" pitchFamily="49" charset="0"/>
-              </a:rPr>
-              <a:t> == </a:t>
-            </a:r>
-            <a:r>
-              <a:rPr lang="en-US" dirty="0">
-                <a:solidFill>
-                  <a:srgbClr val="A31515"/>
-                </a:solidFill>
-                <a:highlight>
-                  <a:srgbClr val="FFFFFF"/>
-                </a:highlight>
-                <a:latin typeface="Consolas" panose="020B0609020204030204" pitchFamily="49" charset="0"/>
-              </a:rPr>
-              <a:t>"Controller"</a:t>
-            </a:r>
-            <a:r>
-              <a:rPr lang="en-US" dirty="0">
-                <a:solidFill>
-                  <a:srgbClr val="000000"/>
-                </a:solidFill>
-                <a:highlight>
-                  <a:srgbClr val="FFFFFF"/>
-                </a:highlight>
-                <a:latin typeface="Consolas" panose="020B0609020204030204" pitchFamily="49" charset="0"/>
-              </a:rPr>
-              <a:t> </a:t>
-            </a:r>
-          </a:p>
-          <a:p>
-            <a:r>
-              <a:rPr lang="en-US" dirty="0">
-                <a:solidFill>
-                  <a:srgbClr val="000000"/>
-                </a:solidFill>
-                <a:highlight>
-                  <a:srgbClr val="FFFFFF"/>
-                </a:highlight>
-                <a:latin typeface="Consolas" panose="020B0609020204030204" pitchFamily="49" charset="0"/>
-              </a:rPr>
-              <a:t>      || </a:t>
-            </a:r>
-            <a:r>
-              <a:rPr lang="en-US" dirty="0" err="1">
-                <a:solidFill>
-                  <a:srgbClr val="000000"/>
-                </a:solidFill>
-                <a:highlight>
-                  <a:srgbClr val="FFFFFF"/>
-                </a:highlight>
-                <a:latin typeface="Consolas" panose="020B0609020204030204" pitchFamily="49" charset="0"/>
-              </a:rPr>
-              <a:t>symbol.BaseType.Name</a:t>
-            </a:r>
-            <a:r>
-              <a:rPr lang="en-US" dirty="0">
-                <a:solidFill>
-                  <a:srgbClr val="000000"/>
-                </a:solidFill>
-                <a:highlight>
-                  <a:srgbClr val="FFFFFF"/>
-                </a:highlight>
-                <a:latin typeface="Consolas" panose="020B0609020204030204" pitchFamily="49" charset="0"/>
-              </a:rPr>
-              <a:t> == </a:t>
-            </a:r>
-            <a:r>
-              <a:rPr lang="en-US" dirty="0">
-                <a:solidFill>
-                  <a:srgbClr val="A31515"/>
-                </a:solidFill>
-                <a:highlight>
-                  <a:srgbClr val="FFFFFF"/>
-                </a:highlight>
-                <a:latin typeface="Consolas" panose="020B0609020204030204" pitchFamily="49" charset="0"/>
-              </a:rPr>
-              <a:t>"</a:t>
-            </a:r>
-            <a:r>
-              <a:rPr lang="en-US" dirty="0" err="1">
-                <a:solidFill>
-                  <a:srgbClr val="A31515"/>
-                </a:solidFill>
-                <a:highlight>
-                  <a:srgbClr val="FFFFFF"/>
-                </a:highlight>
-                <a:latin typeface="Consolas" panose="020B0609020204030204" pitchFamily="49" charset="0"/>
-              </a:rPr>
-              <a:t>ApiController</a:t>
-            </a:r>
-            <a:r>
-              <a:rPr lang="en-US" dirty="0">
-                <a:solidFill>
-                  <a:srgbClr val="A31515"/>
-                </a:solidFill>
-                <a:highlight>
-                  <a:srgbClr val="FFFFFF"/>
-                </a:highlight>
-                <a:latin typeface="Consolas" panose="020B0609020204030204" pitchFamily="49" charset="0"/>
-              </a:rPr>
-              <a:t>"</a:t>
-            </a:r>
-            <a:r>
-              <a:rPr lang="en-US" dirty="0">
-                <a:solidFill>
-                  <a:srgbClr val="000000"/>
-                </a:solidFill>
-                <a:highlight>
-                  <a:srgbClr val="FFFFFF"/>
-                </a:highlight>
-                <a:latin typeface="Consolas" panose="020B0609020204030204" pitchFamily="49" charset="0"/>
-              </a:rPr>
-              <a:t>)</a:t>
-            </a:r>
-          </a:p>
-          <a:p>
-            <a:r>
-              <a:rPr lang="en-US" dirty="0">
-                <a:solidFill>
-                  <a:srgbClr val="000000"/>
-                </a:solidFill>
-                <a:highlight>
-                  <a:srgbClr val="FFFFFF"/>
-                </a:highlight>
-                <a:latin typeface="Consolas" panose="020B0609020204030204" pitchFamily="49" charset="0"/>
-              </a:rPr>
-              <a:t>      &amp;&amp; !</a:t>
-            </a:r>
-            <a:r>
-              <a:rPr lang="en-US" dirty="0" err="1">
-                <a:solidFill>
-                  <a:srgbClr val="000000"/>
-                </a:solidFill>
-                <a:highlight>
-                  <a:srgbClr val="FFFFFF"/>
-                </a:highlight>
-                <a:latin typeface="Consolas" panose="020B0609020204030204" pitchFamily="49" charset="0"/>
-              </a:rPr>
-              <a:t>symbol.Name.EndsWith</a:t>
-            </a:r>
-            <a:r>
-              <a:rPr lang="en-US" dirty="0">
-                <a:solidFill>
-                  <a:srgbClr val="000000"/>
-                </a:solidFill>
-                <a:highlight>
-                  <a:srgbClr val="FFFFFF"/>
-                </a:highlight>
-                <a:latin typeface="Consolas" panose="020B0609020204030204" pitchFamily="49" charset="0"/>
-              </a:rPr>
-              <a:t>(</a:t>
-            </a:r>
-            <a:r>
-              <a:rPr lang="en-US" dirty="0">
-                <a:solidFill>
-                  <a:srgbClr val="A31515"/>
-                </a:solidFill>
-                <a:highlight>
-                  <a:srgbClr val="FFFFFF"/>
-                </a:highlight>
-                <a:latin typeface="Consolas" panose="020B0609020204030204" pitchFamily="49" charset="0"/>
-              </a:rPr>
-              <a:t>"Controller"</a:t>
-            </a:r>
-            <a:r>
-              <a:rPr lang="en-US" dirty="0">
-                <a:solidFill>
-                  <a:srgbClr val="000000"/>
-                </a:solidFill>
-                <a:highlight>
-                  <a:srgbClr val="FFFFFF"/>
-                </a:highlight>
-                <a:latin typeface="Consolas" panose="020B0609020204030204" pitchFamily="49" charset="0"/>
-              </a:rPr>
-              <a:t>))</a:t>
-            </a:r>
-          </a:p>
-          <a:p>
-            <a:r>
-              <a:rPr lang="en-US" dirty="0">
-                <a:solidFill>
-                  <a:srgbClr val="000000"/>
-                </a:solidFill>
-                <a:highlight>
-                  <a:srgbClr val="FFFFFF"/>
-                </a:highlight>
-                <a:latin typeface="Consolas" panose="020B0609020204030204" pitchFamily="49" charset="0"/>
-              </a:rPr>
-              <a:t>    {</a:t>
-            </a:r>
-          </a:p>
-          <a:p>
-            <a:r>
-              <a:rPr lang="en-US" dirty="0">
-                <a:solidFill>
-                  <a:srgbClr val="000000"/>
-                </a:solidFill>
-                <a:highlight>
-                  <a:srgbClr val="FFFFFF"/>
-                </a:highlight>
-                <a:latin typeface="Consolas" panose="020B0609020204030204" pitchFamily="49" charset="0"/>
-              </a:rPr>
-              <a:t>        </a:t>
-            </a:r>
-            <a:r>
-              <a:rPr lang="en-US" dirty="0" err="1">
-                <a:solidFill>
-                  <a:srgbClr val="0000FF"/>
-                </a:solidFill>
-                <a:highlight>
-                  <a:srgbClr val="FFFFFF"/>
-                </a:highlight>
-                <a:latin typeface="Consolas" panose="020B0609020204030204" pitchFamily="49" charset="0"/>
-              </a:rPr>
-              <a:t>var</a:t>
-            </a:r>
-            <a:r>
-              <a:rPr lang="en-US" dirty="0">
-                <a:solidFill>
-                  <a:srgbClr val="000000"/>
-                </a:solidFill>
-                <a:highlight>
-                  <a:srgbClr val="FFFFFF"/>
-                </a:highlight>
-                <a:latin typeface="Consolas" panose="020B0609020204030204" pitchFamily="49" charset="0"/>
-              </a:rPr>
-              <a:t> diagnostic = </a:t>
-            </a:r>
-            <a:r>
-              <a:rPr lang="en-US" dirty="0" err="1">
-                <a:solidFill>
-                  <a:srgbClr val="2B91AF"/>
-                </a:solidFill>
-                <a:highlight>
-                  <a:srgbClr val="FFFFFF"/>
-                </a:highlight>
-                <a:latin typeface="Consolas" panose="020B0609020204030204" pitchFamily="49" charset="0"/>
-              </a:rPr>
-              <a:t>Diagnostic</a:t>
-            </a:r>
-            <a:r>
-              <a:rPr lang="en-US" dirty="0" err="1">
-                <a:solidFill>
-                  <a:srgbClr val="000000"/>
-                </a:solidFill>
-                <a:highlight>
-                  <a:srgbClr val="FFFFFF"/>
-                </a:highlight>
-                <a:latin typeface="Consolas" panose="020B0609020204030204" pitchFamily="49" charset="0"/>
-              </a:rPr>
-              <a:t>.Create</a:t>
-            </a:r>
-            <a:r>
-              <a:rPr lang="en-US" dirty="0">
-                <a:solidFill>
-                  <a:srgbClr val="000000"/>
-                </a:solidFill>
-                <a:highlight>
-                  <a:srgbClr val="FFFFFF"/>
-                </a:highlight>
-                <a:latin typeface="Consolas" panose="020B0609020204030204" pitchFamily="49" charset="0"/>
-              </a:rPr>
-              <a:t>(</a:t>
-            </a:r>
-          </a:p>
-          <a:p>
-            <a:r>
-              <a:rPr lang="en-US" dirty="0">
-                <a:solidFill>
-                  <a:srgbClr val="000000"/>
-                </a:solidFill>
-                <a:highlight>
-                  <a:srgbClr val="FFFFFF"/>
-                </a:highlight>
-                <a:latin typeface="Consolas" panose="020B0609020204030204" pitchFamily="49" charset="0"/>
-              </a:rPr>
-              <a:t>            Rule, </a:t>
-            </a:r>
-            <a:r>
-              <a:rPr lang="en-US" dirty="0" err="1">
-                <a:solidFill>
-                  <a:srgbClr val="000000"/>
-                </a:solidFill>
-                <a:highlight>
-                  <a:srgbClr val="FFFFFF"/>
-                </a:highlight>
-                <a:latin typeface="Consolas" panose="020B0609020204030204" pitchFamily="49" charset="0"/>
-              </a:rPr>
-              <a:t>symbol.Locations</a:t>
-            </a:r>
-            <a:r>
-              <a:rPr lang="en-US" dirty="0">
-                <a:solidFill>
-                  <a:srgbClr val="000000"/>
-                </a:solidFill>
-                <a:highlight>
-                  <a:srgbClr val="FFFFFF"/>
-                </a:highlight>
-                <a:latin typeface="Consolas" panose="020B0609020204030204" pitchFamily="49" charset="0"/>
-              </a:rPr>
-              <a:t>[0], </a:t>
-            </a:r>
-            <a:r>
-              <a:rPr lang="en-US" dirty="0" err="1">
-                <a:solidFill>
-                  <a:srgbClr val="000000"/>
-                </a:solidFill>
-                <a:highlight>
-                  <a:srgbClr val="FFFFFF"/>
-                </a:highlight>
-                <a:latin typeface="Consolas" panose="020B0609020204030204" pitchFamily="49" charset="0"/>
-              </a:rPr>
-              <a:t>symbol.Name</a:t>
-            </a:r>
-            <a:r>
-              <a:rPr lang="en-US" dirty="0">
-                <a:solidFill>
-                  <a:srgbClr val="000000"/>
-                </a:solidFill>
-                <a:highlight>
-                  <a:srgbClr val="FFFFFF"/>
-                </a:highlight>
-                <a:latin typeface="Consolas" panose="020B0609020204030204" pitchFamily="49" charset="0"/>
-              </a:rPr>
-              <a:t>);</a:t>
-            </a:r>
-          </a:p>
-          <a:p>
-            <a:r>
-              <a:rPr lang="en-US" dirty="0">
-                <a:solidFill>
-                  <a:srgbClr val="000000"/>
-                </a:solidFill>
-                <a:highlight>
-                  <a:srgbClr val="FFFFFF"/>
-                </a:highlight>
-                <a:latin typeface="Consolas" panose="020B0609020204030204" pitchFamily="49" charset="0"/>
-              </a:rPr>
-              <a:t>        </a:t>
-            </a:r>
-            <a:r>
-              <a:rPr lang="en-US" dirty="0" err="1">
-                <a:solidFill>
-                  <a:srgbClr val="000000"/>
-                </a:solidFill>
-                <a:highlight>
-                  <a:srgbClr val="FFFFFF"/>
-                </a:highlight>
-                <a:latin typeface="Consolas" panose="020B0609020204030204" pitchFamily="49" charset="0"/>
-              </a:rPr>
-              <a:t>context.ReportDiagnostic</a:t>
-            </a:r>
-            <a:r>
-              <a:rPr lang="en-US" dirty="0">
-                <a:solidFill>
-                  <a:srgbClr val="000000"/>
-                </a:solidFill>
-                <a:highlight>
-                  <a:srgbClr val="FFFFFF"/>
-                </a:highlight>
-                <a:latin typeface="Consolas" panose="020B0609020204030204" pitchFamily="49" charset="0"/>
-              </a:rPr>
-              <a:t>(diagnostic);</a:t>
-            </a:r>
-          </a:p>
-          <a:p>
-            <a:r>
-              <a:rPr lang="en-US" dirty="0">
-                <a:solidFill>
-                  <a:srgbClr val="000000"/>
-                </a:solidFill>
-                <a:highlight>
-                  <a:srgbClr val="FFFFFF"/>
-                </a:highlight>
-                <a:latin typeface="Consolas" panose="020B0609020204030204" pitchFamily="49" charset="0"/>
-              </a:rPr>
-              <a:t>    }</a:t>
-            </a:r>
-          </a:p>
-          <a:p>
-            <a:r>
-              <a:rPr lang="en-US" dirty="0">
-                <a:solidFill>
-                  <a:srgbClr val="000000"/>
-                </a:solidFill>
-                <a:highlight>
-                  <a:srgbClr val="FFFFFF"/>
-                </a:highlight>
-                <a:latin typeface="Consolas" panose="020B0609020204030204" pitchFamily="49" charset="0"/>
-              </a:rPr>
-              <a:t>}</a:t>
-            </a:r>
-            <a:endParaRPr lang="en-US" dirty="0"/>
-          </a:p>
-        </p:txBody>
-      </p:sp>
-    </p:spTree>
-    <p:extLst>
-      <p:ext uri="{BB962C8B-B14F-4D97-AF65-F5344CB8AC3E}">
-        <p14:creationId xmlns:p14="http://schemas.microsoft.com/office/powerpoint/2010/main" val="908995456"/>
-      </p:ext>
-    </p:extLst>
-  </p:cSld>
-  <p:clrMapOvr>
-    <a:masterClrMapping/>
-  </p:clrMapOvr>
-  <p:timing>
-    <p:tnLst>
-      <p:par>
-        <p:cTn id="1" dur="indefinite" restart="never" nodeType="tmRoot">
-          <p:childTnLst>
-            <p:seq concurrent="1" nextAc="seek">
-              <p:cTn id="2" dur="indefinite" nodeType="mainSeq">
-                <p:childTnLst>
-                  <p:par>
-                    <p:cTn id="3" fill="hold">
-                      <p:stCondLst>
-                        <p:cond delay="indefinite"/>
-                      </p:stCondLst>
-                      <p:childTnLst>
-                        <p:par>
-                          <p:cTn id="4" fill="hold">
-                            <p:stCondLst>
-                              <p:cond delay="0"/>
-                            </p:stCondLst>
-                            <p:childTnLst>
-                              <p:par>
-                                <p:cTn id="5" presetID="2" presetClass="entr" presetSubtype="4" fill="hold" grpId="0" nodeType="clickEffect">
-                                  <p:stCondLst>
-                                    <p:cond delay="0"/>
-                                  </p:stCondLst>
-                                  <p:childTnLst>
-                                    <p:set>
-                                      <p:cBhvr>
-                                        <p:cTn id="6" dur="1" fill="hold">
-                                          <p:stCondLst>
-                                            <p:cond delay="0"/>
-                                          </p:stCondLst>
-                                        </p:cTn>
-                                        <p:tgtEl>
-                                          <p:spTgt spid="4"/>
-                                        </p:tgtEl>
-                                        <p:attrNameLst>
-                                          <p:attrName>style.visibility</p:attrName>
-                                        </p:attrNameLst>
-                                      </p:cBhvr>
-                                      <p:to>
-                                        <p:strVal val="visible"/>
-                                      </p:to>
-                                    </p:set>
-                                    <p:anim calcmode="lin" valueType="num">
-                                      <p:cBhvr additive="base">
-                                        <p:cTn id="7" dur="500" fill="hold"/>
-                                        <p:tgtEl>
-                                          <p:spTgt spid="4"/>
-                                        </p:tgtEl>
-                                        <p:attrNameLst>
-                                          <p:attrName>ppt_x</p:attrName>
-                                        </p:attrNameLst>
-                                      </p:cBhvr>
-                                      <p:tavLst>
-                                        <p:tav tm="0">
-                                          <p:val>
-                                            <p:strVal val="#ppt_x"/>
-                                          </p:val>
-                                        </p:tav>
-                                        <p:tav tm="100000">
-                                          <p:val>
-                                            <p:strVal val="#ppt_x"/>
-                                          </p:val>
-                                        </p:tav>
-                                      </p:tavLst>
-                                    </p:anim>
-                                    <p:anim calcmode="lin" valueType="num">
-                                      <p:cBhvr additive="base">
-                                        <p:cTn id="8" dur="500" fill="hold"/>
-                                        <p:tgtEl>
-                                          <p:spTgt spid="4"/>
-                                        </p:tgtEl>
-                                        <p:attrNameLst>
-                                          <p:attrName>ppt_y</p:attrName>
-                                        </p:attrNameLst>
-                                      </p:cBhvr>
-                                      <p:tavLst>
-                                        <p:tav tm="0">
-                                          <p:val>
-                                            <p:strVal val="1+#ppt_h/2"/>
-                                          </p:val>
-                                        </p:tav>
-                                        <p:tav tm="100000">
-                                          <p:val>
-                                            <p:strVal val="#ppt_y"/>
-                                          </p:val>
-                                        </p:tav>
-                                      </p:tavLst>
-                                    </p:anim>
-                                  </p:childTnLst>
-                                </p:cTn>
-                              </p:par>
-                            </p:childTnLst>
-                          </p:cTn>
-                        </p:par>
-                      </p:childTnLst>
-                    </p:cTn>
-                  </p:par>
-                </p:childTnLst>
-              </p:cTn>
-              <p:prevCondLst>
-                <p:cond evt="onPrev" delay="0">
-                  <p:tgtEl>
-                    <p:sldTgt/>
-                  </p:tgtEl>
-                </p:cond>
-              </p:prevCondLst>
-              <p:nextCondLst>
-                <p:cond evt="onNext" delay="0">
-                  <p:tgtEl>
-                    <p:sldTgt/>
-                  </p:tgtEl>
-                </p:cond>
-              </p:nextCondLst>
-            </p:seq>
-          </p:childTnLst>
-        </p:cTn>
-      </p:par>
-    </p:tnLst>
-    <p:bldLst>
-      <p:bldP spid="4" grpId="0" animBg="1"/>
     </p:bldLst>
   </p:timing>
 </p:sld>

</xml_diff>

<commit_message>
Adding more CodeCracker samples
</commit_message>
<xml_diff>
--- a/RoslynAndYou.pptx
+++ b/RoslynAndYou.pptx
@@ -903,10 +903,9 @@
         <a:lstStyle/>
         <a:p>
           <a:r>
-            <a:rPr lang="en-US" dirty="0" smtClean="0"/>
+            <a:rPr lang="en-US" dirty="0"/>
             <a:t>2002</a:t>
           </a:r>
-          <a:endParaRPr lang="en-US" dirty="0"/>
         </a:p>
       </dgm:t>
     </dgm:pt>
@@ -940,10 +939,9 @@
         <a:lstStyle/>
         <a:p>
           <a:r>
-            <a:rPr lang="en-US" dirty="0" smtClean="0"/>
+            <a:rPr lang="en-US" dirty="0"/>
             <a:t>2005</a:t>
           </a:r>
-          <a:endParaRPr lang="en-US" dirty="0"/>
         </a:p>
       </dgm:t>
     </dgm:pt>
@@ -977,10 +975,9 @@
         <a:lstStyle/>
         <a:p>
           <a:r>
-            <a:rPr lang="en-US" dirty="0" smtClean="0"/>
+            <a:rPr lang="en-US" dirty="0"/>
             <a:t>2008</a:t>
           </a:r>
-          <a:endParaRPr lang="en-US" dirty="0"/>
         </a:p>
       </dgm:t>
     </dgm:pt>
@@ -1014,10 +1011,9 @@
         <a:lstStyle/>
         <a:p>
           <a:r>
-            <a:rPr lang="en-US" dirty="0" smtClean="0"/>
+            <a:rPr lang="en-US" dirty="0"/>
             <a:t>2010</a:t>
           </a:r>
-          <a:endParaRPr lang="en-US" dirty="0"/>
         </a:p>
       </dgm:t>
     </dgm:pt>
@@ -1051,10 +1047,9 @@
         <a:lstStyle/>
         <a:p>
           <a:r>
-            <a:rPr lang="en-US" dirty="0" smtClean="0"/>
+            <a:rPr lang="en-US" dirty="0"/>
             <a:t>2012</a:t>
           </a:r>
-          <a:endParaRPr lang="en-US" dirty="0"/>
         </a:p>
       </dgm:t>
     </dgm:pt>
@@ -1088,10 +1083,9 @@
         <a:lstStyle/>
         <a:p>
           <a:r>
-            <a:rPr lang="en-US" dirty="0" smtClean="0"/>
+            <a:rPr lang="en-US" dirty="0"/>
             <a:t>2013</a:t>
           </a:r>
-          <a:endParaRPr lang="en-US" dirty="0"/>
         </a:p>
       </dgm:t>
     </dgm:pt>
@@ -1125,10 +1119,9 @@
         <a:lstStyle/>
         <a:p>
           <a:r>
-            <a:rPr lang="en-US" dirty="0" smtClean="0"/>
+            <a:rPr lang="en-US" dirty="0"/>
             <a:t>2015</a:t>
           </a:r>
-          <a:endParaRPr lang="en-US" dirty="0"/>
         </a:p>
       </dgm:t>
     </dgm:pt>
@@ -1162,10 +1155,9 @@
         <a:lstStyle/>
         <a:p>
           <a:r>
-            <a:rPr lang="en-US" dirty="0" smtClean="0"/>
+            <a:rPr lang="en-US" dirty="0"/>
             <a:t>C# 1/VB7</a:t>
           </a:r>
-          <a:endParaRPr lang="en-US" dirty="0"/>
         </a:p>
       </dgm:t>
     </dgm:pt>
@@ -1199,18 +1191,17 @@
         <a:lstStyle/>
         <a:p>
           <a:r>
-            <a:rPr lang="en-US" dirty="0" smtClean="0"/>
+            <a:rPr lang="en-US" dirty="0"/>
             <a:t>Generics, Iterators, Anonymous Delegates, </a:t>
           </a:r>
           <a:r>
-            <a:rPr lang="en-US" dirty="0" err="1" smtClean="0"/>
+            <a:rPr lang="en-US" dirty="0" err="1"/>
             <a:t>Nullable</a:t>
           </a:r>
           <a:r>
-            <a:rPr lang="en-US" dirty="0" smtClean="0"/>
+            <a:rPr lang="en-US" dirty="0"/>
             <a:t>, Partial</a:t>
           </a:r>
-          <a:endParaRPr lang="en-US" dirty="0"/>
         </a:p>
       </dgm:t>
     </dgm:pt>
@@ -1244,7 +1235,7 @@
         <a:lstStyle/>
         <a:p>
           <a:r>
-            <a:rPr lang="en-US" dirty="0" smtClean="0">
+            <a:rPr lang="en-US" dirty="0">
               <a:solidFill>
                 <a:srgbClr val="00B050"/>
               </a:solidFill>
@@ -1252,18 +1243,17 @@
             <a:t>LINQ</a:t>
           </a:r>
           <a:r>
-            <a:rPr lang="en-US" dirty="0" smtClean="0"/>
+            <a:rPr lang="en-US" dirty="0"/>
             <a:t>, Lambda, Anonymous, </a:t>
           </a:r>
           <a:r>
-            <a:rPr lang="en-US" dirty="0" err="1" smtClean="0"/>
+            <a:rPr lang="en-US" dirty="0" err="1"/>
             <a:t>AutoProp</a:t>
           </a:r>
           <a:r>
-            <a:rPr lang="en-US" dirty="0" smtClean="0"/>
+            <a:rPr lang="en-US" dirty="0"/>
             <a:t>, Extension Methods </a:t>
           </a:r>
-          <a:endParaRPr lang="en-US" dirty="0"/>
         </a:p>
       </dgm:t>
     </dgm:pt>
@@ -1297,18 +1287,17 @@
         <a:lstStyle/>
         <a:p>
           <a:r>
-            <a:rPr lang="en-US" dirty="0" smtClean="0"/>
+            <a:rPr lang="en-US" dirty="0"/>
             <a:t>Parallel, Dynamic, optional </a:t>
           </a:r>
           <a:r>
-            <a:rPr lang="en-US" dirty="0" err="1" smtClean="0"/>
+            <a:rPr lang="en-US" dirty="0" err="1"/>
             <a:t>params</a:t>
           </a:r>
           <a:r>
-            <a:rPr lang="en-US" dirty="0" smtClean="0"/>
+            <a:rPr lang="en-US" dirty="0"/>
             <a:t>, named arguments</a:t>
           </a:r>
-          <a:endParaRPr lang="en-US" dirty="0"/>
         </a:p>
       </dgm:t>
     </dgm:pt>
@@ -1342,7 +1331,7 @@
         <a:lstStyle/>
         <a:p>
           <a:r>
-            <a:rPr lang="en-US" dirty="0" err="1" smtClean="0"/>
+            <a:rPr lang="en-US" dirty="0" err="1"/>
             <a:t>Async</a:t>
           </a:r>
           <a:endParaRPr lang="en-US" dirty="0"/>
@@ -1379,10 +1368,9 @@
         <a:lstStyle/>
         <a:p>
           <a:r>
-            <a:rPr lang="en-US" dirty="0" smtClean="0"/>
+            <a:rPr lang="en-US" dirty="0"/>
             <a:t>Roslyn</a:t>
           </a:r>
-          <a:endParaRPr lang="en-US" dirty="0"/>
         </a:p>
       </dgm:t>
     </dgm:pt>
@@ -1416,10 +1404,9 @@
         <a:lstStyle/>
         <a:p>
           <a:r>
-            <a:rPr lang="en-US" dirty="0" smtClean="0"/>
+            <a:rPr lang="en-US" dirty="0"/>
             <a:t>???</a:t>
           </a:r>
-          <a:endParaRPr lang="en-US" dirty="0"/>
         </a:p>
       </dgm:t>
     </dgm:pt>
@@ -1453,13 +1440,6 @@
         </dgm:presLayoutVars>
       </dgm:prSet>
       <dgm:spPr/>
-      <dgm:t>
-        <a:bodyPr/>
-        <a:lstStyle/>
-        <a:p>
-          <a:endParaRPr lang="en-US"/>
-        </a:p>
-      </dgm:t>
     </dgm:pt>
     <dgm:pt modelId="{99404815-EBB5-40EA-B4FB-18C60F71A14A}" type="pres">
       <dgm:prSet presAssocID="{55AF256D-980F-4EAC-BDE3-A1B7BB810149}" presName="descendantText" presStyleLbl="alignAcc1" presStyleIdx="0" presStyleCnt="7" custLinFactNeighborX="0" custLinFactNeighborY="-262">
@@ -1468,13 +1448,6 @@
         </dgm:presLayoutVars>
       </dgm:prSet>
       <dgm:spPr/>
-      <dgm:t>
-        <a:bodyPr/>
-        <a:lstStyle/>
-        <a:p>
-          <a:endParaRPr lang="en-US"/>
-        </a:p>
-      </dgm:t>
     </dgm:pt>
     <dgm:pt modelId="{37EC7346-47C0-4615-841A-9E4F49B20616}" type="pres">
       <dgm:prSet presAssocID="{A0FA65F2-48E1-4C84-8387-4B40ABD643EF}" presName="sp" presStyleCnt="0"/>
@@ -1492,13 +1465,6 @@
         </dgm:presLayoutVars>
       </dgm:prSet>
       <dgm:spPr/>
-      <dgm:t>
-        <a:bodyPr/>
-        <a:lstStyle/>
-        <a:p>
-          <a:endParaRPr lang="en-US"/>
-        </a:p>
-      </dgm:t>
     </dgm:pt>
     <dgm:pt modelId="{DC734305-151B-44F7-8A31-4DF6B9EFACF5}" type="pres">
       <dgm:prSet presAssocID="{A3920C65-3F7C-48E9-ACE8-6414D7482E18}" presName="descendantText" presStyleLbl="alignAcc1" presStyleIdx="1" presStyleCnt="7">
@@ -1507,13 +1473,6 @@
         </dgm:presLayoutVars>
       </dgm:prSet>
       <dgm:spPr/>
-      <dgm:t>
-        <a:bodyPr/>
-        <a:lstStyle/>
-        <a:p>
-          <a:endParaRPr lang="en-US"/>
-        </a:p>
-      </dgm:t>
     </dgm:pt>
     <dgm:pt modelId="{9C7EE37F-721D-46BD-AB76-FC0B9FABD973}" type="pres">
       <dgm:prSet presAssocID="{A84EAA2E-6FF3-4307-8D22-5FB6E0659300}" presName="sp" presStyleCnt="0"/>
@@ -1531,13 +1490,6 @@
         </dgm:presLayoutVars>
       </dgm:prSet>
       <dgm:spPr/>
-      <dgm:t>
-        <a:bodyPr/>
-        <a:lstStyle/>
-        <a:p>
-          <a:endParaRPr lang="en-US"/>
-        </a:p>
-      </dgm:t>
     </dgm:pt>
     <dgm:pt modelId="{114B75A6-06AB-4193-B4F9-C42AEDF360ED}" type="pres">
       <dgm:prSet presAssocID="{1F8667CE-1C44-4E08-9A2B-FF616C613456}" presName="descendantText" presStyleLbl="alignAcc1" presStyleIdx="2" presStyleCnt="7">
@@ -1546,13 +1498,6 @@
         </dgm:presLayoutVars>
       </dgm:prSet>
       <dgm:spPr/>
-      <dgm:t>
-        <a:bodyPr/>
-        <a:lstStyle/>
-        <a:p>
-          <a:endParaRPr lang="en-US"/>
-        </a:p>
-      </dgm:t>
     </dgm:pt>
     <dgm:pt modelId="{BA64D39E-95CC-4CC6-92C0-C7057B7FC9A2}" type="pres">
       <dgm:prSet presAssocID="{8A1EDCB2-7721-4B0B-9ECE-0E0736CDE7BE}" presName="sp" presStyleCnt="0"/>
@@ -1570,13 +1515,6 @@
         </dgm:presLayoutVars>
       </dgm:prSet>
       <dgm:spPr/>
-      <dgm:t>
-        <a:bodyPr/>
-        <a:lstStyle/>
-        <a:p>
-          <a:endParaRPr lang="en-US"/>
-        </a:p>
-      </dgm:t>
     </dgm:pt>
     <dgm:pt modelId="{DAD2E2F8-54E6-4FAE-A9BD-86AF88168CB8}" type="pres">
       <dgm:prSet presAssocID="{EADE0D2D-1205-40C5-86CE-1D93146D1A90}" presName="descendantText" presStyleLbl="alignAcc1" presStyleIdx="3" presStyleCnt="7">
@@ -1585,13 +1523,6 @@
         </dgm:presLayoutVars>
       </dgm:prSet>
       <dgm:spPr/>
-      <dgm:t>
-        <a:bodyPr/>
-        <a:lstStyle/>
-        <a:p>
-          <a:endParaRPr lang="en-US"/>
-        </a:p>
-      </dgm:t>
     </dgm:pt>
     <dgm:pt modelId="{C9D992B7-A7BC-4357-99AD-F77F70604335}" type="pres">
       <dgm:prSet presAssocID="{FE89EA1D-5BF4-4389-891E-1C4333E940F1}" presName="sp" presStyleCnt="0"/>
@@ -1609,13 +1540,6 @@
         </dgm:presLayoutVars>
       </dgm:prSet>
       <dgm:spPr/>
-      <dgm:t>
-        <a:bodyPr/>
-        <a:lstStyle/>
-        <a:p>
-          <a:endParaRPr lang="en-US"/>
-        </a:p>
-      </dgm:t>
     </dgm:pt>
     <dgm:pt modelId="{7A703FAB-2697-4360-9F76-B04086C14C7D}" type="pres">
       <dgm:prSet presAssocID="{7EB9B65E-F1F1-4C0C-BCEF-84E7CC628B93}" presName="descendantText" presStyleLbl="alignAcc1" presStyleIdx="4" presStyleCnt="7">
@@ -1624,13 +1548,6 @@
         </dgm:presLayoutVars>
       </dgm:prSet>
       <dgm:spPr/>
-      <dgm:t>
-        <a:bodyPr/>
-        <a:lstStyle/>
-        <a:p>
-          <a:endParaRPr lang="en-US"/>
-        </a:p>
-      </dgm:t>
     </dgm:pt>
     <dgm:pt modelId="{FA094EC6-401C-4C3D-8BCD-D36EBCBF57A2}" type="pres">
       <dgm:prSet presAssocID="{E25BEE93-F45D-4AF9-8923-EC981D9554A2}" presName="sp" presStyleCnt="0"/>
@@ -1648,13 +1565,6 @@
         </dgm:presLayoutVars>
       </dgm:prSet>
       <dgm:spPr/>
-      <dgm:t>
-        <a:bodyPr/>
-        <a:lstStyle/>
-        <a:p>
-          <a:endParaRPr lang="en-US"/>
-        </a:p>
-      </dgm:t>
     </dgm:pt>
     <dgm:pt modelId="{A736080A-6712-4C93-9E27-BF60389BE78D}" type="pres">
       <dgm:prSet presAssocID="{295C1A26-C0BB-4CC5-A7C3-C9BB31F1079B}" presName="descendantText" presStyleLbl="alignAcc1" presStyleIdx="5" presStyleCnt="7">
@@ -1663,13 +1573,6 @@
         </dgm:presLayoutVars>
       </dgm:prSet>
       <dgm:spPr/>
-      <dgm:t>
-        <a:bodyPr/>
-        <a:lstStyle/>
-        <a:p>
-          <a:endParaRPr lang="en-US"/>
-        </a:p>
-      </dgm:t>
     </dgm:pt>
     <dgm:pt modelId="{90A72ED7-D95B-4830-AC90-B05431EACFA1}" type="pres">
       <dgm:prSet presAssocID="{2FF0FE31-AA20-4E75-AC28-31F2605A195E}" presName="sp" presStyleCnt="0"/>
@@ -1687,13 +1590,6 @@
         </dgm:presLayoutVars>
       </dgm:prSet>
       <dgm:spPr/>
-      <dgm:t>
-        <a:bodyPr/>
-        <a:lstStyle/>
-        <a:p>
-          <a:endParaRPr lang="en-US"/>
-        </a:p>
-      </dgm:t>
     </dgm:pt>
     <dgm:pt modelId="{37953712-67A3-4E6D-83CD-63697DE27E74}" type="pres">
       <dgm:prSet presAssocID="{1002025F-1C72-4A21-ADB8-7F4B762D0701}" presName="descendantText" presStyleLbl="alignAcc1" presStyleIdx="6" presStyleCnt="7">
@@ -1702,13 +1598,6 @@
         </dgm:presLayoutVars>
       </dgm:prSet>
       <dgm:spPr/>
-      <dgm:t>
-        <a:bodyPr/>
-        <a:lstStyle/>
-        <a:p>
-          <a:endParaRPr lang="en-US"/>
-        </a:p>
-      </dgm:t>
     </dgm:pt>
   </dgm:ptLst>
   <dgm:cxnLst>
@@ -1841,7 +1730,7 @@
         </a:bodyPr>
         <a:lstStyle/>
         <a:p>
-          <a:pPr lvl="0" algn="ctr" defTabSz="755650">
+          <a:pPr marL="0" lvl="0" indent="0" algn="ctr" defTabSz="755650">
             <a:lnSpc>
               <a:spcPct val="90000"/>
             </a:lnSpc>
@@ -1851,12 +1740,12 @@
             <a:spcAft>
               <a:spcPct val="35000"/>
             </a:spcAft>
+            <a:buNone/>
           </a:pPr>
           <a:r>
-            <a:rPr lang="en-US" sz="1700" kern="1200" dirty="0" smtClean="0"/>
+            <a:rPr lang="en-US" sz="1700" kern="1200" dirty="0"/>
             <a:t>2002</a:t>
           </a:r>
-          <a:endParaRPr lang="en-US" sz="1700" kern="1200" dirty="0"/>
         </a:p>
       </dsp:txBody>
       <dsp:txXfrm rot="-5400000">
@@ -1927,13 +1816,12 @@
             <a:spcAft>
               <a:spcPct val="15000"/>
             </a:spcAft>
-            <a:buChar char="••"/>
+            <a:buChar char="•"/>
           </a:pPr>
           <a:r>
-            <a:rPr lang="en-US" sz="2400" kern="1200" dirty="0" smtClean="0"/>
+            <a:rPr lang="en-US" sz="2400" kern="1200" dirty="0"/>
             <a:t>C# 1/VB7</a:t>
           </a:r>
-          <a:endParaRPr lang="en-US" sz="2400" kern="1200" dirty="0"/>
         </a:p>
       </dsp:txBody>
       <dsp:txXfrm rot="-5400000">
@@ -1995,7 +1883,7 @@
         </a:bodyPr>
         <a:lstStyle/>
         <a:p>
-          <a:pPr lvl="0" algn="ctr" defTabSz="755650">
+          <a:pPr marL="0" lvl="0" indent="0" algn="ctr" defTabSz="755650">
             <a:lnSpc>
               <a:spcPct val="90000"/>
             </a:lnSpc>
@@ -2005,12 +1893,12 @@
             <a:spcAft>
               <a:spcPct val="35000"/>
             </a:spcAft>
+            <a:buNone/>
           </a:pPr>
           <a:r>
-            <a:rPr lang="en-US" sz="1700" kern="1200" dirty="0" smtClean="0"/>
+            <a:rPr lang="en-US" sz="1700" kern="1200" dirty="0"/>
             <a:t>2005</a:t>
           </a:r>
-          <a:endParaRPr lang="en-US" sz="1700" kern="1200" dirty="0"/>
         </a:p>
       </dsp:txBody>
       <dsp:txXfrm rot="-5400000">
@@ -2081,21 +1969,20 @@
             <a:spcAft>
               <a:spcPct val="15000"/>
             </a:spcAft>
-            <a:buChar char="••"/>
+            <a:buChar char="•"/>
           </a:pPr>
           <a:r>
-            <a:rPr lang="en-US" sz="2400" kern="1200" dirty="0" smtClean="0"/>
+            <a:rPr lang="en-US" sz="2400" kern="1200" dirty="0"/>
             <a:t>Generics, Iterators, Anonymous Delegates, </a:t>
           </a:r>
           <a:r>
-            <a:rPr lang="en-US" sz="2400" kern="1200" dirty="0" err="1" smtClean="0"/>
+            <a:rPr lang="en-US" sz="2400" kern="1200" dirty="0" err="1"/>
             <a:t>Nullable</a:t>
           </a:r>
           <a:r>
-            <a:rPr lang="en-US" sz="2400" kern="1200" dirty="0" smtClean="0"/>
+            <a:rPr lang="en-US" sz="2400" kern="1200" dirty="0"/>
             <a:t>, Partial</a:t>
           </a:r>
-          <a:endParaRPr lang="en-US" sz="2400" kern="1200" dirty="0"/>
         </a:p>
       </dsp:txBody>
       <dsp:txXfrm rot="-5400000">
@@ -2157,7 +2044,7 @@
         </a:bodyPr>
         <a:lstStyle/>
         <a:p>
-          <a:pPr lvl="0" algn="ctr" defTabSz="755650">
+          <a:pPr marL="0" lvl="0" indent="0" algn="ctr" defTabSz="755650">
             <a:lnSpc>
               <a:spcPct val="90000"/>
             </a:lnSpc>
@@ -2167,12 +2054,12 @@
             <a:spcAft>
               <a:spcPct val="35000"/>
             </a:spcAft>
+            <a:buNone/>
           </a:pPr>
           <a:r>
-            <a:rPr lang="en-US" sz="1700" kern="1200" dirty="0" smtClean="0"/>
+            <a:rPr lang="en-US" sz="1700" kern="1200" dirty="0"/>
             <a:t>2008</a:t>
           </a:r>
-          <a:endParaRPr lang="en-US" sz="1700" kern="1200" dirty="0"/>
         </a:p>
       </dsp:txBody>
       <dsp:txXfrm rot="-5400000">
@@ -2243,10 +2130,10 @@
             <a:spcAft>
               <a:spcPct val="15000"/>
             </a:spcAft>
-            <a:buChar char="••"/>
+            <a:buChar char="•"/>
           </a:pPr>
           <a:r>
-            <a:rPr lang="en-US" sz="2400" kern="1200" dirty="0" smtClean="0">
+            <a:rPr lang="en-US" sz="2400" kern="1200" dirty="0">
               <a:solidFill>
                 <a:srgbClr val="00B050"/>
               </a:solidFill>
@@ -2254,18 +2141,17 @@
             <a:t>LINQ</a:t>
           </a:r>
           <a:r>
-            <a:rPr lang="en-US" sz="2400" kern="1200" dirty="0" smtClean="0"/>
+            <a:rPr lang="en-US" sz="2400" kern="1200" dirty="0"/>
             <a:t>, Lambda, Anonymous, </a:t>
           </a:r>
           <a:r>
-            <a:rPr lang="en-US" sz="2400" kern="1200" dirty="0" err="1" smtClean="0"/>
+            <a:rPr lang="en-US" sz="2400" kern="1200" dirty="0" err="1"/>
             <a:t>AutoProp</a:t>
           </a:r>
           <a:r>
-            <a:rPr lang="en-US" sz="2400" kern="1200" dirty="0" smtClean="0"/>
+            <a:rPr lang="en-US" sz="2400" kern="1200" dirty="0"/>
             <a:t>, Extension Methods </a:t>
           </a:r>
-          <a:endParaRPr lang="en-US" sz="2400" kern="1200" dirty="0"/>
         </a:p>
       </dsp:txBody>
       <dsp:txXfrm rot="-5400000">
@@ -2327,7 +2213,7 @@
         </a:bodyPr>
         <a:lstStyle/>
         <a:p>
-          <a:pPr lvl="0" algn="ctr" defTabSz="755650">
+          <a:pPr marL="0" lvl="0" indent="0" algn="ctr" defTabSz="755650">
             <a:lnSpc>
               <a:spcPct val="90000"/>
             </a:lnSpc>
@@ -2337,12 +2223,12 @@
             <a:spcAft>
               <a:spcPct val="35000"/>
             </a:spcAft>
+            <a:buNone/>
           </a:pPr>
           <a:r>
-            <a:rPr lang="en-US" sz="1700" kern="1200" dirty="0" smtClean="0"/>
+            <a:rPr lang="en-US" sz="1700" kern="1200" dirty="0"/>
             <a:t>2010</a:t>
           </a:r>
-          <a:endParaRPr lang="en-US" sz="1700" kern="1200" dirty="0"/>
         </a:p>
       </dsp:txBody>
       <dsp:txXfrm rot="-5400000">
@@ -2413,21 +2299,20 @@
             <a:spcAft>
               <a:spcPct val="15000"/>
             </a:spcAft>
-            <a:buChar char="••"/>
+            <a:buChar char="•"/>
           </a:pPr>
           <a:r>
-            <a:rPr lang="en-US" sz="2400" kern="1200" dirty="0" smtClean="0"/>
+            <a:rPr lang="en-US" sz="2400" kern="1200" dirty="0"/>
             <a:t>Parallel, Dynamic, optional </a:t>
           </a:r>
           <a:r>
-            <a:rPr lang="en-US" sz="2400" kern="1200" dirty="0" err="1" smtClean="0"/>
+            <a:rPr lang="en-US" sz="2400" kern="1200" dirty="0" err="1"/>
             <a:t>params</a:t>
           </a:r>
           <a:r>
-            <a:rPr lang="en-US" sz="2400" kern="1200" dirty="0" smtClean="0"/>
+            <a:rPr lang="en-US" sz="2400" kern="1200" dirty="0"/>
             <a:t>, named arguments</a:t>
           </a:r>
-          <a:endParaRPr lang="en-US" sz="2400" kern="1200" dirty="0"/>
         </a:p>
       </dsp:txBody>
       <dsp:txXfrm rot="-5400000">
@@ -2489,7 +2374,7 @@
         </a:bodyPr>
         <a:lstStyle/>
         <a:p>
-          <a:pPr lvl="0" algn="ctr" defTabSz="755650">
+          <a:pPr marL="0" lvl="0" indent="0" algn="ctr" defTabSz="755650">
             <a:lnSpc>
               <a:spcPct val="90000"/>
             </a:lnSpc>
@@ -2499,12 +2384,12 @@
             <a:spcAft>
               <a:spcPct val="35000"/>
             </a:spcAft>
+            <a:buNone/>
           </a:pPr>
           <a:r>
-            <a:rPr lang="en-US" sz="1700" kern="1200" dirty="0" smtClean="0"/>
+            <a:rPr lang="en-US" sz="1700" kern="1200" dirty="0"/>
             <a:t>2012</a:t>
           </a:r>
-          <a:endParaRPr lang="en-US" sz="1700" kern="1200" dirty="0"/>
         </a:p>
       </dsp:txBody>
       <dsp:txXfrm rot="-5400000">
@@ -2575,10 +2460,10 @@
             <a:spcAft>
               <a:spcPct val="15000"/>
             </a:spcAft>
-            <a:buChar char="••"/>
+            <a:buChar char="•"/>
           </a:pPr>
           <a:r>
-            <a:rPr lang="en-US" sz="2400" kern="1200" dirty="0" err="1" smtClean="0"/>
+            <a:rPr lang="en-US" sz="2400" kern="1200" dirty="0" err="1"/>
             <a:t>Async</a:t>
           </a:r>
           <a:endParaRPr lang="en-US" sz="2400" kern="1200" dirty="0"/>
@@ -2643,7 +2528,7 @@
         </a:bodyPr>
         <a:lstStyle/>
         <a:p>
-          <a:pPr lvl="0" algn="ctr" defTabSz="755650">
+          <a:pPr marL="0" lvl="0" indent="0" algn="ctr" defTabSz="755650">
             <a:lnSpc>
               <a:spcPct val="90000"/>
             </a:lnSpc>
@@ -2653,12 +2538,12 @@
             <a:spcAft>
               <a:spcPct val="35000"/>
             </a:spcAft>
+            <a:buNone/>
           </a:pPr>
           <a:r>
-            <a:rPr lang="en-US" sz="1700" kern="1200" dirty="0" smtClean="0"/>
+            <a:rPr lang="en-US" sz="1700" kern="1200" dirty="0"/>
             <a:t>2013</a:t>
           </a:r>
-          <a:endParaRPr lang="en-US" sz="1700" kern="1200" dirty="0"/>
         </a:p>
       </dsp:txBody>
       <dsp:txXfrm rot="-5400000">
@@ -2729,13 +2614,12 @@
             <a:spcAft>
               <a:spcPct val="15000"/>
             </a:spcAft>
-            <a:buChar char="••"/>
+            <a:buChar char="•"/>
           </a:pPr>
           <a:r>
-            <a:rPr lang="en-US" sz="2400" kern="1200" dirty="0" smtClean="0"/>
+            <a:rPr lang="en-US" sz="2400" kern="1200" dirty="0"/>
             <a:t>???</a:t>
           </a:r>
-          <a:endParaRPr lang="en-US" sz="2400" kern="1200" dirty="0"/>
         </a:p>
       </dsp:txBody>
       <dsp:txXfrm rot="-5400000">
@@ -2797,7 +2681,7 @@
         </a:bodyPr>
         <a:lstStyle/>
         <a:p>
-          <a:pPr lvl="0" algn="ctr" defTabSz="755650">
+          <a:pPr marL="0" lvl="0" indent="0" algn="ctr" defTabSz="755650">
             <a:lnSpc>
               <a:spcPct val="90000"/>
             </a:lnSpc>
@@ -2807,12 +2691,12 @@
             <a:spcAft>
               <a:spcPct val="35000"/>
             </a:spcAft>
+            <a:buNone/>
           </a:pPr>
           <a:r>
-            <a:rPr lang="en-US" sz="1700" kern="1200" dirty="0" smtClean="0"/>
+            <a:rPr lang="en-US" sz="1700" kern="1200" dirty="0"/>
             <a:t>2015</a:t>
           </a:r>
-          <a:endParaRPr lang="en-US" sz="1700" kern="1200" dirty="0"/>
         </a:p>
       </dsp:txBody>
       <dsp:txXfrm rot="-5400000">
@@ -2883,13 +2767,12 @@
             <a:spcAft>
               <a:spcPct val="15000"/>
             </a:spcAft>
-            <a:buChar char="••"/>
+            <a:buChar char="•"/>
           </a:pPr>
           <a:r>
-            <a:rPr lang="en-US" sz="2400" kern="1200" dirty="0" smtClean="0"/>
+            <a:rPr lang="en-US" sz="2400" kern="1200" dirty="0"/>
             <a:t>Roslyn</a:t>
           </a:r>
-          <a:endParaRPr lang="en-US" sz="2400" kern="1200" dirty="0"/>
         </a:p>
       </dsp:txBody>
       <dsp:txXfrm rot="-5400000">
@@ -4273,7 +4156,7 @@
           <a:p>
             <a:fld id="{FC81B089-160E-404A-8C73-8674F1782EA4}" type="datetimeFigureOut">
               <a:rPr lang="en-US" smtClean="0"/>
-              <a:t>4/16/2016</a:t>
+              <a:t>9/29/2016</a:t>
             </a:fld>
             <a:endParaRPr lang="en-US"/>
           </a:p>
@@ -4337,38 +4220,37 @@
           <a:p>
             <a:pPr lvl="0"/>
             <a:r>
-              <a:rPr lang="en-US" smtClean="0"/>
+              <a:rPr lang="en-US"/>
               <a:t>Click to edit Master text styles</a:t>
             </a:r>
           </a:p>
           <a:p>
             <a:pPr lvl="1"/>
             <a:r>
-              <a:rPr lang="en-US" smtClean="0"/>
+              <a:rPr lang="en-US"/>
               <a:t>Second level</a:t>
             </a:r>
           </a:p>
           <a:p>
             <a:pPr lvl="2"/>
             <a:r>
-              <a:rPr lang="en-US" smtClean="0"/>
+              <a:rPr lang="en-US"/>
               <a:t>Third level</a:t>
             </a:r>
           </a:p>
           <a:p>
             <a:pPr lvl="3"/>
             <a:r>
-              <a:rPr lang="en-US" smtClean="0"/>
+              <a:rPr lang="en-US"/>
               <a:t>Fourth level</a:t>
             </a:r>
           </a:p>
           <a:p>
             <a:pPr lvl="4"/>
             <a:r>
-              <a:rPr lang="en-US" smtClean="0"/>
+              <a:rPr lang="en-US"/>
               <a:t>Fifth level</a:t>
             </a:r>
-            <a:endParaRPr lang="en-US"/>
           </a:p>
         </p:txBody>
       </p:sp>
@@ -7342,7 +7224,7 @@
           <a:p>
             <a:fld id="{D2B62928-2648-4210-B25C-2BD7B5FE2C7B}" type="datetimeFigureOut">
               <a:rPr lang="en-US" smtClean="0"/>
-              <a:t>4/16/2016</a:t>
+              <a:t>9/29/2016</a:t>
             </a:fld>
             <a:endParaRPr lang="en-US"/>
           </a:p>
@@ -7612,7 +7494,7 @@
           </a:lstStyle>
           <a:p>
             <a:r>
-              <a:rPr lang="en-US" smtClean="0"/>
+              <a:rPr lang="en-US"/>
               <a:t>Click to edit Master title style</a:t>
             </a:r>
             <a:endParaRPr lang="en-US" dirty="0"/>
@@ -7731,7 +7613,7 @@
           </a:lstStyle>
           <a:p>
             <a:r>
-              <a:rPr lang="en-US" smtClean="0"/>
+              <a:rPr lang="en-US"/>
               <a:t>Click to edit Master subtitle style</a:t>
             </a:r>
             <a:endParaRPr lang="en-US" dirty="0"/>
@@ -7779,10 +7661,9 @@
           <a:lstStyle/>
           <a:p>
             <a:r>
-              <a:rPr lang="en-US" smtClean="0"/>
+              <a:rPr lang="en-US"/>
               <a:t>Click to edit Master title style</a:t>
             </a:r>
-            <a:endParaRPr lang="en-US"/>
           </a:p>
         </p:txBody>
       </p:sp>
@@ -7803,38 +7684,37 @@
           <a:p>
             <a:pPr lvl="0"/>
             <a:r>
-              <a:rPr lang="en-US" smtClean="0"/>
+              <a:rPr lang="en-US"/>
               <a:t>Click to edit Master text styles</a:t>
             </a:r>
           </a:p>
           <a:p>
             <a:pPr lvl="1"/>
             <a:r>
-              <a:rPr lang="en-US" smtClean="0"/>
+              <a:rPr lang="en-US"/>
               <a:t>Second level</a:t>
             </a:r>
           </a:p>
           <a:p>
             <a:pPr lvl="2"/>
             <a:r>
-              <a:rPr lang="en-US" smtClean="0"/>
+              <a:rPr lang="en-US"/>
               <a:t>Third level</a:t>
             </a:r>
           </a:p>
           <a:p>
             <a:pPr lvl="3"/>
             <a:r>
-              <a:rPr lang="en-US" smtClean="0"/>
+              <a:rPr lang="en-US"/>
               <a:t>Fourth level</a:t>
             </a:r>
           </a:p>
           <a:p>
             <a:pPr lvl="4"/>
             <a:r>
-              <a:rPr lang="en-US" smtClean="0"/>
+              <a:rPr lang="en-US"/>
               <a:t>Fifth level</a:t>
             </a:r>
-            <a:endParaRPr lang="en-US"/>
           </a:p>
         </p:txBody>
       </p:sp>
@@ -7855,7 +7735,7 @@
           <a:p>
             <a:fld id="{D2B62928-2648-4210-B25C-2BD7B5FE2C7B}" type="datetimeFigureOut">
               <a:rPr lang="en-US" smtClean="0"/>
-              <a:t>4/16/2016</a:t>
+              <a:t>9/29/2016</a:t>
             </a:fld>
             <a:endParaRPr lang="en-US"/>
           </a:p>
@@ -7949,10 +7829,9 @@
           <a:lstStyle/>
           <a:p>
             <a:r>
-              <a:rPr lang="en-US" smtClean="0"/>
+              <a:rPr lang="en-US"/>
               <a:t>Click to edit Master title style</a:t>
             </a:r>
-            <a:endParaRPr lang="en-US"/>
           </a:p>
         </p:txBody>
       </p:sp>
@@ -7978,38 +7857,37 @@
           <a:p>
             <a:pPr lvl="0"/>
             <a:r>
-              <a:rPr lang="en-US" smtClean="0"/>
+              <a:rPr lang="en-US"/>
               <a:t>Click to edit Master text styles</a:t>
             </a:r>
           </a:p>
           <a:p>
             <a:pPr lvl="1"/>
             <a:r>
-              <a:rPr lang="en-US" smtClean="0"/>
+              <a:rPr lang="en-US"/>
               <a:t>Second level</a:t>
             </a:r>
           </a:p>
           <a:p>
             <a:pPr lvl="2"/>
             <a:r>
-              <a:rPr lang="en-US" smtClean="0"/>
+              <a:rPr lang="en-US"/>
               <a:t>Third level</a:t>
             </a:r>
           </a:p>
           <a:p>
             <a:pPr lvl="3"/>
             <a:r>
-              <a:rPr lang="en-US" smtClean="0"/>
+              <a:rPr lang="en-US"/>
               <a:t>Fourth level</a:t>
             </a:r>
           </a:p>
           <a:p>
             <a:pPr lvl="4"/>
             <a:r>
-              <a:rPr lang="en-US" smtClean="0"/>
+              <a:rPr lang="en-US"/>
               <a:t>Fifth level</a:t>
             </a:r>
-            <a:endParaRPr lang="en-US"/>
           </a:p>
         </p:txBody>
       </p:sp>
@@ -8030,7 +7908,7 @@
           <a:p>
             <a:fld id="{D2B62928-2648-4210-B25C-2BD7B5FE2C7B}" type="datetimeFigureOut">
               <a:rPr lang="en-US" smtClean="0"/>
-              <a:t>4/16/2016</a:t>
+              <a:t>9/29/2016</a:t>
             </a:fld>
             <a:endParaRPr lang="en-US"/>
           </a:p>
@@ -8119,7 +7997,7 @@
           <a:lstStyle/>
           <a:p>
             <a:r>
-              <a:rPr lang="en-US" smtClean="0"/>
+              <a:rPr lang="en-US"/>
               <a:t>Click to edit Master title style</a:t>
             </a:r>
             <a:endParaRPr lang="en-US" dirty="0"/>
@@ -8143,38 +8021,37 @@
           <a:p>
             <a:pPr lvl="0"/>
             <a:r>
-              <a:rPr lang="en-US" smtClean="0"/>
+              <a:rPr lang="en-US"/>
               <a:t>Click to edit Master text styles</a:t>
             </a:r>
           </a:p>
           <a:p>
             <a:pPr lvl="1"/>
             <a:r>
-              <a:rPr lang="en-US" smtClean="0"/>
+              <a:rPr lang="en-US"/>
               <a:t>Second level</a:t>
             </a:r>
           </a:p>
           <a:p>
             <a:pPr lvl="2"/>
             <a:r>
-              <a:rPr lang="en-US" smtClean="0"/>
+              <a:rPr lang="en-US"/>
               <a:t>Third level</a:t>
             </a:r>
           </a:p>
           <a:p>
             <a:pPr lvl="3"/>
             <a:r>
-              <a:rPr lang="en-US" smtClean="0"/>
+              <a:rPr lang="en-US"/>
               <a:t>Fourth level</a:t>
             </a:r>
           </a:p>
           <a:p>
             <a:pPr lvl="4"/>
             <a:r>
-              <a:rPr lang="en-US" smtClean="0"/>
+              <a:rPr lang="en-US"/>
               <a:t>Fifth level</a:t>
             </a:r>
-            <a:endParaRPr lang="en-US"/>
           </a:p>
         </p:txBody>
       </p:sp>
@@ -8195,7 +8072,7 @@
           <a:p>
             <a:fld id="{D2B62928-2648-4210-B25C-2BD7B5FE2C7B}" type="datetimeFigureOut">
               <a:rPr lang="en-US" smtClean="0"/>
-              <a:t>4/16/2016</a:t>
+              <a:t>9/29/2016</a:t>
             </a:fld>
             <a:endParaRPr lang="en-US"/>
           </a:p>
@@ -11268,7 +11145,7 @@
           <a:p>
             <a:pPr lvl="0"/>
             <a:r>
-              <a:rPr lang="en-US" smtClean="0"/>
+              <a:rPr lang="en-US"/>
               <a:t>Click to edit Master text styles</a:t>
             </a:r>
           </a:p>
@@ -11295,10 +11172,9 @@
           <a:lstStyle/>
           <a:p>
             <a:r>
-              <a:rPr lang="en-US" smtClean="0"/>
+              <a:rPr lang="en-US"/>
               <a:t>Click to edit Master title style</a:t>
             </a:r>
-            <a:endParaRPr lang="en-US"/>
           </a:p>
         </p:txBody>
       </p:sp>
@@ -11319,7 +11195,7 @@
           <a:p>
             <a:fld id="{D2B62928-2648-4210-B25C-2BD7B5FE2C7B}" type="datetimeFigureOut">
               <a:rPr lang="en-US" smtClean="0"/>
-              <a:t>4/16/2016</a:t>
+              <a:t>9/29/2016</a:t>
             </a:fld>
             <a:endParaRPr lang="en-US"/>
           </a:p>
@@ -11408,10 +11284,9 @@
           <a:lstStyle/>
           <a:p>
             <a:r>
-              <a:rPr lang="en-US" smtClean="0"/>
+              <a:rPr lang="en-US"/>
               <a:t>Click to edit Master title style</a:t>
             </a:r>
-            <a:endParaRPr lang="en-US"/>
           </a:p>
         </p:txBody>
       </p:sp>
@@ -11465,38 +11340,37 @@
           <a:p>
             <a:pPr lvl="0"/>
             <a:r>
-              <a:rPr lang="en-US" smtClean="0"/>
+              <a:rPr lang="en-US"/>
               <a:t>Click to edit Master text styles</a:t>
             </a:r>
           </a:p>
           <a:p>
             <a:pPr lvl="1"/>
             <a:r>
-              <a:rPr lang="en-US" smtClean="0"/>
+              <a:rPr lang="en-US"/>
               <a:t>Second level</a:t>
             </a:r>
           </a:p>
           <a:p>
             <a:pPr lvl="2"/>
             <a:r>
-              <a:rPr lang="en-US" smtClean="0"/>
+              <a:rPr lang="en-US"/>
               <a:t>Third level</a:t>
             </a:r>
           </a:p>
           <a:p>
             <a:pPr lvl="3"/>
             <a:r>
-              <a:rPr lang="en-US" smtClean="0"/>
+              <a:rPr lang="en-US"/>
               <a:t>Fourth level</a:t>
             </a:r>
           </a:p>
           <a:p>
             <a:pPr lvl="4"/>
             <a:r>
-              <a:rPr lang="en-US" smtClean="0"/>
+              <a:rPr lang="en-US"/>
               <a:t>Fifth level</a:t>
             </a:r>
-            <a:endParaRPr lang="en-US"/>
           </a:p>
         </p:txBody>
       </p:sp>
@@ -11550,38 +11424,37 @@
           <a:p>
             <a:pPr lvl="0"/>
             <a:r>
-              <a:rPr lang="en-US" smtClean="0"/>
+              <a:rPr lang="en-US"/>
               <a:t>Click to edit Master text styles</a:t>
             </a:r>
           </a:p>
           <a:p>
             <a:pPr lvl="1"/>
             <a:r>
-              <a:rPr lang="en-US" smtClean="0"/>
+              <a:rPr lang="en-US"/>
               <a:t>Second level</a:t>
             </a:r>
           </a:p>
           <a:p>
             <a:pPr lvl="2"/>
             <a:r>
-              <a:rPr lang="en-US" smtClean="0"/>
+              <a:rPr lang="en-US"/>
               <a:t>Third level</a:t>
             </a:r>
           </a:p>
           <a:p>
             <a:pPr lvl="3"/>
             <a:r>
-              <a:rPr lang="en-US" smtClean="0"/>
+              <a:rPr lang="en-US"/>
               <a:t>Fourth level</a:t>
             </a:r>
           </a:p>
           <a:p>
             <a:pPr lvl="4"/>
             <a:r>
-              <a:rPr lang="en-US" smtClean="0"/>
+              <a:rPr lang="en-US"/>
               <a:t>Fifth level</a:t>
             </a:r>
-            <a:endParaRPr lang="en-US"/>
           </a:p>
         </p:txBody>
       </p:sp>
@@ -11602,7 +11475,7 @@
           <a:p>
             <a:fld id="{D2B62928-2648-4210-B25C-2BD7B5FE2C7B}" type="datetimeFigureOut">
               <a:rPr lang="en-US" smtClean="0"/>
-              <a:t>4/16/2016</a:t>
+              <a:t>9/29/2016</a:t>
             </a:fld>
             <a:endParaRPr lang="en-US"/>
           </a:p>
@@ -11695,10 +11568,9 @@
           </a:lstStyle>
           <a:p>
             <a:r>
-              <a:rPr lang="en-US" smtClean="0"/>
+              <a:rPr lang="en-US"/>
               <a:t>Click to edit Master title style</a:t>
             </a:r>
-            <a:endParaRPr lang="en-US"/>
           </a:p>
         </p:txBody>
       </p:sp>
@@ -11761,7 +11633,7 @@
           <a:p>
             <a:pPr lvl="0"/>
             <a:r>
-              <a:rPr lang="en-US" smtClean="0"/>
+              <a:rPr lang="en-US"/>
               <a:t>Click to edit Master text styles</a:t>
             </a:r>
           </a:p>
@@ -11817,38 +11689,37 @@
           <a:p>
             <a:pPr lvl="0"/>
             <a:r>
-              <a:rPr lang="en-US" smtClean="0"/>
+              <a:rPr lang="en-US"/>
               <a:t>Click to edit Master text styles</a:t>
             </a:r>
           </a:p>
           <a:p>
             <a:pPr lvl="1"/>
             <a:r>
-              <a:rPr lang="en-US" smtClean="0"/>
+              <a:rPr lang="en-US"/>
               <a:t>Second level</a:t>
             </a:r>
           </a:p>
           <a:p>
             <a:pPr lvl="2"/>
             <a:r>
-              <a:rPr lang="en-US" smtClean="0"/>
+              <a:rPr lang="en-US"/>
               <a:t>Third level</a:t>
             </a:r>
           </a:p>
           <a:p>
             <a:pPr lvl="3"/>
             <a:r>
-              <a:rPr lang="en-US" smtClean="0"/>
+              <a:rPr lang="en-US"/>
               <a:t>Fourth level</a:t>
             </a:r>
           </a:p>
           <a:p>
             <a:pPr lvl="4"/>
             <a:r>
-              <a:rPr lang="en-US" smtClean="0"/>
+              <a:rPr lang="en-US"/>
               <a:t>Fifth level</a:t>
             </a:r>
-            <a:endParaRPr lang="en-US"/>
           </a:p>
         </p:txBody>
       </p:sp>
@@ -11911,7 +11782,7 @@
           <a:p>
             <a:pPr lvl="0"/>
             <a:r>
-              <a:rPr lang="en-US" smtClean="0"/>
+              <a:rPr lang="en-US"/>
               <a:t>Click to edit Master text styles</a:t>
             </a:r>
           </a:p>
@@ -11967,38 +11838,37 @@
           <a:p>
             <a:pPr lvl="0"/>
             <a:r>
-              <a:rPr lang="en-US" smtClean="0"/>
+              <a:rPr lang="en-US"/>
               <a:t>Click to edit Master text styles</a:t>
             </a:r>
           </a:p>
           <a:p>
             <a:pPr lvl="1"/>
             <a:r>
-              <a:rPr lang="en-US" smtClean="0"/>
+              <a:rPr lang="en-US"/>
               <a:t>Second level</a:t>
             </a:r>
           </a:p>
           <a:p>
             <a:pPr lvl="2"/>
             <a:r>
-              <a:rPr lang="en-US" smtClean="0"/>
+              <a:rPr lang="en-US"/>
               <a:t>Third level</a:t>
             </a:r>
           </a:p>
           <a:p>
             <a:pPr lvl="3"/>
             <a:r>
-              <a:rPr lang="en-US" smtClean="0"/>
+              <a:rPr lang="en-US"/>
               <a:t>Fourth level</a:t>
             </a:r>
           </a:p>
           <a:p>
             <a:pPr lvl="4"/>
             <a:r>
-              <a:rPr lang="en-US" smtClean="0"/>
+              <a:rPr lang="en-US"/>
               <a:t>Fifth level</a:t>
             </a:r>
-            <a:endParaRPr lang="en-US"/>
           </a:p>
         </p:txBody>
       </p:sp>
@@ -12019,7 +11889,7 @@
           <a:p>
             <a:fld id="{D2B62928-2648-4210-B25C-2BD7B5FE2C7B}" type="datetimeFigureOut">
               <a:rPr lang="en-US" smtClean="0"/>
-              <a:t>4/16/2016</a:t>
+              <a:t>9/29/2016</a:t>
             </a:fld>
             <a:endParaRPr lang="en-US"/>
           </a:p>
@@ -12108,10 +11978,9 @@
           <a:lstStyle/>
           <a:p>
             <a:r>
-              <a:rPr lang="en-US" smtClean="0"/>
+              <a:rPr lang="en-US"/>
               <a:t>Click to edit Master title style</a:t>
             </a:r>
-            <a:endParaRPr lang="en-US"/>
           </a:p>
         </p:txBody>
       </p:sp>
@@ -12132,7 +12001,7 @@
           <a:p>
             <a:fld id="{D2B62928-2648-4210-B25C-2BD7B5FE2C7B}" type="datetimeFigureOut">
               <a:rPr lang="en-US" smtClean="0"/>
-              <a:t>4/16/2016</a:t>
+              <a:t>9/29/2016</a:t>
             </a:fld>
             <a:endParaRPr lang="en-US"/>
           </a:p>
@@ -12222,7 +12091,7 @@
           <a:p>
             <a:fld id="{D2B62928-2648-4210-B25C-2BD7B5FE2C7B}" type="datetimeFigureOut">
               <a:rPr lang="en-US" smtClean="0"/>
-              <a:t>4/16/2016</a:t>
+              <a:t>9/29/2016</a:t>
             </a:fld>
             <a:endParaRPr lang="en-US"/>
           </a:p>
@@ -12345,35 +12214,35 @@
           <a:p>
             <a:pPr lvl="0"/>
             <a:r>
-              <a:rPr lang="en-US" smtClean="0"/>
+              <a:rPr lang="en-US"/>
               <a:t>Click to edit Master text styles</a:t>
             </a:r>
           </a:p>
           <a:p>
             <a:pPr lvl="1"/>
             <a:r>
-              <a:rPr lang="en-US" smtClean="0"/>
+              <a:rPr lang="en-US"/>
               <a:t>Second level</a:t>
             </a:r>
           </a:p>
           <a:p>
             <a:pPr lvl="2"/>
             <a:r>
-              <a:rPr lang="en-US" smtClean="0"/>
+              <a:rPr lang="en-US"/>
               <a:t>Third level</a:t>
             </a:r>
           </a:p>
           <a:p>
             <a:pPr lvl="3"/>
             <a:r>
-              <a:rPr lang="en-US" smtClean="0"/>
+              <a:rPr lang="en-US"/>
               <a:t>Fourth level</a:t>
             </a:r>
           </a:p>
           <a:p>
             <a:pPr lvl="4"/>
             <a:r>
-              <a:rPr lang="en-US" smtClean="0"/>
+              <a:rPr lang="en-US"/>
               <a:t>Fifth level</a:t>
             </a:r>
             <a:endParaRPr lang="en-US" dirty="0"/>
@@ -12397,7 +12266,7 @@
           <a:p>
             <a:fld id="{D2B62928-2648-4210-B25C-2BD7B5FE2C7B}" type="datetimeFigureOut">
               <a:rPr lang="en-US" smtClean="0"/>
-              <a:t>4/16/2016</a:t>
+              <a:t>9/29/2016</a:t>
             </a:fld>
             <a:endParaRPr lang="en-US"/>
           </a:p>
@@ -12670,7 +12539,7 @@
           </a:lstStyle>
           <a:p>
             <a:r>
-              <a:rPr lang="en-US" smtClean="0"/>
+              <a:rPr lang="en-US"/>
               <a:t>Click to edit Master title style</a:t>
             </a:r>
             <a:endParaRPr lang="en-US" dirty="0"/>
@@ -12742,7 +12611,7 @@
           <a:p>
             <a:pPr lvl="0"/>
             <a:r>
-              <a:rPr lang="en-US" smtClean="0"/>
+              <a:rPr lang="en-US"/>
               <a:t>Click to edit Master text styles</a:t>
             </a:r>
           </a:p>
@@ -12859,10 +12728,9 @@
           </a:lstStyle>
           <a:p>
             <a:r>
-              <a:rPr lang="en-US" smtClean="0"/>
+              <a:rPr lang="en-US"/>
               <a:t>Click icon to add picture</a:t>
             </a:r>
-            <a:endParaRPr lang="en-US"/>
           </a:p>
         </p:txBody>
       </p:sp>
@@ -12883,7 +12751,7 @@
           <a:p>
             <a:fld id="{D2B62928-2648-4210-B25C-2BD7B5FE2C7B}" type="datetimeFigureOut">
               <a:rPr lang="en-US" smtClean="0"/>
-              <a:t>4/16/2016</a:t>
+              <a:t>9/29/2016</a:t>
             </a:fld>
             <a:endParaRPr lang="en-US"/>
           </a:p>
@@ -13146,7 +13014,7 @@
           </a:lstStyle>
           <a:p>
             <a:r>
-              <a:rPr lang="en-US" smtClean="0"/>
+              <a:rPr lang="en-US"/>
               <a:t>Click to edit Master title style</a:t>
             </a:r>
             <a:endParaRPr lang="en-US" dirty="0"/>
@@ -13218,7 +13086,7 @@
           <a:p>
             <a:pPr lvl="0"/>
             <a:r>
-              <a:rPr lang="en-US" smtClean="0"/>
+              <a:rPr lang="en-US"/>
               <a:t>Click to edit Master text styles</a:t>
             </a:r>
           </a:p>
@@ -13333,7 +13201,7 @@
           <a:lstStyle/>
           <a:p>
             <a:r>
-              <a:rPr lang="en-US" smtClean="0"/>
+              <a:rPr lang="en-US"/>
               <a:t>Click to edit Master title style</a:t>
             </a:r>
             <a:endParaRPr lang="en-US" dirty="0"/>
@@ -13367,35 +13235,35 @@
           <a:p>
             <a:pPr lvl="0"/>
             <a:r>
-              <a:rPr lang="en-US" smtClean="0"/>
+              <a:rPr lang="en-US"/>
               <a:t>Click to edit Master text styles</a:t>
             </a:r>
           </a:p>
           <a:p>
             <a:pPr lvl="1"/>
             <a:r>
-              <a:rPr lang="en-US" smtClean="0"/>
+              <a:rPr lang="en-US"/>
               <a:t>Second level</a:t>
             </a:r>
           </a:p>
           <a:p>
             <a:pPr lvl="2"/>
             <a:r>
-              <a:rPr lang="en-US" smtClean="0"/>
+              <a:rPr lang="en-US"/>
               <a:t>Third level</a:t>
             </a:r>
           </a:p>
           <a:p>
             <a:pPr lvl="3"/>
             <a:r>
-              <a:rPr lang="en-US" smtClean="0"/>
+              <a:rPr lang="en-US"/>
               <a:t>Fourth level</a:t>
             </a:r>
           </a:p>
           <a:p>
             <a:pPr lvl="4"/>
             <a:r>
-              <a:rPr lang="en-US" smtClean="0"/>
+              <a:rPr lang="en-US"/>
               <a:t>Fifth level</a:t>
             </a:r>
             <a:endParaRPr lang="en-US" dirty="0"/>
@@ -13435,7 +13303,7 @@
           <a:p>
             <a:fld id="{D2B62928-2648-4210-B25C-2BD7B5FE2C7B}" type="datetimeFigureOut">
               <a:rPr lang="en-US" smtClean="0"/>
-              <a:t>4/16/2016</a:t>
+              <a:t>9/29/2016</a:t>
             </a:fld>
             <a:endParaRPr lang="en-US"/>
           </a:p>
@@ -13924,7 +13792,7 @@
           <a:p>
             <a:pPr algn="ctr"/>
             <a:r>
-              <a:rPr lang="en-US" cap="small" dirty="0" err="1" smtClean="0">
+              <a:rPr lang="en-US" cap="small" dirty="0" err="1">
                 <a:solidFill>
                   <a:schemeClr val="tx1"/>
                 </a:solidFill>
@@ -13932,7 +13800,7 @@
               <a:t>.Net</a:t>
             </a:r>
             <a:r>
-              <a:rPr lang="en-US" cap="small" dirty="0" smtClean="0">
+              <a:rPr lang="en-US" cap="small" dirty="0">
                 <a:solidFill>
                   <a:schemeClr val="tx1"/>
                 </a:solidFill>
@@ -13940,27 +13808,19 @@
               <a:t> Compiler Platform (Roslyn)</a:t>
             </a:r>
             <a:br>
-              <a:rPr lang="en-US" cap="small" dirty="0" smtClean="0">
+              <a:rPr lang="en-US" cap="small" dirty="0">
                 <a:solidFill>
                   <a:schemeClr val="tx1"/>
                 </a:solidFill>
               </a:rPr>
             </a:br>
             <a:r>
-              <a:rPr lang="en-US" cap="small" dirty="0" smtClean="0">
+              <a:rPr lang="en-US" cap="small" dirty="0">
                 <a:solidFill>
                   <a:schemeClr val="tx1"/>
                 </a:solidFill>
               </a:rPr>
-              <a:t>And </a:t>
-            </a:r>
-            <a:r>
-              <a:rPr lang="en-US" cap="small" dirty="0">
-                <a:solidFill>
-                  <a:schemeClr val="tx1"/>
-                </a:solidFill>
-              </a:rPr>
-              <a:t>You</a:t>
+              <a:t>And You</a:t>
             </a:r>
             <a:br>
               <a:rPr lang="en-US" cap="small" dirty="0">
@@ -14357,11 +14217,11 @@
           <a:lstStyle/>
           <a:p>
             <a:r>
-              <a:rPr lang="en-US" dirty="0" smtClean="0"/>
+              <a:rPr lang="en-US" dirty="0"/>
               <a:t>Out of the Box </a:t>
             </a:r>
             <a:r>
-              <a:rPr lang="en-US" dirty="0" err="1" smtClean="0"/>
+              <a:rPr lang="en-US" dirty="0" err="1"/>
               <a:t>Refactorings</a:t>
             </a:r>
             <a:endParaRPr lang="en-US" dirty="0"/>
@@ -14387,16 +14247,10 @@
               <a:rPr lang="en-US" dirty="0">
                 <a:hlinkClick r:id="rId2"/>
               </a:rPr>
-              <a:t>Code </a:t>
-            </a:r>
-            <a:r>
-              <a:rPr lang="en-US" dirty="0" smtClean="0">
-                <a:hlinkClick r:id="rId2"/>
-              </a:rPr>
-              <a:t>Fixes</a:t>
-            </a:r>
-            <a:r>
-              <a:rPr lang="en-US" dirty="0" smtClean="0"/>
+              <a:t>Code Fixes</a:t>
+            </a:r>
+            <a:r>
+              <a:rPr lang="en-US" dirty="0"/>
               <a:t> (30)</a:t>
             </a:r>
             <a:endParaRPr lang="en-US" dirty="0">
@@ -14423,74 +14277,73 @@
           <a:lstStyle/>
           <a:p>
             <a:r>
-              <a:rPr lang="en-US" dirty="0" smtClean="0"/>
+              <a:rPr lang="en-US" dirty="0"/>
               <a:t>Add  Await</a:t>
             </a:r>
           </a:p>
           <a:p>
             <a:r>
-              <a:rPr lang="en-US" dirty="0" smtClean="0"/>
+              <a:rPr lang="en-US" dirty="0"/>
               <a:t>Add </a:t>
             </a:r>
             <a:r>
-              <a:rPr lang="en-US" dirty="0" err="1" smtClean="0"/>
+              <a:rPr lang="en-US" dirty="0" err="1"/>
               <a:t>Async</a:t>
             </a:r>
-            <a:endParaRPr lang="en-US" dirty="0" smtClean="0"/>
-          </a:p>
-          <a:p>
-            <a:r>
-              <a:rPr lang="en-US" dirty="0" smtClean="0"/>
+            <a:endParaRPr lang="en-US" dirty="0"/>
+          </a:p>
+          <a:p>
+            <a:r>
+              <a:rPr lang="en-US" dirty="0"/>
               <a:t>Change Return Type</a:t>
             </a:r>
           </a:p>
           <a:p>
             <a:r>
-              <a:rPr lang="en-US" dirty="0" smtClean="0"/>
+              <a:rPr lang="en-US" dirty="0"/>
               <a:t>Change To Yield</a:t>
             </a:r>
           </a:p>
           <a:p>
             <a:r>
-              <a:rPr lang="en-US" dirty="0" smtClean="0"/>
+              <a:rPr lang="en-US" dirty="0"/>
               <a:t>Convert To </a:t>
             </a:r>
             <a:r>
-              <a:rPr lang="en-US" dirty="0" err="1" smtClean="0"/>
+              <a:rPr lang="en-US" dirty="0" err="1"/>
               <a:t>Async</a:t>
             </a:r>
-            <a:endParaRPr lang="en-US" dirty="0" smtClean="0"/>
-          </a:p>
-          <a:p>
-            <a:r>
-              <a:rPr lang="en-US" dirty="0" smtClean="0"/>
+            <a:endParaRPr lang="en-US" dirty="0"/>
+          </a:p>
+          <a:p>
+            <a:r>
+              <a:rPr lang="en-US" dirty="0"/>
               <a:t>Convert To Iterator</a:t>
             </a:r>
           </a:p>
           <a:p>
             <a:r>
-              <a:rPr lang="en-US" dirty="0" smtClean="0"/>
+              <a:rPr lang="en-US" dirty="0"/>
               <a:t>Add Missing Reference</a:t>
             </a:r>
           </a:p>
           <a:p>
             <a:r>
-              <a:rPr lang="en-US" dirty="0" smtClean="0"/>
+              <a:rPr lang="en-US" dirty="0"/>
               <a:t>Add Using</a:t>
             </a:r>
           </a:p>
           <a:p>
             <a:r>
-              <a:rPr lang="en-US" dirty="0" smtClean="0"/>
+              <a:rPr lang="en-US" dirty="0"/>
               <a:t>Fully Qualify</a:t>
             </a:r>
           </a:p>
           <a:p>
             <a:r>
-              <a:rPr lang="en-US" dirty="0" smtClean="0"/>
+              <a:rPr lang="en-US" dirty="0"/>
               <a:t>Generate Method</a:t>
             </a:r>
-            <a:endParaRPr lang="en-US" dirty="0"/>
           </a:p>
         </p:txBody>
       </p:sp>
@@ -14510,16 +14363,15 @@
           <a:lstStyle/>
           <a:p>
             <a:r>
-              <a:rPr lang="en-US" dirty="0" err="1" smtClean="0">
+              <a:rPr lang="en-US" dirty="0" err="1">
                 <a:hlinkClick r:id="rId3"/>
               </a:rPr>
               <a:t>Refactorings</a:t>
             </a:r>
             <a:r>
-              <a:rPr lang="en-US" dirty="0" smtClean="0"/>
+              <a:rPr lang="en-US" dirty="0"/>
               <a:t> (13)</a:t>
             </a:r>
-            <a:endParaRPr lang="en-US" dirty="0"/>
           </a:p>
         </p:txBody>
       </p:sp>
@@ -14541,70 +14393,69 @@
           <a:lstStyle/>
           <a:p>
             <a:r>
-              <a:rPr lang="en-US" dirty="0" smtClean="0"/>
+              <a:rPr lang="en-US" dirty="0"/>
               <a:t>Add Constructor Parameters from members</a:t>
             </a:r>
           </a:p>
           <a:p>
             <a:r>
-              <a:rPr lang="en-US" dirty="0" smtClean="0"/>
+              <a:rPr lang="en-US" dirty="0"/>
               <a:t>Change Signature</a:t>
             </a:r>
           </a:p>
           <a:p>
             <a:r>
-              <a:rPr lang="en-US" dirty="0" smtClean="0"/>
+              <a:rPr lang="en-US" dirty="0"/>
               <a:t>Encapsulate Field</a:t>
             </a:r>
           </a:p>
           <a:p>
             <a:r>
-              <a:rPr lang="en-US" dirty="0" smtClean="0"/>
+              <a:rPr lang="en-US" dirty="0"/>
               <a:t>Extract Interface</a:t>
             </a:r>
           </a:p>
           <a:p>
             <a:r>
-              <a:rPr lang="en-US" dirty="0" smtClean="0"/>
+              <a:rPr lang="en-US" dirty="0"/>
               <a:t>Extract Method</a:t>
             </a:r>
           </a:p>
           <a:p>
             <a:r>
-              <a:rPr lang="en-US" dirty="0" smtClean="0"/>
+              <a:rPr lang="en-US" dirty="0"/>
               <a:t>Generate Constructor from members</a:t>
             </a:r>
           </a:p>
           <a:p>
             <a:r>
-              <a:rPr lang="en-US" dirty="0" smtClean="0"/>
+              <a:rPr lang="en-US" dirty="0"/>
               <a:t>Generate default constructors</a:t>
             </a:r>
           </a:p>
           <a:p>
             <a:r>
-              <a:rPr lang="en-US" dirty="0" smtClean="0"/>
+              <a:rPr lang="en-US" dirty="0"/>
               <a:t>Inline temporary</a:t>
             </a:r>
           </a:p>
           <a:p>
             <a:r>
-              <a:rPr lang="en-US" dirty="0" smtClean="0"/>
+              <a:rPr lang="en-US" dirty="0"/>
               <a:t>Introduce Variable</a:t>
             </a:r>
           </a:p>
           <a:p>
             <a:r>
-              <a:rPr lang="en-US" dirty="0" smtClean="0"/>
+              <a:rPr lang="en-US" dirty="0"/>
               <a:t>Invert If</a:t>
             </a:r>
           </a:p>
           <a:p>
             <a:r>
-              <a:rPr lang="en-US" dirty="0" smtClean="0"/>
+              <a:rPr lang="en-US" dirty="0"/>
               <a:t>Simplify Lambda</a:t>
             </a:r>
-            <a:endParaRPr lang="en-US" dirty="0"/>
           </a:p>
         </p:txBody>
       </p:sp>
@@ -14685,10 +14536,9 @@
           <a:lstStyle/>
           <a:p>
             <a:r>
-              <a:rPr lang="en-US" dirty="0" smtClean="0"/>
+              <a:rPr lang="en-US" dirty="0"/>
               <a:t>Building your own Fix</a:t>
             </a:r>
-            <a:endParaRPr lang="en-US" dirty="0"/>
           </a:p>
         </p:txBody>
       </p:sp>
@@ -16013,7 +15863,7 @@
           </a:p>
           <a:p>
             <a:r>
-              <a:rPr lang="en-US" dirty="0" err="1" smtClean="0">
+              <a:rPr lang="en-US" dirty="0" err="1">
                 <a:solidFill>
                   <a:schemeClr val="accent2">
                     <a:lumMod val="75000"/>
@@ -16022,7 +15872,7 @@
               </a:rPr>
               <a:t>SyntaxTrivia</a:t>
             </a:r>
-            <a:endParaRPr lang="en-US" dirty="0" smtClean="0">
+            <a:endParaRPr lang="en-US" dirty="0">
               <a:solidFill>
                 <a:schemeClr val="accent2">
                   <a:lumMod val="75000"/>
@@ -16456,10 +16306,9 @@
           <a:lstStyle/>
           <a:p>
             <a:r>
-              <a:rPr lang="en-US" dirty="0" smtClean="0"/>
+              <a:rPr lang="en-US" dirty="0"/>
               <a:t>Custom Diagnostic - Analyzer</a:t>
             </a:r>
-            <a:endParaRPr lang="en-US" dirty="0"/>
           </a:p>
         </p:txBody>
       </p:sp>
@@ -18266,11 +18115,11 @@
           <a:lstStyle/>
           <a:p>
             <a:r>
-              <a:rPr lang="en-US" dirty="0" smtClean="0"/>
+              <a:rPr lang="en-US" dirty="0"/>
               <a:t>Custom Diagnostic - </a:t>
             </a:r>
             <a:r>
-              <a:rPr lang="en-US" dirty="0" err="1" smtClean="0"/>
+              <a:rPr lang="en-US" dirty="0" err="1"/>
               <a:t>CodeFixProvider</a:t>
             </a:r>
             <a:endParaRPr lang="en-US" dirty="0"/>
@@ -21650,10 +21499,9 @@
           <a:lstStyle/>
           <a:p>
             <a:r>
-              <a:rPr lang="en-US" dirty="0" smtClean="0"/>
+              <a:rPr lang="en-US" dirty="0"/>
               <a:t>Third Party Code Fixes</a:t>
             </a:r>
-            <a:endParaRPr lang="en-US" dirty="0"/>
           </a:p>
         </p:txBody>
       </p:sp>
@@ -21667,18 +21515,24 @@
             <p:ph sz="half" idx="1"/>
           </p:nvPr>
         </p:nvSpPr>
-        <p:spPr/>
+        <p:spPr>
+          <a:solidFill>
+            <a:schemeClr val="tx1">
+              <a:lumMod val="85000"/>
+            </a:schemeClr>
+          </a:solidFill>
+        </p:spPr>
         <p:txBody>
           <a:bodyPr/>
           <a:lstStyle/>
           <a:p>
             <a:r>
-              <a:rPr lang="en-US" dirty="0" smtClean="0">
+              <a:rPr lang="en-US" dirty="0">
                 <a:hlinkClick r:id="rId2"/>
               </a:rPr>
               <a:t>Code Cracker</a:t>
             </a:r>
-            <a:endParaRPr lang="en-US" dirty="0" smtClean="0"/>
+            <a:endParaRPr lang="en-US" dirty="0"/>
           </a:p>
           <a:p>
             <a:r>
@@ -21712,7 +21566,7 @@
           <a:p>
             <a:pPr lvl="1"/>
             <a:r>
-              <a:rPr lang="en-US" dirty="0" err="1" smtClean="0">
+              <a:rPr lang="en-US" dirty="0" err="1">
                 <a:hlinkClick r:id="rId6"/>
               </a:rPr>
               <a:t>TSqlAnalyzer</a:t>
@@ -21731,23 +21585,45 @@
             <p:ph sz="half" idx="2"/>
           </p:nvPr>
         </p:nvSpPr>
-        <p:spPr/>
+        <p:spPr>
+          <a:solidFill>
+            <a:schemeClr val="tx1">
+              <a:lumMod val="85000"/>
+            </a:schemeClr>
+          </a:solidFill>
+        </p:spPr>
         <p:txBody>
           <a:bodyPr/>
           <a:lstStyle/>
           <a:p>
             <a:r>
-              <a:rPr lang="en-US" dirty="0" err="1"/>
+              <a:rPr lang="en-US" dirty="0" err="1">
+                <a:solidFill>
+                  <a:schemeClr val="accent3"/>
+                </a:solidFill>
+              </a:rPr>
               <a:t>DotNetDoodle</a:t>
             </a:r>
-            <a:endParaRPr lang="en-US" dirty="0"/>
-          </a:p>
-          <a:p>
-            <a:r>
-              <a:rPr lang="en-US" dirty="0" err="1"/>
+            <a:endParaRPr lang="en-US" dirty="0">
+              <a:solidFill>
+                <a:schemeClr val="accent3"/>
+              </a:solidFill>
+            </a:endParaRPr>
+          </a:p>
+          <a:p>
+            <a:r>
+              <a:rPr lang="en-US" dirty="0" err="1">
+                <a:solidFill>
+                  <a:schemeClr val="accent3"/>
+                </a:solidFill>
+              </a:rPr>
               <a:t>RoslynDiagnostics</a:t>
             </a:r>
-            <a:endParaRPr lang="en-US" dirty="0"/>
+            <a:endParaRPr lang="en-US" dirty="0">
+              <a:solidFill>
+                <a:schemeClr val="accent3"/>
+              </a:solidFill>
+            </a:endParaRPr>
           </a:p>
           <a:p>
             <a:r>
@@ -21818,10 +21694,9 @@
           <a:lstStyle/>
           <a:p>
             <a:r>
-              <a:rPr lang="en-US" dirty="0" smtClean="0"/>
+              <a:rPr lang="en-US" dirty="0"/>
               <a:t>Roslyn Resources</a:t>
             </a:r>
-            <a:endParaRPr lang="en-US" dirty="0"/>
           </a:p>
         </p:txBody>
       </p:sp>
@@ -21835,230 +21710,312 @@
             <p:ph idx="1"/>
           </p:nvPr>
         </p:nvSpPr>
-        <p:spPr/>
+        <p:spPr>
+          <a:solidFill>
+            <a:schemeClr val="tx1">
+              <a:lumMod val="85000"/>
+            </a:schemeClr>
+          </a:solidFill>
+        </p:spPr>
         <p:txBody>
           <a:bodyPr>
-            <a:normAutofit fontScale="92500" lnSpcReduction="10000"/>
+            <a:normAutofit/>
           </a:bodyPr>
           <a:lstStyle/>
           <a:p>
             <a:r>
-              <a:rPr lang="en-US" dirty="0" err="1"/>
+              <a:rPr lang="en-US" dirty="0" err="1">
+                <a:solidFill>
+                  <a:schemeClr val="bg1">
+                    <a:lumMod val="65000"/>
+                    <a:lumOff val="35000"/>
+                  </a:schemeClr>
+                </a:solidFill>
+              </a:rPr>
               <a:t>Github</a:t>
             </a:r>
             <a:r>
-              <a:rPr lang="en-US" dirty="0" smtClean="0"/>
+              <a:rPr lang="en-US" dirty="0">
+                <a:solidFill>
+                  <a:schemeClr val="bg1">
+                    <a:lumMod val="65000"/>
+                    <a:lumOff val="35000"/>
+                  </a:schemeClr>
+                </a:solidFill>
+              </a:rPr>
               <a:t>: </a:t>
             </a:r>
             <a:r>
-              <a:rPr lang="en-US" dirty="0" smtClean="0">
+              <a:rPr lang="en-US" dirty="0">
+                <a:solidFill>
+                  <a:schemeClr val="bg1">
+                    <a:lumMod val="65000"/>
+                    <a:lumOff val="35000"/>
+                  </a:schemeClr>
+                </a:solidFill>
                 <a:hlinkClick r:id="rId2"/>
               </a:rPr>
-              <a:t>https</a:t>
+              <a:t>https://github.com/dotnet/roslyn</a:t>
             </a:r>
             <a:r>
               <a:rPr lang="en-US" dirty="0">
-                <a:hlinkClick r:id="rId2"/>
-              </a:rPr>
-              <a:t>://</a:t>
-            </a:r>
-            <a:r>
-              <a:rPr lang="en-US" dirty="0" smtClean="0">
-                <a:hlinkClick r:id="rId2"/>
-              </a:rPr>
-              <a:t>github.com/dotnet/roslyn</a:t>
-            </a:r>
-            <a:r>
-              <a:rPr lang="en-US" dirty="0" smtClean="0"/>
+                <a:solidFill>
+                  <a:schemeClr val="bg1">
+                    <a:lumMod val="65000"/>
+                    <a:lumOff val="35000"/>
+                  </a:schemeClr>
+                </a:solidFill>
+              </a:rPr>
               <a:t>   </a:t>
             </a:r>
           </a:p>
           <a:p>
             <a:r>
+              <a:rPr lang="en-US" dirty="0">
+                <a:solidFill>
+                  <a:schemeClr val="bg1">
+                    <a:lumMod val="65000"/>
+                    <a:lumOff val="35000"/>
+                  </a:schemeClr>
+                </a:solidFill>
+              </a:rPr>
+              <a:t>Dotnet: </a:t>
+            </a:r>
+            <a:r>
+              <a:rPr lang="en-US" dirty="0">
+                <a:solidFill>
+                  <a:schemeClr val="bg1">
+                    <a:lumMod val="65000"/>
+                    <a:lumOff val="35000"/>
+                  </a:schemeClr>
+                </a:solidFill>
+                <a:hlinkClick r:id="rId3"/>
+              </a:rPr>
+              <a:t>https://github.com/dotnet</a:t>
+            </a:r>
+            <a:endParaRPr lang="en-US" dirty="0">
+              <a:solidFill>
+                <a:schemeClr val="bg1">
+                  <a:lumMod val="65000"/>
+                  <a:lumOff val="35000"/>
+                </a:schemeClr>
+              </a:solidFill>
+            </a:endParaRPr>
+          </a:p>
+          <a:p>
+            <a:r>
+              <a:rPr lang="en-US" dirty="0">
+                <a:solidFill>
+                  <a:schemeClr val="bg1">
+                    <a:lumMod val="65000"/>
+                    <a:lumOff val="35000"/>
+                  </a:schemeClr>
+                </a:solidFill>
+              </a:rPr>
+              <a:t>Code Cracker: </a:t>
+            </a:r>
+            <a:r>
+              <a:rPr lang="en-US" dirty="0">
+                <a:solidFill>
+                  <a:schemeClr val="bg1">
+                    <a:lumMod val="65000"/>
+                    <a:lumOff val="35000"/>
+                  </a:schemeClr>
+                </a:solidFill>
+                <a:hlinkClick r:id="rId4"/>
+              </a:rPr>
+              <a:t>https://github.com/code-cracker/code-cracker</a:t>
+            </a:r>
+            <a:r>
+              <a:rPr lang="en-US" dirty="0">
+                <a:solidFill>
+                  <a:schemeClr val="bg1">
+                    <a:lumMod val="65000"/>
+                    <a:lumOff val="35000"/>
+                  </a:schemeClr>
+                </a:solidFill>
+              </a:rPr>
+              <a:t> </a:t>
+            </a:r>
+          </a:p>
+          <a:p>
+            <a:r>
+              <a:rPr lang="en-US" dirty="0">
+                <a:solidFill>
+                  <a:schemeClr val="bg1">
+                    <a:lumMod val="65000"/>
+                    <a:lumOff val="35000"/>
+                  </a:schemeClr>
+                </a:solidFill>
+              </a:rPr>
+              <a:t>VB Team Blog: </a:t>
+            </a:r>
+            <a:r>
+              <a:rPr lang="en-US" dirty="0">
+                <a:solidFill>
+                  <a:schemeClr val="bg1">
+                    <a:lumMod val="65000"/>
+                    <a:lumOff val="35000"/>
+                  </a:schemeClr>
+                </a:solidFill>
+                <a:hlinkClick r:id="rId5"/>
+              </a:rPr>
+              <a:t>http://blogs.msdn.com/b/vbteam/</a:t>
+            </a:r>
+            <a:endParaRPr lang="en-US" dirty="0">
+              <a:solidFill>
+                <a:schemeClr val="bg1">
+                  <a:lumMod val="65000"/>
+                  <a:lumOff val="35000"/>
+                </a:schemeClr>
+              </a:solidFill>
+            </a:endParaRPr>
+          </a:p>
+          <a:p>
+            <a:r>
+              <a:rPr lang="en-US" dirty="0">
+                <a:solidFill>
+                  <a:schemeClr val="bg1">
+                    <a:lumMod val="65000"/>
+                    <a:lumOff val="35000"/>
+                  </a:schemeClr>
+                </a:solidFill>
+              </a:rPr>
+              <a:t>LLILC (LLVM for .NET Core): </a:t>
+            </a:r>
+            <a:r>
+              <a:rPr lang="en-US" dirty="0">
+                <a:solidFill>
+                  <a:schemeClr val="bg1">
+                    <a:lumMod val="65000"/>
+                    <a:lumOff val="35000"/>
+                  </a:schemeClr>
+                </a:solidFill>
+                <a:hlinkClick r:id="rId6"/>
+              </a:rPr>
+              <a:t>https://github.com/dotnet/llilc</a:t>
+            </a:r>
+            <a:r>
+              <a:rPr lang="en-US" dirty="0">
+                <a:solidFill>
+                  <a:schemeClr val="bg1">
+                    <a:lumMod val="65000"/>
+                    <a:lumOff val="35000"/>
+                  </a:schemeClr>
+                </a:solidFill>
+              </a:rPr>
+              <a:t> </a:t>
+            </a:r>
+          </a:p>
+          <a:p>
+            <a:r>
+              <a:rPr lang="en-US" dirty="0">
+                <a:solidFill>
+                  <a:schemeClr val="bg1">
+                    <a:lumMod val="65000"/>
+                    <a:lumOff val="35000"/>
+                  </a:schemeClr>
+                </a:solidFill>
+              </a:rPr>
+              <a:t>Roslyn Visualizer: </a:t>
+            </a:r>
+            <a:r>
+              <a:rPr lang="en-US" dirty="0">
+                <a:solidFill>
+                  <a:schemeClr val="bg1">
+                    <a:lumMod val="65000"/>
+                    <a:lumOff val="35000"/>
+                  </a:schemeClr>
+                </a:solidFill>
+                <a:hlinkClick r:id="rId7"/>
+              </a:rPr>
+              <a:t>https://visualstudiogallery.msdn.microsoft.com/32fe332c-51ad-411a-a74c-9fdbc2a03bb7</a:t>
+            </a:r>
+            <a:r>
+              <a:rPr lang="en-US" dirty="0">
+                <a:solidFill>
+                  <a:schemeClr val="bg1">
+                    <a:lumMod val="65000"/>
+                    <a:lumOff val="35000"/>
+                  </a:schemeClr>
+                </a:solidFill>
+              </a:rPr>
+              <a:t> </a:t>
+            </a:r>
+          </a:p>
+          <a:p>
+            <a:r>
+              <a:rPr lang="en-US" dirty="0">
+                <a:solidFill>
+                  <a:schemeClr val="bg1">
+                    <a:lumMod val="65000"/>
+                    <a:lumOff val="35000"/>
+                  </a:schemeClr>
+                </a:solidFill>
+              </a:rPr>
+              <a:t>Roslyn SDK Templates: </a:t>
+            </a:r>
+            <a:r>
+              <a:rPr lang="en-US" dirty="0">
+                <a:solidFill>
+                  <a:schemeClr val="bg1">
+                    <a:lumMod val="65000"/>
+                    <a:lumOff val="35000"/>
+                  </a:schemeClr>
+                </a:solidFill>
+                <a:hlinkClick r:id="rId8"/>
+              </a:rPr>
+              <a:t>https://visualstudiogallery.msdn.microsoft.com/e2e07e91-9d0b-4944-ba40-e86bcbec1599</a:t>
+            </a:r>
+            <a:endParaRPr lang="en-US" dirty="0">
+              <a:solidFill>
+                <a:schemeClr val="bg1">
+                  <a:lumMod val="65000"/>
+                  <a:lumOff val="35000"/>
+                </a:schemeClr>
+              </a:solidFill>
+            </a:endParaRPr>
+          </a:p>
+          <a:p>
+            <a:r>
+              <a:rPr lang="en-US" dirty="0">
+                <a:solidFill>
+                  <a:schemeClr val="bg1">
+                    <a:lumMod val="65000"/>
+                    <a:lumOff val="35000"/>
+                  </a:schemeClr>
+                </a:solidFill>
+              </a:rPr>
+              <a:t>This presentation</a:t>
+            </a:r>
+            <a:r>
               <a:rPr lang="en-US" dirty="0"/>
-              <a:t>Dotnet: </a:t>
-            </a:r>
-            <a:r>
-              <a:rPr lang="en-US" dirty="0">
-                <a:hlinkClick r:id="rId3"/>
-              </a:rPr>
-              <a:t>https://</a:t>
-            </a:r>
-            <a:r>
-              <a:rPr lang="en-US" dirty="0" smtClean="0">
-                <a:hlinkClick r:id="rId3"/>
-              </a:rPr>
-              <a:t>github.com/dotnet</a:t>
-            </a:r>
-            <a:endParaRPr lang="en-US" dirty="0" smtClean="0"/>
-          </a:p>
-          <a:p>
-            <a:r>
-              <a:rPr lang="en-US" dirty="0"/>
-              <a:t>Code Cracker: </a:t>
-            </a:r>
-            <a:r>
-              <a:rPr lang="en-US" dirty="0">
-                <a:hlinkClick r:id="rId4"/>
-              </a:rPr>
-              <a:t>https://</a:t>
-            </a:r>
-            <a:r>
-              <a:rPr lang="en-US" dirty="0" smtClean="0">
-                <a:hlinkClick r:id="rId4"/>
-              </a:rPr>
-              <a:t>github.com/code-cracker/code-cracker</a:t>
-            </a:r>
-            <a:r>
-              <a:rPr lang="en-US" dirty="0" smtClean="0"/>
+              <a:t>: </a:t>
+            </a:r>
+            <a:r>
+              <a:rPr lang="en-US" cap="small" dirty="0">
+                <a:solidFill>
+                  <a:schemeClr val="tx1"/>
+                </a:solidFill>
+                <a:hlinkClick r:id="rId9"/>
+              </a:rPr>
+              <a:t>https://github.com/jwooley/RoslynAndYou</a:t>
+            </a:r>
+            <a:r>
+              <a:rPr lang="en-US" cap="small" dirty="0">
+                <a:solidFill>
+                  <a:schemeClr val="tx1"/>
+                </a:solidFill>
+              </a:rPr>
               <a:t> </a:t>
             </a:r>
-          </a:p>
-          <a:p>
-            <a:r>
-              <a:rPr lang="en-US" dirty="0" smtClean="0"/>
-              <a:t>VB </a:t>
-            </a:r>
-            <a:r>
-              <a:rPr lang="en-US" dirty="0"/>
-              <a:t>Team Blog: </a:t>
-            </a:r>
-            <a:r>
-              <a:rPr lang="en-US" dirty="0">
-                <a:hlinkClick r:id="rId5"/>
-              </a:rPr>
-              <a:t>http://blogs.msdn.com/b/vbteam</a:t>
-            </a:r>
-            <a:r>
-              <a:rPr lang="en-US" dirty="0" smtClean="0">
-                <a:hlinkClick r:id="rId5"/>
-              </a:rPr>
-              <a:t>/</a:t>
-            </a:r>
-            <a:endParaRPr lang="en-US" dirty="0" smtClean="0"/>
-          </a:p>
-          <a:p>
-            <a:r>
-              <a:rPr lang="en-US" dirty="0">
-                <a:hlinkClick r:id="rId6"/>
-              </a:rPr>
-              <a:t>http://</a:t>
-            </a:r>
-            <a:r>
-              <a:rPr lang="en-US" dirty="0" smtClean="0">
-                <a:hlinkClick r:id="rId6"/>
-              </a:rPr>
-              <a:t>blogs.msdn.com/b/vbteam/archive/2014/11/12/introducing-the-visual-studio-2015-preview-for-c-and-vb.aspx</a:t>
-            </a:r>
-            <a:r>
-              <a:rPr lang="en-US" dirty="0" smtClean="0"/>
-              <a:t> </a:t>
-            </a:r>
-          </a:p>
-          <a:p>
-            <a:r>
-              <a:rPr lang="en-US" dirty="0" smtClean="0"/>
-              <a:t>LLILC (</a:t>
-            </a:r>
-            <a:r>
-              <a:rPr lang="en-US" dirty="0"/>
-              <a:t>LLVM for .NET Core</a:t>
-            </a:r>
-            <a:r>
-              <a:rPr lang="en-US" dirty="0" smtClean="0"/>
-              <a:t>): </a:t>
-            </a:r>
-            <a:r>
-              <a:rPr lang="en-US" dirty="0" smtClean="0">
-                <a:hlinkClick r:id="rId7"/>
-              </a:rPr>
-              <a:t>https</a:t>
-            </a:r>
-            <a:r>
-              <a:rPr lang="en-US" dirty="0">
-                <a:hlinkClick r:id="rId7"/>
-              </a:rPr>
-              <a:t>://</a:t>
-            </a:r>
-            <a:r>
-              <a:rPr lang="en-US" dirty="0" smtClean="0">
-                <a:hlinkClick r:id="rId7"/>
-              </a:rPr>
-              <a:t>github.com/dotnet/llilc</a:t>
-            </a:r>
-            <a:r>
-              <a:rPr lang="en-US" dirty="0" smtClean="0"/>
-              <a:t> </a:t>
-            </a:r>
-          </a:p>
-          <a:p>
-            <a:r>
-              <a:rPr lang="en-US" dirty="0" smtClean="0"/>
-              <a:t>Roslyn Visualizer: </a:t>
-            </a:r>
-            <a:r>
-              <a:rPr lang="en-US" dirty="0">
-                <a:hlinkClick r:id="rId8"/>
-              </a:rPr>
-              <a:t>https://visualstudiogallery.msdn.microsoft.com/32fe332c-51ad-411a-a74c-9fdbc2a03bb7</a:t>
-            </a:r>
-            <a:r>
-              <a:rPr lang="en-US" dirty="0"/>
-              <a:t> </a:t>
-            </a:r>
-            <a:endParaRPr lang="en-US" dirty="0" smtClean="0"/>
-          </a:p>
-          <a:p>
-            <a:r>
-              <a:rPr lang="en-US" dirty="0" smtClean="0"/>
-              <a:t>Roslyn SDK Templates: </a:t>
-            </a:r>
-            <a:r>
-              <a:rPr lang="en-US" dirty="0">
-                <a:hlinkClick r:id="rId9"/>
-              </a:rPr>
-              <a:t>https://visualstudiogallery.msdn.microsoft.com/e2e07e91-9d0b-4944-ba40-e86bcbec1599</a:t>
-            </a:r>
-            <a:endParaRPr lang="en-US" dirty="0" smtClean="0"/>
-          </a:p>
-          <a:p>
-            <a:r>
-              <a:rPr lang="en-US" dirty="0" smtClean="0"/>
-              <a:t>This presentation: </a:t>
-            </a:r>
-            <a:r>
-              <a:rPr lang="en-US" cap="small" dirty="0">
-                <a:solidFill>
-                  <a:schemeClr val="tx1"/>
-                </a:solidFill>
-                <a:hlinkClick r:id="rId10"/>
-              </a:rPr>
-              <a:t>https://</a:t>
-            </a:r>
-            <a:r>
-              <a:rPr lang="en-US" cap="small" dirty="0" smtClean="0">
-                <a:solidFill>
-                  <a:schemeClr val="tx1"/>
-                </a:solidFill>
-                <a:hlinkClick r:id="rId10"/>
-              </a:rPr>
-              <a:t>github.com/jwooley/RoslynAndYou</a:t>
-            </a:r>
-            <a:r>
-              <a:rPr lang="en-US" cap="small" dirty="0" smtClean="0">
-                <a:solidFill>
-                  <a:schemeClr val="tx1"/>
-                </a:solidFill>
-              </a:rPr>
-              <a:t> </a:t>
-            </a:r>
-            <a:endParaRPr lang="en-US" dirty="0" smtClean="0"/>
-          </a:p>
-          <a:p>
-            <a:endParaRPr lang="en-US" dirty="0" smtClean="0"/>
-          </a:p>
-          <a:p>
-            <a:endParaRPr lang="en-US" dirty="0" smtClean="0"/>
+            <a:endParaRPr lang="en-US" dirty="0"/>
+          </a:p>
+          <a:p>
+            <a:endParaRPr lang="en-US" dirty="0"/>
+          </a:p>
+          <a:p>
+            <a:endParaRPr lang="en-US" dirty="0"/>
           </a:p>
         </p:txBody>
       </p:sp>
@@ -22071,7 +22028,7 @@
           <p:nvPr/>
         </p:nvPicPr>
         <p:blipFill>
-          <a:blip r:embed="rId11">
+          <a:blip r:embed="rId10">
             <a:extLst>
               <a:ext uri="{28A0092B-C50C-407E-A947-70E740481C1C}">
                 <a14:useLocalDpi xmlns:a14="http://schemas.microsoft.com/office/drawing/2010/main" val="0"/>
@@ -22532,7 +22489,7 @@
           <a:p>
             <a:pPr algn="ctr"/>
             <a:r>
-              <a:rPr lang="en-US" cap="small" dirty="0" err="1" smtClean="0">
+              <a:rPr lang="en-US" cap="small" dirty="0" err="1">
                 <a:solidFill>
                   <a:schemeClr val="tx1"/>
                 </a:solidFill>
@@ -22540,7 +22497,7 @@
               <a:t>.Net</a:t>
             </a:r>
             <a:r>
-              <a:rPr lang="en-US" cap="small" dirty="0" smtClean="0">
+              <a:rPr lang="en-US" cap="small" dirty="0">
                 <a:solidFill>
                   <a:schemeClr val="tx1"/>
                 </a:solidFill>
@@ -22548,14 +22505,14 @@
               <a:t> Compiler Platform</a:t>
             </a:r>
             <a:br>
-              <a:rPr lang="en-US" cap="small" dirty="0" smtClean="0">
+              <a:rPr lang="en-US" cap="small" dirty="0">
                 <a:solidFill>
                   <a:schemeClr val="tx1"/>
                 </a:solidFill>
               </a:rPr>
             </a:br>
             <a:r>
-              <a:rPr lang="en-US" cap="small" dirty="0" smtClean="0">
+              <a:rPr lang="en-US" cap="small" dirty="0">
                 <a:solidFill>
                   <a:schemeClr val="tx1"/>
                 </a:solidFill>
@@ -22563,14 +22520,14 @@
               <a:t>(Roslyn)</a:t>
             </a:r>
             <a:br>
-              <a:rPr lang="en-US" cap="small" dirty="0" smtClean="0">
+              <a:rPr lang="en-US" cap="small" dirty="0">
                 <a:solidFill>
                   <a:schemeClr val="tx1"/>
                 </a:solidFill>
               </a:rPr>
             </a:br>
             <a:r>
-              <a:rPr lang="en-US" cap="small" dirty="0" smtClean="0">
+              <a:rPr lang="en-US" cap="small" dirty="0">
                 <a:solidFill>
                   <a:schemeClr val="tx1"/>
                 </a:solidFill>
@@ -22578,7 +22535,7 @@
               <a:t>And You</a:t>
             </a:r>
             <a:br>
-              <a:rPr lang="en-US" cap="small" dirty="0" smtClean="0">
+              <a:rPr lang="en-US" cap="small" dirty="0">
                 <a:solidFill>
                   <a:schemeClr val="tx1"/>
                 </a:solidFill>
@@ -22598,6 +22555,34 @@
                 <a:schemeClr val="tx1"/>
               </a:solidFill>
             </a:endParaRPr>
+          </a:p>
+        </p:txBody>
+      </p:sp>
+      <p:sp>
+        <p:nvSpPr>
+          <p:cNvPr id="2" name="Rectangle 1"/>
+          <p:cNvSpPr/>
+          <p:nvPr/>
+        </p:nvSpPr>
+        <p:spPr>
+          <a:xfrm>
+            <a:off x="457200" y="574039"/>
+            <a:ext cx="3488263" cy="369332"/>
+          </a:xfrm>
+          <a:prstGeom prst="rect">
+            <a:avLst/>
+          </a:prstGeom>
+        </p:spPr>
+        <p:txBody>
+          <a:bodyPr wrap="none">
+            <a:spAutoFit/>
+          </a:bodyPr>
+          <a:lstStyle/>
+          <a:p>
+            <a:r>
+              <a:rPr lang="en-US" dirty="0"/>
+              <a:t> http://techbash.com/evals/sessions</a:t>
+            </a:r>
           </a:p>
         </p:txBody>
       </p:sp>
@@ -22647,10 +22632,9 @@
           <a:lstStyle/>
           <a:p>
             <a:r>
-              <a:rPr lang="en-US" dirty="0" smtClean="0"/>
+              <a:rPr lang="en-US" dirty="0"/>
               <a:t>Agenda</a:t>
             </a:r>
-            <a:endParaRPr lang="en-US" dirty="0"/>
           </a:p>
         </p:txBody>
       </p:sp>
@@ -22672,36 +22656,35 @@
           <a:lstStyle/>
           <a:p>
             <a:r>
-              <a:rPr lang="en-US" sz="3200" dirty="0" smtClean="0"/>
+              <a:rPr lang="en-US" sz="3200" dirty="0"/>
               <a:t>What is Roslyn?</a:t>
             </a:r>
           </a:p>
           <a:p>
             <a:r>
-              <a:rPr lang="en-US" sz="3200" dirty="0" smtClean="0"/>
+              <a:rPr lang="en-US" sz="3200" dirty="0"/>
               <a:t>New Compiler</a:t>
             </a:r>
           </a:p>
           <a:p>
             <a:r>
-              <a:rPr lang="en-US" sz="3200" dirty="0" smtClean="0"/>
+              <a:rPr lang="en-US" sz="3200" dirty="0"/>
               <a:t>Language Enhancements</a:t>
             </a:r>
           </a:p>
           <a:p>
             <a:r>
-              <a:rPr lang="en-US" sz="3200" dirty="0" smtClean="0"/>
+              <a:rPr lang="en-US" sz="3200" dirty="0"/>
               <a:t>Code Analytics, </a:t>
             </a:r>
             <a:r>
-              <a:rPr lang="en-US" sz="3200" dirty="0" err="1" smtClean="0"/>
+              <a:rPr lang="en-US" sz="3200" dirty="0" err="1"/>
               <a:t>Refactorings</a:t>
             </a:r>
             <a:r>
-              <a:rPr lang="en-US" sz="3200" dirty="0" smtClean="0"/>
+              <a:rPr lang="en-US" sz="3200" dirty="0"/>
               <a:t>, and Code Fixes</a:t>
             </a:r>
-            <a:endParaRPr lang="en-US" sz="3200" dirty="0"/>
           </a:p>
         </p:txBody>
       </p:sp>
@@ -22751,10 +22734,9 @@
           <a:lstStyle/>
           <a:p>
             <a:r>
-              <a:rPr lang="en-US" dirty="0" smtClean="0"/>
+              <a:rPr lang="en-US" dirty="0"/>
               <a:t>What is Roslyn?</a:t>
             </a:r>
-            <a:endParaRPr lang="en-US" dirty="0"/>
           </a:p>
         </p:txBody>
       </p:sp>
@@ -22866,10 +22848,9 @@
           <a:lstStyle/>
           <a:p>
             <a:r>
-              <a:rPr lang="en-US" dirty="0" smtClean="0"/>
-              <a:t>Language Features</a:t>
-            </a:r>
-            <a:endParaRPr lang="en-US" dirty="0"/>
+              <a:rPr lang="en-US" dirty="0"/>
+              <a:t>Language Evolution</a:t>
+            </a:r>
           </a:p>
         </p:txBody>
       </p:sp>
@@ -24456,10 +24437,9 @@
           <a:lstStyle/>
           <a:p>
             <a:r>
-              <a:rPr lang="en-US" dirty="0" smtClean="0"/>
+              <a:rPr lang="en-US" dirty="0"/>
               <a:t>Roslyn Language Enhancements</a:t>
             </a:r>
-            <a:endParaRPr lang="en-US" dirty="0"/>
           </a:p>
         </p:txBody>
       </p:sp>
@@ -29010,19 +28990,12 @@
               <a:rPr lang="en-US" dirty="0">
                 <a:hlinkClick r:id="rId2"/>
               </a:rPr>
-              <a:t>https://</a:t>
-            </a:r>
-            <a:r>
-              <a:rPr lang="en-US" dirty="0" smtClean="0">
-                <a:hlinkClick r:id="rId2"/>
-              </a:rPr>
-              <a:t>github.com/dotnet/roslyn/issues/2136</a:t>
-            </a:r>
-            <a:r>
-              <a:rPr lang="en-US" dirty="0" smtClean="0"/>
+              <a:t>https://github.com/dotnet/roslyn/issues/2136</a:t>
+            </a:r>
+            <a:r>
+              <a:rPr lang="en-US" dirty="0"/>
               <a:t> </a:t>
             </a:r>
-            <a:endParaRPr lang="en-US" dirty="0"/>
           </a:p>
         </p:txBody>
       </p:sp>
@@ -29081,7 +29054,7 @@
           <a:lstStyle/>
           <a:p>
             <a:r>
-              <a:rPr lang="en-US" sz="5400" dirty="0" smtClean="0">
+              <a:rPr lang="en-US" sz="5400" dirty="0">
                 <a:solidFill>
                   <a:schemeClr val="bg1"/>
                 </a:solidFill>
@@ -29089,12 +29062,6 @@
               </a:rPr>
               <a:t>C# 7</a:t>
             </a:r>
-            <a:endParaRPr lang="en-US" sz="5400" dirty="0">
-              <a:solidFill>
-                <a:schemeClr val="bg1"/>
-              </a:solidFill>
-              <a:latin typeface="Berlin Sans FB" panose="020E0602020502020306" pitchFamily="34" charset="0"/>
-            </a:endParaRPr>
           </a:p>
         </p:txBody>
       </p:sp>
@@ -29177,7 +29144,7 @@
                 </a:highlight>
                 <a:latin typeface="Consolas" panose="020B0609020204030204" pitchFamily="49" charset="0"/>
               </a:rPr>
-              <a:t> </a:t>
+              <a:t>        </a:t>
             </a:r>
             <a:r>
               <a:rPr lang="en-US" dirty="0">
@@ -30087,7 +30054,7 @@
                 </a:highlight>
                 <a:latin typeface="Consolas" panose="020B0609020204030204" pitchFamily="49" charset="0"/>
               </a:rPr>
-              <a:t> t1 = tally(l);</a:t>
+              <a:t> t1 = Tally(l);</a:t>
             </a:r>
           </a:p>
           <a:p>
@@ -30697,7 +30664,7 @@
           <a:lstStyle/>
           <a:p>
             <a:r>
-              <a:rPr lang="en-US" spc="0" dirty="0" smtClean="0">
+              <a:rPr lang="en-US" spc="0" dirty="0">
                 <a:ln w="12700">
                   <a:solidFill>
                     <a:schemeClr val="accent1"/>
@@ -30723,30 +30690,6 @@
               </a:rPr>
               <a:t>C#7</a:t>
             </a:r>
-            <a:endParaRPr lang="en-US" spc="0" dirty="0">
-              <a:ln w="12700">
-                <a:solidFill>
-                  <a:schemeClr val="accent1"/>
-                </a:solidFill>
-                <a:prstDash val="solid"/>
-              </a:ln>
-              <a:pattFill prst="pct50">
-                <a:fgClr>
-                  <a:schemeClr val="accent1"/>
-                </a:fgClr>
-                <a:bgClr>
-                  <a:schemeClr val="accent1">
-                    <a:lumMod val="20000"/>
-                    <a:lumOff val="80000"/>
-                  </a:schemeClr>
-                </a:bgClr>
-              </a:pattFill>
-              <a:effectLst>
-                <a:outerShdw dist="38100" dir="2640000" algn="bl" rotWithShape="0">
-                  <a:schemeClr val="accent1"/>
-                </a:outerShdw>
-              </a:effectLst>
-            </a:endParaRPr>
           </a:p>
         </p:txBody>
       </p:sp>
@@ -30791,10 +30734,9 @@
           <a:p>
             <a:pPr algn="ctr"/>
             <a:r>
-              <a:rPr lang="en-US" dirty="0" smtClean="0"/>
+              <a:rPr lang="en-US" dirty="0"/>
               <a:t>Binary Literals</a:t>
             </a:r>
-            <a:endParaRPr lang="en-US" dirty="0"/>
           </a:p>
         </p:txBody>
       </p:sp>
@@ -30839,10 +30781,9 @@
           <a:p>
             <a:pPr algn="ctr"/>
             <a:r>
-              <a:rPr lang="en-US" dirty="0" smtClean="0"/>
+              <a:rPr lang="en-US" dirty="0"/>
               <a:t>Digit Separators</a:t>
             </a:r>
-            <a:endParaRPr lang="en-US" dirty="0"/>
           </a:p>
         </p:txBody>
       </p:sp>
@@ -30887,10 +30828,9 @@
           <a:p>
             <a:pPr algn="ctr"/>
             <a:r>
-              <a:rPr lang="en-US" dirty="0" smtClean="0"/>
+              <a:rPr lang="en-US" dirty="0"/>
               <a:t>Named Tuples</a:t>
             </a:r>
-            <a:endParaRPr lang="en-US" dirty="0"/>
           </a:p>
         </p:txBody>
       </p:sp>
@@ -30935,10 +30875,9 @@
           <a:p>
             <a:pPr algn="ctr"/>
             <a:r>
-              <a:rPr lang="en-US" dirty="0" smtClean="0"/>
+              <a:rPr lang="en-US" dirty="0"/>
               <a:t>Local Functions</a:t>
             </a:r>
-            <a:endParaRPr lang="en-US" dirty="0"/>
           </a:p>
         </p:txBody>
       </p:sp>
@@ -30983,10 +30922,9 @@
           <a:p>
             <a:pPr algn="ctr"/>
             <a:r>
-              <a:rPr lang="en-US" dirty="0" smtClean="0"/>
+              <a:rPr lang="en-US" dirty="0"/>
               <a:t>Pattern Matching</a:t>
             </a:r>
-            <a:endParaRPr lang="en-US" dirty="0"/>
           </a:p>
         </p:txBody>
       </p:sp>
@@ -31298,10 +31236,9 @@
           <a:lstStyle/>
           <a:p>
             <a:r>
-              <a:rPr lang="en-US" dirty="0" smtClean="0"/>
+              <a:rPr lang="en-US" dirty="0"/>
               <a:t>C# Scripting / Interactive</a:t>
             </a:r>
-            <a:endParaRPr lang="en-US" dirty="0"/>
           </a:p>
         </p:txBody>
       </p:sp>
@@ -31317,7 +31254,7 @@
         </p:nvSpPr>
         <p:spPr bwMode="auto">
           <a:xfrm>
-            <a:off x="457200" y="2590800"/>
+            <a:off x="533400" y="3581400"/>
             <a:ext cx="11125200" cy="2677656"/>
           </a:xfrm>
           <a:prstGeom prst="rect">
@@ -31378,7 +31315,7 @@
               <a:tabLst/>
             </a:pPr>
             <a:r>
-              <a:rPr kumimoji="0" lang="en-US" altLang="en-US" b="0" i="0" u="none" strike="noStrike" cap="none" normalizeH="0" baseline="0" dirty="0" err="1" smtClean="0">
+              <a:rPr kumimoji="0" lang="en-US" altLang="en-US" b="0" i="0" u="none" strike="noStrike" cap="none" normalizeH="0" baseline="0" dirty="0" err="1">
                 <a:ln>
                   <a:noFill/>
                 </a:ln>
@@ -31391,7 +31328,7 @@
               <a:t>var</a:t>
             </a:r>
             <a:r>
-              <a:rPr kumimoji="0" lang="en-US" altLang="en-US" b="0" i="0" u="none" strike="noStrike" cap="none" normalizeH="0" baseline="0" dirty="0" smtClean="0">
+              <a:rPr kumimoji="0" lang="en-US" altLang="en-US" b="0" i="0" u="none" strike="noStrike" cap="none" normalizeH="0" baseline="0" dirty="0">
                 <a:ln>
                   <a:noFill/>
                 </a:ln>
@@ -31404,7 +31341,7 @@
               <a:t> script = </a:t>
             </a:r>
             <a:r>
-              <a:rPr kumimoji="0" lang="en-US" altLang="en-US" b="0" i="0" u="none" strike="noStrike" cap="none" normalizeH="0" baseline="0" dirty="0" err="1" smtClean="0">
+              <a:rPr kumimoji="0" lang="en-US" altLang="en-US" b="0" i="0" u="none" strike="noStrike" cap="none" normalizeH="0" baseline="0" dirty="0" err="1">
                 <a:ln>
                   <a:noFill/>
                 </a:ln>
@@ -31417,7 +31354,7 @@
               <a:t>CSharpScript</a:t>
             </a:r>
             <a:r>
-              <a:rPr kumimoji="0" lang="en-US" altLang="en-US" b="0" i="0" u="none" strike="noStrike" cap="none" normalizeH="0" baseline="0" dirty="0" err="1" smtClean="0">
+              <a:rPr kumimoji="0" lang="en-US" altLang="en-US" b="0" i="0" u="none" strike="noStrike" cap="none" normalizeH="0" baseline="0" dirty="0" err="1">
                 <a:ln>
                   <a:noFill/>
                 </a:ln>
@@ -31430,7 +31367,7 @@
               <a:t>.Create</a:t>
             </a:r>
             <a:r>
-              <a:rPr kumimoji="0" lang="en-US" altLang="en-US" b="0" i="0" u="none" strike="noStrike" cap="none" normalizeH="0" baseline="0" dirty="0" smtClean="0">
+              <a:rPr kumimoji="0" lang="en-US" altLang="en-US" b="0" i="0" u="none" strike="noStrike" cap="none" normalizeH="0" baseline="0" dirty="0">
                 <a:ln>
                   <a:noFill/>
                 </a:ln>
@@ -31443,7 +31380,7 @@
               <a:t>&lt;</a:t>
             </a:r>
             <a:r>
-              <a:rPr kumimoji="0" lang="en-US" altLang="en-US" b="0" i="0" u="none" strike="noStrike" cap="none" normalizeH="0" baseline="0" dirty="0" err="1" smtClean="0">
+              <a:rPr kumimoji="0" lang="en-US" altLang="en-US" b="0" i="0" u="none" strike="noStrike" cap="none" normalizeH="0" baseline="0" dirty="0" err="1">
                 <a:ln>
                   <a:noFill/>
                 </a:ln>
@@ -31456,7 +31393,7 @@
               <a:t>int</a:t>
             </a:r>
             <a:r>
-              <a:rPr kumimoji="0" lang="en-US" altLang="en-US" b="0" i="0" u="none" strike="noStrike" cap="none" normalizeH="0" baseline="0" dirty="0" smtClean="0">
+              <a:rPr kumimoji="0" lang="en-US" altLang="en-US" b="0" i="0" u="none" strike="noStrike" cap="none" normalizeH="0" baseline="0" dirty="0">
                 <a:ln>
                   <a:noFill/>
                 </a:ln>
@@ -31469,7 +31406,7 @@
               <a:t>&gt;(</a:t>
             </a:r>
             <a:r>
-              <a:rPr kumimoji="0" lang="en-US" altLang="en-US" b="0" i="0" u="none" strike="noStrike" cap="none" normalizeH="0" baseline="0" dirty="0" smtClean="0">
+              <a:rPr kumimoji="0" lang="en-US" altLang="en-US" b="0" i="0" u="none" strike="noStrike" cap="none" normalizeH="0" baseline="0" dirty="0">
                 <a:ln>
                   <a:noFill/>
                 </a:ln>
@@ -31482,7 +31419,7 @@
               <a:t>"</a:t>
             </a:r>
             <a:r>
-              <a:rPr kumimoji="0" lang="en-US" altLang="en-US" b="0" i="0" u="none" strike="noStrike" cap="none" normalizeH="0" baseline="0" dirty="0" err="1" smtClean="0">
+              <a:rPr kumimoji="0" lang="en-US" altLang="en-US" b="0" i="0" u="none" strike="noStrike" cap="none" normalizeH="0" baseline="0" dirty="0" err="1">
                 <a:ln>
                   <a:noFill/>
                 </a:ln>
@@ -31495,7 +31432,7 @@
               <a:t>int</a:t>
             </a:r>
             <a:r>
-              <a:rPr kumimoji="0" lang="en-US" altLang="en-US" b="0" i="0" u="none" strike="noStrike" cap="none" normalizeH="0" baseline="0" dirty="0" smtClean="0">
+              <a:rPr kumimoji="0" lang="en-US" altLang="en-US" b="0" i="0" u="none" strike="noStrike" cap="none" normalizeH="0" baseline="0" dirty="0">
                 <a:ln>
                   <a:noFill/>
                 </a:ln>
@@ -31508,7 +31445,7 @@
               <a:t> x = 1;"</a:t>
             </a:r>
             <a:r>
-              <a:rPr kumimoji="0" lang="en-US" altLang="en-US" b="0" i="0" u="none" strike="noStrike" cap="none" normalizeH="0" baseline="0" dirty="0" smtClean="0">
+              <a:rPr kumimoji="0" lang="en-US" altLang="en-US" b="0" i="0" u="none" strike="noStrike" cap="none" normalizeH="0" baseline="0" dirty="0">
                 <a:ln>
                   <a:noFill/>
                 </a:ln>
@@ -31539,7 +31476,7 @@
               <a:tabLst/>
             </a:pPr>
             <a:r>
-              <a:rPr kumimoji="0" lang="en-US" altLang="en-US" b="0" i="0" u="none" strike="noStrike" cap="none" normalizeH="0" baseline="0" dirty="0" smtClean="0">
+              <a:rPr kumimoji="0" lang="en-US" altLang="en-US" b="0" i="0" u="none" strike="noStrike" cap="none" normalizeH="0" baseline="0" dirty="0">
                 <a:ln>
                   <a:noFill/>
                 </a:ln>
@@ -31552,7 +31489,7 @@
               <a:t>     .</a:t>
             </a:r>
             <a:r>
-              <a:rPr kumimoji="0" lang="en-US" altLang="en-US" b="0" i="0" u="none" strike="noStrike" cap="none" normalizeH="0" baseline="0" dirty="0" err="1" smtClean="0">
+              <a:rPr kumimoji="0" lang="en-US" altLang="en-US" b="0" i="0" u="none" strike="noStrike" cap="none" normalizeH="0" baseline="0" dirty="0" err="1">
                 <a:ln>
                   <a:noFill/>
                 </a:ln>
@@ -31565,7 +31502,7 @@
               <a:t>ContinueWith</a:t>
             </a:r>
             <a:r>
-              <a:rPr kumimoji="0" lang="en-US" altLang="en-US" b="0" i="0" u="none" strike="noStrike" cap="none" normalizeH="0" baseline="0" dirty="0" smtClean="0">
+              <a:rPr kumimoji="0" lang="en-US" altLang="en-US" b="0" i="0" u="none" strike="noStrike" cap="none" normalizeH="0" baseline="0" dirty="0">
                 <a:ln>
                   <a:noFill/>
                 </a:ln>
@@ -31578,7 +31515,7 @@
               <a:t>(</a:t>
             </a:r>
             <a:r>
-              <a:rPr kumimoji="0" lang="en-US" altLang="en-US" b="0" i="0" u="none" strike="noStrike" cap="none" normalizeH="0" baseline="0" dirty="0" smtClean="0">
+              <a:rPr kumimoji="0" lang="en-US" altLang="en-US" b="0" i="0" u="none" strike="noStrike" cap="none" normalizeH="0" baseline="0" dirty="0">
                 <a:ln>
                   <a:noFill/>
                 </a:ln>
@@ -31591,7 +31528,7 @@
               <a:t>"</a:t>
             </a:r>
             <a:r>
-              <a:rPr kumimoji="0" lang="en-US" altLang="en-US" b="0" i="0" u="none" strike="noStrike" cap="none" normalizeH="0" baseline="0" dirty="0" err="1" smtClean="0">
+              <a:rPr kumimoji="0" lang="en-US" altLang="en-US" b="0" i="0" u="none" strike="noStrike" cap="none" normalizeH="0" baseline="0" dirty="0" err="1">
                 <a:ln>
                   <a:noFill/>
                 </a:ln>
@@ -31604,7 +31541,7 @@
               <a:t>int</a:t>
             </a:r>
             <a:r>
-              <a:rPr kumimoji="0" lang="en-US" altLang="en-US" b="0" i="0" u="none" strike="noStrike" cap="none" normalizeH="0" baseline="0" dirty="0" smtClean="0">
+              <a:rPr kumimoji="0" lang="en-US" altLang="en-US" b="0" i="0" u="none" strike="noStrike" cap="none" normalizeH="0" baseline="0" dirty="0">
                 <a:ln>
                   <a:noFill/>
                 </a:ln>
@@ -31617,7 +31554,7 @@
               <a:t> y = 2;"</a:t>
             </a:r>
             <a:r>
-              <a:rPr kumimoji="0" lang="en-US" altLang="en-US" b="0" i="0" u="none" strike="noStrike" cap="none" normalizeH="0" baseline="0" dirty="0" smtClean="0">
+              <a:rPr kumimoji="0" lang="en-US" altLang="en-US" b="0" i="0" u="none" strike="noStrike" cap="none" normalizeH="0" baseline="0" dirty="0">
                 <a:ln>
                   <a:noFill/>
                 </a:ln>
@@ -31648,7 +31585,7 @@
               <a:tabLst/>
             </a:pPr>
             <a:r>
-              <a:rPr kumimoji="0" lang="en-US" altLang="en-US" b="0" i="0" u="none" strike="noStrike" cap="none" normalizeH="0" baseline="0" dirty="0" smtClean="0">
+              <a:rPr kumimoji="0" lang="en-US" altLang="en-US" b="0" i="0" u="none" strike="noStrike" cap="none" normalizeH="0" baseline="0" dirty="0">
                 <a:ln>
                   <a:noFill/>
                 </a:ln>
@@ -31661,7 +31598,7 @@
               <a:t>     .</a:t>
             </a:r>
             <a:r>
-              <a:rPr kumimoji="0" lang="en-US" altLang="en-US" b="0" i="0" u="none" strike="noStrike" cap="none" normalizeH="0" baseline="0" dirty="0" err="1" smtClean="0">
+              <a:rPr kumimoji="0" lang="en-US" altLang="en-US" b="0" i="0" u="none" strike="noStrike" cap="none" normalizeH="0" baseline="0" dirty="0" err="1">
                 <a:ln>
                   <a:noFill/>
                 </a:ln>
@@ -31674,7 +31611,7 @@
               <a:t>ContinueWith</a:t>
             </a:r>
             <a:r>
-              <a:rPr kumimoji="0" lang="en-US" altLang="en-US" b="0" i="0" u="none" strike="noStrike" cap="none" normalizeH="0" baseline="0" dirty="0" smtClean="0">
+              <a:rPr kumimoji="0" lang="en-US" altLang="en-US" b="0" i="0" u="none" strike="noStrike" cap="none" normalizeH="0" baseline="0" dirty="0">
                 <a:ln>
                   <a:noFill/>
                 </a:ln>
@@ -31687,7 +31624,7 @@
               <a:t>(</a:t>
             </a:r>
             <a:r>
-              <a:rPr kumimoji="0" lang="en-US" altLang="en-US" b="0" i="0" u="none" strike="noStrike" cap="none" normalizeH="0" baseline="0" dirty="0" smtClean="0">
+              <a:rPr kumimoji="0" lang="en-US" altLang="en-US" b="0" i="0" u="none" strike="noStrike" cap="none" normalizeH="0" baseline="0" dirty="0">
                 <a:ln>
                   <a:noFill/>
                 </a:ln>
@@ -31700,7 +31637,7 @@
               <a:t>"x + y"</a:t>
             </a:r>
             <a:r>
-              <a:rPr kumimoji="0" lang="en-US" altLang="en-US" b="0" i="0" u="none" strike="noStrike" cap="none" normalizeH="0" baseline="0" dirty="0" smtClean="0">
+              <a:rPr kumimoji="0" lang="en-US" altLang="en-US" b="0" i="0" u="none" strike="noStrike" cap="none" normalizeH="0" baseline="0" dirty="0">
                 <a:ln>
                   <a:noFill/>
                 </a:ln>
@@ -31755,7 +31692,7 @@
               <a:tabLst/>
             </a:pPr>
             <a:r>
-              <a:rPr kumimoji="0" lang="en-US" altLang="en-US" b="0" i="0" u="none" strike="noStrike" cap="none" normalizeH="0" baseline="0" dirty="0" err="1" smtClean="0">
+              <a:rPr kumimoji="0" lang="en-US" altLang="en-US" b="0" i="0" u="none" strike="noStrike" cap="none" normalizeH="0" baseline="0" dirty="0" err="1">
                 <a:ln>
                   <a:noFill/>
                 </a:ln>
@@ -31768,7 +31705,7 @@
               <a:t>Assert</a:t>
             </a:r>
             <a:r>
-              <a:rPr kumimoji="0" lang="en-US" altLang="en-US" b="0" i="0" u="none" strike="noStrike" cap="none" normalizeH="0" baseline="0" dirty="0" err="1" smtClean="0">
+              <a:rPr kumimoji="0" lang="en-US" altLang="en-US" b="0" i="0" u="none" strike="noStrike" cap="none" normalizeH="0" baseline="0" dirty="0" err="1">
                 <a:ln>
                   <a:noFill/>
                 </a:ln>
@@ -31781,7 +31718,7 @@
               <a:t>.AreEqual</a:t>
             </a:r>
             <a:r>
-              <a:rPr kumimoji="0" lang="en-US" altLang="en-US" b="0" i="0" u="none" strike="noStrike" cap="none" normalizeH="0" baseline="0" dirty="0" smtClean="0">
+              <a:rPr kumimoji="0" lang="en-US" altLang="en-US" b="0" i="0" u="none" strike="noStrike" cap="none" normalizeH="0" baseline="0" dirty="0">
                 <a:ln>
                   <a:noFill/>
                 </a:ln>
@@ -31821,7 +31758,7 @@
               <a:t>	</a:t>
             </a:r>
             <a:r>
-              <a:rPr kumimoji="0" lang="en-US" altLang="en-US" b="0" i="0" u="none" strike="noStrike" cap="none" normalizeH="0" baseline="0" dirty="0" smtClean="0">
+              <a:rPr kumimoji="0" lang="en-US" altLang="en-US" b="0" i="0" u="none" strike="noStrike" cap="none" normalizeH="0" baseline="0" dirty="0">
                 <a:ln>
                   <a:noFill/>
                 </a:ln>
@@ -31861,7 +31798,7 @@
               <a:t>	</a:t>
             </a:r>
             <a:r>
-              <a:rPr kumimoji="0" lang="en-US" altLang="en-US" b="0" i="0" u="none" strike="noStrike" cap="none" normalizeH="0" baseline="0" dirty="0" smtClean="0">
+              <a:rPr kumimoji="0" lang="en-US" altLang="en-US" b="0" i="0" u="none" strike="noStrike" cap="none" normalizeH="0" baseline="0" dirty="0">
                 <a:ln>
                   <a:noFill/>
                 </a:ln>
@@ -31874,7 +31811,7 @@
               <a:t>(</a:t>
             </a:r>
             <a:r>
-              <a:rPr kumimoji="0" lang="en-US" altLang="en-US" b="0" i="0" u="none" strike="noStrike" cap="none" normalizeH="0" baseline="0" dirty="0" err="1" smtClean="0">
+              <a:rPr kumimoji="0" lang="en-US" altLang="en-US" b="0" i="0" u="none" strike="noStrike" cap="none" normalizeH="0" baseline="0" dirty="0" err="1">
                 <a:ln>
                   <a:noFill/>
                 </a:ln>
@@ -31887,7 +31824,7 @@
               <a:t>int</a:t>
             </a:r>
             <a:r>
-              <a:rPr kumimoji="0" lang="en-US" altLang="en-US" b="0" i="0" u="none" strike="noStrike" cap="none" normalizeH="0" baseline="0" dirty="0" smtClean="0">
+              <a:rPr kumimoji="0" lang="en-US" altLang="en-US" b="0" i="0" u="none" strike="noStrike" cap="none" normalizeH="0" baseline="0" dirty="0">
                 <a:ln>
                   <a:noFill/>
                 </a:ln>
@@ -31900,7 +31837,7 @@
               <a:t>)(</a:t>
             </a:r>
             <a:r>
-              <a:rPr kumimoji="0" lang="en-US" altLang="en-US" b="0" i="0" u="none" strike="noStrike" cap="none" normalizeH="0" baseline="0" dirty="0" smtClean="0">
+              <a:rPr kumimoji="0" lang="en-US" altLang="en-US" b="0" i="0" u="none" strike="noStrike" cap="none" normalizeH="0" baseline="0" dirty="0">
                 <a:ln>
                   <a:noFill/>
                 </a:ln>
@@ -31913,7 +31850,7 @@
               <a:t>await</a:t>
             </a:r>
             <a:r>
-              <a:rPr kumimoji="0" lang="en-US" altLang="en-US" b="0" i="0" u="none" strike="noStrike" cap="none" normalizeH="0" baseline="0" dirty="0" smtClean="0">
+              <a:rPr kumimoji="0" lang="en-US" altLang="en-US" b="0" i="0" u="none" strike="noStrike" cap="none" normalizeH="0" baseline="0" dirty="0">
                 <a:ln>
                   <a:noFill/>
                 </a:ln>
@@ -31926,7 +31863,7 @@
               <a:t> </a:t>
             </a:r>
             <a:r>
-              <a:rPr kumimoji="0" lang="en-US" altLang="en-US" b="0" i="0" u="none" strike="noStrike" cap="none" normalizeH="0" baseline="0" dirty="0" err="1" smtClean="0">
+              <a:rPr kumimoji="0" lang="en-US" altLang="en-US" b="0" i="0" u="none" strike="noStrike" cap="none" normalizeH="0" baseline="0" dirty="0" err="1">
                 <a:ln>
                   <a:noFill/>
                 </a:ln>
@@ -31939,7 +31876,7 @@
               <a:t>script.RunAsync</a:t>
             </a:r>
             <a:r>
-              <a:rPr kumimoji="0" lang="en-US" altLang="en-US" b="0" i="0" u="none" strike="noStrike" cap="none" normalizeH="0" baseline="0" dirty="0" smtClean="0">
+              <a:rPr kumimoji="0" lang="en-US" altLang="en-US" b="0" i="0" u="none" strike="noStrike" cap="none" normalizeH="0" baseline="0" dirty="0">
                 <a:ln>
                   <a:noFill/>
                 </a:ln>
@@ -31952,7 +31889,7 @@
               <a:t>()).</a:t>
             </a:r>
             <a:r>
-              <a:rPr kumimoji="0" lang="en-US" altLang="en-US" b="0" i="0" u="none" strike="noStrike" cap="none" normalizeH="0" baseline="0" dirty="0" err="1" smtClean="0">
+              <a:rPr kumimoji="0" lang="en-US" altLang="en-US" b="0" i="0" u="none" strike="noStrike" cap="none" normalizeH="0" baseline="0" dirty="0" err="1">
                 <a:ln>
                   <a:noFill/>
                 </a:ln>
@@ -31965,7 +31902,7 @@
               <a:t>ReturnValue</a:t>
             </a:r>
             <a:r>
-              <a:rPr kumimoji="0" lang="en-US" altLang="en-US" b="0" i="0" u="none" strike="noStrike" cap="none" normalizeH="0" baseline="0" dirty="0" smtClean="0">
+              <a:rPr kumimoji="0" lang="en-US" altLang="en-US" b="0" i="0" u="none" strike="noStrike" cap="none" normalizeH="0" baseline="0" dirty="0">
                 <a:ln>
                   <a:noFill/>
                 </a:ln>
@@ -31977,7 +31914,7 @@
               </a:rPr>
               <a:t>);</a:t>
             </a:r>
-            <a:endParaRPr kumimoji="0" lang="en-US" altLang="en-US" b="0" i="0" u="none" strike="noStrike" cap="none" normalizeH="0" baseline="0" dirty="0" smtClean="0">
+            <a:endParaRPr kumimoji="0" lang="en-US" altLang="en-US" b="0" i="0" u="none" strike="noStrike" cap="none" normalizeH="0" baseline="0" dirty="0">
               <a:ln>
                 <a:noFill/>
               </a:ln>
@@ -31990,6 +31927,30 @@
           </a:p>
         </p:txBody>
       </p:sp>
+      <p:pic>
+        <p:nvPicPr>
+          <p:cNvPr id="3" name="Picture 2"/>
+          <p:cNvPicPr>
+            <a:picLocks noChangeAspect="1"/>
+          </p:cNvPicPr>
+          <p:nvPr/>
+        </p:nvPicPr>
+        <p:blipFill>
+          <a:blip r:embed="rId2"/>
+          <a:stretch>
+            <a:fillRect/>
+          </a:stretch>
+        </p:blipFill>
+        <p:spPr>
+          <a:xfrm>
+            <a:off x="6083249" y="862467"/>
+            <a:ext cx="5537251" cy="2392362"/>
+          </a:xfrm>
+          <a:prstGeom prst="rect">
+            <a:avLst/>
+          </a:prstGeom>
+        </p:spPr>
+      </p:pic>
     </p:spTree>
     <p:extLst>
       <p:ext uri="{BB962C8B-B14F-4D97-AF65-F5344CB8AC3E}">
@@ -32115,10 +32076,9 @@
           <a:lstStyle/>
           <a:p>
             <a:r>
-              <a:rPr lang="en-US" dirty="0" smtClean="0"/>
+              <a:rPr lang="en-US" dirty="0"/>
               <a:t>Opening up the compiler</a:t>
             </a:r>
-            <a:endParaRPr lang="en-US" dirty="0"/>
           </a:p>
         </p:txBody>
       </p:sp>

</xml_diff>

<commit_message>
Enhance CS7 test and enable LUT
</commit_message>
<xml_diff>
--- a/RoslynAndYou.pptx
+++ b/RoslynAndYou.pptx
@@ -1601,35 +1601,35 @@
     </dgm:pt>
   </dgm:ptLst>
   <dgm:cxnLst>
+    <dgm:cxn modelId="{A58080E9-33CB-4C07-920E-0A056786FE89}" srcId="{55AF256D-980F-4EAC-BDE3-A1B7BB810149}" destId="{329A6205-D92F-4A22-8653-055AF4549D01}" srcOrd="0" destOrd="0" parTransId="{BEC259D7-C0D1-4807-BF6D-B18A5084B23F}" sibTransId="{26A8870A-A98F-4E04-8A52-D7615622D8D3}"/>
+    <dgm:cxn modelId="{06EF365C-2188-448C-B630-9BC4B2FABD60}" type="presOf" srcId="{95B1ADF6-2F93-4BE7-9AC4-D1E9AB468A86}" destId="{DC734305-151B-44F7-8A31-4DF6B9EFACF5}" srcOrd="0" destOrd="0" presId="urn:microsoft.com/office/officeart/2005/8/layout/chevron2"/>
+    <dgm:cxn modelId="{6B6AEED6-C8AB-41D1-9284-C186433F0B1E}" type="presOf" srcId="{EADE0D2D-1205-40C5-86CE-1D93146D1A90}" destId="{540CB1EA-7FE9-4D73-A499-E9A4351FFD87}" srcOrd="0" destOrd="0" presId="urn:microsoft.com/office/officeart/2005/8/layout/chevron2"/>
+    <dgm:cxn modelId="{CA01A593-1FA6-4083-B431-989E97B542B1}" type="presOf" srcId="{A3920C65-3F7C-48E9-ACE8-6414D7482E18}" destId="{BBC3BD6A-454F-4CAA-A5C0-8F47CE19C2CC}" srcOrd="0" destOrd="0" presId="urn:microsoft.com/office/officeart/2005/8/layout/chevron2"/>
+    <dgm:cxn modelId="{4ED9D936-B292-48D0-8935-08A116E8717A}" type="presOf" srcId="{1002025F-1C72-4A21-ADB8-7F4B762D0701}" destId="{D87B602B-E23A-4814-B38E-6089C0F57C7A}" srcOrd="0" destOrd="0" presId="urn:microsoft.com/office/officeart/2005/8/layout/chevron2"/>
+    <dgm:cxn modelId="{F95291AB-9FCB-45A0-9370-1BE1E020A44C}" type="presOf" srcId="{CED0AB39-B94A-4134-95E2-43EA72704BE0}" destId="{DAD2E2F8-54E6-4FAE-A9BD-86AF88168CB8}" srcOrd="0" destOrd="0" presId="urn:microsoft.com/office/officeart/2005/8/layout/chevron2"/>
+    <dgm:cxn modelId="{0C3B6F2C-FC7D-432A-9C28-77B4A1C9C28E}" srcId="{EE40FFF8-103D-4F45-B85F-403984910D7F}" destId="{55AF256D-980F-4EAC-BDE3-A1B7BB810149}" srcOrd="0" destOrd="0" parTransId="{748A717C-599F-4C3A-B811-C08F8B1B0759}" sibTransId="{A0FA65F2-48E1-4C84-8387-4B40ABD643EF}"/>
+    <dgm:cxn modelId="{4CB8A257-4370-4096-875D-308C3EB6A12E}" srcId="{1F8667CE-1C44-4E08-9A2B-FF616C613456}" destId="{95694C06-2B2B-4047-8F05-8E36FD842531}" srcOrd="0" destOrd="0" parTransId="{94B991CB-22F8-4502-8602-4106C506106C}" sibTransId="{9F3061E0-B093-4D7C-9680-103D4FEDC06A}"/>
     <dgm:cxn modelId="{C6DCB072-4394-4062-AE87-BC3F79818562}" srcId="{1002025F-1C72-4A21-ADB8-7F4B762D0701}" destId="{AC1EF113-D03B-420E-911E-B92C916ACEDF}" srcOrd="0" destOrd="0" parTransId="{3596FEFB-719F-4095-B6C5-079E00E3C72E}" sibTransId="{E3F70FB8-8A18-4458-9266-24A45CFE504C}"/>
+    <dgm:cxn modelId="{69986308-9F57-4347-842D-2BFBFAA33A8D}" srcId="{EE40FFF8-103D-4F45-B85F-403984910D7F}" destId="{A3920C65-3F7C-48E9-ACE8-6414D7482E18}" srcOrd="1" destOrd="0" parTransId="{0F08BE9B-F890-421A-B90E-90EC86276BFA}" sibTransId="{A84EAA2E-6FF3-4307-8D22-5FB6E0659300}"/>
+    <dgm:cxn modelId="{946299B6-2978-4AD5-9265-3EC1C4717D78}" type="presOf" srcId="{1F8667CE-1C44-4E08-9A2B-FF616C613456}" destId="{C8AD4FE8-2A6D-4A55-9C0A-17A337DE34C6}" srcOrd="0" destOrd="0" presId="urn:microsoft.com/office/officeart/2005/8/layout/chevron2"/>
+    <dgm:cxn modelId="{0D5AABA5-A419-42AA-AAED-5BD1FF12B65B}" srcId="{295C1A26-C0BB-4CC5-A7C3-C9BB31F1079B}" destId="{A5B00B44-D32B-4A6A-9650-07C7E70EA17D}" srcOrd="0" destOrd="0" parTransId="{40DD1C00-2473-4003-BEC0-C004D7F14797}" sibTransId="{AA12AF86-DBFF-401E-8F90-8794184B09F1}"/>
+    <dgm:cxn modelId="{91C181B8-EF46-47FF-908C-8CEFA6F32B8D}" type="presOf" srcId="{7EB9B65E-F1F1-4C0C-BCEF-84E7CC628B93}" destId="{5830255F-49E8-44C9-A5BD-24B9CDC2A666}" srcOrd="0" destOrd="0" presId="urn:microsoft.com/office/officeart/2005/8/layout/chevron2"/>
+    <dgm:cxn modelId="{A4387B6C-47C1-43EA-AB0B-C9634E0707DB}" srcId="{EE40FFF8-103D-4F45-B85F-403984910D7F}" destId="{1002025F-1C72-4A21-ADB8-7F4B762D0701}" srcOrd="6" destOrd="0" parTransId="{765806DF-0E39-44E0-9A16-10384E41AC7A}" sibTransId="{70204279-0190-443C-A74E-BDAC0C260844}"/>
+    <dgm:cxn modelId="{CE4F279D-9FF2-4D7D-9662-E2C36EFB7600}" type="presOf" srcId="{295C1A26-C0BB-4CC5-A7C3-C9BB31F1079B}" destId="{63437E7B-65DF-4A27-B708-B701FB2F2D97}" srcOrd="0" destOrd="0" presId="urn:microsoft.com/office/officeart/2005/8/layout/chevron2"/>
+    <dgm:cxn modelId="{D979ED70-DEDD-4FF2-A9F4-B36066266231}" srcId="{A3920C65-3F7C-48E9-ACE8-6414D7482E18}" destId="{95B1ADF6-2F93-4BE7-9AC4-D1E9AB468A86}" srcOrd="0" destOrd="0" parTransId="{8E7CC16E-DEE7-448C-9AE8-94347153FD45}" sibTransId="{8B39424F-A08A-4296-B69A-35544451D833}"/>
+    <dgm:cxn modelId="{58354AFC-FF9F-4168-953F-3495D229016B}" srcId="{EE40FFF8-103D-4F45-B85F-403984910D7F}" destId="{EADE0D2D-1205-40C5-86CE-1D93146D1A90}" srcOrd="3" destOrd="0" parTransId="{1313A02D-916B-4376-9187-E1513360A3B7}" sibTransId="{FE89EA1D-5BF4-4389-891E-1C4333E940F1}"/>
     <dgm:cxn modelId="{DCD357E6-3B99-4AC3-A81E-1D8E5B28EA4A}" type="presOf" srcId="{329A6205-D92F-4A22-8653-055AF4549D01}" destId="{99404815-EBB5-40EA-B4FB-18C60F71A14A}" srcOrd="0" destOrd="0" presId="urn:microsoft.com/office/officeart/2005/8/layout/chevron2"/>
-    <dgm:cxn modelId="{003416AB-762C-4B98-B62B-189A70C864B9}" srcId="{7EB9B65E-F1F1-4C0C-BCEF-84E7CC628B93}" destId="{2A98F07E-328C-46E7-8251-0118F4BFB566}" srcOrd="0" destOrd="0" parTransId="{2D9A8C24-217F-4619-992B-B0C2B61B4D2D}" sibTransId="{363DC761-3722-44DA-B104-F9B7A7D09A14}"/>
-    <dgm:cxn modelId="{0EAD68A0-D989-4A37-96EB-6EE2F661AA46}" srcId="{EE40FFF8-103D-4F45-B85F-403984910D7F}" destId="{1F8667CE-1C44-4E08-9A2B-FF616C613456}" srcOrd="2" destOrd="0" parTransId="{EACB439E-3988-4013-BCE0-44C4BC1A809E}" sibTransId="{8A1EDCB2-7721-4B0B-9ECE-0E0736CDE7BE}"/>
+    <dgm:cxn modelId="{6C1D7293-C30D-4549-AED5-F126A7367255}" srcId="{EADE0D2D-1205-40C5-86CE-1D93146D1A90}" destId="{CED0AB39-B94A-4134-95E2-43EA72704BE0}" srcOrd="0" destOrd="0" parTransId="{80922B93-8062-40AC-9F4A-4357962A9003}" sibTransId="{CD781B07-49E8-4330-97C4-09871056819B}"/>
+    <dgm:cxn modelId="{37FBB0B3-8481-4EE8-82FF-FE2847EDC146}" srcId="{EE40FFF8-103D-4F45-B85F-403984910D7F}" destId="{7EB9B65E-F1F1-4C0C-BCEF-84E7CC628B93}" srcOrd="4" destOrd="0" parTransId="{C6EC86F0-2776-4AB7-AEC7-E5C672323418}" sibTransId="{E25BEE93-F45D-4AF9-8923-EC981D9554A2}"/>
+    <dgm:cxn modelId="{F232DB0F-D1DA-4851-84BA-3F5473E143D9}" srcId="{EE40FFF8-103D-4F45-B85F-403984910D7F}" destId="{295C1A26-C0BB-4CC5-A7C3-C9BB31F1079B}" srcOrd="5" destOrd="0" parTransId="{CCADCD90-BF8B-4450-868B-55E107F5E97C}" sibTransId="{2FF0FE31-AA20-4E75-AC28-31F2605A195E}"/>
+    <dgm:cxn modelId="{0103D843-07BC-46D7-B5CF-881EB1990E31}" type="presOf" srcId="{55AF256D-980F-4EAC-BDE3-A1B7BB810149}" destId="{FF38E5F5-B2ED-46F9-98AC-B8A051288B43}" srcOrd="0" destOrd="0" presId="urn:microsoft.com/office/officeart/2005/8/layout/chevron2"/>
+    <dgm:cxn modelId="{26FA470A-BC9E-4344-9C68-21FB9BEFE51D}" type="presOf" srcId="{2A98F07E-328C-46E7-8251-0118F4BFB566}" destId="{7A703FAB-2697-4360-9F76-B04086C14C7D}" srcOrd="0" destOrd="0" presId="urn:microsoft.com/office/officeart/2005/8/layout/chevron2"/>
     <dgm:cxn modelId="{9C44351A-EAC8-4F14-8B59-4465E6F4228A}" type="presOf" srcId="{95694C06-2B2B-4047-8F05-8E36FD842531}" destId="{114B75A6-06AB-4193-B4F9-C42AEDF360ED}" srcOrd="0" destOrd="0" presId="urn:microsoft.com/office/officeart/2005/8/layout/chevron2"/>
-    <dgm:cxn modelId="{0D5AABA5-A419-42AA-AAED-5BD1FF12B65B}" srcId="{295C1A26-C0BB-4CC5-A7C3-C9BB31F1079B}" destId="{A5B00B44-D32B-4A6A-9650-07C7E70EA17D}" srcOrd="0" destOrd="0" parTransId="{40DD1C00-2473-4003-BEC0-C004D7F14797}" sibTransId="{AA12AF86-DBFF-401E-8F90-8794184B09F1}"/>
-    <dgm:cxn modelId="{06EF365C-2188-448C-B630-9BC4B2FABD60}" type="presOf" srcId="{95B1ADF6-2F93-4BE7-9AC4-D1E9AB468A86}" destId="{DC734305-151B-44F7-8A31-4DF6B9EFACF5}" srcOrd="0" destOrd="0" presId="urn:microsoft.com/office/officeart/2005/8/layout/chevron2"/>
-    <dgm:cxn modelId="{CA01A593-1FA6-4083-B431-989E97B542B1}" type="presOf" srcId="{A3920C65-3F7C-48E9-ACE8-6414D7482E18}" destId="{BBC3BD6A-454F-4CAA-A5C0-8F47CE19C2CC}" srcOrd="0" destOrd="0" presId="urn:microsoft.com/office/officeart/2005/8/layout/chevron2"/>
-    <dgm:cxn modelId="{0103D843-07BC-46D7-B5CF-881EB1990E31}" type="presOf" srcId="{55AF256D-980F-4EAC-BDE3-A1B7BB810149}" destId="{FF38E5F5-B2ED-46F9-98AC-B8A051288B43}" srcOrd="0" destOrd="0" presId="urn:microsoft.com/office/officeart/2005/8/layout/chevron2"/>
-    <dgm:cxn modelId="{6B6AEED6-C8AB-41D1-9284-C186433F0B1E}" type="presOf" srcId="{EADE0D2D-1205-40C5-86CE-1D93146D1A90}" destId="{540CB1EA-7FE9-4D73-A499-E9A4351FFD87}" srcOrd="0" destOrd="0" presId="urn:microsoft.com/office/officeart/2005/8/layout/chevron2"/>
-    <dgm:cxn modelId="{A58080E9-33CB-4C07-920E-0A056786FE89}" srcId="{55AF256D-980F-4EAC-BDE3-A1B7BB810149}" destId="{329A6205-D92F-4A22-8653-055AF4549D01}" srcOrd="0" destOrd="0" parTransId="{BEC259D7-C0D1-4807-BF6D-B18A5084B23F}" sibTransId="{26A8870A-A98F-4E04-8A52-D7615622D8D3}"/>
-    <dgm:cxn modelId="{4CB8A257-4370-4096-875D-308C3EB6A12E}" srcId="{1F8667CE-1C44-4E08-9A2B-FF616C613456}" destId="{95694C06-2B2B-4047-8F05-8E36FD842531}" srcOrd="0" destOrd="0" parTransId="{94B991CB-22F8-4502-8602-4106C506106C}" sibTransId="{9F3061E0-B093-4D7C-9680-103D4FEDC06A}"/>
-    <dgm:cxn modelId="{F232DB0F-D1DA-4851-84BA-3F5473E143D9}" srcId="{EE40FFF8-103D-4F45-B85F-403984910D7F}" destId="{295C1A26-C0BB-4CC5-A7C3-C9BB31F1079B}" srcOrd="5" destOrd="0" parTransId="{CCADCD90-BF8B-4450-868B-55E107F5E97C}" sibTransId="{2FF0FE31-AA20-4E75-AC28-31F2605A195E}"/>
-    <dgm:cxn modelId="{58354AFC-FF9F-4168-953F-3495D229016B}" srcId="{EE40FFF8-103D-4F45-B85F-403984910D7F}" destId="{EADE0D2D-1205-40C5-86CE-1D93146D1A90}" srcOrd="3" destOrd="0" parTransId="{1313A02D-916B-4376-9187-E1513360A3B7}" sibTransId="{FE89EA1D-5BF4-4389-891E-1C4333E940F1}"/>
-    <dgm:cxn modelId="{91C181B8-EF46-47FF-908C-8CEFA6F32B8D}" type="presOf" srcId="{7EB9B65E-F1F1-4C0C-BCEF-84E7CC628B93}" destId="{5830255F-49E8-44C9-A5BD-24B9CDC2A666}" srcOrd="0" destOrd="0" presId="urn:microsoft.com/office/officeart/2005/8/layout/chevron2"/>
-    <dgm:cxn modelId="{F95291AB-9FCB-45A0-9370-1BE1E020A44C}" type="presOf" srcId="{CED0AB39-B94A-4134-95E2-43EA72704BE0}" destId="{DAD2E2F8-54E6-4FAE-A9BD-86AF88168CB8}" srcOrd="0" destOrd="0" presId="urn:microsoft.com/office/officeart/2005/8/layout/chevron2"/>
-    <dgm:cxn modelId="{6C1D7293-C30D-4549-AED5-F126A7367255}" srcId="{EADE0D2D-1205-40C5-86CE-1D93146D1A90}" destId="{CED0AB39-B94A-4134-95E2-43EA72704BE0}" srcOrd="0" destOrd="0" parTransId="{80922B93-8062-40AC-9F4A-4357962A9003}" sibTransId="{CD781B07-49E8-4330-97C4-09871056819B}"/>
-    <dgm:cxn modelId="{4ED9D936-B292-48D0-8935-08A116E8717A}" type="presOf" srcId="{1002025F-1C72-4A21-ADB8-7F4B762D0701}" destId="{D87B602B-E23A-4814-B38E-6089C0F57C7A}" srcOrd="0" destOrd="0" presId="urn:microsoft.com/office/officeart/2005/8/layout/chevron2"/>
-    <dgm:cxn modelId="{946299B6-2978-4AD5-9265-3EC1C4717D78}" type="presOf" srcId="{1F8667CE-1C44-4E08-9A2B-FF616C613456}" destId="{C8AD4FE8-2A6D-4A55-9C0A-17A337DE34C6}" srcOrd="0" destOrd="0" presId="urn:microsoft.com/office/officeart/2005/8/layout/chevron2"/>
-    <dgm:cxn modelId="{0C3B6F2C-FC7D-432A-9C28-77B4A1C9C28E}" srcId="{EE40FFF8-103D-4F45-B85F-403984910D7F}" destId="{55AF256D-980F-4EAC-BDE3-A1B7BB810149}" srcOrd="0" destOrd="0" parTransId="{748A717C-599F-4C3A-B811-C08F8B1B0759}" sibTransId="{A0FA65F2-48E1-4C84-8387-4B40ABD643EF}"/>
-    <dgm:cxn modelId="{A4387B6C-47C1-43EA-AB0B-C9634E0707DB}" srcId="{EE40FFF8-103D-4F45-B85F-403984910D7F}" destId="{1002025F-1C72-4A21-ADB8-7F4B762D0701}" srcOrd="6" destOrd="0" parTransId="{765806DF-0E39-44E0-9A16-10384E41AC7A}" sibTransId="{70204279-0190-443C-A74E-BDAC0C260844}"/>
-    <dgm:cxn modelId="{37FBB0B3-8481-4EE8-82FF-FE2847EDC146}" srcId="{EE40FFF8-103D-4F45-B85F-403984910D7F}" destId="{7EB9B65E-F1F1-4C0C-BCEF-84E7CC628B93}" srcOrd="4" destOrd="0" parTransId="{C6EC86F0-2776-4AB7-AEC7-E5C672323418}" sibTransId="{E25BEE93-F45D-4AF9-8923-EC981D9554A2}"/>
-    <dgm:cxn modelId="{3FEC02A6-3B33-4CA3-A1B8-B28E86AA8748}" type="presOf" srcId="{EE40FFF8-103D-4F45-B85F-403984910D7F}" destId="{C0F71877-8D45-45C6-ADEB-A07688B38294}" srcOrd="0" destOrd="0" presId="urn:microsoft.com/office/officeart/2005/8/layout/chevron2"/>
-    <dgm:cxn modelId="{CE4F279D-9FF2-4D7D-9662-E2C36EFB7600}" type="presOf" srcId="{295C1A26-C0BB-4CC5-A7C3-C9BB31F1079B}" destId="{63437E7B-65DF-4A27-B708-B701FB2F2D97}" srcOrd="0" destOrd="0" presId="urn:microsoft.com/office/officeart/2005/8/layout/chevron2"/>
-    <dgm:cxn modelId="{26FA470A-BC9E-4344-9C68-21FB9BEFE51D}" type="presOf" srcId="{2A98F07E-328C-46E7-8251-0118F4BFB566}" destId="{7A703FAB-2697-4360-9F76-B04086C14C7D}" srcOrd="0" destOrd="0" presId="urn:microsoft.com/office/officeart/2005/8/layout/chevron2"/>
-    <dgm:cxn modelId="{D979ED70-DEDD-4FF2-A9F4-B36066266231}" srcId="{A3920C65-3F7C-48E9-ACE8-6414D7482E18}" destId="{95B1ADF6-2F93-4BE7-9AC4-D1E9AB468A86}" srcOrd="0" destOrd="0" parTransId="{8E7CC16E-DEE7-448C-9AE8-94347153FD45}" sibTransId="{8B39424F-A08A-4296-B69A-35544451D833}"/>
-    <dgm:cxn modelId="{69986308-9F57-4347-842D-2BFBFAA33A8D}" srcId="{EE40FFF8-103D-4F45-B85F-403984910D7F}" destId="{A3920C65-3F7C-48E9-ACE8-6414D7482E18}" srcOrd="1" destOrd="0" parTransId="{0F08BE9B-F890-421A-B90E-90EC86276BFA}" sibTransId="{A84EAA2E-6FF3-4307-8D22-5FB6E0659300}"/>
     <dgm:cxn modelId="{A8D72F47-3DFC-4DF0-A79B-D8F9BFA00820}" type="presOf" srcId="{A5B00B44-D32B-4A6A-9650-07C7E70EA17D}" destId="{A736080A-6712-4C93-9E27-BF60389BE78D}" srcOrd="0" destOrd="0" presId="urn:microsoft.com/office/officeart/2005/8/layout/chevron2"/>
     <dgm:cxn modelId="{3E678A58-A92A-441B-BD75-D4E269FBDAEE}" type="presOf" srcId="{AC1EF113-D03B-420E-911E-B92C916ACEDF}" destId="{37953712-67A3-4E6D-83CD-63697DE27E74}" srcOrd="0" destOrd="0" presId="urn:microsoft.com/office/officeart/2005/8/layout/chevron2"/>
+    <dgm:cxn modelId="{003416AB-762C-4B98-B62B-189A70C864B9}" srcId="{7EB9B65E-F1F1-4C0C-BCEF-84E7CC628B93}" destId="{2A98F07E-328C-46E7-8251-0118F4BFB566}" srcOrd="0" destOrd="0" parTransId="{2D9A8C24-217F-4619-992B-B0C2B61B4D2D}" sibTransId="{363DC761-3722-44DA-B104-F9B7A7D09A14}"/>
+    <dgm:cxn modelId="{3FEC02A6-3B33-4CA3-A1B8-B28E86AA8748}" type="presOf" srcId="{EE40FFF8-103D-4F45-B85F-403984910D7F}" destId="{C0F71877-8D45-45C6-ADEB-A07688B38294}" srcOrd="0" destOrd="0" presId="urn:microsoft.com/office/officeart/2005/8/layout/chevron2"/>
+    <dgm:cxn modelId="{0EAD68A0-D989-4A37-96EB-6EE2F661AA46}" srcId="{EE40FFF8-103D-4F45-B85F-403984910D7F}" destId="{1F8667CE-1C44-4E08-9A2B-FF616C613456}" srcOrd="2" destOrd="0" parTransId="{EACB439E-3988-4013-BCE0-44C4BC1A809E}" sibTransId="{8A1EDCB2-7721-4B0B-9ECE-0E0736CDE7BE}"/>
     <dgm:cxn modelId="{80E9981C-D6AF-4AA0-AE34-95916BB6042D}" type="presParOf" srcId="{C0F71877-8D45-45C6-ADEB-A07688B38294}" destId="{33F818AB-FF01-4241-9AE4-10038E362029}" srcOrd="0" destOrd="0" presId="urn:microsoft.com/office/officeart/2005/8/layout/chevron2"/>
     <dgm:cxn modelId="{BD8631D0-F477-4DAE-87B1-937628472942}" type="presParOf" srcId="{33F818AB-FF01-4241-9AE4-10038E362029}" destId="{FF38E5F5-B2ED-46F9-98AC-B8A051288B43}" srcOrd="0" destOrd="0" presId="urn:microsoft.com/office/officeart/2005/8/layout/chevron2"/>
     <dgm:cxn modelId="{2D223C1E-935B-45DD-ABB9-BBD1CC91D5F5}" type="presParOf" srcId="{33F818AB-FF01-4241-9AE4-10038E362029}" destId="{99404815-EBB5-40EA-B4FB-18C60F71A14A}" srcOrd="1" destOrd="0" presId="urn:microsoft.com/office/officeart/2005/8/layout/chevron2"/>
@@ -4156,7 +4156,7 @@
           <a:p>
             <a:fld id="{FC81B089-160E-404A-8C73-8674F1782EA4}" type="datetimeFigureOut">
               <a:rPr lang="en-US" smtClean="0"/>
-              <a:t>9/29/2016</a:t>
+              <a:t>2/22/2017</a:t>
             </a:fld>
             <a:endParaRPr lang="en-US"/>
           </a:p>
@@ -7224,7 +7224,7 @@
           <a:p>
             <a:fld id="{D2B62928-2648-4210-B25C-2BD7B5FE2C7B}" type="datetimeFigureOut">
               <a:rPr lang="en-US" smtClean="0"/>
-              <a:t>9/29/2016</a:t>
+              <a:t>2/22/2017</a:t>
             </a:fld>
             <a:endParaRPr lang="en-US"/>
           </a:p>
@@ -7735,7 +7735,7 @@
           <a:p>
             <a:fld id="{D2B62928-2648-4210-B25C-2BD7B5FE2C7B}" type="datetimeFigureOut">
               <a:rPr lang="en-US" smtClean="0"/>
-              <a:t>9/29/2016</a:t>
+              <a:t>2/22/2017</a:t>
             </a:fld>
             <a:endParaRPr lang="en-US"/>
           </a:p>
@@ -7908,7 +7908,7 @@
           <a:p>
             <a:fld id="{D2B62928-2648-4210-B25C-2BD7B5FE2C7B}" type="datetimeFigureOut">
               <a:rPr lang="en-US" smtClean="0"/>
-              <a:t>9/29/2016</a:t>
+              <a:t>2/22/2017</a:t>
             </a:fld>
             <a:endParaRPr lang="en-US"/>
           </a:p>
@@ -8072,7 +8072,7 @@
           <a:p>
             <a:fld id="{D2B62928-2648-4210-B25C-2BD7B5FE2C7B}" type="datetimeFigureOut">
               <a:rPr lang="en-US" smtClean="0"/>
-              <a:t>9/29/2016</a:t>
+              <a:t>2/22/2017</a:t>
             </a:fld>
             <a:endParaRPr lang="en-US"/>
           </a:p>
@@ -11195,7 +11195,7 @@
           <a:p>
             <a:fld id="{D2B62928-2648-4210-B25C-2BD7B5FE2C7B}" type="datetimeFigureOut">
               <a:rPr lang="en-US" smtClean="0"/>
-              <a:t>9/29/2016</a:t>
+              <a:t>2/22/2017</a:t>
             </a:fld>
             <a:endParaRPr lang="en-US"/>
           </a:p>
@@ -11475,7 +11475,7 @@
           <a:p>
             <a:fld id="{D2B62928-2648-4210-B25C-2BD7B5FE2C7B}" type="datetimeFigureOut">
               <a:rPr lang="en-US" smtClean="0"/>
-              <a:t>9/29/2016</a:t>
+              <a:t>2/22/2017</a:t>
             </a:fld>
             <a:endParaRPr lang="en-US"/>
           </a:p>
@@ -11889,7 +11889,7 @@
           <a:p>
             <a:fld id="{D2B62928-2648-4210-B25C-2BD7B5FE2C7B}" type="datetimeFigureOut">
               <a:rPr lang="en-US" smtClean="0"/>
-              <a:t>9/29/2016</a:t>
+              <a:t>2/22/2017</a:t>
             </a:fld>
             <a:endParaRPr lang="en-US"/>
           </a:p>
@@ -12001,7 +12001,7 @@
           <a:p>
             <a:fld id="{D2B62928-2648-4210-B25C-2BD7B5FE2C7B}" type="datetimeFigureOut">
               <a:rPr lang="en-US" smtClean="0"/>
-              <a:t>9/29/2016</a:t>
+              <a:t>2/22/2017</a:t>
             </a:fld>
             <a:endParaRPr lang="en-US"/>
           </a:p>
@@ -12091,7 +12091,7 @@
           <a:p>
             <a:fld id="{D2B62928-2648-4210-B25C-2BD7B5FE2C7B}" type="datetimeFigureOut">
               <a:rPr lang="en-US" smtClean="0"/>
-              <a:t>9/29/2016</a:t>
+              <a:t>2/22/2017</a:t>
             </a:fld>
             <a:endParaRPr lang="en-US"/>
           </a:p>
@@ -12266,7 +12266,7 @@
           <a:p>
             <a:fld id="{D2B62928-2648-4210-B25C-2BD7B5FE2C7B}" type="datetimeFigureOut">
               <a:rPr lang="en-US" smtClean="0"/>
-              <a:t>9/29/2016</a:t>
+              <a:t>2/22/2017</a:t>
             </a:fld>
             <a:endParaRPr lang="en-US"/>
           </a:p>
@@ -12751,7 +12751,7 @@
           <a:p>
             <a:fld id="{D2B62928-2648-4210-B25C-2BD7B5FE2C7B}" type="datetimeFigureOut">
               <a:rPr lang="en-US" smtClean="0"/>
-              <a:t>9/29/2016</a:t>
+              <a:t>2/22/2017</a:t>
             </a:fld>
             <a:endParaRPr lang="en-US"/>
           </a:p>
@@ -13303,7 +13303,7 @@
           <a:p>
             <a:fld id="{D2B62928-2648-4210-B25C-2BD7B5FE2C7B}" type="datetimeFigureOut">
               <a:rPr lang="en-US" smtClean="0"/>
-              <a:t>9/29/2016</a:t>
+              <a:t>2/22/2017</a:t>
             </a:fld>
             <a:endParaRPr lang="en-US"/>
           </a:p>
@@ -13758,8 +13758,8 @@
         </p:nvSpPr>
         <p:spPr>
           <a:xfrm>
-            <a:off x="1905000" y="2438400"/>
-            <a:ext cx="8153400" cy="1600200"/>
+            <a:off x="1828800" y="2133600"/>
+            <a:ext cx="8153400" cy="2090065"/>
           </a:xfrm>
           <a:solidFill>
             <a:srgbClr val="000000">
@@ -13830,13 +13830,43 @@
               </a:rPr>
             </a:br>
             <a:r>
-              <a:rPr lang="en-US" cap="small" dirty="0">
+              <a:rPr lang="en-US" dirty="0">
                 <a:solidFill>
                   <a:schemeClr val="tx1"/>
                 </a:solidFill>
+                <a:hlinkClick r:id="rId3"/>
               </a:rPr>
               <a:t>https://github.com/jwooley/RoslynAndYou</a:t>
             </a:r>
+            <a:br>
+              <a:rPr lang="en-US" dirty="0">
+                <a:solidFill>
+                  <a:schemeClr val="tx1"/>
+                </a:solidFill>
+              </a:rPr>
+            </a:br>
+            <a:r>
+              <a:rPr lang="en-US" dirty="0">
+                <a:solidFill>
+                  <a:schemeClr val="tx1"/>
+                </a:solidFill>
+                <a:hlinkClick r:id="rId4"/>
+              </a:rPr>
+              <a:t>https://jwooley.github.io/</a:t>
+            </a:r>
+            <a:r>
+              <a:rPr lang="en-US" dirty="0">
+                <a:solidFill>
+                  <a:schemeClr val="tx1"/>
+                </a:solidFill>
+              </a:rPr>
+              <a:t> </a:t>
+            </a:r>
+            <a:endParaRPr lang="en-US" dirty="0">
+              <a:solidFill>
+                <a:schemeClr val="tx1"/>
+              </a:solidFill>
+            </a:endParaRPr>
           </a:p>
         </p:txBody>
       </p:sp>
@@ -13849,7 +13879,7 @@
           <p:nvPr/>
         </p:nvPicPr>
         <p:blipFill>
-          <a:blip r:embed="rId3" cstate="print">
+          <a:blip r:embed="rId5" cstate="print">
             <a:extLst>
               <a:ext uri="{28A0092B-C50C-407E-A947-70E740481C1C}">
                 <a14:useLocalDpi xmlns:a14="http://schemas.microsoft.com/office/drawing/2010/main" val="0"/>
@@ -13890,7 +13920,7 @@
           <p:nvPr/>
         </p:nvPicPr>
         <p:blipFill>
-          <a:blip r:embed="rId4">
+          <a:blip r:embed="rId6">
             <a:extLst>
               <a:ext uri="{28A0092B-C50C-407E-A947-70E740481C1C}">
                 <a14:useLocalDpi xmlns:a14="http://schemas.microsoft.com/office/drawing/2010/main" val="0"/>
@@ -21530,26 +21560,27 @@
               <a:rPr lang="en-US" dirty="0">
                 <a:hlinkClick r:id="rId2"/>
               </a:rPr>
+              <a:t>Roslyn Analyzers</a:t>
+            </a:r>
+            <a:endParaRPr lang="en-US" dirty="0">
+              <a:hlinkClick r:id="rId3"/>
+            </a:endParaRPr>
+          </a:p>
+          <a:p>
+            <a:r>
+              <a:rPr lang="en-US" dirty="0">
+                <a:hlinkClick r:id="rId3"/>
+              </a:rPr>
               <a:t>Code Cracker</a:t>
             </a:r>
             <a:endParaRPr lang="en-US" dirty="0"/>
           </a:p>
           <a:p>
-            <a:r>
-              <a:rPr lang="en-US" dirty="0" err="1">
-                <a:hlinkClick r:id="rId3"/>
-              </a:rPr>
-              <a:t>DotNetAnalyzers</a:t>
-            </a:r>
-            <a:endParaRPr lang="en-US" dirty="0"/>
-          </a:p>
-          <a:p>
-            <a:pPr lvl="1"/>
             <a:r>
               <a:rPr lang="en-US" dirty="0" err="1">
                 <a:hlinkClick r:id="rId4"/>
               </a:rPr>
-              <a:t>StyleCop</a:t>
+              <a:t>DotNetAnalyzers</a:t>
             </a:r>
             <a:endParaRPr lang="en-US" dirty="0"/>
           </a:p>
@@ -21559,7 +21590,7 @@
               <a:rPr lang="en-US" dirty="0" err="1">
                 <a:hlinkClick r:id="rId5"/>
               </a:rPr>
-              <a:t>AsyncUsageAnalyzers</a:t>
+              <a:t>StyleCop</a:t>
             </a:r>
             <a:endParaRPr lang="en-US" dirty="0"/>
           </a:p>
@@ -21568,6 +21599,16 @@
             <a:r>
               <a:rPr lang="en-US" dirty="0" err="1">
                 <a:hlinkClick r:id="rId6"/>
+              </a:rPr>
+              <a:t>AsyncUsageAnalyzers</a:t>
+            </a:r>
+            <a:endParaRPr lang="en-US" dirty="0"/>
+          </a:p>
+          <a:p>
+            <a:pPr lvl="1"/>
+            <a:r>
+              <a:rPr lang="en-US" dirty="0" err="1">
+                <a:hlinkClick r:id="rId7"/>
               </a:rPr>
               <a:t>TSqlAnalyzer</a:t>
             </a:r>
@@ -21628,7 +21669,7 @@
           <a:p>
             <a:r>
               <a:rPr lang="en-US" dirty="0" err="1">
-                <a:hlinkClick r:id="rId7"/>
+                <a:hlinkClick r:id="rId8"/>
               </a:rPr>
               <a:t>AzureAnalytics</a:t>
             </a:r>
@@ -21637,7 +21678,7 @@
           <a:p>
             <a:r>
               <a:rPr lang="en-US" dirty="0" err="1">
-                <a:hlinkClick r:id="rId8"/>
+                <a:hlinkClick r:id="rId9"/>
               </a:rPr>
               <a:t>Wintellect.Analyzers</a:t>
             </a:r>
@@ -21824,7 +21865,7 @@
                 </a:solidFill>
                 <a:hlinkClick r:id="rId4"/>
               </a:rPr>
-              <a:t>https://github.com/code-cracker/code-cracker</a:t>
+              <a:t>http://code-cracker.github.io/</a:t>
             </a:r>
             <a:r>
               <a:rPr lang="en-US" dirty="0">
@@ -21835,7 +21876,7 @@
                   </a:schemeClr>
                 </a:solidFill>
               </a:rPr>
-              <a:t> </a:t>
+              <a:t>  </a:t>
             </a:r>
           </a:p>
           <a:p>
@@ -22455,8 +22496,8 @@
         </p:nvSpPr>
         <p:spPr>
           <a:xfrm>
-            <a:off x="2590800" y="2438400"/>
-            <a:ext cx="7848600" cy="1902640"/>
+            <a:off x="2590800" y="2133600"/>
+            <a:ext cx="7848600" cy="2362200"/>
           </a:xfrm>
           <a:solidFill>
             <a:srgbClr val="000000">
@@ -22547,42 +22588,41 @@
                   <a:schemeClr val="tx1"/>
                 </a:solidFill>
                 <a:latin typeface="Segoe UI" panose="020B0502040204020203" pitchFamily="34" charset="0"/>
+                <a:hlinkClick r:id="rId6"/>
               </a:rPr>
               <a:t>https://github.com/jwooley/RoslynAndYou</a:t>
+            </a:r>
+            <a:br>
+              <a:rPr lang="en-US" sz="2200" dirty="0">
+                <a:solidFill>
+                  <a:schemeClr val="tx1"/>
+                </a:solidFill>
+                <a:latin typeface="Segoe UI" panose="020B0502040204020203" pitchFamily="34" charset="0"/>
+              </a:rPr>
+            </a:br>
+            <a:r>
+              <a:rPr lang="en-US" sz="2400" dirty="0">
+                <a:solidFill>
+                  <a:schemeClr val="tx1"/>
+                </a:solidFill>
+                <a:hlinkClick r:id="rId7"/>
+              </a:rPr>
+              <a:t>https://jwooley.github.io</a:t>
+            </a:r>
+            <a:r>
+              <a:rPr lang="en-US" sz="2400" cap="small" dirty="0">
+                <a:solidFill>
+                  <a:schemeClr val="tx1"/>
+                </a:solidFill>
+                <a:hlinkClick r:id="rId7"/>
+              </a:rPr>
+              <a:t>/</a:t>
             </a:r>
             <a:endParaRPr lang="en-US" sz="2200" cap="small" dirty="0">
               <a:solidFill>
                 <a:schemeClr val="tx1"/>
               </a:solidFill>
             </a:endParaRPr>
-          </a:p>
-        </p:txBody>
-      </p:sp>
-      <p:sp>
-        <p:nvSpPr>
-          <p:cNvPr id="2" name="Rectangle 1"/>
-          <p:cNvSpPr/>
-          <p:nvPr/>
-        </p:nvSpPr>
-        <p:spPr>
-          <a:xfrm>
-            <a:off x="457200" y="574039"/>
-            <a:ext cx="3488263" cy="369332"/>
-          </a:xfrm>
-          <a:prstGeom prst="rect">
-            <a:avLst/>
-          </a:prstGeom>
-        </p:spPr>
-        <p:txBody>
-          <a:bodyPr wrap="none">
-            <a:spAutoFit/>
-          </a:bodyPr>
-          <a:lstStyle/>
-          <a:p>
-            <a:r>
-              <a:rPr lang="en-US" dirty="0"/>
-              <a:t> http://techbash.com/evals/sessions</a:t>
-            </a:r>
           </a:p>
         </p:txBody>
       </p:sp>
@@ -28974,14 +29014,18 @@
         <p:spPr>
           <a:xfrm>
             <a:off x="609600" y="5715000"/>
-            <a:ext cx="10972800" cy="944564"/>
+            <a:ext cx="11353800" cy="944564"/>
           </a:xfrm>
         </p:spPr>
         <p:txBody>
-          <a:bodyPr/>
+          <a:bodyPr>
+            <a:normAutofit fontScale="85000" lnSpcReduction="10000"/>
+          </a:bodyPr>
           <a:lstStyle/>
           <a:p>
-            <a:pPr algn="ctr"/>
+            <a:pPr marL="0" indent="0" algn="ctr">
+              <a:buNone/>
+            </a:pPr>
             <a:r>
               <a:rPr lang="en-US" dirty="0"/>
               <a:t>C#7 proposals - </a:t>
@@ -28996,6 +29040,26 @@
               <a:rPr lang="en-US" dirty="0"/>
               <a:t> </a:t>
             </a:r>
+          </a:p>
+          <a:p>
+            <a:pPr marL="0" indent="0" algn="ctr">
+              <a:buNone/>
+            </a:pPr>
+            <a:r>
+              <a:rPr lang="en-US" dirty="0"/>
+              <a:t> Feature Status: </a:t>
+            </a:r>
+            <a:r>
+              <a:rPr lang="en-US" dirty="0">
+                <a:hlinkClick r:id="rId3"/>
+              </a:rPr>
+              <a:t>https://github.com/dotnet/roslyn/blob/master/docs/Language%20Feature%20Status.md</a:t>
+            </a:r>
+            <a:r>
+              <a:rPr lang="en-US" dirty="0"/>
+              <a:t> </a:t>
+            </a:r>
+            <a:endParaRPr lang="en-US" dirty="0"/>
           </a:p>
         </p:txBody>
       </p:sp>
@@ -29008,7 +29072,7 @@
           <p:nvPr/>
         </p:nvPicPr>
         <p:blipFill>
-          <a:blip r:embed="rId3">
+          <a:blip r:embed="rId4">
             <a:extLst>
               <a:ext uri="{28A0092B-C50C-407E-A947-70E740481C1C}">
                 <a14:useLocalDpi xmlns:a14="http://schemas.microsoft.com/office/drawing/2010/main" val="0"/>

</xml_diff>

<commit_message>
Add features for 7.1-7.3
</commit_message>
<xml_diff>
--- a/RoslynAndYou.pptx
+++ b/RoslynAndYou.pptx
@@ -5,7 +5,7 @@
     <p:sldMasterId id="2147483672" r:id="rId1"/>
   </p:sldMasterIdLst>
   <p:notesMasterIdLst>
-    <p:notesMasterId r:id="rId18"/>
+    <p:notesMasterId r:id="rId19"/>
   </p:notesMasterIdLst>
   <p:sldIdLst>
     <p:sldId id="286" r:id="rId2"/>
@@ -16,14 +16,15 @@
     <p:sldId id="309" r:id="rId7"/>
     <p:sldId id="310" r:id="rId8"/>
     <p:sldId id="311" r:id="rId9"/>
-    <p:sldId id="291" r:id="rId10"/>
-    <p:sldId id="289" r:id="rId11"/>
-    <p:sldId id="305" r:id="rId12"/>
-    <p:sldId id="306" r:id="rId13"/>
-    <p:sldId id="307" r:id="rId14"/>
-    <p:sldId id="303" r:id="rId15"/>
-    <p:sldId id="263" r:id="rId16"/>
-    <p:sldId id="287" r:id="rId17"/>
+    <p:sldId id="289" r:id="rId10"/>
+    <p:sldId id="303" r:id="rId11"/>
+    <p:sldId id="291" r:id="rId12"/>
+    <p:sldId id="312" r:id="rId13"/>
+    <p:sldId id="305" r:id="rId14"/>
+    <p:sldId id="306" r:id="rId15"/>
+    <p:sldId id="307" r:id="rId16"/>
+    <p:sldId id="263" r:id="rId17"/>
+    <p:sldId id="287" r:id="rId18"/>
   </p:sldIdLst>
   <p:sldSz cx="12192000" cy="6858000"/>
   <p:notesSz cx="6858000" cy="9144000"/>
@@ -139,6 +140,10 @@
     </p:ext>
   </p:extLst>
 </p:presentation>
+</file>
+
+<file path=ppt/revisionInfo.xml><?xml version="1.0" encoding="utf-8"?>
+<p1510:revInfo xmlns:a="http://schemas.openxmlformats.org/drawingml/2006/main" xmlns:r="http://schemas.openxmlformats.org/officeDocument/2006/relationships" xmlns:p1510="http://schemas.microsoft.com/office/powerpoint/2015/10/main"/>
 </file>
 
 <file path=ppt/diagrams/colors1.xml><?xml version="1.0" encoding="utf-8"?>
@@ -1413,10 +1418,24 @@
     <dgm:pt modelId="{40DD1C00-2473-4003-BEC0-C004D7F14797}" type="parTrans" cxnId="{0D5AABA5-A419-42AA-AAED-5BD1FF12B65B}">
       <dgm:prSet/>
       <dgm:spPr/>
+      <dgm:t>
+        <a:bodyPr/>
+        <a:lstStyle/>
+        <a:p>
+          <a:endParaRPr lang="en-US"/>
+        </a:p>
+      </dgm:t>
     </dgm:pt>
     <dgm:pt modelId="{AA12AF86-DBFF-401E-8F90-8794184B09F1}" type="sibTrans" cxnId="{0D5AABA5-A419-42AA-AAED-5BD1FF12B65B}">
       <dgm:prSet/>
       <dgm:spPr/>
+      <dgm:t>
+        <a:bodyPr/>
+        <a:lstStyle/>
+        <a:p>
+          <a:endParaRPr lang="en-US"/>
+        </a:p>
+      </dgm:t>
     </dgm:pt>
     <dgm:pt modelId="{C0F71877-8D45-45C6-ADEB-A07688B38294}" type="pres">
       <dgm:prSet presAssocID="{EE40FFF8-103D-4F45-B85F-403984910D7F}" presName="linearFlow" presStyleCnt="0">
@@ -1601,35 +1620,35 @@
     </dgm:pt>
   </dgm:ptLst>
   <dgm:cxnLst>
+    <dgm:cxn modelId="{69986308-9F57-4347-842D-2BFBFAA33A8D}" srcId="{EE40FFF8-103D-4F45-B85F-403984910D7F}" destId="{A3920C65-3F7C-48E9-ACE8-6414D7482E18}" srcOrd="1" destOrd="0" parTransId="{0F08BE9B-F890-421A-B90E-90EC86276BFA}" sibTransId="{A84EAA2E-6FF3-4307-8D22-5FB6E0659300}"/>
+    <dgm:cxn modelId="{26FA470A-BC9E-4344-9C68-21FB9BEFE51D}" type="presOf" srcId="{2A98F07E-328C-46E7-8251-0118F4BFB566}" destId="{7A703FAB-2697-4360-9F76-B04086C14C7D}" srcOrd="0" destOrd="0" presId="urn:microsoft.com/office/officeart/2005/8/layout/chevron2"/>
+    <dgm:cxn modelId="{F232DB0F-D1DA-4851-84BA-3F5473E143D9}" srcId="{EE40FFF8-103D-4F45-B85F-403984910D7F}" destId="{295C1A26-C0BB-4CC5-A7C3-C9BB31F1079B}" srcOrd="5" destOrd="0" parTransId="{CCADCD90-BF8B-4450-868B-55E107F5E97C}" sibTransId="{2FF0FE31-AA20-4E75-AC28-31F2605A195E}"/>
+    <dgm:cxn modelId="{9C44351A-EAC8-4F14-8B59-4465E6F4228A}" type="presOf" srcId="{95694C06-2B2B-4047-8F05-8E36FD842531}" destId="{114B75A6-06AB-4193-B4F9-C42AEDF360ED}" srcOrd="0" destOrd="0" presId="urn:microsoft.com/office/officeart/2005/8/layout/chevron2"/>
+    <dgm:cxn modelId="{0C3B6F2C-FC7D-432A-9C28-77B4A1C9C28E}" srcId="{EE40FFF8-103D-4F45-B85F-403984910D7F}" destId="{55AF256D-980F-4EAC-BDE3-A1B7BB810149}" srcOrd="0" destOrd="0" parTransId="{748A717C-599F-4C3A-B811-C08F8B1B0759}" sibTransId="{A0FA65F2-48E1-4C84-8387-4B40ABD643EF}"/>
+    <dgm:cxn modelId="{4ED9D936-B292-48D0-8935-08A116E8717A}" type="presOf" srcId="{1002025F-1C72-4A21-ADB8-7F4B762D0701}" destId="{D87B602B-E23A-4814-B38E-6089C0F57C7A}" srcOrd="0" destOrd="0" presId="urn:microsoft.com/office/officeart/2005/8/layout/chevron2"/>
+    <dgm:cxn modelId="{06EF365C-2188-448C-B630-9BC4B2FABD60}" type="presOf" srcId="{95B1ADF6-2F93-4BE7-9AC4-D1E9AB468A86}" destId="{DC734305-151B-44F7-8A31-4DF6B9EFACF5}" srcOrd="0" destOrd="0" presId="urn:microsoft.com/office/officeart/2005/8/layout/chevron2"/>
+    <dgm:cxn modelId="{0103D843-07BC-46D7-B5CF-881EB1990E31}" type="presOf" srcId="{55AF256D-980F-4EAC-BDE3-A1B7BB810149}" destId="{FF38E5F5-B2ED-46F9-98AC-B8A051288B43}" srcOrd="0" destOrd="0" presId="urn:microsoft.com/office/officeart/2005/8/layout/chevron2"/>
+    <dgm:cxn modelId="{A8D72F47-3DFC-4DF0-A79B-D8F9BFA00820}" type="presOf" srcId="{A5B00B44-D32B-4A6A-9650-07C7E70EA17D}" destId="{A736080A-6712-4C93-9E27-BF60389BE78D}" srcOrd="0" destOrd="0" presId="urn:microsoft.com/office/officeart/2005/8/layout/chevron2"/>
+    <dgm:cxn modelId="{A4387B6C-47C1-43EA-AB0B-C9634E0707DB}" srcId="{EE40FFF8-103D-4F45-B85F-403984910D7F}" destId="{1002025F-1C72-4A21-ADB8-7F4B762D0701}" srcOrd="6" destOrd="0" parTransId="{765806DF-0E39-44E0-9A16-10384E41AC7A}" sibTransId="{70204279-0190-443C-A74E-BDAC0C260844}"/>
+    <dgm:cxn modelId="{D979ED70-DEDD-4FF2-A9F4-B36066266231}" srcId="{A3920C65-3F7C-48E9-ACE8-6414D7482E18}" destId="{95B1ADF6-2F93-4BE7-9AC4-D1E9AB468A86}" srcOrd="0" destOrd="0" parTransId="{8E7CC16E-DEE7-448C-9AE8-94347153FD45}" sibTransId="{8B39424F-A08A-4296-B69A-35544451D833}"/>
+    <dgm:cxn modelId="{C6DCB072-4394-4062-AE87-BC3F79818562}" srcId="{1002025F-1C72-4A21-ADB8-7F4B762D0701}" destId="{AC1EF113-D03B-420E-911E-B92C916ACEDF}" srcOrd="0" destOrd="0" parTransId="{3596FEFB-719F-4095-B6C5-079E00E3C72E}" sibTransId="{E3F70FB8-8A18-4458-9266-24A45CFE504C}"/>
+    <dgm:cxn modelId="{4CB8A257-4370-4096-875D-308C3EB6A12E}" srcId="{1F8667CE-1C44-4E08-9A2B-FF616C613456}" destId="{95694C06-2B2B-4047-8F05-8E36FD842531}" srcOrd="0" destOrd="0" parTransId="{94B991CB-22F8-4502-8602-4106C506106C}" sibTransId="{9F3061E0-B093-4D7C-9680-103D4FEDC06A}"/>
+    <dgm:cxn modelId="{3E678A58-A92A-441B-BD75-D4E269FBDAEE}" type="presOf" srcId="{AC1EF113-D03B-420E-911E-B92C916ACEDF}" destId="{37953712-67A3-4E6D-83CD-63697DE27E74}" srcOrd="0" destOrd="0" presId="urn:microsoft.com/office/officeart/2005/8/layout/chevron2"/>
+    <dgm:cxn modelId="{6C1D7293-C30D-4549-AED5-F126A7367255}" srcId="{EADE0D2D-1205-40C5-86CE-1D93146D1A90}" destId="{CED0AB39-B94A-4134-95E2-43EA72704BE0}" srcOrd="0" destOrd="0" parTransId="{80922B93-8062-40AC-9F4A-4357962A9003}" sibTransId="{CD781B07-49E8-4330-97C4-09871056819B}"/>
+    <dgm:cxn modelId="{CA01A593-1FA6-4083-B431-989E97B542B1}" type="presOf" srcId="{A3920C65-3F7C-48E9-ACE8-6414D7482E18}" destId="{BBC3BD6A-454F-4CAA-A5C0-8F47CE19C2CC}" srcOrd="0" destOrd="0" presId="urn:microsoft.com/office/officeart/2005/8/layout/chevron2"/>
+    <dgm:cxn modelId="{CE4F279D-9FF2-4D7D-9662-E2C36EFB7600}" type="presOf" srcId="{295C1A26-C0BB-4CC5-A7C3-C9BB31F1079B}" destId="{63437E7B-65DF-4A27-B708-B701FB2F2D97}" srcOrd="0" destOrd="0" presId="urn:microsoft.com/office/officeart/2005/8/layout/chevron2"/>
+    <dgm:cxn modelId="{0EAD68A0-D989-4A37-96EB-6EE2F661AA46}" srcId="{EE40FFF8-103D-4F45-B85F-403984910D7F}" destId="{1F8667CE-1C44-4E08-9A2B-FF616C613456}" srcOrd="2" destOrd="0" parTransId="{EACB439E-3988-4013-BCE0-44C4BC1A809E}" sibTransId="{8A1EDCB2-7721-4B0B-9ECE-0E0736CDE7BE}"/>
+    <dgm:cxn modelId="{0D5AABA5-A419-42AA-AAED-5BD1FF12B65B}" srcId="{295C1A26-C0BB-4CC5-A7C3-C9BB31F1079B}" destId="{A5B00B44-D32B-4A6A-9650-07C7E70EA17D}" srcOrd="0" destOrd="0" parTransId="{40DD1C00-2473-4003-BEC0-C004D7F14797}" sibTransId="{AA12AF86-DBFF-401E-8F90-8794184B09F1}"/>
+    <dgm:cxn modelId="{3FEC02A6-3B33-4CA3-A1B8-B28E86AA8748}" type="presOf" srcId="{EE40FFF8-103D-4F45-B85F-403984910D7F}" destId="{C0F71877-8D45-45C6-ADEB-A07688B38294}" srcOrd="0" destOrd="0" presId="urn:microsoft.com/office/officeart/2005/8/layout/chevron2"/>
+    <dgm:cxn modelId="{003416AB-762C-4B98-B62B-189A70C864B9}" srcId="{7EB9B65E-F1F1-4C0C-BCEF-84E7CC628B93}" destId="{2A98F07E-328C-46E7-8251-0118F4BFB566}" srcOrd="0" destOrd="0" parTransId="{2D9A8C24-217F-4619-992B-B0C2B61B4D2D}" sibTransId="{363DC761-3722-44DA-B104-F9B7A7D09A14}"/>
+    <dgm:cxn modelId="{F95291AB-9FCB-45A0-9370-1BE1E020A44C}" type="presOf" srcId="{CED0AB39-B94A-4134-95E2-43EA72704BE0}" destId="{DAD2E2F8-54E6-4FAE-A9BD-86AF88168CB8}" srcOrd="0" destOrd="0" presId="urn:microsoft.com/office/officeart/2005/8/layout/chevron2"/>
+    <dgm:cxn modelId="{37FBB0B3-8481-4EE8-82FF-FE2847EDC146}" srcId="{EE40FFF8-103D-4F45-B85F-403984910D7F}" destId="{7EB9B65E-F1F1-4C0C-BCEF-84E7CC628B93}" srcOrd="4" destOrd="0" parTransId="{C6EC86F0-2776-4AB7-AEC7-E5C672323418}" sibTransId="{E25BEE93-F45D-4AF9-8923-EC981D9554A2}"/>
+    <dgm:cxn modelId="{946299B6-2978-4AD5-9265-3EC1C4717D78}" type="presOf" srcId="{1F8667CE-1C44-4E08-9A2B-FF616C613456}" destId="{C8AD4FE8-2A6D-4A55-9C0A-17A337DE34C6}" srcOrd="0" destOrd="0" presId="urn:microsoft.com/office/officeart/2005/8/layout/chevron2"/>
+    <dgm:cxn modelId="{91C181B8-EF46-47FF-908C-8CEFA6F32B8D}" type="presOf" srcId="{7EB9B65E-F1F1-4C0C-BCEF-84E7CC628B93}" destId="{5830255F-49E8-44C9-A5BD-24B9CDC2A666}" srcOrd="0" destOrd="0" presId="urn:microsoft.com/office/officeart/2005/8/layout/chevron2"/>
+    <dgm:cxn modelId="{6B6AEED6-C8AB-41D1-9284-C186433F0B1E}" type="presOf" srcId="{EADE0D2D-1205-40C5-86CE-1D93146D1A90}" destId="{540CB1EA-7FE9-4D73-A499-E9A4351FFD87}" srcOrd="0" destOrd="0" presId="urn:microsoft.com/office/officeart/2005/8/layout/chevron2"/>
+    <dgm:cxn modelId="{DCD357E6-3B99-4AC3-A81E-1D8E5B28EA4A}" type="presOf" srcId="{329A6205-D92F-4A22-8653-055AF4549D01}" destId="{99404815-EBB5-40EA-B4FB-18C60F71A14A}" srcOrd="0" destOrd="0" presId="urn:microsoft.com/office/officeart/2005/8/layout/chevron2"/>
     <dgm:cxn modelId="{A58080E9-33CB-4C07-920E-0A056786FE89}" srcId="{55AF256D-980F-4EAC-BDE3-A1B7BB810149}" destId="{329A6205-D92F-4A22-8653-055AF4549D01}" srcOrd="0" destOrd="0" parTransId="{BEC259D7-C0D1-4807-BF6D-B18A5084B23F}" sibTransId="{26A8870A-A98F-4E04-8A52-D7615622D8D3}"/>
-    <dgm:cxn modelId="{06EF365C-2188-448C-B630-9BC4B2FABD60}" type="presOf" srcId="{95B1ADF6-2F93-4BE7-9AC4-D1E9AB468A86}" destId="{DC734305-151B-44F7-8A31-4DF6B9EFACF5}" srcOrd="0" destOrd="0" presId="urn:microsoft.com/office/officeart/2005/8/layout/chevron2"/>
-    <dgm:cxn modelId="{6B6AEED6-C8AB-41D1-9284-C186433F0B1E}" type="presOf" srcId="{EADE0D2D-1205-40C5-86CE-1D93146D1A90}" destId="{540CB1EA-7FE9-4D73-A499-E9A4351FFD87}" srcOrd="0" destOrd="0" presId="urn:microsoft.com/office/officeart/2005/8/layout/chevron2"/>
-    <dgm:cxn modelId="{CA01A593-1FA6-4083-B431-989E97B542B1}" type="presOf" srcId="{A3920C65-3F7C-48E9-ACE8-6414D7482E18}" destId="{BBC3BD6A-454F-4CAA-A5C0-8F47CE19C2CC}" srcOrd="0" destOrd="0" presId="urn:microsoft.com/office/officeart/2005/8/layout/chevron2"/>
-    <dgm:cxn modelId="{4ED9D936-B292-48D0-8935-08A116E8717A}" type="presOf" srcId="{1002025F-1C72-4A21-ADB8-7F4B762D0701}" destId="{D87B602B-E23A-4814-B38E-6089C0F57C7A}" srcOrd="0" destOrd="0" presId="urn:microsoft.com/office/officeart/2005/8/layout/chevron2"/>
-    <dgm:cxn modelId="{F95291AB-9FCB-45A0-9370-1BE1E020A44C}" type="presOf" srcId="{CED0AB39-B94A-4134-95E2-43EA72704BE0}" destId="{DAD2E2F8-54E6-4FAE-A9BD-86AF88168CB8}" srcOrd="0" destOrd="0" presId="urn:microsoft.com/office/officeart/2005/8/layout/chevron2"/>
-    <dgm:cxn modelId="{0C3B6F2C-FC7D-432A-9C28-77B4A1C9C28E}" srcId="{EE40FFF8-103D-4F45-B85F-403984910D7F}" destId="{55AF256D-980F-4EAC-BDE3-A1B7BB810149}" srcOrd="0" destOrd="0" parTransId="{748A717C-599F-4C3A-B811-C08F8B1B0759}" sibTransId="{A0FA65F2-48E1-4C84-8387-4B40ABD643EF}"/>
-    <dgm:cxn modelId="{4CB8A257-4370-4096-875D-308C3EB6A12E}" srcId="{1F8667CE-1C44-4E08-9A2B-FF616C613456}" destId="{95694C06-2B2B-4047-8F05-8E36FD842531}" srcOrd="0" destOrd="0" parTransId="{94B991CB-22F8-4502-8602-4106C506106C}" sibTransId="{9F3061E0-B093-4D7C-9680-103D4FEDC06A}"/>
-    <dgm:cxn modelId="{C6DCB072-4394-4062-AE87-BC3F79818562}" srcId="{1002025F-1C72-4A21-ADB8-7F4B762D0701}" destId="{AC1EF113-D03B-420E-911E-B92C916ACEDF}" srcOrd="0" destOrd="0" parTransId="{3596FEFB-719F-4095-B6C5-079E00E3C72E}" sibTransId="{E3F70FB8-8A18-4458-9266-24A45CFE504C}"/>
-    <dgm:cxn modelId="{69986308-9F57-4347-842D-2BFBFAA33A8D}" srcId="{EE40FFF8-103D-4F45-B85F-403984910D7F}" destId="{A3920C65-3F7C-48E9-ACE8-6414D7482E18}" srcOrd="1" destOrd="0" parTransId="{0F08BE9B-F890-421A-B90E-90EC86276BFA}" sibTransId="{A84EAA2E-6FF3-4307-8D22-5FB6E0659300}"/>
-    <dgm:cxn modelId="{946299B6-2978-4AD5-9265-3EC1C4717D78}" type="presOf" srcId="{1F8667CE-1C44-4E08-9A2B-FF616C613456}" destId="{C8AD4FE8-2A6D-4A55-9C0A-17A337DE34C6}" srcOrd="0" destOrd="0" presId="urn:microsoft.com/office/officeart/2005/8/layout/chevron2"/>
-    <dgm:cxn modelId="{0D5AABA5-A419-42AA-AAED-5BD1FF12B65B}" srcId="{295C1A26-C0BB-4CC5-A7C3-C9BB31F1079B}" destId="{A5B00B44-D32B-4A6A-9650-07C7E70EA17D}" srcOrd="0" destOrd="0" parTransId="{40DD1C00-2473-4003-BEC0-C004D7F14797}" sibTransId="{AA12AF86-DBFF-401E-8F90-8794184B09F1}"/>
-    <dgm:cxn modelId="{91C181B8-EF46-47FF-908C-8CEFA6F32B8D}" type="presOf" srcId="{7EB9B65E-F1F1-4C0C-BCEF-84E7CC628B93}" destId="{5830255F-49E8-44C9-A5BD-24B9CDC2A666}" srcOrd="0" destOrd="0" presId="urn:microsoft.com/office/officeart/2005/8/layout/chevron2"/>
-    <dgm:cxn modelId="{A4387B6C-47C1-43EA-AB0B-C9634E0707DB}" srcId="{EE40FFF8-103D-4F45-B85F-403984910D7F}" destId="{1002025F-1C72-4A21-ADB8-7F4B762D0701}" srcOrd="6" destOrd="0" parTransId="{765806DF-0E39-44E0-9A16-10384E41AC7A}" sibTransId="{70204279-0190-443C-A74E-BDAC0C260844}"/>
-    <dgm:cxn modelId="{CE4F279D-9FF2-4D7D-9662-E2C36EFB7600}" type="presOf" srcId="{295C1A26-C0BB-4CC5-A7C3-C9BB31F1079B}" destId="{63437E7B-65DF-4A27-B708-B701FB2F2D97}" srcOrd="0" destOrd="0" presId="urn:microsoft.com/office/officeart/2005/8/layout/chevron2"/>
-    <dgm:cxn modelId="{D979ED70-DEDD-4FF2-A9F4-B36066266231}" srcId="{A3920C65-3F7C-48E9-ACE8-6414D7482E18}" destId="{95B1ADF6-2F93-4BE7-9AC4-D1E9AB468A86}" srcOrd="0" destOrd="0" parTransId="{8E7CC16E-DEE7-448C-9AE8-94347153FD45}" sibTransId="{8B39424F-A08A-4296-B69A-35544451D833}"/>
     <dgm:cxn modelId="{58354AFC-FF9F-4168-953F-3495D229016B}" srcId="{EE40FFF8-103D-4F45-B85F-403984910D7F}" destId="{EADE0D2D-1205-40C5-86CE-1D93146D1A90}" srcOrd="3" destOrd="0" parTransId="{1313A02D-916B-4376-9187-E1513360A3B7}" sibTransId="{FE89EA1D-5BF4-4389-891E-1C4333E940F1}"/>
-    <dgm:cxn modelId="{DCD357E6-3B99-4AC3-A81E-1D8E5B28EA4A}" type="presOf" srcId="{329A6205-D92F-4A22-8653-055AF4549D01}" destId="{99404815-EBB5-40EA-B4FB-18C60F71A14A}" srcOrd="0" destOrd="0" presId="urn:microsoft.com/office/officeart/2005/8/layout/chevron2"/>
-    <dgm:cxn modelId="{6C1D7293-C30D-4549-AED5-F126A7367255}" srcId="{EADE0D2D-1205-40C5-86CE-1D93146D1A90}" destId="{CED0AB39-B94A-4134-95E2-43EA72704BE0}" srcOrd="0" destOrd="0" parTransId="{80922B93-8062-40AC-9F4A-4357962A9003}" sibTransId="{CD781B07-49E8-4330-97C4-09871056819B}"/>
-    <dgm:cxn modelId="{37FBB0B3-8481-4EE8-82FF-FE2847EDC146}" srcId="{EE40FFF8-103D-4F45-B85F-403984910D7F}" destId="{7EB9B65E-F1F1-4C0C-BCEF-84E7CC628B93}" srcOrd="4" destOrd="0" parTransId="{C6EC86F0-2776-4AB7-AEC7-E5C672323418}" sibTransId="{E25BEE93-F45D-4AF9-8923-EC981D9554A2}"/>
-    <dgm:cxn modelId="{F232DB0F-D1DA-4851-84BA-3F5473E143D9}" srcId="{EE40FFF8-103D-4F45-B85F-403984910D7F}" destId="{295C1A26-C0BB-4CC5-A7C3-C9BB31F1079B}" srcOrd="5" destOrd="0" parTransId="{CCADCD90-BF8B-4450-868B-55E107F5E97C}" sibTransId="{2FF0FE31-AA20-4E75-AC28-31F2605A195E}"/>
-    <dgm:cxn modelId="{0103D843-07BC-46D7-B5CF-881EB1990E31}" type="presOf" srcId="{55AF256D-980F-4EAC-BDE3-A1B7BB810149}" destId="{FF38E5F5-B2ED-46F9-98AC-B8A051288B43}" srcOrd="0" destOrd="0" presId="urn:microsoft.com/office/officeart/2005/8/layout/chevron2"/>
-    <dgm:cxn modelId="{26FA470A-BC9E-4344-9C68-21FB9BEFE51D}" type="presOf" srcId="{2A98F07E-328C-46E7-8251-0118F4BFB566}" destId="{7A703FAB-2697-4360-9F76-B04086C14C7D}" srcOrd="0" destOrd="0" presId="urn:microsoft.com/office/officeart/2005/8/layout/chevron2"/>
-    <dgm:cxn modelId="{9C44351A-EAC8-4F14-8B59-4465E6F4228A}" type="presOf" srcId="{95694C06-2B2B-4047-8F05-8E36FD842531}" destId="{114B75A6-06AB-4193-B4F9-C42AEDF360ED}" srcOrd="0" destOrd="0" presId="urn:microsoft.com/office/officeart/2005/8/layout/chevron2"/>
-    <dgm:cxn modelId="{A8D72F47-3DFC-4DF0-A79B-D8F9BFA00820}" type="presOf" srcId="{A5B00B44-D32B-4A6A-9650-07C7E70EA17D}" destId="{A736080A-6712-4C93-9E27-BF60389BE78D}" srcOrd="0" destOrd="0" presId="urn:microsoft.com/office/officeart/2005/8/layout/chevron2"/>
-    <dgm:cxn modelId="{3E678A58-A92A-441B-BD75-D4E269FBDAEE}" type="presOf" srcId="{AC1EF113-D03B-420E-911E-B92C916ACEDF}" destId="{37953712-67A3-4E6D-83CD-63697DE27E74}" srcOrd="0" destOrd="0" presId="urn:microsoft.com/office/officeart/2005/8/layout/chevron2"/>
-    <dgm:cxn modelId="{003416AB-762C-4B98-B62B-189A70C864B9}" srcId="{7EB9B65E-F1F1-4C0C-BCEF-84E7CC628B93}" destId="{2A98F07E-328C-46E7-8251-0118F4BFB566}" srcOrd="0" destOrd="0" parTransId="{2D9A8C24-217F-4619-992B-B0C2B61B4D2D}" sibTransId="{363DC761-3722-44DA-B104-F9B7A7D09A14}"/>
-    <dgm:cxn modelId="{3FEC02A6-3B33-4CA3-A1B8-B28E86AA8748}" type="presOf" srcId="{EE40FFF8-103D-4F45-B85F-403984910D7F}" destId="{C0F71877-8D45-45C6-ADEB-A07688B38294}" srcOrd="0" destOrd="0" presId="urn:microsoft.com/office/officeart/2005/8/layout/chevron2"/>
-    <dgm:cxn modelId="{0EAD68A0-D989-4A37-96EB-6EE2F661AA46}" srcId="{EE40FFF8-103D-4F45-B85F-403984910D7F}" destId="{1F8667CE-1C44-4E08-9A2B-FF616C613456}" srcOrd="2" destOrd="0" parTransId="{EACB439E-3988-4013-BCE0-44C4BC1A809E}" sibTransId="{8A1EDCB2-7721-4B0B-9ECE-0E0736CDE7BE}"/>
     <dgm:cxn modelId="{80E9981C-D6AF-4AA0-AE34-95916BB6042D}" type="presParOf" srcId="{C0F71877-8D45-45C6-ADEB-A07688B38294}" destId="{33F818AB-FF01-4241-9AE4-10038E362029}" srcOrd="0" destOrd="0" presId="urn:microsoft.com/office/officeart/2005/8/layout/chevron2"/>
     <dgm:cxn modelId="{BD8631D0-F477-4DAE-87B1-937628472942}" type="presParOf" srcId="{33F818AB-FF01-4241-9AE4-10038E362029}" destId="{FF38E5F5-B2ED-46F9-98AC-B8A051288B43}" srcOrd="0" destOrd="0" presId="urn:microsoft.com/office/officeart/2005/8/layout/chevron2"/>
     <dgm:cxn modelId="{2D223C1E-935B-45DD-ABB9-BBD1CC91D5F5}" type="presParOf" srcId="{33F818AB-FF01-4241-9AE4-10038E362029}" destId="{99404815-EBB5-40EA-B4FB-18C60F71A14A}" srcOrd="1" destOrd="0" presId="urn:microsoft.com/office/officeart/2005/8/layout/chevron2"/>
@@ -4156,7 +4175,7 @@
           <a:p>
             <a:fld id="{FC81B089-160E-404A-8C73-8674F1782EA4}" type="datetimeFigureOut">
               <a:rPr lang="en-US" smtClean="0"/>
-              <a:t>2/22/2017</a:t>
+              <a:t>10/14/2017</a:t>
             </a:fld>
             <a:endParaRPr lang="en-US"/>
           </a:p>
@@ -7224,7 +7243,7 @@
           <a:p>
             <a:fld id="{D2B62928-2648-4210-B25C-2BD7B5FE2C7B}" type="datetimeFigureOut">
               <a:rPr lang="en-US" smtClean="0"/>
-              <a:t>2/22/2017</a:t>
+              <a:t>10/14/2017</a:t>
             </a:fld>
             <a:endParaRPr lang="en-US"/>
           </a:p>
@@ -7735,7 +7754,7 @@
           <a:p>
             <a:fld id="{D2B62928-2648-4210-B25C-2BD7B5FE2C7B}" type="datetimeFigureOut">
               <a:rPr lang="en-US" smtClean="0"/>
-              <a:t>2/22/2017</a:t>
+              <a:t>10/14/2017</a:t>
             </a:fld>
             <a:endParaRPr lang="en-US"/>
           </a:p>
@@ -7908,7 +7927,7 @@
           <a:p>
             <a:fld id="{D2B62928-2648-4210-B25C-2BD7B5FE2C7B}" type="datetimeFigureOut">
               <a:rPr lang="en-US" smtClean="0"/>
-              <a:t>2/22/2017</a:t>
+              <a:t>10/14/2017</a:t>
             </a:fld>
             <a:endParaRPr lang="en-US"/>
           </a:p>
@@ -8072,7 +8091,7 @@
           <a:p>
             <a:fld id="{D2B62928-2648-4210-B25C-2BD7B5FE2C7B}" type="datetimeFigureOut">
               <a:rPr lang="en-US" smtClean="0"/>
-              <a:t>2/22/2017</a:t>
+              <a:t>10/14/2017</a:t>
             </a:fld>
             <a:endParaRPr lang="en-US"/>
           </a:p>
@@ -11195,7 +11214,7 @@
           <a:p>
             <a:fld id="{D2B62928-2648-4210-B25C-2BD7B5FE2C7B}" type="datetimeFigureOut">
               <a:rPr lang="en-US" smtClean="0"/>
-              <a:t>2/22/2017</a:t>
+              <a:t>10/14/2017</a:t>
             </a:fld>
             <a:endParaRPr lang="en-US"/>
           </a:p>
@@ -11475,7 +11494,7 @@
           <a:p>
             <a:fld id="{D2B62928-2648-4210-B25C-2BD7B5FE2C7B}" type="datetimeFigureOut">
               <a:rPr lang="en-US" smtClean="0"/>
-              <a:t>2/22/2017</a:t>
+              <a:t>10/14/2017</a:t>
             </a:fld>
             <a:endParaRPr lang="en-US"/>
           </a:p>
@@ -11889,7 +11908,7 @@
           <a:p>
             <a:fld id="{D2B62928-2648-4210-B25C-2BD7B5FE2C7B}" type="datetimeFigureOut">
               <a:rPr lang="en-US" smtClean="0"/>
-              <a:t>2/22/2017</a:t>
+              <a:t>10/14/2017</a:t>
             </a:fld>
             <a:endParaRPr lang="en-US"/>
           </a:p>
@@ -12001,7 +12020,7 @@
           <a:p>
             <a:fld id="{D2B62928-2648-4210-B25C-2BD7B5FE2C7B}" type="datetimeFigureOut">
               <a:rPr lang="en-US" smtClean="0"/>
-              <a:t>2/22/2017</a:t>
+              <a:t>10/14/2017</a:t>
             </a:fld>
             <a:endParaRPr lang="en-US"/>
           </a:p>
@@ -12091,7 +12110,7 @@
           <a:p>
             <a:fld id="{D2B62928-2648-4210-B25C-2BD7B5FE2C7B}" type="datetimeFigureOut">
               <a:rPr lang="en-US" smtClean="0"/>
-              <a:t>2/22/2017</a:t>
+              <a:t>10/14/2017</a:t>
             </a:fld>
             <a:endParaRPr lang="en-US"/>
           </a:p>
@@ -12266,7 +12285,7 @@
           <a:p>
             <a:fld id="{D2B62928-2648-4210-B25C-2BD7B5FE2C7B}" type="datetimeFigureOut">
               <a:rPr lang="en-US" smtClean="0"/>
-              <a:t>2/22/2017</a:t>
+              <a:t>10/14/2017</a:t>
             </a:fld>
             <a:endParaRPr lang="en-US"/>
           </a:p>
@@ -12751,7 +12770,7 @@
           <a:p>
             <a:fld id="{D2B62928-2648-4210-B25C-2BD7B5FE2C7B}" type="datetimeFigureOut">
               <a:rPr lang="en-US" smtClean="0"/>
-              <a:t>2/22/2017</a:t>
+              <a:t>10/14/2017</a:t>
             </a:fld>
             <a:endParaRPr lang="en-US"/>
           </a:p>
@@ -13303,7 +13322,7 @@
           <a:p>
             <a:fld id="{D2B62928-2648-4210-B25C-2BD7B5FE2C7B}" type="datetimeFigureOut">
               <a:rPr lang="en-US" smtClean="0"/>
-              <a:t>2/22/2017</a:t>
+              <a:t>10/14/2017</a:t>
             </a:fld>
             <a:endParaRPr lang="en-US"/>
           </a:p>
@@ -13862,11 +13881,6 @@
               </a:rPr>
               <a:t> </a:t>
             </a:r>
-            <a:endParaRPr lang="en-US" dirty="0">
-              <a:solidFill>
-                <a:schemeClr val="tx1"/>
-              </a:solidFill>
-            </a:endParaRPr>
           </a:p>
         </p:txBody>
       </p:sp>
@@ -14248,44 +14262,8 @@
           <a:p>
             <a:r>
               <a:rPr lang="en-US" dirty="0"/>
-              <a:t>Out of the Box </a:t>
-            </a:r>
-            <a:r>
-              <a:rPr lang="en-US" dirty="0" err="1"/>
-              <a:t>Refactorings</a:t>
-            </a:r>
-            <a:endParaRPr lang="en-US" dirty="0"/>
-          </a:p>
-        </p:txBody>
-      </p:sp>
-      <p:sp>
-        <p:nvSpPr>
-          <p:cNvPr id="4" name="Text Placeholder 3"/>
-          <p:cNvSpPr>
-            <a:spLocks noGrp="1"/>
-          </p:cNvSpPr>
-          <p:nvPr>
-            <p:ph type="body" idx="1"/>
-          </p:nvPr>
-        </p:nvSpPr>
-        <p:spPr/>
-        <p:txBody>
-          <a:bodyPr/>
-          <a:lstStyle/>
-          <a:p>
-            <a:r>
-              <a:rPr lang="en-US" dirty="0">
-                <a:hlinkClick r:id="rId2"/>
-              </a:rPr>
-              <a:t>Code Fixes</a:t>
-            </a:r>
-            <a:r>
-              <a:rPr lang="en-US" dirty="0"/>
-              <a:t> (30)</a:t>
-            </a:r>
-            <a:endParaRPr lang="en-US" dirty="0">
-              <a:hlinkClick r:id="rId3"/>
-            </a:endParaRPr>
+              <a:t>Third Party Code Fixes</a:t>
+            </a:r>
           </a:p>
         </p:txBody>
       </p:sp>
@@ -14296,234 +14274,166 @@
             <a:spLocks noGrp="1"/>
           </p:cNvSpPr>
           <p:nvPr>
-            <p:ph sz="half" idx="2"/>
+            <p:ph sz="half" idx="1"/>
           </p:nvPr>
         </p:nvSpPr>
-        <p:spPr/>
+        <p:spPr>
+          <a:solidFill>
+            <a:schemeClr val="tx1">
+              <a:lumMod val="85000"/>
+            </a:schemeClr>
+          </a:solidFill>
+        </p:spPr>
         <p:txBody>
-          <a:bodyPr>
-            <a:normAutofit fontScale="92500" lnSpcReduction="10000"/>
-          </a:bodyPr>
+          <a:bodyPr/>
           <a:lstStyle/>
           <a:p>
             <a:r>
-              <a:rPr lang="en-US" dirty="0"/>
-              <a:t>Add  Await</a:t>
-            </a:r>
-          </a:p>
-          <a:p>
-            <a:r>
-              <a:rPr lang="en-US" dirty="0"/>
-              <a:t>Add </a:t>
-            </a:r>
-            <a:r>
-              <a:rPr lang="en-US" dirty="0" err="1"/>
-              <a:t>Async</a:t>
+              <a:rPr lang="en-US" dirty="0">
+                <a:hlinkClick r:id="rId2"/>
+              </a:rPr>
+              <a:t>Roslyn Analyzers</a:t>
+            </a:r>
+            <a:endParaRPr lang="en-US" dirty="0">
+              <a:hlinkClick r:id="rId3"/>
+            </a:endParaRPr>
+          </a:p>
+          <a:p>
+            <a:r>
+              <a:rPr lang="en-US" dirty="0">
+                <a:hlinkClick r:id="rId3"/>
+              </a:rPr>
+              <a:t>Code Cracker</a:t>
             </a:r>
             <a:endParaRPr lang="en-US" dirty="0"/>
           </a:p>
           <a:p>
             <a:r>
-              <a:rPr lang="en-US" dirty="0"/>
-              <a:t>Change Return Type</a:t>
-            </a:r>
-          </a:p>
-          <a:p>
-            <a:r>
-              <a:rPr lang="en-US" dirty="0"/>
-              <a:t>Change To Yield</a:t>
-            </a:r>
-          </a:p>
-          <a:p>
-            <a:r>
-              <a:rPr lang="en-US" dirty="0"/>
-              <a:t>Convert To </a:t>
-            </a:r>
-            <a:r>
-              <a:rPr lang="en-US" dirty="0" err="1"/>
-              <a:t>Async</a:t>
+              <a:rPr lang="en-US" dirty="0" err="1">
+                <a:hlinkClick r:id="rId4"/>
+              </a:rPr>
+              <a:t>DotNetAnalyzers</a:t>
             </a:r>
             <a:endParaRPr lang="en-US" dirty="0"/>
           </a:p>
           <a:p>
-            <a:r>
-              <a:rPr lang="en-US" dirty="0"/>
-              <a:t>Convert To Iterator</a:t>
-            </a:r>
-          </a:p>
-          <a:p>
-            <a:r>
-              <a:rPr lang="en-US" dirty="0"/>
-              <a:t>Add Missing Reference</a:t>
-            </a:r>
-          </a:p>
-          <a:p>
-            <a:r>
-              <a:rPr lang="en-US" dirty="0"/>
-              <a:t>Add Using</a:t>
-            </a:r>
-          </a:p>
-          <a:p>
-            <a:r>
-              <a:rPr lang="en-US" dirty="0"/>
-              <a:t>Fully Qualify</a:t>
-            </a:r>
-          </a:p>
-          <a:p>
-            <a:r>
-              <a:rPr lang="en-US" dirty="0"/>
-              <a:t>Generate Method</a:t>
-            </a:r>
+            <a:pPr lvl="1"/>
+            <a:r>
+              <a:rPr lang="en-US" dirty="0" err="1">
+                <a:hlinkClick r:id="rId5"/>
+              </a:rPr>
+              <a:t>StyleCop</a:t>
+            </a:r>
+            <a:endParaRPr lang="en-US" dirty="0"/>
+          </a:p>
+          <a:p>
+            <a:pPr lvl="1"/>
+            <a:r>
+              <a:rPr lang="en-US" dirty="0" err="1">
+                <a:hlinkClick r:id="rId6"/>
+              </a:rPr>
+              <a:t>AsyncUsageAnalyzers</a:t>
+            </a:r>
+            <a:endParaRPr lang="en-US" dirty="0"/>
+          </a:p>
+          <a:p>
+            <a:pPr lvl="1"/>
+            <a:r>
+              <a:rPr lang="en-US" dirty="0" err="1">
+                <a:hlinkClick r:id="rId7"/>
+              </a:rPr>
+              <a:t>TSqlAnalyzer</a:t>
+            </a:r>
+            <a:endParaRPr lang="en-US" dirty="0"/>
           </a:p>
         </p:txBody>
       </p:sp>
       <p:sp>
         <p:nvSpPr>
-          <p:cNvPr id="5" name="Text Placeholder 4"/>
+          <p:cNvPr id="4" name="Content Placeholder 3"/>
           <p:cNvSpPr>
             <a:spLocks noGrp="1"/>
           </p:cNvSpPr>
           <p:nvPr>
-            <p:ph type="body" sz="quarter" idx="3"/>
+            <p:ph sz="half" idx="2"/>
           </p:nvPr>
         </p:nvSpPr>
-        <p:spPr/>
+        <p:spPr>
+          <a:solidFill>
+            <a:schemeClr val="tx1">
+              <a:lumMod val="85000"/>
+            </a:schemeClr>
+          </a:solidFill>
+        </p:spPr>
         <p:txBody>
           <a:bodyPr/>
           <a:lstStyle/>
           <a:p>
             <a:r>
               <a:rPr lang="en-US" dirty="0" err="1">
-                <a:hlinkClick r:id="rId3"/>
-              </a:rPr>
-              <a:t>Refactorings</a:t>
-            </a:r>
-            <a:r>
-              <a:rPr lang="en-US" dirty="0"/>
-              <a:t> (13)</a:t>
-            </a:r>
-          </a:p>
-        </p:txBody>
-      </p:sp>
-      <p:sp>
-        <p:nvSpPr>
-          <p:cNvPr id="6" name="Content Placeholder 5"/>
-          <p:cNvSpPr>
-            <a:spLocks noGrp="1"/>
-          </p:cNvSpPr>
-          <p:nvPr>
-            <p:ph sz="quarter" idx="4"/>
-          </p:nvPr>
-        </p:nvSpPr>
-        <p:spPr/>
-        <p:txBody>
-          <a:bodyPr>
-            <a:normAutofit fontScale="92500" lnSpcReduction="20000"/>
-          </a:bodyPr>
-          <a:lstStyle/>
-          <a:p>
-            <a:r>
-              <a:rPr lang="en-US" dirty="0"/>
-              <a:t>Add Constructor Parameters from members</a:t>
-            </a:r>
-          </a:p>
-          <a:p>
-            <a:r>
-              <a:rPr lang="en-US" dirty="0"/>
-              <a:t>Change Signature</a:t>
-            </a:r>
-          </a:p>
-          <a:p>
-            <a:r>
-              <a:rPr lang="en-US" dirty="0"/>
-              <a:t>Encapsulate Field</a:t>
-            </a:r>
-          </a:p>
-          <a:p>
-            <a:r>
-              <a:rPr lang="en-US" dirty="0"/>
-              <a:t>Extract Interface</a:t>
-            </a:r>
-          </a:p>
-          <a:p>
-            <a:r>
-              <a:rPr lang="en-US" dirty="0"/>
-              <a:t>Extract Method</a:t>
-            </a:r>
-          </a:p>
-          <a:p>
-            <a:r>
-              <a:rPr lang="en-US" dirty="0"/>
-              <a:t>Generate Constructor from members</a:t>
-            </a:r>
-          </a:p>
-          <a:p>
-            <a:r>
-              <a:rPr lang="en-US" dirty="0"/>
-              <a:t>Generate default constructors</a:t>
-            </a:r>
-          </a:p>
-          <a:p>
-            <a:r>
-              <a:rPr lang="en-US" dirty="0"/>
-              <a:t>Inline temporary</a:t>
-            </a:r>
-          </a:p>
-          <a:p>
-            <a:r>
-              <a:rPr lang="en-US" dirty="0"/>
-              <a:t>Introduce Variable</a:t>
-            </a:r>
-          </a:p>
-          <a:p>
-            <a:r>
-              <a:rPr lang="en-US" dirty="0"/>
-              <a:t>Invert If</a:t>
-            </a:r>
-          </a:p>
-          <a:p>
-            <a:r>
-              <a:rPr lang="en-US" dirty="0"/>
-              <a:t>Simplify Lambda</a:t>
-            </a:r>
-          </a:p>
-        </p:txBody>
-      </p:sp>
-      <p:sp>
-        <p:nvSpPr>
-          <p:cNvPr id="7" name="TextBox 6"/>
-          <p:cNvSpPr txBox="1"/>
-          <p:nvPr/>
-        </p:nvSpPr>
-        <p:spPr>
-          <a:xfrm>
-            <a:off x="3769577" y="6126164"/>
-            <a:ext cx="4651260" cy="461665"/>
-          </a:xfrm>
-          <a:prstGeom prst="rect">
-            <a:avLst/>
-          </a:prstGeom>
-          <a:noFill/>
-        </p:spPr>
-        <p:txBody>
-          <a:bodyPr wrap="square" rtlCol="0">
-            <a:spAutoFit/>
-          </a:bodyPr>
-          <a:lstStyle/>
-          <a:p>
-            <a:pPr algn="l"/>
-            <a:r>
-              <a:rPr lang="en-US" sz="2400" dirty="0" err="1"/>
-              <a:t>Microsoft.CodeAnalysis.Internal.Log</a:t>
-            </a:r>
-            <a:endParaRPr lang="en-US" sz="2400" dirty="0"/>
+                <a:solidFill>
+                  <a:schemeClr val="accent3"/>
+                </a:solidFill>
+              </a:rPr>
+              <a:t>DotNetDoodle</a:t>
+            </a:r>
+            <a:endParaRPr lang="en-US" dirty="0">
+              <a:solidFill>
+                <a:schemeClr val="accent3"/>
+              </a:solidFill>
+            </a:endParaRPr>
+          </a:p>
+          <a:p>
+            <a:r>
+              <a:rPr lang="en-US" dirty="0" err="1">
+                <a:solidFill>
+                  <a:schemeClr val="accent3"/>
+                </a:solidFill>
+              </a:rPr>
+              <a:t>RoslynDiagnostics</a:t>
+            </a:r>
+            <a:endParaRPr lang="en-US" dirty="0">
+              <a:solidFill>
+                <a:schemeClr val="accent3"/>
+              </a:solidFill>
+            </a:endParaRPr>
+          </a:p>
+          <a:p>
+            <a:r>
+              <a:rPr lang="en-US" dirty="0" err="1">
+                <a:hlinkClick r:id="rId8"/>
+              </a:rPr>
+              <a:t>AzureAnalytics</a:t>
+            </a:r>
+            <a:endParaRPr lang="en-US" dirty="0"/>
+          </a:p>
+          <a:p>
+            <a:r>
+              <a:rPr lang="en-US" dirty="0" err="1">
+                <a:hlinkClick r:id="rId9"/>
+              </a:rPr>
+              <a:t>Wintellect.Analyzers</a:t>
+            </a:r>
+            <a:endParaRPr lang="en-US" dirty="0"/>
+          </a:p>
+          <a:p>
+            <a:r>
+              <a:rPr lang="en-US" dirty="0" err="1">
+                <a:hlinkClick r:id="rId10"/>
+              </a:rPr>
+              <a:t>Xunit.Analyzers</a:t>
+            </a:r>
+            <a:endParaRPr lang="en-US" dirty="0"/>
+          </a:p>
+          <a:p>
+            <a:endParaRPr lang="en-US" dirty="0"/>
           </a:p>
         </p:txBody>
       </p:sp>
     </p:spTree>
     <p:extLst>
       <p:ext uri="{BB962C8B-B14F-4D97-AF65-F5344CB8AC3E}">
-        <p14:creationId xmlns:p14="http://schemas.microsoft.com/office/powerpoint/2010/main" val="1527053908"/>
+        <p14:creationId xmlns:p14="http://schemas.microsoft.com/office/powerpoint/2010/main" val="2362224569"/>
       </p:ext>
     </p:extLst>
   </p:cSld>
@@ -14534,6 +14444,764 @@
 </file>
 
 <file path=ppt/slides/slide11.xml><?xml version="1.0" encoding="utf-8"?>
+<p:sld xmlns:a="http://schemas.openxmlformats.org/drawingml/2006/main" xmlns:r="http://schemas.openxmlformats.org/officeDocument/2006/relationships" xmlns:p="http://schemas.openxmlformats.org/presentationml/2006/main">
+  <p:cSld>
+    <p:spTree>
+      <p:nvGrpSpPr>
+        <p:cNvPr id="1" name=""/>
+        <p:cNvGrpSpPr/>
+        <p:nvPr/>
+      </p:nvGrpSpPr>
+      <p:grpSpPr>
+        <a:xfrm>
+          <a:off x="0" y="0"/>
+          <a:ext cx="0" cy="0"/>
+          <a:chOff x="0" y="0"/>
+          <a:chExt cx="0" cy="0"/>
+        </a:xfrm>
+      </p:grpSpPr>
+      <p:sp>
+        <p:nvSpPr>
+          <p:cNvPr id="18" name="Flowchart: Internal Storage 17"/>
+          <p:cNvSpPr/>
+          <p:nvPr/>
+        </p:nvSpPr>
+        <p:spPr>
+          <a:xfrm>
+            <a:off x="5687680" y="3485734"/>
+            <a:ext cx="1143000" cy="1552613"/>
+          </a:xfrm>
+          <a:prstGeom prst="flowChartInternalStorage">
+            <a:avLst/>
+          </a:prstGeom>
+        </p:spPr>
+        <p:style>
+          <a:lnRef idx="1">
+            <a:schemeClr val="accent1"/>
+          </a:lnRef>
+          <a:fillRef idx="2">
+            <a:schemeClr val="accent1"/>
+          </a:fillRef>
+          <a:effectRef idx="1">
+            <a:schemeClr val="accent1"/>
+          </a:effectRef>
+          <a:fontRef idx="minor">
+            <a:schemeClr val="dk1"/>
+          </a:fontRef>
+        </p:style>
+        <p:txBody>
+          <a:bodyPr rtlCol="0" anchor="ctr"/>
+          <a:lstStyle/>
+          <a:p>
+            <a:pPr algn="ctr"/>
+            <a:endParaRPr lang="en-US"/>
+          </a:p>
+        </p:txBody>
+      </p:sp>
+      <p:sp>
+        <p:nvSpPr>
+          <p:cNvPr id="7" name="Cube 6"/>
+          <p:cNvSpPr/>
+          <p:nvPr/>
+        </p:nvSpPr>
+        <p:spPr>
+          <a:xfrm>
+            <a:off x="4012406" y="2595959"/>
+            <a:ext cx="3124200" cy="3067844"/>
+          </a:xfrm>
+          <a:prstGeom prst="cube">
+            <a:avLst/>
+          </a:prstGeom>
+        </p:spPr>
+        <p:style>
+          <a:lnRef idx="1">
+            <a:schemeClr val="dk1"/>
+          </a:lnRef>
+          <a:fillRef idx="3">
+            <a:schemeClr val="dk1"/>
+          </a:fillRef>
+          <a:effectRef idx="2">
+            <a:schemeClr val="dk1"/>
+          </a:effectRef>
+          <a:fontRef idx="minor">
+            <a:schemeClr val="lt1"/>
+          </a:fontRef>
+        </p:style>
+        <p:txBody>
+          <a:bodyPr rtlCol="0" anchor="ctr"/>
+          <a:lstStyle/>
+          <a:p>
+            <a:pPr algn="ctr"/>
+            <a:r>
+              <a:rPr lang="en-US" dirty="0"/>
+              <a:t>CSC/VBC</a:t>
+            </a:r>
+          </a:p>
+        </p:txBody>
+      </p:sp>
+      <p:sp>
+        <p:nvSpPr>
+          <p:cNvPr id="2" name="Title 1"/>
+          <p:cNvSpPr>
+            <a:spLocks noGrp="1"/>
+          </p:cNvSpPr>
+          <p:nvPr>
+            <p:ph type="title"/>
+          </p:nvPr>
+        </p:nvSpPr>
+        <p:spPr/>
+        <p:txBody>
+          <a:bodyPr/>
+          <a:lstStyle/>
+          <a:p>
+            <a:r>
+              <a:rPr lang="en-US" dirty="0"/>
+              <a:t>Opening up the compiler</a:t>
+            </a:r>
+          </a:p>
+        </p:txBody>
+      </p:sp>
+      <p:pic>
+        <p:nvPicPr>
+          <p:cNvPr id="4" name="Picture 3"/>
+          <p:cNvPicPr>
+            <a:picLocks noChangeAspect="1"/>
+          </p:cNvPicPr>
+          <p:nvPr/>
+        </p:nvPicPr>
+        <p:blipFill>
+          <a:blip r:embed="rId2"/>
+          <a:stretch>
+            <a:fillRect/>
+          </a:stretch>
+        </p:blipFill>
+        <p:spPr>
+          <a:xfrm>
+            <a:off x="1981201" y="2133601"/>
+            <a:ext cx="447675" cy="2600325"/>
+          </a:xfrm>
+          <a:prstGeom prst="rect">
+            <a:avLst/>
+          </a:prstGeom>
+        </p:spPr>
+      </p:pic>
+      <p:pic>
+        <p:nvPicPr>
+          <p:cNvPr id="5" name="Picture 4"/>
+          <p:cNvPicPr>
+            <a:picLocks noChangeAspect="1"/>
+          </p:cNvPicPr>
+          <p:nvPr/>
+        </p:nvPicPr>
+        <p:blipFill>
+          <a:blip r:embed="rId2"/>
+          <a:stretch>
+            <a:fillRect/>
+          </a:stretch>
+        </p:blipFill>
+        <p:spPr>
+          <a:xfrm>
+            <a:off x="2243138" y="2829720"/>
+            <a:ext cx="447675" cy="2600325"/>
+          </a:xfrm>
+          <a:prstGeom prst="rect">
+            <a:avLst/>
+          </a:prstGeom>
+        </p:spPr>
+      </p:pic>
+      <p:pic>
+        <p:nvPicPr>
+          <p:cNvPr id="6" name="Picture 5"/>
+          <p:cNvPicPr>
+            <a:picLocks noChangeAspect="1"/>
+          </p:cNvPicPr>
+          <p:nvPr/>
+        </p:nvPicPr>
+        <p:blipFill>
+          <a:blip r:embed="rId2"/>
+          <a:stretch>
+            <a:fillRect/>
+          </a:stretch>
+        </p:blipFill>
+        <p:spPr>
+          <a:xfrm>
+            <a:off x="2466975" y="3372644"/>
+            <a:ext cx="447675" cy="2600325"/>
+          </a:xfrm>
+          <a:prstGeom prst="rect">
+            <a:avLst/>
+          </a:prstGeom>
+        </p:spPr>
+      </p:pic>
+      <p:sp>
+        <p:nvSpPr>
+          <p:cNvPr id="9" name="Flowchart: Multidocument 8"/>
+          <p:cNvSpPr/>
+          <p:nvPr/>
+        </p:nvSpPr>
+        <p:spPr>
+          <a:xfrm>
+            <a:off x="8458200" y="3154364"/>
+            <a:ext cx="1981200" cy="2275681"/>
+          </a:xfrm>
+          <a:prstGeom prst="flowChartMultidocument">
+            <a:avLst/>
+          </a:prstGeom>
+        </p:spPr>
+        <p:style>
+          <a:lnRef idx="1">
+            <a:schemeClr val="accent1"/>
+          </a:lnRef>
+          <a:fillRef idx="2">
+            <a:schemeClr val="accent1"/>
+          </a:fillRef>
+          <a:effectRef idx="1">
+            <a:schemeClr val="accent1"/>
+          </a:effectRef>
+          <a:fontRef idx="minor">
+            <a:schemeClr val="dk1"/>
+          </a:fontRef>
+        </p:style>
+        <p:txBody>
+          <a:bodyPr rtlCol="0" anchor="ctr"/>
+          <a:lstStyle/>
+          <a:p>
+            <a:pPr algn="ctr"/>
+            <a:r>
+              <a:rPr lang="en-US" sz="3200" dirty="0"/>
+              <a:t>IL</a:t>
+            </a:r>
+          </a:p>
+        </p:txBody>
+      </p:sp>
+      <p:sp>
+        <p:nvSpPr>
+          <p:cNvPr id="10" name="Right Arrow 9"/>
+          <p:cNvSpPr/>
+          <p:nvPr/>
+        </p:nvSpPr>
+        <p:spPr>
+          <a:xfrm>
+            <a:off x="3017043" y="4152901"/>
+            <a:ext cx="888206" cy="542924"/>
+          </a:xfrm>
+          <a:prstGeom prst="rightArrow">
+            <a:avLst/>
+          </a:prstGeom>
+        </p:spPr>
+        <p:style>
+          <a:lnRef idx="2">
+            <a:schemeClr val="accent1">
+              <a:shade val="50000"/>
+            </a:schemeClr>
+          </a:lnRef>
+          <a:fillRef idx="1">
+            <a:schemeClr val="accent1"/>
+          </a:fillRef>
+          <a:effectRef idx="0">
+            <a:schemeClr val="accent1"/>
+          </a:effectRef>
+          <a:fontRef idx="minor">
+            <a:schemeClr val="lt1"/>
+          </a:fontRef>
+        </p:style>
+        <p:txBody>
+          <a:bodyPr rtlCol="0" anchor="ctr"/>
+          <a:lstStyle/>
+          <a:p>
+            <a:pPr algn="ctr"/>
+            <a:endParaRPr lang="en-US"/>
+          </a:p>
+        </p:txBody>
+      </p:sp>
+      <p:sp>
+        <p:nvSpPr>
+          <p:cNvPr id="11" name="Right Arrow 10"/>
+          <p:cNvSpPr/>
+          <p:nvPr/>
+        </p:nvSpPr>
+        <p:spPr>
+          <a:xfrm>
+            <a:off x="7345986" y="4201207"/>
+            <a:ext cx="888206" cy="542924"/>
+          </a:xfrm>
+          <a:prstGeom prst="rightArrow">
+            <a:avLst/>
+          </a:prstGeom>
+        </p:spPr>
+        <p:style>
+          <a:lnRef idx="2">
+            <a:schemeClr val="accent1">
+              <a:shade val="50000"/>
+            </a:schemeClr>
+          </a:lnRef>
+          <a:fillRef idx="1">
+            <a:schemeClr val="accent1"/>
+          </a:fillRef>
+          <a:effectRef idx="0">
+            <a:schemeClr val="accent1"/>
+          </a:effectRef>
+          <a:fontRef idx="minor">
+            <a:schemeClr val="lt1"/>
+          </a:fontRef>
+        </p:style>
+        <p:txBody>
+          <a:bodyPr rtlCol="0" anchor="ctr"/>
+          <a:lstStyle/>
+          <a:p>
+            <a:pPr algn="ctr"/>
+            <a:endParaRPr lang="en-US"/>
+          </a:p>
+        </p:txBody>
+      </p:sp>
+      <p:sp>
+        <p:nvSpPr>
+          <p:cNvPr id="12" name="Parallelogram 11"/>
+          <p:cNvSpPr/>
+          <p:nvPr/>
+        </p:nvSpPr>
+        <p:spPr>
+          <a:xfrm rot="1920874">
+            <a:off x="2722231" y="2013385"/>
+            <a:ext cx="1959525" cy="1044864"/>
+          </a:xfrm>
+          <a:prstGeom prst="parallelogram">
+            <a:avLst>
+              <a:gd name="adj" fmla="val 21631"/>
+            </a:avLst>
+          </a:prstGeom>
+        </p:spPr>
+        <p:style>
+          <a:lnRef idx="1">
+            <a:schemeClr val="dk1"/>
+          </a:lnRef>
+          <a:fillRef idx="2">
+            <a:schemeClr val="dk1"/>
+          </a:fillRef>
+          <a:effectRef idx="1">
+            <a:schemeClr val="dk1"/>
+          </a:effectRef>
+          <a:fontRef idx="minor">
+            <a:schemeClr val="dk1"/>
+          </a:fontRef>
+        </p:style>
+        <p:txBody>
+          <a:bodyPr rtlCol="0" anchor="ctr"/>
+          <a:lstStyle/>
+          <a:p>
+            <a:pPr algn="ctr"/>
+            <a:endParaRPr lang="en-US"/>
+          </a:p>
+        </p:txBody>
+      </p:sp>
+      <p:sp>
+        <p:nvSpPr>
+          <p:cNvPr id="16" name="Explosion 1 15"/>
+          <p:cNvSpPr/>
+          <p:nvPr/>
+        </p:nvSpPr>
+        <p:spPr>
+          <a:xfrm>
+            <a:off x="5211588" y="2039107"/>
+            <a:ext cx="1438694" cy="1666081"/>
+          </a:xfrm>
+          <a:prstGeom prst="irregularSeal1">
+            <a:avLst/>
+          </a:prstGeom>
+        </p:spPr>
+        <p:style>
+          <a:lnRef idx="0">
+            <a:schemeClr val="accent3"/>
+          </a:lnRef>
+          <a:fillRef idx="3">
+            <a:schemeClr val="accent3"/>
+          </a:fillRef>
+          <a:effectRef idx="3">
+            <a:schemeClr val="accent3"/>
+          </a:effectRef>
+          <a:fontRef idx="minor">
+            <a:schemeClr val="lt1"/>
+          </a:fontRef>
+        </p:style>
+        <p:txBody>
+          <a:bodyPr rtlCol="0" anchor="ctr"/>
+          <a:lstStyle/>
+          <a:p>
+            <a:pPr algn="ctr"/>
+            <a:r>
+              <a:rPr lang="en-US" dirty="0"/>
+              <a:t>AST</a:t>
+            </a:r>
+          </a:p>
+        </p:txBody>
+      </p:sp>
+      <p:sp>
+        <p:nvSpPr>
+          <p:cNvPr id="17" name="Explosion 1 16"/>
+          <p:cNvSpPr/>
+          <p:nvPr/>
+        </p:nvSpPr>
+        <p:spPr>
+          <a:xfrm>
+            <a:off x="3997961" y="1251657"/>
+            <a:ext cx="1438694" cy="1666081"/>
+          </a:xfrm>
+          <a:prstGeom prst="irregularSeal1">
+            <a:avLst/>
+          </a:prstGeom>
+        </p:spPr>
+        <p:style>
+          <a:lnRef idx="0">
+            <a:schemeClr val="accent4"/>
+          </a:lnRef>
+          <a:fillRef idx="3">
+            <a:schemeClr val="accent4"/>
+          </a:fillRef>
+          <a:effectRef idx="3">
+            <a:schemeClr val="accent4"/>
+          </a:effectRef>
+          <a:fontRef idx="minor">
+            <a:schemeClr val="lt1"/>
+          </a:fontRef>
+        </p:style>
+        <p:txBody>
+          <a:bodyPr rtlCol="0" anchor="ctr"/>
+          <a:lstStyle/>
+          <a:p>
+            <a:pPr algn="ctr"/>
+            <a:r>
+              <a:rPr lang="en-US" dirty="0"/>
+              <a:t>AST</a:t>
+            </a:r>
+          </a:p>
+        </p:txBody>
+      </p:sp>
+      <p:sp>
+        <p:nvSpPr>
+          <p:cNvPr id="14" name="Explosion 1 13"/>
+          <p:cNvSpPr/>
+          <p:nvPr/>
+        </p:nvSpPr>
+        <p:spPr>
+          <a:xfrm>
+            <a:off x="6163957" y="1290639"/>
+            <a:ext cx="1438694" cy="1666081"/>
+          </a:xfrm>
+          <a:prstGeom prst="irregularSeal1">
+            <a:avLst/>
+          </a:prstGeom>
+        </p:spPr>
+        <p:style>
+          <a:lnRef idx="0">
+            <a:schemeClr val="accent6"/>
+          </a:lnRef>
+          <a:fillRef idx="3">
+            <a:schemeClr val="accent6"/>
+          </a:fillRef>
+          <a:effectRef idx="3">
+            <a:schemeClr val="accent6"/>
+          </a:effectRef>
+          <a:fontRef idx="minor">
+            <a:schemeClr val="lt1"/>
+          </a:fontRef>
+        </p:style>
+        <p:txBody>
+          <a:bodyPr rtlCol="0" anchor="ctr"/>
+          <a:lstStyle/>
+          <a:p>
+            <a:pPr algn="ctr"/>
+            <a:r>
+              <a:rPr lang="en-US" dirty="0"/>
+              <a:t>AST</a:t>
+            </a:r>
+          </a:p>
+        </p:txBody>
+      </p:sp>
+    </p:spTree>
+    <p:extLst>
+      <p:ext uri="{BB962C8B-B14F-4D97-AF65-F5344CB8AC3E}">
+        <p14:creationId xmlns:p14="http://schemas.microsoft.com/office/powerpoint/2010/main" val="3622419004"/>
+      </p:ext>
+    </p:extLst>
+  </p:cSld>
+  <p:clrMapOvr>
+    <a:masterClrMapping/>
+  </p:clrMapOvr>
+  <p:timing>
+    <p:tnLst>
+      <p:par>
+        <p:cTn id="1" dur="indefinite" restart="never" nodeType="tmRoot">
+          <p:childTnLst>
+            <p:seq concurrent="1" nextAc="seek">
+              <p:cTn id="2" dur="indefinite" nodeType="mainSeq">
+                <p:childTnLst>
+                  <p:par>
+                    <p:cTn id="3" fill="hold">
+                      <p:stCondLst>
+                        <p:cond delay="indefinite"/>
+                      </p:stCondLst>
+                      <p:childTnLst>
+                        <p:par>
+                          <p:cTn id="4" fill="hold">
+                            <p:stCondLst>
+                              <p:cond delay="0"/>
+                            </p:stCondLst>
+                            <p:childTnLst>
+                              <p:par>
+                                <p:cTn id="5" presetID="10" presetClass="entr" presetSubtype="0" fill="hold" grpId="0" nodeType="clickEffect">
+                                  <p:stCondLst>
+                                    <p:cond delay="0"/>
+                                  </p:stCondLst>
+                                  <p:childTnLst>
+                                    <p:set>
+                                      <p:cBhvr>
+                                        <p:cTn id="6" dur="1" fill="hold">
+                                          <p:stCondLst>
+                                            <p:cond delay="0"/>
+                                          </p:stCondLst>
+                                        </p:cTn>
+                                        <p:tgtEl>
+                                          <p:spTgt spid="12"/>
+                                        </p:tgtEl>
+                                        <p:attrNameLst>
+                                          <p:attrName>style.visibility</p:attrName>
+                                        </p:attrNameLst>
+                                      </p:cBhvr>
+                                      <p:to>
+                                        <p:strVal val="visible"/>
+                                      </p:to>
+                                    </p:set>
+                                    <p:animEffect transition="in" filter="fade">
+                                      <p:cBhvr>
+                                        <p:cTn id="7" dur="500"/>
+                                        <p:tgtEl>
+                                          <p:spTgt spid="12"/>
+                                        </p:tgtEl>
+                                      </p:cBhvr>
+                                    </p:animEffect>
+                                  </p:childTnLst>
+                                </p:cTn>
+                              </p:par>
+                            </p:childTnLst>
+                          </p:cTn>
+                        </p:par>
+                      </p:childTnLst>
+                    </p:cTn>
+                  </p:par>
+                  <p:par>
+                    <p:cTn id="8" fill="hold">
+                      <p:stCondLst>
+                        <p:cond delay="indefinite"/>
+                      </p:stCondLst>
+                      <p:childTnLst>
+                        <p:par>
+                          <p:cTn id="9" fill="hold">
+                            <p:stCondLst>
+                              <p:cond delay="0"/>
+                            </p:stCondLst>
+                            <p:childTnLst>
+                              <p:par>
+                                <p:cTn id="10" presetID="10" presetClass="entr" presetSubtype="0" fill="hold" grpId="0" nodeType="clickEffect">
+                                  <p:stCondLst>
+                                    <p:cond delay="0"/>
+                                  </p:stCondLst>
+                                  <p:childTnLst>
+                                    <p:set>
+                                      <p:cBhvr>
+                                        <p:cTn id="11" dur="1" fill="hold">
+                                          <p:stCondLst>
+                                            <p:cond delay="0"/>
+                                          </p:stCondLst>
+                                        </p:cTn>
+                                        <p:tgtEl>
+                                          <p:spTgt spid="17"/>
+                                        </p:tgtEl>
+                                        <p:attrNameLst>
+                                          <p:attrName>style.visibility</p:attrName>
+                                        </p:attrNameLst>
+                                      </p:cBhvr>
+                                      <p:to>
+                                        <p:strVal val="visible"/>
+                                      </p:to>
+                                    </p:set>
+                                    <p:animEffect transition="in" filter="fade">
+                                      <p:cBhvr>
+                                        <p:cTn id="12" dur="500"/>
+                                        <p:tgtEl>
+                                          <p:spTgt spid="17"/>
+                                        </p:tgtEl>
+                                      </p:cBhvr>
+                                    </p:animEffect>
+                                  </p:childTnLst>
+                                </p:cTn>
+                              </p:par>
+                            </p:childTnLst>
+                          </p:cTn>
+                        </p:par>
+                        <p:par>
+                          <p:cTn id="13" fill="hold">
+                            <p:stCondLst>
+                              <p:cond delay="500"/>
+                            </p:stCondLst>
+                            <p:childTnLst>
+                              <p:par>
+                                <p:cTn id="14" presetID="10" presetClass="entr" presetSubtype="0" fill="hold" grpId="0" nodeType="afterEffect">
+                                  <p:stCondLst>
+                                    <p:cond delay="0"/>
+                                  </p:stCondLst>
+                                  <p:childTnLst>
+                                    <p:set>
+                                      <p:cBhvr>
+                                        <p:cTn id="15" dur="1" fill="hold">
+                                          <p:stCondLst>
+                                            <p:cond delay="0"/>
+                                          </p:stCondLst>
+                                        </p:cTn>
+                                        <p:tgtEl>
+                                          <p:spTgt spid="16"/>
+                                        </p:tgtEl>
+                                        <p:attrNameLst>
+                                          <p:attrName>style.visibility</p:attrName>
+                                        </p:attrNameLst>
+                                      </p:cBhvr>
+                                      <p:to>
+                                        <p:strVal val="visible"/>
+                                      </p:to>
+                                    </p:set>
+                                    <p:animEffect transition="in" filter="fade">
+                                      <p:cBhvr>
+                                        <p:cTn id="16" dur="500"/>
+                                        <p:tgtEl>
+                                          <p:spTgt spid="16"/>
+                                        </p:tgtEl>
+                                      </p:cBhvr>
+                                    </p:animEffect>
+                                  </p:childTnLst>
+                                </p:cTn>
+                              </p:par>
+                            </p:childTnLst>
+                          </p:cTn>
+                        </p:par>
+                        <p:par>
+                          <p:cTn id="17" fill="hold">
+                            <p:stCondLst>
+                              <p:cond delay="1000"/>
+                            </p:stCondLst>
+                            <p:childTnLst>
+                              <p:par>
+                                <p:cTn id="18" presetID="10" presetClass="entr" presetSubtype="0" fill="hold" grpId="0" nodeType="afterEffect">
+                                  <p:stCondLst>
+                                    <p:cond delay="0"/>
+                                  </p:stCondLst>
+                                  <p:childTnLst>
+                                    <p:set>
+                                      <p:cBhvr>
+                                        <p:cTn id="19" dur="1" fill="hold">
+                                          <p:stCondLst>
+                                            <p:cond delay="0"/>
+                                          </p:stCondLst>
+                                        </p:cTn>
+                                        <p:tgtEl>
+                                          <p:spTgt spid="14"/>
+                                        </p:tgtEl>
+                                        <p:attrNameLst>
+                                          <p:attrName>style.visibility</p:attrName>
+                                        </p:attrNameLst>
+                                      </p:cBhvr>
+                                      <p:to>
+                                        <p:strVal val="visible"/>
+                                      </p:to>
+                                    </p:set>
+                                    <p:animEffect transition="in" filter="fade">
+                                      <p:cBhvr>
+                                        <p:cTn id="20" dur="500"/>
+                                        <p:tgtEl>
+                                          <p:spTgt spid="14"/>
+                                        </p:tgtEl>
+                                      </p:cBhvr>
+                                    </p:animEffect>
+                                  </p:childTnLst>
+                                </p:cTn>
+                              </p:par>
+                            </p:childTnLst>
+                          </p:cTn>
+                        </p:par>
+                      </p:childTnLst>
+                    </p:cTn>
+                  </p:par>
+                  <p:par>
+                    <p:cTn id="21" fill="hold">
+                      <p:stCondLst>
+                        <p:cond delay="indefinite"/>
+                      </p:stCondLst>
+                      <p:childTnLst>
+                        <p:par>
+                          <p:cTn id="22" fill="hold">
+                            <p:stCondLst>
+                              <p:cond delay="0"/>
+                            </p:stCondLst>
+                            <p:childTnLst>
+                              <p:par>
+                                <p:cTn id="23" presetID="42" presetClass="path" presetSubtype="0" accel="50000" decel="50000" fill="hold" grpId="0" nodeType="clickEffect">
+                                  <p:stCondLst>
+                                    <p:cond delay="0"/>
+                                  </p:stCondLst>
+                                  <p:childTnLst>
+                                    <p:animMotion origin="layout" path="M -0.01041 0.00926 L 0.16545 0.00926 " pathEditMode="relative" rAng="0" ptsTypes="AA">
+                                      <p:cBhvr>
+                                        <p:cTn id="24" dur="1000" fill="hold"/>
+                                        <p:tgtEl>
+                                          <p:spTgt spid="18"/>
+                                        </p:tgtEl>
+                                        <p:attrNameLst>
+                                          <p:attrName>ppt_x</p:attrName>
+                                          <p:attrName>ppt_y</p:attrName>
+                                        </p:attrNameLst>
+                                      </p:cBhvr>
+                                      <p:rCtr x="8785" y="0"/>
+                                    </p:animMotion>
+                                  </p:childTnLst>
+                                </p:cTn>
+                              </p:par>
+                            </p:childTnLst>
+                          </p:cTn>
+                        </p:par>
+                      </p:childTnLst>
+                    </p:cTn>
+                  </p:par>
+                </p:childTnLst>
+              </p:cTn>
+              <p:prevCondLst>
+                <p:cond evt="onPrev" delay="0">
+                  <p:tgtEl>
+                    <p:sldTgt/>
+                  </p:tgtEl>
+                </p:cond>
+              </p:prevCondLst>
+              <p:nextCondLst>
+                <p:cond evt="onNext" delay="0">
+                  <p:tgtEl>
+                    <p:sldTgt/>
+                  </p:tgtEl>
+                </p:cond>
+              </p:nextCondLst>
+            </p:seq>
+          </p:childTnLst>
+        </p:cTn>
+      </p:par>
+    </p:tnLst>
+    <p:bldLst>
+      <p:bldP spid="18" grpId="0" animBg="1"/>
+      <p:bldP spid="12" grpId="0" animBg="1"/>
+      <p:bldP spid="16" grpId="0" animBg="1"/>
+      <p:bldP spid="17" grpId="0" animBg="1"/>
+      <p:bldP spid="14" grpId="0" animBg="1"/>
+    </p:bldLst>
+  </p:timing>
+</p:sld>
+</file>
+
+<file path=ppt/slides/slide12.xml><?xml version="1.0" encoding="utf-8"?>
 <p:sld xmlns:a="http://schemas.openxmlformats.org/drawingml/2006/main" xmlns:r="http://schemas.openxmlformats.org/officeDocument/2006/relationships" xmlns:p="http://schemas.openxmlformats.org/presentationml/2006/main">
   <p:cSld>
     <p:spTree>
@@ -14567,6 +15235,638 @@
           <a:p>
             <a:r>
               <a:rPr lang="en-US" dirty="0"/>
+              <a:t>Building your own Diagnostic with Code Fix</a:t>
+            </a:r>
+          </a:p>
+        </p:txBody>
+      </p:sp>
+      <p:sp>
+        <p:nvSpPr>
+          <p:cNvPr id="4" name="Rectangle 1"/>
+          <p:cNvSpPr>
+            <a:spLocks noGrp="1" noChangeArrowheads="1"/>
+          </p:cNvSpPr>
+          <p:nvPr>
+            <p:ph idx="1"/>
+          </p:nvPr>
+        </p:nvSpPr>
+        <p:spPr bwMode="auto">
+          <a:xfrm>
+            <a:off x="1219200" y="2057400"/>
+            <a:ext cx="9296400" cy="3416320"/>
+          </a:xfrm>
+          <a:prstGeom prst="rect">
+            <a:avLst/>
+          </a:prstGeom>
+          <a:solidFill>
+            <a:srgbClr val="FFFFFF"/>
+          </a:solidFill>
+          <a:ln>
+            <a:noFill/>
+          </a:ln>
+          <a:effectLst/>
+          <a:extLst>
+            <a:ext uri="{91240B29-F687-4F45-9708-019B960494DF}">
+              <a14:hiddenLine xmlns:a14="http://schemas.microsoft.com/office/drawing/2010/main" w="9525">
+                <a:solidFill>
+                  <a:schemeClr val="tx1"/>
+                </a:solidFill>
+                <a:miter lim="800000"/>
+                <a:headEnd/>
+                <a:tailEnd/>
+              </a14:hiddenLine>
+            </a:ext>
+            <a:ext uri="{AF507438-7753-43E0-B8FC-AC1667EBCBE1}">
+              <a14:hiddenEffects xmlns:a14="http://schemas.microsoft.com/office/drawing/2010/main">
+                <a:effectLst>
+                  <a:outerShdw dist="35921" dir="2700000" algn="ctr" rotWithShape="0">
+                    <a:schemeClr val="bg2"/>
+                  </a:outerShdw>
+                </a:effectLst>
+              </a14:hiddenEffects>
+            </a:ext>
+          </a:extLst>
+        </p:spPr>
+        <p:txBody>
+          <a:bodyPr vert="horz" wrap="square" lIns="91440" tIns="45720" rIns="91440" bIns="45720" numCol="1" anchor="ctr" anchorCtr="0" compatLnSpc="1">
+            <a:prstTxWarp prst="textNoShape">
+              <a:avLst/>
+            </a:prstTxWarp>
+            <a:spAutoFit/>
+          </a:bodyPr>
+          <a:lstStyle/>
+          <a:p>
+            <a:pPr marL="0" marR="0" lvl="0" indent="0" algn="l" defTabSz="914400" rtl="0" eaLnBrk="0" fontAlgn="base" latinLnBrk="0" hangingPunct="0">
+              <a:lnSpc>
+                <a:spcPct val="100000"/>
+              </a:lnSpc>
+              <a:spcBef>
+                <a:spcPct val="0"/>
+              </a:spcBef>
+              <a:spcAft>
+                <a:spcPct val="0"/>
+              </a:spcAft>
+              <a:buClrTx/>
+              <a:buSzTx/>
+              <a:buFontTx/>
+              <a:buNone/>
+              <a:tabLst/>
+            </a:pPr>
+            <a:r>
+              <a:rPr kumimoji="0" lang="en-US" altLang="en-US" b="0" i="0" u="none" strike="noStrike" cap="none" normalizeH="0" baseline="0" dirty="0">
+                <a:ln>
+                  <a:noFill/>
+                </a:ln>
+                <a:solidFill>
+                  <a:srgbClr val="0000FF"/>
+                </a:solidFill>
+                <a:effectLst/>
+                <a:latin typeface="Consolas" panose="020B0609020204030204" pitchFamily="49" charset="0"/>
+              </a:rPr>
+              <a:t>public</a:t>
+            </a:r>
+            <a:r>
+              <a:rPr kumimoji="0" lang="en-US" altLang="en-US" b="0" i="0" u="none" strike="noStrike" cap="none" normalizeH="0" baseline="0" dirty="0">
+                <a:ln>
+                  <a:noFill/>
+                </a:ln>
+                <a:solidFill>
+                  <a:srgbClr val="000000"/>
+                </a:solidFill>
+                <a:effectLst/>
+                <a:latin typeface="Consolas" panose="020B0609020204030204" pitchFamily="49" charset="0"/>
+              </a:rPr>
+              <a:t> </a:t>
+            </a:r>
+            <a:r>
+              <a:rPr kumimoji="0" lang="en-US" altLang="en-US" b="0" i="0" u="none" strike="noStrike" cap="none" normalizeH="0" baseline="0" dirty="0">
+                <a:ln>
+                  <a:noFill/>
+                </a:ln>
+                <a:solidFill>
+                  <a:srgbClr val="0000FF"/>
+                </a:solidFill>
+                <a:effectLst/>
+                <a:latin typeface="Consolas" panose="020B0609020204030204" pitchFamily="49" charset="0"/>
+              </a:rPr>
+              <a:t>class</a:t>
+            </a:r>
+            <a:r>
+              <a:rPr kumimoji="0" lang="en-US" altLang="en-US" b="0" i="0" u="none" strike="noStrike" cap="none" normalizeH="0" baseline="0" dirty="0">
+                <a:ln>
+                  <a:noFill/>
+                </a:ln>
+                <a:solidFill>
+                  <a:srgbClr val="000000"/>
+                </a:solidFill>
+                <a:effectLst/>
+                <a:latin typeface="Consolas" panose="020B0609020204030204" pitchFamily="49" charset="0"/>
+              </a:rPr>
+              <a:t> </a:t>
+            </a:r>
+            <a:r>
+              <a:rPr kumimoji="0" lang="en-US" altLang="en-US" b="0" i="0" u="none" strike="noStrike" cap="none" normalizeH="0" baseline="0" dirty="0" err="1">
+                <a:ln>
+                  <a:noFill/>
+                </a:ln>
+                <a:solidFill>
+                  <a:srgbClr val="2B91AF"/>
+                </a:solidFill>
+                <a:effectLst/>
+                <a:latin typeface="Consolas" panose="020B0609020204030204" pitchFamily="49" charset="0"/>
+              </a:rPr>
+              <a:t>TestControllerMisnamed</a:t>
+            </a:r>
+            <a:r>
+              <a:rPr kumimoji="0" lang="en-US" altLang="en-US" b="0" i="0" u="none" strike="noStrike" cap="none" normalizeH="0" baseline="0" dirty="0">
+                <a:ln>
+                  <a:noFill/>
+                </a:ln>
+                <a:solidFill>
+                  <a:srgbClr val="000000"/>
+                </a:solidFill>
+                <a:effectLst/>
+                <a:latin typeface="Consolas" panose="020B0609020204030204" pitchFamily="49" charset="0"/>
+              </a:rPr>
+              <a:t> : </a:t>
+            </a:r>
+            <a:r>
+              <a:rPr kumimoji="0" lang="en-US" altLang="en-US" b="0" i="0" u="none" strike="noStrike" cap="none" normalizeH="0" baseline="0" dirty="0">
+                <a:ln>
+                  <a:noFill/>
+                </a:ln>
+                <a:solidFill>
+                  <a:srgbClr val="2B91AF"/>
+                </a:solidFill>
+                <a:effectLst/>
+                <a:latin typeface="Consolas" panose="020B0609020204030204" pitchFamily="49" charset="0"/>
+              </a:rPr>
+              <a:t>Controller</a:t>
+            </a:r>
+            <a:r>
+              <a:rPr kumimoji="0" lang="en-US" altLang="en-US" b="0" i="0" u="none" strike="noStrike" cap="none" normalizeH="0" baseline="0" dirty="0">
+                <a:ln>
+                  <a:noFill/>
+                </a:ln>
+                <a:solidFill>
+                  <a:srgbClr val="000000"/>
+                </a:solidFill>
+                <a:effectLst/>
+                <a:latin typeface="Consolas" panose="020B0609020204030204" pitchFamily="49" charset="0"/>
+              </a:rPr>
+              <a:t> </a:t>
+            </a:r>
+          </a:p>
+          <a:p>
+            <a:pPr marL="0" marR="0" lvl="0" indent="0" algn="l" defTabSz="914400" rtl="0" eaLnBrk="0" fontAlgn="base" latinLnBrk="0" hangingPunct="0">
+              <a:lnSpc>
+                <a:spcPct val="100000"/>
+              </a:lnSpc>
+              <a:spcBef>
+                <a:spcPct val="0"/>
+              </a:spcBef>
+              <a:spcAft>
+                <a:spcPct val="0"/>
+              </a:spcAft>
+              <a:buClrTx/>
+              <a:buSzTx/>
+              <a:buFontTx/>
+              <a:buNone/>
+              <a:tabLst/>
+            </a:pPr>
+            <a:r>
+              <a:rPr kumimoji="0" lang="en-US" altLang="en-US" b="0" i="0" u="none" strike="noStrike" cap="none" normalizeH="0" baseline="0" dirty="0">
+                <a:ln>
+                  <a:noFill/>
+                </a:ln>
+                <a:solidFill>
+                  <a:srgbClr val="000000"/>
+                </a:solidFill>
+                <a:effectLst/>
+                <a:latin typeface="Consolas" panose="020B0609020204030204" pitchFamily="49" charset="0"/>
+              </a:rPr>
+              <a:t>{     </a:t>
+            </a:r>
+          </a:p>
+          <a:p>
+            <a:pPr marL="0" marR="0" lvl="0" indent="0" algn="l" defTabSz="914400" rtl="0" eaLnBrk="0" fontAlgn="base" latinLnBrk="0" hangingPunct="0">
+              <a:lnSpc>
+                <a:spcPct val="100000"/>
+              </a:lnSpc>
+              <a:spcBef>
+                <a:spcPct val="0"/>
+              </a:spcBef>
+              <a:spcAft>
+                <a:spcPct val="0"/>
+              </a:spcAft>
+              <a:buClrTx/>
+              <a:buSzTx/>
+              <a:buFontTx/>
+              <a:buNone/>
+              <a:tabLst/>
+            </a:pPr>
+            <a:r>
+              <a:rPr lang="en-US" altLang="en-US" dirty="0">
+                <a:solidFill>
+                  <a:srgbClr val="0000FF"/>
+                </a:solidFill>
+                <a:latin typeface="Consolas" panose="020B0609020204030204" pitchFamily="49" charset="0"/>
+              </a:rPr>
+              <a:t>     </a:t>
+            </a:r>
+            <a:r>
+              <a:rPr kumimoji="0" lang="en-US" altLang="en-US" b="0" i="0" u="none" strike="noStrike" cap="none" normalizeH="0" baseline="0" dirty="0">
+                <a:ln>
+                  <a:noFill/>
+                </a:ln>
+                <a:solidFill>
+                  <a:srgbClr val="0000FF"/>
+                </a:solidFill>
+                <a:effectLst/>
+                <a:latin typeface="Consolas" panose="020B0609020204030204" pitchFamily="49" charset="0"/>
+              </a:rPr>
+              <a:t>public</a:t>
+            </a:r>
+            <a:r>
+              <a:rPr kumimoji="0" lang="en-US" altLang="en-US" b="0" i="0" u="none" strike="noStrike" cap="none" normalizeH="0" baseline="0" dirty="0">
+                <a:ln>
+                  <a:noFill/>
+                </a:ln>
+                <a:solidFill>
+                  <a:srgbClr val="000000"/>
+                </a:solidFill>
+                <a:effectLst/>
+                <a:latin typeface="Consolas" panose="020B0609020204030204" pitchFamily="49" charset="0"/>
+              </a:rPr>
+              <a:t> </a:t>
+            </a:r>
+            <a:r>
+              <a:rPr kumimoji="0" lang="en-US" altLang="en-US" b="0" i="0" u="none" strike="noStrike" cap="none" normalizeH="0" baseline="0" dirty="0" err="1">
+                <a:ln>
+                  <a:noFill/>
+                </a:ln>
+                <a:solidFill>
+                  <a:srgbClr val="000000"/>
+                </a:solidFill>
+                <a:effectLst/>
+                <a:latin typeface="Consolas" panose="020B0609020204030204" pitchFamily="49" charset="0"/>
+              </a:rPr>
+              <a:t>TestControllerMisnamed</a:t>
+            </a:r>
+            <a:r>
+              <a:rPr kumimoji="0" lang="en-US" altLang="en-US" b="0" i="0" u="none" strike="noStrike" cap="none" normalizeH="0" baseline="0" dirty="0">
+                <a:ln>
+                  <a:noFill/>
+                </a:ln>
+                <a:solidFill>
+                  <a:srgbClr val="000000"/>
+                </a:solidFill>
+                <a:effectLst/>
+                <a:latin typeface="Consolas" panose="020B0609020204030204" pitchFamily="49" charset="0"/>
+              </a:rPr>
+              <a:t>() {}</a:t>
+            </a:r>
+          </a:p>
+          <a:p>
+            <a:pPr marL="0" marR="0" lvl="0" indent="0" algn="l" defTabSz="914400" rtl="0" eaLnBrk="0" fontAlgn="base" latinLnBrk="0" hangingPunct="0">
+              <a:lnSpc>
+                <a:spcPct val="100000"/>
+              </a:lnSpc>
+              <a:spcBef>
+                <a:spcPct val="0"/>
+              </a:spcBef>
+              <a:spcAft>
+                <a:spcPct val="0"/>
+              </a:spcAft>
+              <a:buClrTx/>
+              <a:buSzTx/>
+              <a:buFontTx/>
+              <a:buNone/>
+              <a:tabLst/>
+            </a:pPr>
+            <a:endParaRPr lang="en-US" altLang="en-US" dirty="0">
+              <a:solidFill>
+                <a:srgbClr val="000000"/>
+              </a:solidFill>
+              <a:latin typeface="Consolas" panose="020B0609020204030204" pitchFamily="49" charset="0"/>
+            </a:endParaRPr>
+          </a:p>
+          <a:p>
+            <a:pPr marL="0" marR="0" lvl="0" indent="0" algn="l" defTabSz="914400" rtl="0" eaLnBrk="0" fontAlgn="base" latinLnBrk="0" hangingPunct="0">
+              <a:lnSpc>
+                <a:spcPct val="100000"/>
+              </a:lnSpc>
+              <a:spcBef>
+                <a:spcPct val="0"/>
+              </a:spcBef>
+              <a:spcAft>
+                <a:spcPct val="0"/>
+              </a:spcAft>
+              <a:buClrTx/>
+              <a:buSzTx/>
+              <a:buFontTx/>
+              <a:buNone/>
+              <a:tabLst/>
+            </a:pPr>
+            <a:r>
+              <a:rPr kumimoji="0" lang="en-US" altLang="en-US" b="0" i="0" u="none" strike="noStrike" cap="none" normalizeH="0" baseline="0" dirty="0">
+                <a:ln>
+                  <a:noFill/>
+                </a:ln>
+                <a:solidFill>
+                  <a:srgbClr val="000000"/>
+                </a:solidFill>
+                <a:effectLst/>
+                <a:latin typeface="Consolas" panose="020B0609020204030204" pitchFamily="49" charset="0"/>
+              </a:rPr>
+              <a:t>     </a:t>
+            </a:r>
+            <a:r>
+              <a:rPr kumimoji="0" lang="en-US" altLang="en-US" b="0" i="0" u="none" strike="noStrike" cap="none" normalizeH="0" baseline="0" dirty="0">
+                <a:ln>
+                  <a:noFill/>
+                </a:ln>
+                <a:solidFill>
+                  <a:srgbClr val="0000FF"/>
+                </a:solidFill>
+                <a:effectLst/>
+                <a:latin typeface="Consolas" panose="020B0609020204030204" pitchFamily="49" charset="0"/>
+              </a:rPr>
+              <a:t>public</a:t>
+            </a:r>
+            <a:r>
+              <a:rPr kumimoji="0" lang="en-US" altLang="en-US" b="0" i="0" u="none" strike="noStrike" cap="none" normalizeH="0" baseline="0" dirty="0">
+                <a:ln>
+                  <a:noFill/>
+                </a:ln>
+                <a:solidFill>
+                  <a:srgbClr val="000000"/>
+                </a:solidFill>
+                <a:effectLst/>
+                <a:latin typeface="Consolas" panose="020B0609020204030204" pitchFamily="49" charset="0"/>
+              </a:rPr>
+              <a:t> </a:t>
+            </a:r>
+            <a:r>
+              <a:rPr kumimoji="0" lang="en-US" altLang="en-US" b="0" i="0" u="none" strike="noStrike" cap="none" normalizeH="0" baseline="0" dirty="0" err="1">
+                <a:ln>
+                  <a:noFill/>
+                </a:ln>
+                <a:solidFill>
+                  <a:srgbClr val="2B91AF"/>
+                </a:solidFill>
+                <a:effectLst/>
+                <a:latin typeface="Consolas" panose="020B0609020204030204" pitchFamily="49" charset="0"/>
+              </a:rPr>
+              <a:t>ActionResult</a:t>
+            </a:r>
+            <a:r>
+              <a:rPr kumimoji="0" lang="en-US" altLang="en-US" b="0" i="0" u="none" strike="noStrike" cap="none" normalizeH="0" baseline="0" dirty="0">
+                <a:ln>
+                  <a:noFill/>
+                </a:ln>
+                <a:solidFill>
+                  <a:srgbClr val="000000"/>
+                </a:solidFill>
+                <a:effectLst/>
+                <a:latin typeface="Consolas" panose="020B0609020204030204" pitchFamily="49" charset="0"/>
+              </a:rPr>
+              <a:t> Index()</a:t>
+            </a:r>
+          </a:p>
+          <a:p>
+            <a:pPr marL="0" marR="0" lvl="0" indent="0" algn="l" defTabSz="914400" rtl="0" eaLnBrk="0" fontAlgn="base" latinLnBrk="0" hangingPunct="0">
+              <a:lnSpc>
+                <a:spcPct val="100000"/>
+              </a:lnSpc>
+              <a:spcBef>
+                <a:spcPct val="0"/>
+              </a:spcBef>
+              <a:spcAft>
+                <a:spcPct val="0"/>
+              </a:spcAft>
+              <a:buClrTx/>
+              <a:buSzTx/>
+              <a:buFontTx/>
+              <a:buNone/>
+              <a:tabLst/>
+            </a:pPr>
+            <a:r>
+              <a:rPr kumimoji="0" lang="en-US" altLang="en-US" b="0" i="0" u="none" strike="noStrike" cap="none" normalizeH="0" baseline="0" dirty="0">
+                <a:ln>
+                  <a:noFill/>
+                </a:ln>
+                <a:solidFill>
+                  <a:srgbClr val="000000"/>
+                </a:solidFill>
+                <a:effectLst/>
+                <a:latin typeface="Consolas" panose="020B0609020204030204" pitchFamily="49" charset="0"/>
+              </a:rPr>
+              <a:t>     {</a:t>
+            </a:r>
+          </a:p>
+          <a:p>
+            <a:pPr marL="0" marR="0" lvl="0" indent="0" algn="l" defTabSz="914400" rtl="0" eaLnBrk="0" fontAlgn="base" latinLnBrk="0" hangingPunct="0">
+              <a:lnSpc>
+                <a:spcPct val="100000"/>
+              </a:lnSpc>
+              <a:spcBef>
+                <a:spcPct val="0"/>
+              </a:spcBef>
+              <a:spcAft>
+                <a:spcPct val="0"/>
+              </a:spcAft>
+              <a:buClrTx/>
+              <a:buSzTx/>
+              <a:buFontTx/>
+              <a:buNone/>
+              <a:tabLst/>
+            </a:pPr>
+            <a:r>
+              <a:rPr kumimoji="0" lang="en-US" altLang="en-US" b="0" i="0" u="none" strike="noStrike" cap="none" normalizeH="0" baseline="0" dirty="0">
+                <a:ln>
+                  <a:noFill/>
+                </a:ln>
+                <a:solidFill>
+                  <a:srgbClr val="000000"/>
+                </a:solidFill>
+                <a:effectLst/>
+                <a:latin typeface="Consolas" panose="020B0609020204030204" pitchFamily="49" charset="0"/>
+              </a:rPr>
+              <a:t>         </a:t>
+            </a:r>
+            <a:r>
+              <a:rPr kumimoji="0" lang="en-US" altLang="en-US" b="0" i="0" u="none" strike="noStrike" cap="none" normalizeH="0" baseline="0" dirty="0">
+                <a:ln>
+                  <a:noFill/>
+                </a:ln>
+                <a:solidFill>
+                  <a:srgbClr val="0000FF"/>
+                </a:solidFill>
+                <a:effectLst/>
+                <a:latin typeface="Consolas" panose="020B0609020204030204" pitchFamily="49" charset="0"/>
+              </a:rPr>
+              <a:t>return</a:t>
+            </a:r>
+            <a:r>
+              <a:rPr kumimoji="0" lang="en-US" altLang="en-US" b="0" i="0" u="none" strike="noStrike" cap="none" normalizeH="0" baseline="0" dirty="0">
+                <a:ln>
+                  <a:noFill/>
+                </a:ln>
+                <a:solidFill>
+                  <a:srgbClr val="000000"/>
+                </a:solidFill>
+                <a:effectLst/>
+                <a:latin typeface="Consolas" panose="020B0609020204030204" pitchFamily="49" charset="0"/>
+              </a:rPr>
+              <a:t> View();</a:t>
+            </a:r>
+          </a:p>
+          <a:p>
+            <a:pPr marL="0" marR="0" lvl="0" indent="0" algn="l" defTabSz="914400" rtl="0" eaLnBrk="0" fontAlgn="base" latinLnBrk="0" hangingPunct="0">
+              <a:lnSpc>
+                <a:spcPct val="100000"/>
+              </a:lnSpc>
+              <a:spcBef>
+                <a:spcPct val="0"/>
+              </a:spcBef>
+              <a:spcAft>
+                <a:spcPct val="0"/>
+              </a:spcAft>
+              <a:buClrTx/>
+              <a:buSzTx/>
+              <a:buFontTx/>
+              <a:buNone/>
+              <a:tabLst/>
+            </a:pPr>
+            <a:r>
+              <a:rPr kumimoji="0" lang="en-US" altLang="en-US" b="0" i="0" u="none" strike="noStrike" cap="none" normalizeH="0" baseline="0" dirty="0">
+                <a:ln>
+                  <a:noFill/>
+                </a:ln>
+                <a:solidFill>
+                  <a:srgbClr val="000000"/>
+                </a:solidFill>
+                <a:effectLst/>
+                <a:latin typeface="Consolas" panose="020B0609020204030204" pitchFamily="49" charset="0"/>
+              </a:rPr>
+              <a:t>     }</a:t>
+            </a:r>
+          </a:p>
+          <a:p>
+            <a:pPr marL="0" marR="0" lvl="0" indent="0" algn="l" defTabSz="914400" rtl="0" eaLnBrk="0" fontAlgn="base" latinLnBrk="0" hangingPunct="0">
+              <a:lnSpc>
+                <a:spcPct val="100000"/>
+              </a:lnSpc>
+              <a:spcBef>
+                <a:spcPct val="0"/>
+              </a:spcBef>
+              <a:spcAft>
+                <a:spcPct val="0"/>
+              </a:spcAft>
+              <a:buClrTx/>
+              <a:buSzTx/>
+              <a:buFontTx/>
+              <a:buNone/>
+              <a:tabLst/>
+            </a:pPr>
+            <a:r>
+              <a:rPr kumimoji="0" lang="en-US" altLang="en-US" b="0" i="0" u="none" strike="noStrike" cap="none" normalizeH="0" baseline="0" dirty="0">
+                <a:ln>
+                  <a:noFill/>
+                </a:ln>
+                <a:solidFill>
+                  <a:srgbClr val="000000"/>
+                </a:solidFill>
+                <a:effectLst/>
+                <a:latin typeface="Consolas" panose="020B0609020204030204" pitchFamily="49" charset="0"/>
+              </a:rPr>
+              <a:t>}</a:t>
+            </a:r>
+            <a:endParaRPr kumimoji="0" lang="en-US" altLang="en-US" b="0" i="0" u="none" strike="noStrike" cap="none" normalizeH="0" baseline="0" dirty="0">
+              <a:ln>
+                <a:noFill/>
+              </a:ln>
+              <a:solidFill>
+                <a:schemeClr val="tx1"/>
+              </a:solidFill>
+              <a:effectLst/>
+              <a:latin typeface="Arial" panose="020B0604020202020204" pitchFamily="34" charset="0"/>
+            </a:endParaRPr>
+          </a:p>
+        </p:txBody>
+      </p:sp>
+    </p:spTree>
+    <p:extLst>
+      <p:ext uri="{BB962C8B-B14F-4D97-AF65-F5344CB8AC3E}">
+        <p14:creationId xmlns:p14="http://schemas.microsoft.com/office/powerpoint/2010/main" val="2943269631"/>
+      </p:ext>
+    </p:extLst>
+  </p:cSld>
+  <p:clrMapOvr>
+    <a:masterClrMapping/>
+  </p:clrMapOvr>
+</p:sld>
+</file>
+
+<file path=ppt/slides/slide13.xml><?xml version="1.0" encoding="utf-8"?>
+<p:sld xmlns:a="http://schemas.openxmlformats.org/drawingml/2006/main" xmlns:r="http://schemas.openxmlformats.org/officeDocument/2006/relationships" xmlns:p="http://schemas.openxmlformats.org/presentationml/2006/main">
+  <p:cSld>
+    <p:spTree>
+      <p:nvGrpSpPr>
+        <p:cNvPr id="1" name=""/>
+        <p:cNvGrpSpPr/>
+        <p:nvPr/>
+      </p:nvGrpSpPr>
+      <p:grpSpPr>
+        <a:xfrm>
+          <a:off x="0" y="0"/>
+          <a:ext cx="0" cy="0"/>
+          <a:chOff x="0" y="0"/>
+          <a:chExt cx="0" cy="0"/>
+        </a:xfrm>
+      </p:grpSpPr>
+      <p:pic>
+        <p:nvPicPr>
+          <p:cNvPr id="7" name="Picture 6"/>
+          <p:cNvPicPr>
+            <a:picLocks noChangeAspect="1"/>
+          </p:cNvPicPr>
+          <p:nvPr/>
+        </p:nvPicPr>
+        <p:blipFill>
+          <a:blip r:embed="rId2"/>
+          <a:stretch>
+            <a:fillRect/>
+          </a:stretch>
+        </p:blipFill>
+        <p:spPr>
+          <a:xfrm>
+            <a:off x="1808095" y="2451673"/>
+            <a:ext cx="8557843" cy="2932744"/>
+          </a:xfrm>
+          <a:prstGeom prst="rect">
+            <a:avLst/>
+          </a:prstGeom>
+        </p:spPr>
+      </p:pic>
+      <p:sp>
+        <p:nvSpPr>
+          <p:cNvPr id="2" name="Title 1"/>
+          <p:cNvSpPr>
+            <a:spLocks noGrp="1"/>
+          </p:cNvSpPr>
+          <p:nvPr>
+            <p:ph type="title"/>
+          </p:nvPr>
+        </p:nvSpPr>
+        <p:spPr/>
+        <p:txBody>
+          <a:bodyPr/>
+          <a:lstStyle/>
+          <a:p>
+            <a:r>
+              <a:rPr lang="en-US" dirty="0"/>
               <a:t>Building your own Fix</a:t>
             </a:r>
           </a:p>
@@ -14633,7 +15933,7 @@
           <p:nvPr/>
         </p:nvPicPr>
         <p:blipFill>
-          <a:blip r:embed="rId2"/>
+          <a:blip r:embed="rId3"/>
           <a:stretch>
             <a:fillRect/>
           </a:stretch>
@@ -14659,7 +15959,7 @@
           </p:nvPr>
         </p:nvPicPr>
         <p:blipFill>
-          <a:blip r:embed="rId3"/>
+          <a:blip r:embed="rId4"/>
           <a:stretch>
             <a:fillRect/>
           </a:stretch>
@@ -15943,7 +17243,7 @@
                             </p:stCondLst>
                             <p:childTnLst>
                               <p:par>
-                                <p:cTn id="5" presetID="10" presetClass="entr" presetSubtype="0" fill="hold" nodeType="clickEffect">
+                                <p:cTn id="5" presetID="1" presetClass="entr" presetSubtype="0" fill="hold" nodeType="clickEffect">
                                   <p:stCondLst>
                                     <p:cond delay="0"/>
                                   </p:stCondLst>
@@ -15951,6 +17251,51 @@
                                     <p:set>
                                       <p:cBhvr>
                                         <p:cTn id="6" dur="1" fill="hold">
+                                          <p:stCondLst>
+                                            <p:cond delay="0"/>
+                                          </p:stCondLst>
+                                        </p:cTn>
+                                        <p:tgtEl>
+                                          <p:spTgt spid="7"/>
+                                        </p:tgtEl>
+                                        <p:attrNameLst>
+                                          <p:attrName>style.visibility</p:attrName>
+                                        </p:attrNameLst>
+                                      </p:cBhvr>
+                                      <p:to>
+                                        <p:strVal val="visible"/>
+                                      </p:to>
+                                    </p:set>
+                                  </p:childTnLst>
+                                </p:cTn>
+                              </p:par>
+                            </p:childTnLst>
+                          </p:cTn>
+                        </p:par>
+                      </p:childTnLst>
+                    </p:cTn>
+                  </p:par>
+                  <p:par>
+                    <p:cTn id="7" fill="hold">
+                      <p:stCondLst>
+                        <p:cond delay="indefinite"/>
+                      </p:stCondLst>
+                      <p:childTnLst>
+                        <p:par>
+                          <p:cTn id="8" fill="hold">
+                            <p:stCondLst>
+                              <p:cond delay="0"/>
+                            </p:stCondLst>
+                            <p:childTnLst>
+                              <p:par>
+                                <p:cTn id="9" presetID="10" presetClass="entr" presetSubtype="0" fill="hold" nodeType="clickEffect">
+                                  <p:stCondLst>
+                                    <p:cond delay="0"/>
+                                  </p:stCondLst>
+                                  <p:childTnLst>
+                                    <p:set>
+                                      <p:cBhvr>
+                                        <p:cTn id="10" dur="1" fill="hold">
                                           <p:stCondLst>
                                             <p:cond delay="0"/>
                                           </p:stCondLst>
@@ -15968,7 +17313,7 @@
                                     </p:set>
                                     <p:animEffect transition="in" filter="fade">
                                       <p:cBhvr>
-                                        <p:cTn id="7" dur="500"/>
+                                        <p:cTn id="11" dur="500"/>
                                         <p:tgtEl>
                                           <p:spTgt spid="6"/>
                                         </p:tgtEl>
@@ -15978,14 +17323,14 @@
                                 </p:cTn>
                               </p:par>
                               <p:par>
-                                <p:cTn id="8" presetID="2" presetClass="entr" presetSubtype="1" fill="hold" grpId="0" nodeType="withEffect">
+                                <p:cTn id="12" presetID="2" presetClass="entr" presetSubtype="1" fill="hold" grpId="0" nodeType="withEffect">
                                   <p:stCondLst>
                                     <p:cond delay="0"/>
                                   </p:stCondLst>
                                   <p:childTnLst>
                                     <p:set>
                                       <p:cBhvr>
-                                        <p:cTn id="9" dur="1" fill="hold">
+                                        <p:cTn id="13" dur="1" fill="hold">
                                           <p:stCondLst>
                                             <p:cond delay="0"/>
                                           </p:stCondLst>
@@ -16003,7 +17348,7 @@
                                     </p:set>
                                     <p:anim calcmode="lin" valueType="num">
                                       <p:cBhvr additive="base">
-                                        <p:cTn id="10" dur="500" fill="hold"/>
+                                        <p:cTn id="14" dur="500" fill="hold"/>
                                         <p:tgtEl>
                                           <p:spTgt spid="8"/>
                                         </p:tgtEl>
@@ -16026,7 +17371,7 @@
                                     </p:anim>
                                     <p:anim calcmode="lin" valueType="num">
                                       <p:cBhvr additive="base">
-                                        <p:cTn id="11" dur="500" fill="hold"/>
+                                        <p:cTn id="15" dur="500" fill="hold"/>
                                         <p:tgtEl>
                                           <p:spTgt spid="8"/>
                                         </p:tgtEl>
@@ -16057,26 +17402,26 @@
                     </p:cTn>
                   </p:par>
                   <p:par>
-                    <p:cTn id="12" fill="hold">
+                    <p:cTn id="16" fill="hold">
                       <p:stCondLst>
                         <p:cond delay="indefinite"/>
                       </p:stCondLst>
                       <p:childTnLst>
                         <p:par>
-                          <p:cTn id="13" fill="hold">
+                          <p:cTn id="17" fill="hold">
                             <p:stCondLst>
                               <p:cond delay="0"/>
                             </p:stCondLst>
                             <p:childTnLst>
                               <p:par>
-                                <p:cTn id="14" presetID="2" presetClass="entr" presetSubtype="4" fill="hold" nodeType="clickEffect">
+                                <p:cTn id="18" presetID="2" presetClass="entr" presetSubtype="4" fill="hold" nodeType="clickEffect">
                                   <p:stCondLst>
                                     <p:cond delay="0"/>
                                   </p:stCondLst>
                                   <p:childTnLst>
                                     <p:set>
                                       <p:cBhvr>
-                                        <p:cTn id="15" dur="1" fill="hold">
+                                        <p:cTn id="19" dur="1" fill="hold">
                                           <p:stCondLst>
                                             <p:cond delay="0"/>
                                           </p:stCondLst>
@@ -16094,7 +17439,7 @@
                                     </p:set>
                                     <p:anim calcmode="lin" valueType="num">
                                       <p:cBhvr additive="base">
-                                        <p:cTn id="16" dur="500" fill="hold"/>
+                                        <p:cTn id="20" dur="500" fill="hold"/>
                                         <p:tgtEl>
                                           <p:spTgt spid="4"/>
                                         </p:tgtEl>
@@ -16117,7 +17462,7 @@
                                     </p:anim>
                                     <p:anim calcmode="lin" valueType="num">
                                       <p:cBhvr additive="base">
-                                        <p:cTn id="17" dur="500" fill="hold"/>
+                                        <p:cTn id="21" dur="500" fill="hold"/>
                                         <p:tgtEl>
                                           <p:spTgt spid="4"/>
                                         </p:tgtEl>
@@ -16148,26 +17493,26 @@
                     </p:cTn>
                   </p:par>
                   <p:par>
-                    <p:cTn id="18" fill="hold">
+                    <p:cTn id="22" fill="hold">
                       <p:stCondLst>
                         <p:cond delay="indefinite"/>
                       </p:stCondLst>
                       <p:childTnLst>
                         <p:par>
-                          <p:cTn id="19" fill="hold">
+                          <p:cTn id="23" fill="hold">
                             <p:stCondLst>
                               <p:cond delay="0"/>
                             </p:stCondLst>
                             <p:childTnLst>
                               <p:par>
-                                <p:cTn id="20" presetID="2" presetClass="entr" presetSubtype="4" fill="hold" grpId="0" nodeType="clickEffect">
+                                <p:cTn id="24" presetID="2" presetClass="entr" presetSubtype="4" fill="hold" grpId="0" nodeType="clickEffect">
                                   <p:stCondLst>
                                     <p:cond delay="0"/>
                                   </p:stCondLst>
                                   <p:childTnLst>
                                     <p:set>
                                       <p:cBhvr>
-                                        <p:cTn id="21" dur="1" fill="hold">
+                                        <p:cTn id="25" dur="1" fill="hold">
                                           <p:stCondLst>
                                             <p:cond delay="0"/>
                                           </p:stCondLst>
@@ -16185,7 +17530,7 @@
                                     </p:set>
                                     <p:anim calcmode="lin" valueType="num">
                                       <p:cBhvr additive="base">
-                                        <p:cTn id="22" dur="500" fill="hold"/>
+                                        <p:cTn id="26" dur="500" fill="hold"/>
                                         <p:tgtEl>
                                           <p:spTgt spid="3"/>
                                         </p:tgtEl>
@@ -16208,7 +17553,7 @@
                                     </p:anim>
                                     <p:anim calcmode="lin" valueType="num">
                                       <p:cBhvr additive="base">
-                                        <p:cTn id="23" dur="500" fill="hold"/>
+                                        <p:cTn id="27" dur="500" fill="hold"/>
                                         <p:tgtEl>
                                           <p:spTgt spid="3"/>
                                         </p:tgtEl>
@@ -16233,14 +17578,14 @@
                                 </p:cTn>
                               </p:par>
                               <p:par>
-                                <p:cTn id="24" presetID="10" presetClass="exit" presetSubtype="0" fill="hold" grpId="1" nodeType="withEffect">
+                                <p:cTn id="28" presetID="10" presetClass="exit" presetSubtype="0" fill="hold" grpId="1" nodeType="withEffect">
                                   <p:stCondLst>
                                     <p:cond delay="0"/>
                                   </p:stCondLst>
                                   <p:childTnLst>
                                     <p:animEffect transition="out" filter="fade">
                                       <p:cBhvr>
-                                        <p:cTn id="25" dur="500"/>
+                                        <p:cTn id="29" dur="500"/>
                                         <p:tgtEl>
                                           <p:spTgt spid="8"/>
                                         </p:tgtEl>
@@ -16248,7 +17593,7 @@
                                     </p:animEffect>
                                     <p:set>
                                       <p:cBhvr>
-                                        <p:cTn id="26" dur="1" fill="hold">
+                                        <p:cTn id="30" dur="1" fill="hold">
                                           <p:stCondLst>
                                             <p:cond delay="499"/>
                                           </p:stCondLst>
@@ -16303,7 +17648,7 @@
 </p:sld>
 </file>
 
-<file path=ppt/slides/slide12.xml><?xml version="1.0" encoding="utf-8"?>
+<file path=ppt/slides/slide14.xml><?xml version="1.0" encoding="utf-8"?>
 <p:sld xmlns:a="http://schemas.openxmlformats.org/drawingml/2006/main" xmlns:r="http://schemas.openxmlformats.org/officeDocument/2006/relationships" xmlns:p="http://schemas.openxmlformats.org/presentationml/2006/main">
   <p:cSld>
     <p:spTree>
@@ -18112,7 +19457,7 @@
 </p:sld>
 </file>
 
-<file path=ppt/slides/slide13.xml><?xml version="1.0" encoding="utf-8"?>
+<file path=ppt/slides/slide15.xml><?xml version="1.0" encoding="utf-8"?>
 <p:sld xmlns:a="http://schemas.openxmlformats.org/drawingml/2006/main" xmlns:r="http://schemas.openxmlformats.org/officeDocument/2006/relationships" xmlns:p="http://schemas.openxmlformats.org/presentationml/2006/main">
   <p:cSld>
     <p:spTree>
@@ -21496,7 +22841,7 @@
 </p:sld>
 </file>
 
-<file path=ppt/slides/slide14.xml><?xml version="1.0" encoding="utf-8"?>
+<file path=ppt/slides/slide16.xml><?xml version="1.0" encoding="utf-8"?>
 <p:sld xmlns:a="http://schemas.openxmlformats.org/drawingml/2006/main" xmlns:r="http://schemas.openxmlformats.org/officeDocument/2006/relationships" xmlns:p="http://schemas.openxmlformats.org/presentationml/2006/main">
   <p:cSld>
     <p:spTree>
@@ -21530,212 +22875,6 @@
           <a:p>
             <a:r>
               <a:rPr lang="en-US" dirty="0"/>
-              <a:t>Third Party Code Fixes</a:t>
-            </a:r>
-          </a:p>
-        </p:txBody>
-      </p:sp>
-      <p:sp>
-        <p:nvSpPr>
-          <p:cNvPr id="3" name="Content Placeholder 2"/>
-          <p:cNvSpPr>
-            <a:spLocks noGrp="1"/>
-          </p:cNvSpPr>
-          <p:nvPr>
-            <p:ph sz="half" idx="1"/>
-          </p:nvPr>
-        </p:nvSpPr>
-        <p:spPr>
-          <a:solidFill>
-            <a:schemeClr val="tx1">
-              <a:lumMod val="85000"/>
-            </a:schemeClr>
-          </a:solidFill>
-        </p:spPr>
-        <p:txBody>
-          <a:bodyPr/>
-          <a:lstStyle/>
-          <a:p>
-            <a:r>
-              <a:rPr lang="en-US" dirty="0">
-                <a:hlinkClick r:id="rId2"/>
-              </a:rPr>
-              <a:t>Roslyn Analyzers</a:t>
-            </a:r>
-            <a:endParaRPr lang="en-US" dirty="0">
-              <a:hlinkClick r:id="rId3"/>
-            </a:endParaRPr>
-          </a:p>
-          <a:p>
-            <a:r>
-              <a:rPr lang="en-US" dirty="0">
-                <a:hlinkClick r:id="rId3"/>
-              </a:rPr>
-              <a:t>Code Cracker</a:t>
-            </a:r>
-            <a:endParaRPr lang="en-US" dirty="0"/>
-          </a:p>
-          <a:p>
-            <a:r>
-              <a:rPr lang="en-US" dirty="0" err="1">
-                <a:hlinkClick r:id="rId4"/>
-              </a:rPr>
-              <a:t>DotNetAnalyzers</a:t>
-            </a:r>
-            <a:endParaRPr lang="en-US" dirty="0"/>
-          </a:p>
-          <a:p>
-            <a:pPr lvl="1"/>
-            <a:r>
-              <a:rPr lang="en-US" dirty="0" err="1">
-                <a:hlinkClick r:id="rId5"/>
-              </a:rPr>
-              <a:t>StyleCop</a:t>
-            </a:r>
-            <a:endParaRPr lang="en-US" dirty="0"/>
-          </a:p>
-          <a:p>
-            <a:pPr lvl="1"/>
-            <a:r>
-              <a:rPr lang="en-US" dirty="0" err="1">
-                <a:hlinkClick r:id="rId6"/>
-              </a:rPr>
-              <a:t>AsyncUsageAnalyzers</a:t>
-            </a:r>
-            <a:endParaRPr lang="en-US" dirty="0"/>
-          </a:p>
-          <a:p>
-            <a:pPr lvl="1"/>
-            <a:r>
-              <a:rPr lang="en-US" dirty="0" err="1">
-                <a:hlinkClick r:id="rId7"/>
-              </a:rPr>
-              <a:t>TSqlAnalyzer</a:t>
-            </a:r>
-            <a:endParaRPr lang="en-US" dirty="0"/>
-          </a:p>
-        </p:txBody>
-      </p:sp>
-      <p:sp>
-        <p:nvSpPr>
-          <p:cNvPr id="4" name="Content Placeholder 3"/>
-          <p:cNvSpPr>
-            <a:spLocks noGrp="1"/>
-          </p:cNvSpPr>
-          <p:nvPr>
-            <p:ph sz="half" idx="2"/>
-          </p:nvPr>
-        </p:nvSpPr>
-        <p:spPr>
-          <a:solidFill>
-            <a:schemeClr val="tx1">
-              <a:lumMod val="85000"/>
-            </a:schemeClr>
-          </a:solidFill>
-        </p:spPr>
-        <p:txBody>
-          <a:bodyPr/>
-          <a:lstStyle/>
-          <a:p>
-            <a:r>
-              <a:rPr lang="en-US" dirty="0" err="1">
-                <a:solidFill>
-                  <a:schemeClr val="accent3"/>
-                </a:solidFill>
-              </a:rPr>
-              <a:t>DotNetDoodle</a:t>
-            </a:r>
-            <a:endParaRPr lang="en-US" dirty="0">
-              <a:solidFill>
-                <a:schemeClr val="accent3"/>
-              </a:solidFill>
-            </a:endParaRPr>
-          </a:p>
-          <a:p>
-            <a:r>
-              <a:rPr lang="en-US" dirty="0" err="1">
-                <a:solidFill>
-                  <a:schemeClr val="accent3"/>
-                </a:solidFill>
-              </a:rPr>
-              <a:t>RoslynDiagnostics</a:t>
-            </a:r>
-            <a:endParaRPr lang="en-US" dirty="0">
-              <a:solidFill>
-                <a:schemeClr val="accent3"/>
-              </a:solidFill>
-            </a:endParaRPr>
-          </a:p>
-          <a:p>
-            <a:r>
-              <a:rPr lang="en-US" dirty="0" err="1">
-                <a:hlinkClick r:id="rId8"/>
-              </a:rPr>
-              <a:t>AzureAnalytics</a:t>
-            </a:r>
-            <a:endParaRPr lang="en-US" dirty="0"/>
-          </a:p>
-          <a:p>
-            <a:r>
-              <a:rPr lang="en-US" dirty="0" err="1">
-                <a:hlinkClick r:id="rId9"/>
-              </a:rPr>
-              <a:t>Wintellect.Analyzers</a:t>
-            </a:r>
-            <a:endParaRPr lang="en-US" dirty="0"/>
-          </a:p>
-          <a:p>
-            <a:endParaRPr lang="en-US" dirty="0"/>
-          </a:p>
-        </p:txBody>
-      </p:sp>
-    </p:spTree>
-    <p:extLst>
-      <p:ext uri="{BB962C8B-B14F-4D97-AF65-F5344CB8AC3E}">
-        <p14:creationId xmlns:p14="http://schemas.microsoft.com/office/powerpoint/2010/main" val="2362224569"/>
-      </p:ext>
-    </p:extLst>
-  </p:cSld>
-  <p:clrMapOvr>
-    <a:masterClrMapping/>
-  </p:clrMapOvr>
-</p:sld>
-</file>
-
-<file path=ppt/slides/slide15.xml><?xml version="1.0" encoding="utf-8"?>
-<p:sld xmlns:a="http://schemas.openxmlformats.org/drawingml/2006/main" xmlns:r="http://schemas.openxmlformats.org/officeDocument/2006/relationships" xmlns:p="http://schemas.openxmlformats.org/presentationml/2006/main">
-  <p:cSld>
-    <p:spTree>
-      <p:nvGrpSpPr>
-        <p:cNvPr id="1" name=""/>
-        <p:cNvGrpSpPr/>
-        <p:nvPr/>
-      </p:nvGrpSpPr>
-      <p:grpSpPr>
-        <a:xfrm>
-          <a:off x="0" y="0"/>
-          <a:ext cx="0" cy="0"/>
-          <a:chOff x="0" y="0"/>
-          <a:chExt cx="0" cy="0"/>
-        </a:xfrm>
-      </p:grpSpPr>
-      <p:sp>
-        <p:nvSpPr>
-          <p:cNvPr id="2" name="Title 1"/>
-          <p:cNvSpPr>
-            <a:spLocks noGrp="1"/>
-          </p:cNvSpPr>
-          <p:nvPr>
-            <p:ph type="title"/>
-          </p:nvPr>
-        </p:nvSpPr>
-        <p:spPr/>
-        <p:txBody>
-          <a:bodyPr/>
-          <a:lstStyle/>
-          <a:p>
-            <a:r>
-              <a:rPr lang="en-US" dirty="0"/>
               <a:t>Roslyn Resources</a:t>
             </a:r>
           </a:p>
@@ -21853,7 +22992,7 @@
                   </a:schemeClr>
                 </a:solidFill>
               </a:rPr>
-              <a:t>Code Cracker: </a:t>
+              <a:t>Reference Source: </a:t>
             </a:r>
             <a:r>
               <a:rPr lang="en-US" dirty="0">
@@ -21865,7 +23004,7 @@
                 </a:solidFill>
                 <a:hlinkClick r:id="rId4"/>
               </a:rPr>
-              <a:t>http://code-cracker.github.io/</a:t>
+              <a:t>http://source.roslyn.io/</a:t>
             </a:r>
             <a:r>
               <a:rPr lang="en-US" dirty="0">
@@ -21876,7 +23015,7 @@
                   </a:schemeClr>
                 </a:solidFill>
               </a:rPr>
-              <a:t>  </a:t>
+              <a:t> </a:t>
             </a:r>
           </a:p>
           <a:p>
@@ -21889,7 +23028,7 @@
                   </a:schemeClr>
                 </a:solidFill>
               </a:rPr>
-              <a:t>VB Team Blog: </a:t>
+              <a:t>Code Cracker: </a:t>
             </a:r>
             <a:r>
               <a:rPr lang="en-US" dirty="0">
@@ -21901,18 +23040,8 @@
                 </a:solidFill>
                 <a:hlinkClick r:id="rId5"/>
               </a:rPr>
-              <a:t>http://blogs.msdn.com/b/vbteam/</a:t>
-            </a:r>
-            <a:endParaRPr lang="en-US" dirty="0">
-              <a:solidFill>
-                <a:schemeClr val="bg1">
-                  <a:lumMod val="65000"/>
-                  <a:lumOff val="35000"/>
-                </a:schemeClr>
-              </a:solidFill>
-            </a:endParaRPr>
-          </a:p>
-          <a:p>
+              <a:t>http://code-cracker.github.io/</a:t>
+            </a:r>
             <a:r>
               <a:rPr lang="en-US" dirty="0">
                 <a:solidFill>
@@ -21922,8 +23051,10 @@
                   </a:schemeClr>
                 </a:solidFill>
               </a:rPr>
-              <a:t>LLILC (LLVM for .NET Core): </a:t>
-            </a:r>
+              <a:t>  </a:t>
+            </a:r>
+          </a:p>
+          <a:p>
             <a:r>
               <a:rPr lang="en-US" dirty="0">
                 <a:solidFill>
@@ -21932,9 +23063,8 @@
                     <a:lumOff val="35000"/>
                   </a:schemeClr>
                 </a:solidFill>
-                <a:hlinkClick r:id="rId6"/>
-              </a:rPr>
-              <a:t>https://github.com/dotnet/llilc</a:t>
+              </a:rPr>
+              <a:t>LLILC (LLVM for .NET Core): </a:t>
             </a:r>
             <a:r>
               <a:rPr lang="en-US" dirty="0">
@@ -21944,11 +23074,10 @@
                     <a:lumOff val="35000"/>
                   </a:schemeClr>
                 </a:solidFill>
-              </a:rPr>
-              <a:t> </a:t>
-            </a:r>
-          </a:p>
-          <a:p>
+                <a:hlinkClick r:id="rId6"/>
+              </a:rPr>
+              <a:t>https://github.com/dotnet/llilc</a:t>
+            </a:r>
             <a:r>
               <a:rPr lang="en-US" dirty="0">
                 <a:solidFill>
@@ -21958,8 +23087,10 @@
                   </a:schemeClr>
                 </a:solidFill>
               </a:rPr>
-              <a:t>Roslyn Visualizer: </a:t>
-            </a:r>
+              <a:t> </a:t>
+            </a:r>
+          </a:p>
+          <a:p>
             <a:r>
               <a:rPr lang="en-US" dirty="0">
                 <a:solidFill>
@@ -21968,64 +23099,6 @@
                     <a:lumOff val="35000"/>
                   </a:schemeClr>
                 </a:solidFill>
-                <a:hlinkClick r:id="rId7"/>
-              </a:rPr>
-              <a:t>https://visualstudiogallery.msdn.microsoft.com/32fe332c-51ad-411a-a74c-9fdbc2a03bb7</a:t>
-            </a:r>
-            <a:r>
-              <a:rPr lang="en-US" dirty="0">
-                <a:solidFill>
-                  <a:schemeClr val="bg1">
-                    <a:lumMod val="65000"/>
-                    <a:lumOff val="35000"/>
-                  </a:schemeClr>
-                </a:solidFill>
-              </a:rPr>
-              <a:t> </a:t>
-            </a:r>
-          </a:p>
-          <a:p>
-            <a:r>
-              <a:rPr lang="en-US" dirty="0">
-                <a:solidFill>
-                  <a:schemeClr val="bg1">
-                    <a:lumMod val="65000"/>
-                    <a:lumOff val="35000"/>
-                  </a:schemeClr>
-                </a:solidFill>
-              </a:rPr>
-              <a:t>Roslyn SDK Templates: </a:t>
-            </a:r>
-            <a:r>
-              <a:rPr lang="en-US" dirty="0">
-                <a:solidFill>
-                  <a:schemeClr val="bg1">
-                    <a:lumMod val="65000"/>
-                    <a:lumOff val="35000"/>
-                  </a:schemeClr>
-                </a:solidFill>
-                <a:hlinkClick r:id="rId8"/>
-              </a:rPr>
-              <a:t>https://visualstudiogallery.msdn.microsoft.com/e2e07e91-9d0b-4944-ba40-e86bcbec1599</a:t>
-            </a:r>
-            <a:endParaRPr lang="en-US" dirty="0">
-              <a:solidFill>
-                <a:schemeClr val="bg1">
-                  <a:lumMod val="65000"/>
-                  <a:lumOff val="35000"/>
-                </a:schemeClr>
-              </a:solidFill>
-            </a:endParaRPr>
-          </a:p>
-          <a:p>
-            <a:r>
-              <a:rPr lang="en-US" dirty="0">
-                <a:solidFill>
-                  <a:schemeClr val="bg1">
-                    <a:lumMod val="65000"/>
-                    <a:lumOff val="35000"/>
-                  </a:schemeClr>
-                </a:solidFill>
               </a:rPr>
               <a:t>This presentation</a:t>
             </a:r>
@@ -22038,7 +23111,7 @@
                 <a:solidFill>
                   <a:schemeClr val="tx1"/>
                 </a:solidFill>
-                <a:hlinkClick r:id="rId9"/>
+                <a:hlinkClick r:id="rId7"/>
               </a:rPr>
               <a:t>https://github.com/jwooley/RoslynAndYou</a:t>
             </a:r>
@@ -22069,7 +23142,7 @@
           <p:nvPr/>
         </p:nvPicPr>
         <p:blipFill>
-          <a:blip r:embed="rId10">
+          <a:blip r:embed="rId8">
             <a:extLst>
               <a:ext uri="{28A0092B-C50C-407E-A947-70E740481C1C}">
                 <a14:useLocalDpi xmlns:a14="http://schemas.microsoft.com/office/drawing/2010/main" val="0"/>
@@ -22082,7 +23155,7 @@
         </p:blipFill>
         <p:spPr>
           <a:xfrm>
-            <a:off x="8534400" y="266700"/>
+            <a:off x="9448800" y="1752600"/>
             <a:ext cx="1905000" cy="1905000"/>
           </a:xfrm>
           <a:prstGeom prst="rect">
@@ -22103,7 +23176,7 @@
 </p:sld>
 </file>
 
-<file path=ppt/slides/slide16.xml><?xml version="1.0" encoding="utf-8"?>
+<file path=ppt/slides/slide17.xml><?xml version="1.0" encoding="utf-8"?>
 <p:sld xmlns:a="http://schemas.openxmlformats.org/drawingml/2006/main" xmlns:r="http://schemas.openxmlformats.org/officeDocument/2006/relationships" xmlns:p="http://schemas.openxmlformats.org/presentationml/2006/main">
   <p:cSld>
     <p:spTree>
@@ -22721,9 +23794,12 @@
               <a:rPr lang="en-US" sz="3200" dirty="0" err="1"/>
               <a:t>Refactorings</a:t>
             </a:r>
+            <a:endParaRPr lang="en-US" sz="3200" dirty="0"/>
+          </a:p>
+          <a:p>
             <a:r>
               <a:rPr lang="en-US" sz="3200" dirty="0"/>
-              <a:t>, and Code Fixes</a:t>
+              <a:t>Build a Diagnostic with Code Fix</a:t>
             </a:r>
           </a:p>
         </p:txBody>
@@ -22901,7 +23977,7 @@
           <p:nvPr>
             <p:extLst>
               <p:ext uri="{D42A27DB-BD31-4B8C-83A1-F6EECF244321}">
-                <p14:modId xmlns:p14="http://schemas.microsoft.com/office/powerpoint/2010/main" val="2159639503"/>
+                <p14:modId xmlns:p14="http://schemas.microsoft.com/office/powerpoint/2010/main" val="2661342367"/>
               </p:ext>
             </p:extLst>
           </p:nvPr>
@@ -22916,42 +23992,6 @@
           </a:graphicData>
         </a:graphic>
       </p:graphicFrame>
-      <p:sp>
-        <p:nvSpPr>
-          <p:cNvPr id="3" name="Content Placeholder 2"/>
-          <p:cNvSpPr>
-            <a:spLocks noGrp="1"/>
-          </p:cNvSpPr>
-          <p:nvPr>
-            <p:ph idx="1"/>
-          </p:nvPr>
-        </p:nvSpPr>
-        <p:spPr>
-          <a:xfrm>
-            <a:off x="2590800" y="6276262"/>
-            <a:ext cx="7327084" cy="429339"/>
-          </a:xfrm>
-        </p:spPr>
-        <p:txBody>
-          <a:bodyPr>
-            <a:normAutofit lnSpcReduction="10000"/>
-          </a:bodyPr>
-          <a:lstStyle/>
-          <a:p>
-            <a:pPr marL="0" indent="0">
-              <a:buNone/>
-            </a:pPr>
-            <a:r>
-              <a:rPr lang="en-US" dirty="0"/>
-              <a:t>https://</a:t>
-            </a:r>
-            <a:r>
-              <a:rPr lang="en-US" sz="1600" dirty="0"/>
-              <a:t>github.com/dotnet/roslyn/wiki/Languages-features-in-C%23-6-and-VB-14</a:t>
-            </a:r>
-          </a:p>
-        </p:txBody>
-      </p:sp>
     </p:spTree>
     <p:extLst>
       <p:ext uri="{BB962C8B-B14F-4D97-AF65-F5344CB8AC3E}">
@@ -29027,18 +30067,14 @@
               <a:buNone/>
             </a:pPr>
             <a:r>
-              <a:rPr lang="en-US" dirty="0"/>
-              <a:t>C#7 proposals - </a:t>
-            </a:r>
-            <a:r>
               <a:rPr lang="en-US" dirty="0">
                 <a:hlinkClick r:id="rId2"/>
               </a:rPr>
-              <a:t>https://github.com/dotnet/roslyn/issues/2136</a:t>
+              <a:t>https://blogs.msdn.microsoft.com/dotnet/2016/08/24/whats-new-in-csharp-7-0/</a:t>
             </a:r>
             <a:r>
               <a:rPr lang="en-US" dirty="0"/>
-              <a:t> </a:t>
+              <a:t>  </a:t>
             </a:r>
           </a:p>
           <a:p>
@@ -29057,9 +30093,8 @@
             </a:r>
             <a:r>
               <a:rPr lang="en-US" dirty="0"/>
-              <a:t> </a:t>
-            </a:r>
-            <a:endParaRPr lang="en-US" dirty="0"/>
+              <a:t>  </a:t>
+            </a:r>
           </a:p>
         </p:txBody>
       </p:sp>
@@ -29101,8 +30136,8 @@
         </p:nvSpPr>
         <p:spPr>
           <a:xfrm rot="21291473">
-            <a:off x="6736310" y="1300895"/>
-            <a:ext cx="1874186" cy="923330"/>
+            <a:off x="6735385" y="1280307"/>
+            <a:ext cx="2333600" cy="923330"/>
           </a:xfrm>
           <a:prstGeom prst="rect">
             <a:avLst/>
@@ -29124,7 +30159,7 @@
                 </a:solidFill>
                 <a:latin typeface="Berlin Sans FB" panose="020E0602020502020306" pitchFamily="34" charset="0"/>
               </a:rPr>
-              <a:t>C# 7</a:t>
+              <a:t>C# 7.0</a:t>
             </a:r>
           </a:p>
         </p:txBody>
@@ -32047,85 +33082,6 @@
       </p:grpSpPr>
       <p:sp>
         <p:nvSpPr>
-          <p:cNvPr id="18" name="Flowchart: Internal Storage 17"/>
-          <p:cNvSpPr/>
-          <p:nvPr/>
-        </p:nvSpPr>
-        <p:spPr>
-          <a:xfrm>
-            <a:off x="5687680" y="3485734"/>
-            <a:ext cx="1143000" cy="1552613"/>
-          </a:xfrm>
-          <a:prstGeom prst="flowChartInternalStorage">
-            <a:avLst/>
-          </a:prstGeom>
-        </p:spPr>
-        <p:style>
-          <a:lnRef idx="1">
-            <a:schemeClr val="accent1"/>
-          </a:lnRef>
-          <a:fillRef idx="2">
-            <a:schemeClr val="accent1"/>
-          </a:fillRef>
-          <a:effectRef idx="1">
-            <a:schemeClr val="accent1"/>
-          </a:effectRef>
-          <a:fontRef idx="minor">
-            <a:schemeClr val="dk1"/>
-          </a:fontRef>
-        </p:style>
-        <p:txBody>
-          <a:bodyPr rtlCol="0" anchor="ctr"/>
-          <a:lstStyle/>
-          <a:p>
-            <a:pPr algn="ctr"/>
-            <a:endParaRPr lang="en-US"/>
-          </a:p>
-        </p:txBody>
-      </p:sp>
-      <p:sp>
-        <p:nvSpPr>
-          <p:cNvPr id="7" name="Cube 6"/>
-          <p:cNvSpPr/>
-          <p:nvPr/>
-        </p:nvSpPr>
-        <p:spPr>
-          <a:xfrm>
-            <a:off x="4012406" y="2595959"/>
-            <a:ext cx="3124200" cy="3067844"/>
-          </a:xfrm>
-          <a:prstGeom prst="cube">
-            <a:avLst/>
-          </a:prstGeom>
-        </p:spPr>
-        <p:style>
-          <a:lnRef idx="1">
-            <a:schemeClr val="dk1"/>
-          </a:lnRef>
-          <a:fillRef idx="3">
-            <a:schemeClr val="dk1"/>
-          </a:fillRef>
-          <a:effectRef idx="2">
-            <a:schemeClr val="dk1"/>
-          </a:effectRef>
-          <a:fontRef idx="minor">
-            <a:schemeClr val="lt1"/>
-          </a:fontRef>
-        </p:style>
-        <p:txBody>
-          <a:bodyPr rtlCol="0" anchor="ctr"/>
-          <a:lstStyle/>
-          <a:p>
-            <a:pPr algn="ctr"/>
-            <a:r>
-              <a:rPr lang="en-US" dirty="0"/>
-              <a:t>CSC/VBC</a:t>
-            </a:r>
-          </a:p>
-        </p:txBody>
-      </p:sp>
-      <p:sp>
-        <p:nvSpPr>
           <p:cNvPr id="2" name="Title 1"/>
           <p:cNvSpPr>
             <a:spLocks noGrp="1"/>
@@ -32141,648 +33097,288 @@
           <a:p>
             <a:r>
               <a:rPr lang="en-US" dirty="0"/>
-              <a:t>Opening up the compiler</a:t>
-            </a:r>
+              <a:t>Out of the Box </a:t>
+            </a:r>
+            <a:r>
+              <a:rPr lang="en-US" dirty="0" err="1"/>
+              <a:t>Refactorings</a:t>
+            </a:r>
+            <a:endParaRPr lang="en-US" dirty="0"/>
           </a:p>
         </p:txBody>
       </p:sp>
-      <p:pic>
-        <p:nvPicPr>
-          <p:cNvPr id="4" name="Picture 3"/>
-          <p:cNvPicPr>
-            <a:picLocks noChangeAspect="1"/>
-          </p:cNvPicPr>
+      <p:sp>
+        <p:nvSpPr>
+          <p:cNvPr id="4" name="Text Placeholder 3"/>
+          <p:cNvSpPr>
+            <a:spLocks noGrp="1"/>
+          </p:cNvSpPr>
+          <p:nvPr>
+            <p:ph type="body" idx="1"/>
+          </p:nvPr>
+        </p:nvSpPr>
+        <p:spPr/>
+        <p:txBody>
+          <a:bodyPr/>
+          <a:lstStyle/>
+          <a:p>
+            <a:r>
+              <a:rPr lang="en-US" dirty="0">
+                <a:hlinkClick r:id="rId2"/>
+              </a:rPr>
+              <a:t>Code Fixes</a:t>
+            </a:r>
+            <a:r>
+              <a:rPr lang="en-US" dirty="0"/>
+              <a:t> (30)</a:t>
+            </a:r>
+            <a:endParaRPr lang="en-US" dirty="0">
+              <a:hlinkClick r:id="rId3"/>
+            </a:endParaRPr>
+          </a:p>
+        </p:txBody>
+      </p:sp>
+      <p:sp>
+        <p:nvSpPr>
+          <p:cNvPr id="3" name="Content Placeholder 2"/>
+          <p:cNvSpPr>
+            <a:spLocks noGrp="1"/>
+          </p:cNvSpPr>
+          <p:nvPr>
+            <p:ph sz="half" idx="2"/>
+          </p:nvPr>
+        </p:nvSpPr>
+        <p:spPr/>
+        <p:txBody>
+          <a:bodyPr>
+            <a:normAutofit fontScale="92500" lnSpcReduction="10000"/>
+          </a:bodyPr>
+          <a:lstStyle/>
+          <a:p>
+            <a:r>
+              <a:rPr lang="en-US" dirty="0"/>
+              <a:t>Add  Await</a:t>
+            </a:r>
+          </a:p>
+          <a:p>
+            <a:r>
+              <a:rPr lang="en-US" dirty="0"/>
+              <a:t>Add </a:t>
+            </a:r>
+            <a:r>
+              <a:rPr lang="en-US" dirty="0" err="1"/>
+              <a:t>Async</a:t>
+            </a:r>
+            <a:endParaRPr lang="en-US" dirty="0"/>
+          </a:p>
+          <a:p>
+            <a:r>
+              <a:rPr lang="en-US" dirty="0"/>
+              <a:t>Change Return Type</a:t>
+            </a:r>
+          </a:p>
+          <a:p>
+            <a:r>
+              <a:rPr lang="en-US" dirty="0"/>
+              <a:t>Change To Yield</a:t>
+            </a:r>
+          </a:p>
+          <a:p>
+            <a:r>
+              <a:rPr lang="en-US" dirty="0"/>
+              <a:t>Convert To </a:t>
+            </a:r>
+            <a:r>
+              <a:rPr lang="en-US" dirty="0" err="1"/>
+              <a:t>Async</a:t>
+            </a:r>
+            <a:endParaRPr lang="en-US" dirty="0"/>
+          </a:p>
+          <a:p>
+            <a:r>
+              <a:rPr lang="en-US" dirty="0"/>
+              <a:t>Convert To Iterator</a:t>
+            </a:r>
+          </a:p>
+          <a:p>
+            <a:r>
+              <a:rPr lang="en-US" dirty="0"/>
+              <a:t>Add Missing Reference</a:t>
+            </a:r>
+          </a:p>
+          <a:p>
+            <a:r>
+              <a:rPr lang="en-US" dirty="0"/>
+              <a:t>Add Using</a:t>
+            </a:r>
+          </a:p>
+          <a:p>
+            <a:r>
+              <a:rPr lang="en-US" dirty="0"/>
+              <a:t>Fully Qualify</a:t>
+            </a:r>
+          </a:p>
+          <a:p>
+            <a:r>
+              <a:rPr lang="en-US" dirty="0"/>
+              <a:t>Generate Method</a:t>
+            </a:r>
+          </a:p>
+        </p:txBody>
+      </p:sp>
+      <p:sp>
+        <p:nvSpPr>
+          <p:cNvPr id="5" name="Text Placeholder 4"/>
+          <p:cNvSpPr>
+            <a:spLocks noGrp="1"/>
+          </p:cNvSpPr>
+          <p:nvPr>
+            <p:ph type="body" sz="quarter" idx="3"/>
+          </p:nvPr>
+        </p:nvSpPr>
+        <p:spPr/>
+        <p:txBody>
+          <a:bodyPr/>
+          <a:lstStyle/>
+          <a:p>
+            <a:r>
+              <a:rPr lang="en-US" dirty="0" err="1">
+                <a:hlinkClick r:id="rId3"/>
+              </a:rPr>
+              <a:t>Refactorings</a:t>
+            </a:r>
+            <a:r>
+              <a:rPr lang="en-US" dirty="0"/>
+              <a:t> (13)</a:t>
+            </a:r>
+          </a:p>
+        </p:txBody>
+      </p:sp>
+      <p:sp>
+        <p:nvSpPr>
+          <p:cNvPr id="6" name="Content Placeholder 5"/>
+          <p:cNvSpPr>
+            <a:spLocks noGrp="1"/>
+          </p:cNvSpPr>
+          <p:nvPr>
+            <p:ph sz="quarter" idx="4"/>
+          </p:nvPr>
+        </p:nvSpPr>
+        <p:spPr/>
+        <p:txBody>
+          <a:bodyPr>
+            <a:normAutofit fontScale="92500" lnSpcReduction="20000"/>
+          </a:bodyPr>
+          <a:lstStyle/>
+          <a:p>
+            <a:r>
+              <a:rPr lang="en-US" dirty="0"/>
+              <a:t>Add Constructor Parameters from members</a:t>
+            </a:r>
+          </a:p>
+          <a:p>
+            <a:r>
+              <a:rPr lang="en-US" dirty="0"/>
+              <a:t>Change Signature</a:t>
+            </a:r>
+          </a:p>
+          <a:p>
+            <a:r>
+              <a:rPr lang="en-US" dirty="0"/>
+              <a:t>Encapsulate Field</a:t>
+            </a:r>
+          </a:p>
+          <a:p>
+            <a:r>
+              <a:rPr lang="en-US" dirty="0"/>
+              <a:t>Extract Interface</a:t>
+            </a:r>
+          </a:p>
+          <a:p>
+            <a:r>
+              <a:rPr lang="en-US" dirty="0"/>
+              <a:t>Extract Method</a:t>
+            </a:r>
+          </a:p>
+          <a:p>
+            <a:r>
+              <a:rPr lang="en-US" dirty="0"/>
+              <a:t>Generate Constructor from members</a:t>
+            </a:r>
+          </a:p>
+          <a:p>
+            <a:r>
+              <a:rPr lang="en-US" dirty="0"/>
+              <a:t>Generate default constructors</a:t>
+            </a:r>
+          </a:p>
+          <a:p>
+            <a:r>
+              <a:rPr lang="en-US" dirty="0"/>
+              <a:t>Inline temporary</a:t>
+            </a:r>
+          </a:p>
+          <a:p>
+            <a:r>
+              <a:rPr lang="en-US" dirty="0"/>
+              <a:t>Introduce Variable</a:t>
+            </a:r>
+          </a:p>
+          <a:p>
+            <a:r>
+              <a:rPr lang="en-US" dirty="0"/>
+              <a:t>Invert If</a:t>
+            </a:r>
+          </a:p>
+          <a:p>
+            <a:r>
+              <a:rPr lang="en-US" dirty="0"/>
+              <a:t>Simplify Lambda</a:t>
+            </a:r>
+          </a:p>
+        </p:txBody>
+      </p:sp>
+      <p:sp>
+        <p:nvSpPr>
+          <p:cNvPr id="7" name="TextBox 6"/>
+          <p:cNvSpPr txBox="1"/>
           <p:nvPr/>
-        </p:nvPicPr>
-        <p:blipFill>
-          <a:blip r:embed="rId2"/>
-          <a:stretch>
-            <a:fillRect/>
-          </a:stretch>
-        </p:blipFill>
+        </p:nvSpPr>
         <p:spPr>
           <a:xfrm>
-            <a:off x="1981201" y="2133601"/>
-            <a:ext cx="447675" cy="2600325"/>
+            <a:off x="3769577" y="6126164"/>
+            <a:ext cx="4651260" cy="461665"/>
           </a:xfrm>
           <a:prstGeom prst="rect">
             <a:avLst/>
           </a:prstGeom>
+          <a:noFill/>
         </p:spPr>
-      </p:pic>
-      <p:pic>
-        <p:nvPicPr>
-          <p:cNvPr id="5" name="Picture 4"/>
-          <p:cNvPicPr>
-            <a:picLocks noChangeAspect="1"/>
-          </p:cNvPicPr>
-          <p:nvPr/>
-        </p:nvPicPr>
-        <p:blipFill>
-          <a:blip r:embed="rId2"/>
-          <a:stretch>
-            <a:fillRect/>
-          </a:stretch>
-        </p:blipFill>
-        <p:spPr>
-          <a:xfrm>
-            <a:off x="2243138" y="2829720"/>
-            <a:ext cx="447675" cy="2600325"/>
-          </a:xfrm>
-          <a:prstGeom prst="rect">
-            <a:avLst/>
-          </a:prstGeom>
-        </p:spPr>
-      </p:pic>
-      <p:pic>
-        <p:nvPicPr>
-          <p:cNvPr id="6" name="Picture 5"/>
-          <p:cNvPicPr>
-            <a:picLocks noChangeAspect="1"/>
-          </p:cNvPicPr>
-          <p:nvPr/>
-        </p:nvPicPr>
-        <p:blipFill>
-          <a:blip r:embed="rId2"/>
-          <a:stretch>
-            <a:fillRect/>
-          </a:stretch>
-        </p:blipFill>
-        <p:spPr>
-          <a:xfrm>
-            <a:off x="2466975" y="3372644"/>
-            <a:ext cx="447675" cy="2600325"/>
-          </a:xfrm>
-          <a:prstGeom prst="rect">
-            <a:avLst/>
-          </a:prstGeom>
-        </p:spPr>
-      </p:pic>
-      <p:sp>
-        <p:nvSpPr>
-          <p:cNvPr id="9" name="Flowchart: Multidocument 8"/>
-          <p:cNvSpPr/>
-          <p:nvPr/>
-        </p:nvSpPr>
-        <p:spPr>
-          <a:xfrm>
-            <a:off x="8458200" y="3154364"/>
-            <a:ext cx="1981200" cy="2275681"/>
-          </a:xfrm>
-          <a:prstGeom prst="flowChartMultidocument">
-            <a:avLst/>
-          </a:prstGeom>
-        </p:spPr>
-        <p:style>
-          <a:lnRef idx="1">
-            <a:schemeClr val="accent1"/>
-          </a:lnRef>
-          <a:fillRef idx="2">
-            <a:schemeClr val="accent1"/>
-          </a:fillRef>
-          <a:effectRef idx="1">
-            <a:schemeClr val="accent1"/>
-          </a:effectRef>
-          <a:fontRef idx="minor">
-            <a:schemeClr val="dk1"/>
-          </a:fontRef>
-        </p:style>
         <p:txBody>
-          <a:bodyPr rtlCol="0" anchor="ctr"/>
+          <a:bodyPr wrap="square" rtlCol="0">
+            <a:spAutoFit/>
+          </a:bodyPr>
           <a:lstStyle/>
           <a:p>
-            <a:pPr algn="ctr"/>
-            <a:r>
-              <a:rPr lang="en-US" sz="3200" dirty="0"/>
-              <a:t>IL</a:t>
-            </a:r>
-          </a:p>
-        </p:txBody>
-      </p:sp>
-      <p:sp>
-        <p:nvSpPr>
-          <p:cNvPr id="10" name="Right Arrow 9"/>
-          <p:cNvSpPr/>
-          <p:nvPr/>
-        </p:nvSpPr>
-        <p:spPr>
-          <a:xfrm>
-            <a:off x="3017043" y="4152901"/>
-            <a:ext cx="888206" cy="542924"/>
-          </a:xfrm>
-          <a:prstGeom prst="rightArrow">
-            <a:avLst/>
-          </a:prstGeom>
-        </p:spPr>
-        <p:style>
-          <a:lnRef idx="2">
-            <a:schemeClr val="accent1">
-              <a:shade val="50000"/>
-            </a:schemeClr>
-          </a:lnRef>
-          <a:fillRef idx="1">
-            <a:schemeClr val="accent1"/>
-          </a:fillRef>
-          <a:effectRef idx="0">
-            <a:schemeClr val="accent1"/>
-          </a:effectRef>
-          <a:fontRef idx="minor">
-            <a:schemeClr val="lt1"/>
-          </a:fontRef>
-        </p:style>
-        <p:txBody>
-          <a:bodyPr rtlCol="0" anchor="ctr"/>
-          <a:lstStyle/>
-          <a:p>
-            <a:pPr algn="ctr"/>
-            <a:endParaRPr lang="en-US"/>
-          </a:p>
-        </p:txBody>
-      </p:sp>
-      <p:sp>
-        <p:nvSpPr>
-          <p:cNvPr id="11" name="Right Arrow 10"/>
-          <p:cNvSpPr/>
-          <p:nvPr/>
-        </p:nvSpPr>
-        <p:spPr>
-          <a:xfrm>
-            <a:off x="7345986" y="4201207"/>
-            <a:ext cx="888206" cy="542924"/>
-          </a:xfrm>
-          <a:prstGeom prst="rightArrow">
-            <a:avLst/>
-          </a:prstGeom>
-        </p:spPr>
-        <p:style>
-          <a:lnRef idx="2">
-            <a:schemeClr val="accent1">
-              <a:shade val="50000"/>
-            </a:schemeClr>
-          </a:lnRef>
-          <a:fillRef idx="1">
-            <a:schemeClr val="accent1"/>
-          </a:fillRef>
-          <a:effectRef idx="0">
-            <a:schemeClr val="accent1"/>
-          </a:effectRef>
-          <a:fontRef idx="minor">
-            <a:schemeClr val="lt1"/>
-          </a:fontRef>
-        </p:style>
-        <p:txBody>
-          <a:bodyPr rtlCol="0" anchor="ctr"/>
-          <a:lstStyle/>
-          <a:p>
-            <a:pPr algn="ctr"/>
-            <a:endParaRPr lang="en-US"/>
-          </a:p>
-        </p:txBody>
-      </p:sp>
-      <p:sp>
-        <p:nvSpPr>
-          <p:cNvPr id="12" name="Parallelogram 11"/>
-          <p:cNvSpPr/>
-          <p:nvPr/>
-        </p:nvSpPr>
-        <p:spPr>
-          <a:xfrm rot="1920874">
-            <a:off x="2722231" y="2013385"/>
-            <a:ext cx="1959525" cy="1044864"/>
-          </a:xfrm>
-          <a:prstGeom prst="parallelogram">
-            <a:avLst>
-              <a:gd name="adj" fmla="val 21631"/>
-            </a:avLst>
-          </a:prstGeom>
-        </p:spPr>
-        <p:style>
-          <a:lnRef idx="1">
-            <a:schemeClr val="dk1"/>
-          </a:lnRef>
-          <a:fillRef idx="2">
-            <a:schemeClr val="dk1"/>
-          </a:fillRef>
-          <a:effectRef idx="1">
-            <a:schemeClr val="dk1"/>
-          </a:effectRef>
-          <a:fontRef idx="minor">
-            <a:schemeClr val="dk1"/>
-          </a:fontRef>
-        </p:style>
-        <p:txBody>
-          <a:bodyPr rtlCol="0" anchor="ctr"/>
-          <a:lstStyle/>
-          <a:p>
-            <a:pPr algn="ctr"/>
-            <a:endParaRPr lang="en-US"/>
-          </a:p>
-        </p:txBody>
-      </p:sp>
-      <p:sp>
-        <p:nvSpPr>
-          <p:cNvPr id="16" name="Explosion 1 15"/>
-          <p:cNvSpPr/>
-          <p:nvPr/>
-        </p:nvSpPr>
-        <p:spPr>
-          <a:xfrm>
-            <a:off x="5211588" y="2039107"/>
-            <a:ext cx="1438694" cy="1666081"/>
-          </a:xfrm>
-          <a:prstGeom prst="irregularSeal1">
-            <a:avLst/>
-          </a:prstGeom>
-        </p:spPr>
-        <p:style>
-          <a:lnRef idx="0">
-            <a:schemeClr val="accent3"/>
-          </a:lnRef>
-          <a:fillRef idx="3">
-            <a:schemeClr val="accent3"/>
-          </a:fillRef>
-          <a:effectRef idx="3">
-            <a:schemeClr val="accent3"/>
-          </a:effectRef>
-          <a:fontRef idx="minor">
-            <a:schemeClr val="lt1"/>
-          </a:fontRef>
-        </p:style>
-        <p:txBody>
-          <a:bodyPr rtlCol="0" anchor="ctr"/>
-          <a:lstStyle/>
-          <a:p>
-            <a:pPr algn="ctr"/>
-            <a:r>
-              <a:rPr lang="en-US" dirty="0"/>
-              <a:t>AST</a:t>
-            </a:r>
-          </a:p>
-        </p:txBody>
-      </p:sp>
-      <p:sp>
-        <p:nvSpPr>
-          <p:cNvPr id="17" name="Explosion 1 16"/>
-          <p:cNvSpPr/>
-          <p:nvPr/>
-        </p:nvSpPr>
-        <p:spPr>
-          <a:xfrm>
-            <a:off x="3997961" y="1251657"/>
-            <a:ext cx="1438694" cy="1666081"/>
-          </a:xfrm>
-          <a:prstGeom prst="irregularSeal1">
-            <a:avLst/>
-          </a:prstGeom>
-        </p:spPr>
-        <p:style>
-          <a:lnRef idx="0">
-            <a:schemeClr val="accent4"/>
-          </a:lnRef>
-          <a:fillRef idx="3">
-            <a:schemeClr val="accent4"/>
-          </a:fillRef>
-          <a:effectRef idx="3">
-            <a:schemeClr val="accent4"/>
-          </a:effectRef>
-          <a:fontRef idx="minor">
-            <a:schemeClr val="lt1"/>
-          </a:fontRef>
-        </p:style>
-        <p:txBody>
-          <a:bodyPr rtlCol="0" anchor="ctr"/>
-          <a:lstStyle/>
-          <a:p>
-            <a:pPr algn="ctr"/>
-            <a:r>
-              <a:rPr lang="en-US" dirty="0"/>
-              <a:t>AST</a:t>
-            </a:r>
-          </a:p>
-        </p:txBody>
-      </p:sp>
-      <p:sp>
-        <p:nvSpPr>
-          <p:cNvPr id="14" name="Explosion 1 13"/>
-          <p:cNvSpPr/>
-          <p:nvPr/>
-        </p:nvSpPr>
-        <p:spPr>
-          <a:xfrm>
-            <a:off x="6163957" y="1290639"/>
-            <a:ext cx="1438694" cy="1666081"/>
-          </a:xfrm>
-          <a:prstGeom prst="irregularSeal1">
-            <a:avLst/>
-          </a:prstGeom>
-        </p:spPr>
-        <p:style>
-          <a:lnRef idx="0">
-            <a:schemeClr val="accent6"/>
-          </a:lnRef>
-          <a:fillRef idx="3">
-            <a:schemeClr val="accent6"/>
-          </a:fillRef>
-          <a:effectRef idx="3">
-            <a:schemeClr val="accent6"/>
-          </a:effectRef>
-          <a:fontRef idx="minor">
-            <a:schemeClr val="lt1"/>
-          </a:fontRef>
-        </p:style>
-        <p:txBody>
-          <a:bodyPr rtlCol="0" anchor="ctr"/>
-          <a:lstStyle/>
-          <a:p>
-            <a:pPr algn="ctr"/>
-            <a:r>
-              <a:rPr lang="en-US" dirty="0"/>
-              <a:t>AST</a:t>
-            </a:r>
+            <a:pPr algn="l"/>
+            <a:r>
+              <a:rPr lang="en-US" sz="2400" dirty="0" err="1"/>
+              <a:t>Microsoft.CodeAnalysis.Internal.Log</a:t>
+            </a:r>
+            <a:endParaRPr lang="en-US" sz="2400" dirty="0"/>
           </a:p>
         </p:txBody>
       </p:sp>
     </p:spTree>
     <p:extLst>
       <p:ext uri="{BB962C8B-B14F-4D97-AF65-F5344CB8AC3E}">
-        <p14:creationId xmlns:p14="http://schemas.microsoft.com/office/powerpoint/2010/main" val="3622419004"/>
+        <p14:creationId xmlns:p14="http://schemas.microsoft.com/office/powerpoint/2010/main" val="1527053908"/>
       </p:ext>
     </p:extLst>
   </p:cSld>
   <p:clrMapOvr>
     <a:masterClrMapping/>
   </p:clrMapOvr>
-  <p:timing>
-    <p:tnLst>
-      <p:par>
-        <p:cTn id="1" dur="indefinite" restart="never" nodeType="tmRoot">
-          <p:childTnLst>
-            <p:seq concurrent="1" nextAc="seek">
-              <p:cTn id="2" dur="indefinite" nodeType="mainSeq">
-                <p:childTnLst>
-                  <p:par>
-                    <p:cTn id="3" fill="hold">
-                      <p:stCondLst>
-                        <p:cond delay="indefinite"/>
-                      </p:stCondLst>
-                      <p:childTnLst>
-                        <p:par>
-                          <p:cTn id="4" fill="hold">
-                            <p:stCondLst>
-                              <p:cond delay="0"/>
-                            </p:stCondLst>
-                            <p:childTnLst>
-                              <p:par>
-                                <p:cTn id="5" presetID="10" presetClass="entr" presetSubtype="0" fill="hold" grpId="0" nodeType="clickEffect">
-                                  <p:stCondLst>
-                                    <p:cond delay="0"/>
-                                  </p:stCondLst>
-                                  <p:childTnLst>
-                                    <p:set>
-                                      <p:cBhvr>
-                                        <p:cTn id="6" dur="1" fill="hold">
-                                          <p:stCondLst>
-                                            <p:cond delay="0"/>
-                                          </p:stCondLst>
-                                        </p:cTn>
-                                        <p:tgtEl>
-                                          <p:spTgt spid="12"/>
-                                        </p:tgtEl>
-                                        <p:attrNameLst>
-                                          <p:attrName>style.visibility</p:attrName>
-                                        </p:attrNameLst>
-                                      </p:cBhvr>
-                                      <p:to>
-                                        <p:strVal val="visible"/>
-                                      </p:to>
-                                    </p:set>
-                                    <p:animEffect transition="in" filter="fade">
-                                      <p:cBhvr>
-                                        <p:cTn id="7" dur="500"/>
-                                        <p:tgtEl>
-                                          <p:spTgt spid="12"/>
-                                        </p:tgtEl>
-                                      </p:cBhvr>
-                                    </p:animEffect>
-                                  </p:childTnLst>
-                                </p:cTn>
-                              </p:par>
-                            </p:childTnLst>
-                          </p:cTn>
-                        </p:par>
-                      </p:childTnLst>
-                    </p:cTn>
-                  </p:par>
-                  <p:par>
-                    <p:cTn id="8" fill="hold">
-                      <p:stCondLst>
-                        <p:cond delay="indefinite"/>
-                      </p:stCondLst>
-                      <p:childTnLst>
-                        <p:par>
-                          <p:cTn id="9" fill="hold">
-                            <p:stCondLst>
-                              <p:cond delay="0"/>
-                            </p:stCondLst>
-                            <p:childTnLst>
-                              <p:par>
-                                <p:cTn id="10" presetID="10" presetClass="entr" presetSubtype="0" fill="hold" grpId="0" nodeType="clickEffect">
-                                  <p:stCondLst>
-                                    <p:cond delay="0"/>
-                                  </p:stCondLst>
-                                  <p:childTnLst>
-                                    <p:set>
-                                      <p:cBhvr>
-                                        <p:cTn id="11" dur="1" fill="hold">
-                                          <p:stCondLst>
-                                            <p:cond delay="0"/>
-                                          </p:stCondLst>
-                                        </p:cTn>
-                                        <p:tgtEl>
-                                          <p:spTgt spid="17"/>
-                                        </p:tgtEl>
-                                        <p:attrNameLst>
-                                          <p:attrName>style.visibility</p:attrName>
-                                        </p:attrNameLst>
-                                      </p:cBhvr>
-                                      <p:to>
-                                        <p:strVal val="visible"/>
-                                      </p:to>
-                                    </p:set>
-                                    <p:animEffect transition="in" filter="fade">
-                                      <p:cBhvr>
-                                        <p:cTn id="12" dur="500"/>
-                                        <p:tgtEl>
-                                          <p:spTgt spid="17"/>
-                                        </p:tgtEl>
-                                      </p:cBhvr>
-                                    </p:animEffect>
-                                  </p:childTnLst>
-                                </p:cTn>
-                              </p:par>
-                            </p:childTnLst>
-                          </p:cTn>
-                        </p:par>
-                        <p:par>
-                          <p:cTn id="13" fill="hold">
-                            <p:stCondLst>
-                              <p:cond delay="500"/>
-                            </p:stCondLst>
-                            <p:childTnLst>
-                              <p:par>
-                                <p:cTn id="14" presetID="10" presetClass="entr" presetSubtype="0" fill="hold" grpId="0" nodeType="afterEffect">
-                                  <p:stCondLst>
-                                    <p:cond delay="0"/>
-                                  </p:stCondLst>
-                                  <p:childTnLst>
-                                    <p:set>
-                                      <p:cBhvr>
-                                        <p:cTn id="15" dur="1" fill="hold">
-                                          <p:stCondLst>
-                                            <p:cond delay="0"/>
-                                          </p:stCondLst>
-                                        </p:cTn>
-                                        <p:tgtEl>
-                                          <p:spTgt spid="16"/>
-                                        </p:tgtEl>
-                                        <p:attrNameLst>
-                                          <p:attrName>style.visibility</p:attrName>
-                                        </p:attrNameLst>
-                                      </p:cBhvr>
-                                      <p:to>
-                                        <p:strVal val="visible"/>
-                                      </p:to>
-                                    </p:set>
-                                    <p:animEffect transition="in" filter="fade">
-                                      <p:cBhvr>
-                                        <p:cTn id="16" dur="500"/>
-                                        <p:tgtEl>
-                                          <p:spTgt spid="16"/>
-                                        </p:tgtEl>
-                                      </p:cBhvr>
-                                    </p:animEffect>
-                                  </p:childTnLst>
-                                </p:cTn>
-                              </p:par>
-                            </p:childTnLst>
-                          </p:cTn>
-                        </p:par>
-                        <p:par>
-                          <p:cTn id="17" fill="hold">
-                            <p:stCondLst>
-                              <p:cond delay="1000"/>
-                            </p:stCondLst>
-                            <p:childTnLst>
-                              <p:par>
-                                <p:cTn id="18" presetID="10" presetClass="entr" presetSubtype="0" fill="hold" grpId="0" nodeType="afterEffect">
-                                  <p:stCondLst>
-                                    <p:cond delay="0"/>
-                                  </p:stCondLst>
-                                  <p:childTnLst>
-                                    <p:set>
-                                      <p:cBhvr>
-                                        <p:cTn id="19" dur="1" fill="hold">
-                                          <p:stCondLst>
-                                            <p:cond delay="0"/>
-                                          </p:stCondLst>
-                                        </p:cTn>
-                                        <p:tgtEl>
-                                          <p:spTgt spid="14"/>
-                                        </p:tgtEl>
-                                        <p:attrNameLst>
-                                          <p:attrName>style.visibility</p:attrName>
-                                        </p:attrNameLst>
-                                      </p:cBhvr>
-                                      <p:to>
-                                        <p:strVal val="visible"/>
-                                      </p:to>
-                                    </p:set>
-                                    <p:animEffect transition="in" filter="fade">
-                                      <p:cBhvr>
-                                        <p:cTn id="20" dur="500"/>
-                                        <p:tgtEl>
-                                          <p:spTgt spid="14"/>
-                                        </p:tgtEl>
-                                      </p:cBhvr>
-                                    </p:animEffect>
-                                  </p:childTnLst>
-                                </p:cTn>
-                              </p:par>
-                            </p:childTnLst>
-                          </p:cTn>
-                        </p:par>
-                      </p:childTnLst>
-                    </p:cTn>
-                  </p:par>
-                  <p:par>
-                    <p:cTn id="21" fill="hold">
-                      <p:stCondLst>
-                        <p:cond delay="indefinite"/>
-                      </p:stCondLst>
-                      <p:childTnLst>
-                        <p:par>
-                          <p:cTn id="22" fill="hold">
-                            <p:stCondLst>
-                              <p:cond delay="0"/>
-                            </p:stCondLst>
-                            <p:childTnLst>
-                              <p:par>
-                                <p:cTn id="23" presetID="42" presetClass="path" presetSubtype="0" accel="50000" decel="50000" fill="hold" grpId="0" nodeType="clickEffect">
-                                  <p:stCondLst>
-                                    <p:cond delay="0"/>
-                                  </p:stCondLst>
-                                  <p:childTnLst>
-                                    <p:animMotion origin="layout" path="M -0.01041 0.00926 L 0.16545 0.00926 " pathEditMode="relative" rAng="0" ptsTypes="AA">
-                                      <p:cBhvr>
-                                        <p:cTn id="24" dur="1000" fill="hold"/>
-                                        <p:tgtEl>
-                                          <p:spTgt spid="18"/>
-                                        </p:tgtEl>
-                                        <p:attrNameLst>
-                                          <p:attrName>ppt_x</p:attrName>
-                                          <p:attrName>ppt_y</p:attrName>
-                                        </p:attrNameLst>
-                                      </p:cBhvr>
-                                      <p:rCtr x="8785" y="0"/>
-                                    </p:animMotion>
-                                  </p:childTnLst>
-                                </p:cTn>
-                              </p:par>
-                            </p:childTnLst>
-                          </p:cTn>
-                        </p:par>
-                      </p:childTnLst>
-                    </p:cTn>
-                  </p:par>
-                </p:childTnLst>
-              </p:cTn>
-              <p:prevCondLst>
-                <p:cond evt="onPrev" delay="0">
-                  <p:tgtEl>
-                    <p:sldTgt/>
-                  </p:tgtEl>
-                </p:cond>
-              </p:prevCondLst>
-              <p:nextCondLst>
-                <p:cond evt="onNext" delay="0">
-                  <p:tgtEl>
-                    <p:sldTgt/>
-                  </p:tgtEl>
-                </p:cond>
-              </p:nextCondLst>
-            </p:seq>
-          </p:childTnLst>
-        </p:cTn>
-      </p:par>
-    </p:tnLst>
-    <p:bldLst>
-      <p:bldP spid="18" grpId="0" animBg="1"/>
-      <p:bldP spid="12" grpId="0" animBg="1"/>
-      <p:bldP spid="16" grpId="0" animBg="1"/>
-      <p:bldP spid="17" grpId="0" animBg="1"/>
-      <p:bldP spid="14" grpId="0" animBg="1"/>
-    </p:bldLst>
-  </p:timing>
 </p:sld>
 </file>
 

</xml_diff>